<commit_message>
abap on hana training
</commit_message>
<xml_diff>
--- a/Whiteboard.pptx
+++ b/Whiteboard.pptx
@@ -114,6 +114,11 @@
       </a:defRPr>
     </a:lvl9pPr>
   </p:defaultTextStyle>
+  <p:extLst>
+    <p:ext uri="{EFAFB233-063F-42B5-8137-9DF3F51BA10A}">
+      <p15:sldGuideLst xmlns:p15="http://schemas.microsoft.com/office/powerpoint/2012/main"/>
+    </p:ext>
+  </p:extLst>
 </p:presentation>
 </file>
 
@@ -319,6 +324,104 @@
   </inkml:definitions>
   <inkml:trace contextRef="#ctx0" brushRef="#br0">268 269 0,'-48'-48'15,"48"23"-15,0 1 16,0 0-16,0 0 16,24 24-16,-24-24 0,24 24 15,0 0-15,1 0 16,-1 24-16,0-24 15,-24 24-15,0 0 0,0 0 16,0 1-16,-24-1 16,0 0-16,-1 0 0,-23-24 15,0 24-15,23-24 0,-23 0 16,0 0-16,23 0 16,1-24-16,0 0 0,24 0 15,0-25-15,24 25 16,0-24-16,25 24 0,-1-25 15,1 25-15,23 0 0,-23 24 16,23 0-16,-24 24 16,25 24-16,-49 1 0,0 23 15,1 1-15,-25 0 16,-25 23-16,1-23 0,0-1 16,-24 1-16,23-25 0,-23 1 15,24-25-15,-24-24 16,23 0-16,1 0 0,0 0 15,24-24-15,0-25 16,0 25-16,24 0 16,0-24-16,1 23 0,23 1 15,-24 0-15,24 24 16,1 0-16,-1 0 0,1 0 16,-25 24-16,24 0 15,-24 25-15,25-25 0,-25 0 16</inkml:trace>
   <inkml:trace contextRef="#ctx0" brushRef="#br0" timeOffset="155">945 535 0,'25'-24'16,"-25"0"-16,24-1 15,-24 1 1,0 48 15</inkml:trace>
+</inkml:ink>
+</file>
+
+<file path=ppt/ink/ink100.xml><?xml version="1.0" encoding="utf-8"?>
+<inkml:ink xmlns:inkml="http://www.w3.org/2003/InkML">
+  <inkml:definitions>
+    <inkml:context xml:id="ctx0">
+      <inkml:inkSource xml:id="inkSrc0">
+        <inkml:traceFormat>
+          <inkml:channel name="X" type="integer" max="1920" units="cm"/>
+          <inkml:channel name="Y" type="integer" max="1080" units="cm"/>
+          <inkml:channel name="T" type="integer" max="2.14748E9" units="dev"/>
+        </inkml:traceFormat>
+        <inkml:channelProperties>
+          <inkml:channelProperty channel="X" name="resolution" value="55.81395" units="1/cm"/>
+          <inkml:channelProperty channel="Y" name="resolution" value="55.6701" units="1/cm"/>
+          <inkml:channelProperty channel="T" name="resolution" value="1" units="1/dev"/>
+        </inkml:channelProperties>
+      </inkml:inkSource>
+      <inkml:timestamp xml:id="ts0" timeString="2022-02-21T14:55:15.902"/>
+    </inkml:context>
+    <inkml:brush xml:id="br0">
+      <inkml:brushProperty name="width" value="0.05" units="cm"/>
+      <inkml:brushProperty name="height" value="0.05" units="cm"/>
+      <inkml:brushProperty name="fitToCurve" value="1"/>
+    </inkml:brush>
+  </inkml:definitions>
+  <inkml:trace contextRef="#ctx0" brushRef="#br0">172 74 0,'0'-25'16,"0"1"0,25-1-16,0 50 31,-25-1-31,0 26 16,24 24-16,-24-25 0,0 49 15,25-24-15,-25 0 16,25 25-16,-1-25 15,-24 0-15,0 0 0,25 0 0,-25-25 16,0 1-16,0-26 16,-25 26-16</inkml:trace>
+  <inkml:trace contextRef="#ctx0" brushRef="#br0" timeOffset="372">0 838 0,'24'25'31,"1"0"-31,0-25 16,-1 24-16,1 1 16,24 0-16,1-1 0,-1-24 15,25 25-15,-25-25 0,25 0 16,-24 0-16,-1 0 15,50 0-15,-50 0 16,0-25-16,-24 25 0,-1-24 16,1-1-16,0 0 15,-1 1-15,1-1 0,-25 0 16,0 1-16,0-1 0,0 0 16,-25 25-1,1 25-15,-1 0 16,0-1-16,1 26 15,-25-1-15,24 0 0,-24 1 16,24-1-16,-24 25 0,-1-25 16</inkml:trace>
+</inkml:ink>
+</file>
+
+<file path=ppt/ink/ink101.xml><?xml version="1.0" encoding="utf-8"?>
+<inkml:ink xmlns:inkml="http://www.w3.org/2003/InkML">
+  <inkml:definitions>
+    <inkml:context xml:id="ctx0">
+      <inkml:inkSource xml:id="inkSrc0">
+        <inkml:traceFormat>
+          <inkml:channel name="X" type="integer" max="1920" units="cm"/>
+          <inkml:channel name="Y" type="integer" max="1080" units="cm"/>
+          <inkml:channel name="T" type="integer" max="2.14748E9" units="dev"/>
+        </inkml:traceFormat>
+        <inkml:channelProperties>
+          <inkml:channelProperty channel="X" name="resolution" value="55.81395" units="1/cm"/>
+          <inkml:channelProperty channel="Y" name="resolution" value="55.6701" units="1/cm"/>
+          <inkml:channelProperty channel="T" name="resolution" value="1" units="1/dev"/>
+        </inkml:channelProperties>
+      </inkml:inkSource>
+      <inkml:timestamp xml:id="ts0" timeString="2022-02-21T14:55:16.941"/>
+    </inkml:context>
+    <inkml:brush xml:id="br0">
+      <inkml:brushProperty name="width" value="0.05" units="cm"/>
+      <inkml:brushProperty name="height" value="0.05" units="cm"/>
+      <inkml:brushProperty name="fitToCurve" value="1"/>
+    </inkml:brush>
+  </inkml:definitions>
+  <inkml:trace contextRef="#ctx0" brushRef="#br0">74 641 0,'-25'0'0,"0"-25"0,1 25 15,24 25 17,0 0-32,24-1 0,-24 26 15,25-1-15,-25 0 16,25 25-16,-25-24 0,24-1 16,-24 0-16,0 1 0,25-1 15,-25-24-15,0-1 16,0 1-16,0-50 31,-25-49-31,25 25 16,-24-50-16,24 25 0,0-49 15,0 24-15,0-24 16,0 24-16,24-24 0,26 24 16,-26 25-16,26 25 15,-1 0-15,25 24 0,-25 25 16,25 25-16,-25-1 0,1 1 15,48 74 1,-73-50-16,-25 25 0,0-25 16,-25 25-16,-24-24 0,0-1 15,-1 25-15,1-49 16,-25 24-16,25-24 0,0 24 16,-1-49-16,26 25 15,-1-25-15,50 0 31,-1 0-31,26 24 0,-26-24 16,26 25-16,-1 0 0,0-1 16,0 1-16,1 24 15,-26-24-15,26 0 0,-1 24 16,-24-24-16,24-1 16</inkml:trace>
+  <inkml:trace contextRef="#ctx0" brushRef="#br0" timeOffset="379">912 863 0,'0'-49'15,"0"24"-15,0 0 0,0 1 16,25 24 0,-1 0-1,1 0-15,0 0 0,-1 0 16,26 0-16,-26 0 15,26 0-15,-1 0 0,-24 0 16,24-25-16,-24 25 16,-1-25-16,-24 1 15,0-26-15,0 26 0,-24-1 16,-1 0 0,-24 1-16,24-26 0,-24 50 0,-1 0 15,1 0-15,24 0 0,-24 50 16,24-26-16,1 26 15,-1-1-15,25 0 0,0 25 16,0-24-16,25-1 16,-25 0-16,24 1 0,1-26 15,24 1-15,-24 0 16,0-1-16,24-24 0,-24 0 16</inkml:trace>
+  <inkml:trace contextRef="#ctx0" brushRef="#br0" timeOffset="779">1726 690 0,'25'-24'0,"-1"-1"0,1-24 15,-1 24-15,-24 0 16,0-24-16,-24 24 0,24 1 16,-25 24-16,-24-25 0,24 25 15,1 0-15,-26 0 16,26 25-16,-26-1 0,26 1 15,-1 0-15,25 24 16,-25 0-16,25 1 0,-24-1 16,24-24-16,0 24 0,24-24 15,-24 24-15,25-24 16,0-25-16,-1 24 16,1-24-16,0 0 0,-1 0 15,-24-24-15,25-1 0,0 0 16,-1 1-16,-24-1 15,25 0-15,0-24 0,-25 24 16,24 1-16,-24-1 0,25 25 16,-1 25-1,-24-1 1,25 26-16,-25-26 0,25 1 16,-1 0-16,-24-1 15,25-24-15,0 25 0</inkml:trace>
+  <inkml:trace contextRef="#ctx0" brushRef="#br0" timeOffset="1213">2441 592 0,'0'-50'0,"25"26"0,-25-26 16,0 26-16,0-1 0,0 0 15,-25 25 1,-24 0-16,24 25 0,0 0 15,-24-1-15,24 1 0,-24 24 16,24-24-16,25 24 16,-24 1-16,24-1 15,24-24-15,1-1 0,0-24 16,-1 25-16,1-25 16,24 0-16,1 0 0,-1 0 15,0-25-15,-24 1 16,74-50-16,-75 24 15,-24 1-15,25 0 0,-25-25 16,0 0-16,-25 0 16,25 0-16,-24 0 0,-1 24 15,0 1-15,25 25 16,-24-1-16,-1 50 16,25-1-16,0 1 0,25 49 15,-25-25-15,24 25 16,1 0-16,-25 0 0,25 0 15,-1 25-15,-24-25 16,25 0-16,-25-25 0,0 25 16,0-25-16</inkml:trace>
+</inkml:ink>
+</file>
+
+<file path=ppt/ink/ink102.xml><?xml version="1.0" encoding="utf-8"?>
+<inkml:ink xmlns:inkml="http://www.w3.org/2003/InkML">
+  <inkml:definitions>
+    <inkml:context xml:id="ctx0">
+      <inkml:inkSource xml:id="inkSrc0">
+        <inkml:traceFormat>
+          <inkml:channel name="X" type="integer" max="1920" units="cm"/>
+          <inkml:channel name="Y" type="integer" max="1080" units="cm"/>
+          <inkml:channel name="T" type="integer" max="2.14748E9" units="dev"/>
+        </inkml:traceFormat>
+        <inkml:channelProperties>
+          <inkml:channelProperty channel="X" name="resolution" value="55.81395" units="1/cm"/>
+          <inkml:channelProperty channel="Y" name="resolution" value="55.6701" units="1/cm"/>
+          <inkml:channelProperty channel="T" name="resolution" value="1" units="1/dev"/>
+        </inkml:channelProperties>
+      </inkml:inkSource>
+      <inkml:timestamp xml:id="ts0" timeString="2022-02-21T14:55:18.573"/>
+    </inkml:context>
+    <inkml:brush xml:id="br0">
+      <inkml:brushProperty name="width" value="0.05" units="cm"/>
+      <inkml:brushProperty name="height" value="0.05" units="cm"/>
+      <inkml:brushProperty name="fitToCurve" value="1"/>
+    </inkml:brush>
+  </inkml:definitions>
+  <inkml:trace contextRef="#ctx0" brushRef="#br0">370 495 0,'24'-49'0,"-24"0"15,25-1-15,-25 1 16,0 0-16,0-25 0,0 24 16,0 1-16,-25 24 15,1-24-15,-1 49 0,-24 0 16,24 25-16,-24-1 16,-25 100-16,49-26 15,0 1-15,1 0 0,24 24 16,0 0-16,24 0 15,1 25-15,0 0 16,-1-24-16,1-1 0,0 0 0,-1-24 16,1 0-16,-25-25 15,0 0-15,0-25 0,0-24 16,-25-1-16,1-24 16,-1 0-16</inkml:trace>
+  <inkml:trace contextRef="#ctx0" brushRef="#br0" timeOffset="1171">24 1358 0,'0'-49'16,"-24"0"-16,24 24 0,0-24 15,0 24-15,0-24 0,24 24 16,1 0-16,-25 1 16,25-1-16,24 0 0,-24 1 15,-1 24-15,26 0 16,-26 0-16,26 0 0,-26 24 15,1-24-15,24 25 0,-24 0 16,-25 24-16,25-24 16,-25-1-16,24 26 0,-24-26 15,0 1-15,0 0 0,0-1 16,-24 1-16,24-50 31,0-24-15,0 24-16,0 1 15,24-26-15,-24 1 16,25 24-16,0-24 0,-1 24 16,1 1-16,-25-1 0,25 0 15,-1 25-15,1 0 16,-25 25 0,25 0-16,-25-1 15,0 1 1,0 0-16,0-1 0,0 1 15,0 24-15,0-24 16,0 0-16,24-1 0,-24 1 16,25-25-16,0 25 15,-1-25-15,1 0 0,24 0 16,-24 0-16,24-25 0,-24 25 16,-1-25-16,1-24 15,-25 24-15,25 1 0,-25-26 16,-25 1-16,25 0 0,-25-1 15,-24 26-15,25-26 16,-1 26-16,-24-1 0,24 25 16,-24 0-16,24 0 15,0 25-15,1-1 0,24 1 16,-25 0-16,25-1 0,0 1 16,25 24-1,-1-24-15,1 0 0,-25-1 16,25-24-16,-1 0 15,1 0-15,0 0 0,-1 0 16,1-24-16,0-1 16,-25 0-16,24-24 15,-24 24-15,25 1 0,-25-26 16,0 26-16,24-1 16,-24 0-16,25 1 0,0 24 15,-25 24-15,24-24 16,1 25-16,-25 0 15,25-1-15,-1 26 0,-24-26 16,25 1-16,0 0 16,-25-1-16,24 1 0,-24 0 15,0-1-15,0-48 47,0-1-47,25 0 16,-25 1-16,25-1 0,-25-24 15,24-1-15,1 26 0,-25-26 16,25 26-16,-1-1 16,-24 1-16,25 24 15,0 24-15,-25 1 0,24-1 16,-24 26-16,25-26 16,-25 26-16,0-26 0,25 1 15,-25 24-15,24-24 16,-24 0-16,25-1 15,0-24 1,-1-24 0,1 24-16,-25-25 0,25 0 15,-25 1-15,24-1 16,1 0-16,-25 1 16,0 48 15,0 1-31</inkml:trace>
+  <inkml:trace contextRef="#ctx0" brushRef="#br0" timeOffset="1423">2096 495 0,'-25'0'0,"50"0"15,-25 25 1,25 0-16,-1 24 16,1-24-16,-25 24 0,24 0 15,1 0-15,-25 1 0,25-1 16,-25 0-16,24 1 15,-24-1-15</inkml:trace>
+  <inkml:trace contextRef="#ctx0" brushRef="#br0" timeOffset="1733">2047 643 0,'-25'-49'0,"0"-25"15,1 49-15,24 1 0,0-1 16,24 0-16,1 1 16,0-1-16,24 25 0,-24-25 15,48 25-15,-23 0 0,-1 0 16,0 25-16,25 0 16,-24 24-16,-26 0 0,1 1 15,0 24-15,-25-25 0,0 25 16,-25-25-16,0 25 15,1-25-15,-26 1 0,1-26 16,0 1-16,-1 0 16,-24-1-16,25-24 0,25 0 15,-26-24-15,26 24 16,24-50-16</inkml:trace>
+  <inkml:trace contextRef="#ctx0" brushRef="#br0" timeOffset="2388">2762 569 0,'0'-24'16,"0"-1"-16,24 25 0,-24-25 16,25 1-16,0 24 15,-1-25-15,1 25 0,0 0 16,-1 0-16,1 25 15,0 24-15,-1-24 16,-24-1-16,25 26 0,0-1 16,-25 0-16,0-24 0,24 24 15,-24-24-15,0-1 16,0 1-16,0 0 0,-24-25 31,-1-50-31,0 26 16,1-26-16,-1 26 0,25-25 15,-25-25-15,1 24 16,-1-24-16,25 0 0,0 0 16,0 25-16,0 0 15,0-1-15,25 26 0,-1-1 16,1 0-16,0 25 16,-1 0-16,1 25 0,0-25 15,24 25-15,-24-1 0,-1 1 16,26 24-16,-26-24 15,1 0-15,0 24 16,-1-49-16,-24 25 0,-24-1 16,-1-24-16,0 25 15,1-25-15,-1 25 0,-24-25 16,24 0-16,0 0 16,1 0-16,24 24 0,24-24 31,1 25-31,0-25 0,24 0 15,-24 25-15,24-1 0,0 1 16,-24 0-16,24-1 16,-24 1-16,0 24 0,-25-24 15,0-1-15,-25 1 0,0 24 16,-24-24-16,0 0 16,-25-1-16,0-24 0,0 25 15</inkml:trace>
+  <inkml:trace contextRef="#ctx0" brushRef="#br0" timeOffset="2861">1948 1827 0,'25'0'0,"-1"-25"16,1 25-16,0-24 0,-1-1 15,1 0-15,0-24 16,-1 24-16,1 1 0,-25-26 16,0 26-16,-25-1 0,1 0 15,-1 1-15,-24 24 16,-1 0-16,1 24 0,0-24 15,-1 25-15,1 24 16,24-24-16,-24 24 0,49-24 16,0 24-16,0 1 15,25-1-15,-1 0 0,26-24 16,-1 24-16,25 0 16,0-24-16,0 24 0,0-24 15,-25 24-15,0-24 0,1 0 16,-26-1-16,-24 26 15,-24-50-15,-1 24 0,-49 1 16,25-25-16,-25 25 0,0-25 16,0 0-16,25-25 15,-75 0 1,100 1-16,24-1 0</inkml:trace>
+  <inkml:trace contextRef="#ctx0" brushRef="#br0" timeOffset="3529">2540 1926 0,'24'0'0,"-48"0"31,-1 24-31,-49-24 16,49 0-16,1 25 0,-1-25 15,0 24-15,25 1 16,25 0-16,0-1 15,49 1-15,-25 0 16,-24-1-16,24-24 16,0 0-16,-24 0 0,24 0 15,-24 0-15,0-24 16,-25-1 0,0 0-16,0 1 0,-25-1 15,25 0-15,-25 1 16,25-1-16,0 1 15,-24-1-15,24 0 0,0 1 32,24 24-17,26 0-15,-26 0 16,1-25-16,24 25 0,1 0 16,-26 0-16,26 0 0,-1 25 15,-24-25-15,24 24 16,-24-24-16,-1 25 0,1 0 15,0-1-15,-1 1 16,-24-1-16,0 1 16,0 0-16,0-1 0,-24-24 15,-1 25-15,0-25 16,1 0-16,-1 0 16,-24-25-16,24 25 0,0-24 15,25-1-15,-24 0 16,24-24-16,0 25 0,24-1 15,1-24-15,24 24 16,-24 0-16,49 1 0,-25 24 16,1 0-16,24 0 15,-25 0-15,0 24 0,0-24 16,1 25-16,-26-25 0,1 25 16,-25-1-16,0 1 15,-25-25 1</inkml:trace>
+  <inkml:trace contextRef="#ctx0" brushRef="#br0" timeOffset="3749">3575 1457 0,'0'-49'16,"25"24"-16,-25-24 15,25 49-15,-25 24 31,24 26-31,-24-1 0,0 0 16,25 1-16,-25 24 0,0 0 16,0-25-16,25 25 15,-25-25-15,0 1 0,0-1 16,0-25-16,0 1 0,0 0 16</inkml:trace>
+  <inkml:trace contextRef="#ctx0" brushRef="#br0" timeOffset="4550">3625 1827 0,'-25'-25'15,"50"1"17,-1 24-17,1 0-15,0 0 16,-1 0-16,26 0 0,-26 0 0,26 0 15,-1 0-15,25 0 0,-25 0 16,1-25-16,-26 25 16,26 0-16,-26-25 0,26 25 15,-26-24-15,1-1 16,0 0-16,-25 1 16,0-1-16,-25 0 0,0 1 15,1 24-15,-1 0 16,-24 0-16,-1 0 0,1 0 15,0 24-15,-1 26 16,26-26-16,-1 1 0,25 24 16,0 1-16,0-26 0,25 26 15,-1-1-15,1-24 16,74 24 0,-50-25-16,25 1 0,-25-25 15,25 0-15,0 0 0,0-25 16,0 25-16,-24-24 0,-1-1 15,-24 1-15,24-1 16,-25-24-16,-24 24 0,0 0 16,0-24-16,0 24 0,-24 1 15,24-1-15,-25 0 16,1 1-16,-1 24 0,0 0 16,1 0-1,-1 24-15,0 1 0,25 0 16,-24-1-16,24 26 0,-25-26 15,25 1-15,0 24 16,0-24-16,25 0 0,-1-1 16,1-24-1,0 0-15,-1 0 0,1-24 16,49-50 0,-50 49-16,1-24 15,0-25-15,-25 0 0,24 0 16,1-25-16,-25 0 15,0 1-15,25 24 16,-25-25-16,0 25 0,0 25 0,-25 24 16,0 74-1,25 1-15,0 24 16,0 24-16,0 1 16,0 0-16,25 24 0,0-24 15,-1 24-15,1-49 0,-25 0 16,25 0-16,-1-25 15,-24 0-15</inkml:trace>
+  <inkml:trace contextRef="#ctx0" brushRef="#br0" timeOffset="5094">616 3134 0,'-49'0'16,"0"0"-16,24 0 0,25-25 16,0 1-16,49-1 15,1 0-15,48 1 16,1-26-16,49 1 0,24 24 15,26-24-15,48 24 16,26 1-16,-1-26 0,49 26 16,26 24-16,-1-25 0,0 25 15,-24-25-15,-1 25 16,-48-24-16,-26 24 0,-24 0 16,-49 0-16,-25 0 15,-50-25-15,-48 25 0,-1 0 16,-49-25-16,-25 25 0,1 0 15,-26 0-15,26 0 16,-26 0-16,1 0 0,0 0 16,-1 25-16,26-25 15,-1 0-15</inkml:trace>
+  <inkml:trace contextRef="#ctx0" brushRef="#br0" timeOffset="5279">5647 2468 0,'25'0'0,"-25"-25"16,24 25-16,-24-24 15,-24 24 1</inkml:trace>
 </inkml:ink>
 </file>
 
@@ -2270,76 +2373,76 @@
   <inkml:trace contextRef="#ctx0" brushRef="#br0" timeOffset="207222">3029 6583 0,'0'-21'16,"0"42"-1,0 0 1,0 1-16,0 20 0,0 0 16,0 1-16,0-1 0,21 0 15,-21 22-15,0-22 16,0 1-16,0-1 0,0-21 16,0 0-16,0-42 31,0 0-31,0-21 15,0-1-15,0-20 0,21-1 16,-21 1-16,22-1 0,-22 1 16,0-1-16,21 1 15,-21 20-15,0 22 0,21 0 16,0 63 0,-21-20-16,21 20 15,-21 21-15,21-20 0,0 20 16,1 1-16,-22-1 15,21-21-15,0 1 0,-21-1 16,0 1-16,0-22 0,0 0 16</inkml:trace>
   <inkml:trace contextRef="#ctx0" brushRef="#br0" timeOffset="207342">2987 6985 0,'0'-42'0,"-21"21"16,42-42-16,0 20 15,21 1-15,0 21 0,22-22 16,21 22-16,-22-21 16</inkml:trace>
   <inkml:trace contextRef="#ctx0" brushRef="#br0" timeOffset="211825">1357 6435 0,'0'21'0,"0"0"63,0 1-48,0-1-15,0 0 16,-21 0-1,21 0-15,-21 1 0,21-1 16,0 21-16,0-21 16,-22 0-16,22 22 0,0-1 15,0 0-15,0-20 0,0 20 16,0 0-16,0 0 16,22-20-16,-22-1 0,0 0 15,0 0-15,0 0 16,0 1-16,21-22 15,-21-22 95,-21 1-79</inkml:trace>
-  <inkml:trace contextRef="#ctx0" brushRef="#br0" timeOffset="215923">3664 5440 0,'0'-21'0,"0"42"94,21-21-79,-21 22 1,0-1-1,21 0 17,-21-42-1,0 0-31,0-1 16,22 1-16,-22 0 15,21-21-15,0 20 0,0-41 16,0 21-16,0-1 15,0-20-15,1 20 0,-1 1 16,0 0-16,0 21 0,0-22 16,1 43-16,-22-21 15,21 21-15,0 0 16,-21 21-16,21-21 16,0 22-16,0-1 15,0 0-15,1-21 31,-1 0 1,0 0-32,0 0 15,0 21-15,22-21 0,-1 21 16,-21-21-16,21 21 16,1-21-16,-1 21 0,1 1 15,-22-22-15,21 0 16,-21 21-16,21-21 0,-20 0 15,-1 0-15,0-21 16,-21-1 15,0 1-31,0 0 16,0 0 0,0 0-16,0 0 0,0 0 15,0-1-15,0 1 16,0 0-16,0 0 0,21 0 15,-21-1 1,21 22 31,-21 22-47,22-1 31,-22 0-15,21-21-1,-21 21-15,21 0 16,0 1 0,0-1-16,0-21 15,-21 21 1,21-21 0,1 0-16,-1 0 31,0 0-16,0 0-15,0 21 16,1-21-16,-1 0 16,21 0-16,-21 0 15,0 0-15,0 0 16,1 0-16,-1 21 16,0-21-1,0 0 1,0 0-16,1 21 15,-1-21 1,0 0 0,-42 0 46,21-21-62</inkml:trace>
-  <inkml:trace contextRef="#ctx0" brushRef="#br0" timeOffset="216517">5061 4721 0,'-21'0'16,"0"0"-16,0 0 15,21 21 17,21-21-1,-21 21-15,21-21-16,0 21 0,0-21 15,0 21-15,0 1 16,22-1-16,-1 0 0,1 0 15,-22 0-15,21 0 16,0 0-16,-21 1 0,1-1 16,-1 0-16,0 0 0,0 0 15,-21 1 1,21-22-16,-21 21 0,22-21 16,-22 21-16,-22 0 62,1-21-62,0 21 16,0 0-16,0 0 0,-1 1 15,-20-1-15,21 0 16,0 0-16,-21 0 0,20 1 16,1-1-16,0 0 15,21 0-15,-21 0 0,21 0 16,-21 0-16,21 1 0,0-1 15,-22-21 1,22-21 47</inkml:trace>
-  <inkml:trace contextRef="#ctx0" brushRef="#br0" timeOffset="218224">6035 3959 0,'0'21'78,"0"0"-62,0 21-16,0 1 0,-21 20 16,21 1-16,0 20 15,0 1-15,0-22 0,0 22 16,21 0-16,-21-22 16,21 1-16,-21-1 0,0-20 15,21-1-15,-21-21 0,0 0 16,0 0-16,0 1 15,21-22 48,0-22-47,0 22-16,1 0 0,20 0 15,22-21-15,20 21 0,43-21 16,21 0-16,1 21 15,41-21-15,22 0 0,-1 0 16,1-1-16,0 1 16,-43 0-16,0 0 0,-20 0 15,-23-1-15,-20 1 0,-21 0 16,-22 21-16,-20-21 16,-1 21-16,-21-21 0,-21 0 15,0 0 16,-21 21-31,21-22 16,-21 22-16,21-21 16,0 0-1,0 0-15,0 0 16,0-1-16,0-20 16,0 0-16,0-22 0,0 1 15,0-1-15,0 1 16,0-22-16,21 0 0,-21 22 15,0 0-15,0-1 16,0 22-16,0-22 0,0 43 16,-21-21-16,21 21 0,-21-1 15,0 22-15,-1-21 16,22 0-16,-21 21 0,-21 0 16,21-21-16,-21 21 0,-22 0 15,0 0-15,-20 0 16,-22 21-16,-21-21 0,-21 0 15,0 21-15,-22-21 0,-20 21 16,21-21-16,-22 22 16,22-22-16,-1 0 0,43 21 15,0-21-15,0 0 16,43 21-16,20-21 0,1 21 16,20-21-16,1 21 15,21 0-15,0 0 0,21 1 16,0-1-16,0 0 0,0 21 15,0-20-15,0-1 16,0 0-16,0 0 0,0 0 16,0 0-16</inkml:trace>
-  <inkml:trace contextRef="#ctx0" brushRef="#br0" timeOffset="218689">6691 4149 0,'21'0'0,"0"-21"16,0 21-1,-21-21-15,22 0 16,-22-1-16,-22 22 16,1 0-1,0 0-15,-85 22 16,64-1 0,21 0-16,-22 0 0,22 22 15,0-22-15,0 0 0,21 0 16,21 21-16,0-21 15,22 1-15,-1-1 0,0 21 16,22-42-16,-1 21 16,-20 1-16,-1-1 0,-21-21 15,0 0-15,-21 21 0,-21 0 16,-21-21 0,-22 21-16,22-21 0,-22 0 15,22 0-15,0 0 0,-1 0 16,22 0-16,0 0 15</inkml:trace>
-  <inkml:trace contextRef="#ctx0" brushRef="#br0" timeOffset="218920">7136 3959 0,'0'-21'16,"-21"42"15,0 21-31,21-21 16,-21 21-16,21 1 0,-21 20 15,21-20-15,-22 20 16,22-21-16,0 22 0,0-22 16,0 1-16,0-1 15,0-21-15,22 0 0</inkml:trace>
-  <inkml:trace contextRef="#ctx0" brushRef="#br0" timeOffset="219298">7262 4128 0,'22'-21'16,"-22"42"15,0 0-16,0 0-15,0 0 16,0 22-16,0-22 0,0 0 16,21 0-16,-21 1 15,21-22-15,-21 21 0,21-21 16,0 0-16,0 0 16,0 0-16,1-21 15,-22-1-15,21 1 0,0 0 16,0 0-16,-21-22 15,0 22-15,21-21 0,-21 21 16,0 0-16,0 42 31,0 0-31,0 0 0,0 21 16,0 1-16,0 20 16,21 22-1,-21-43-15,22 1 0,-22-22 16,21 0-16</inkml:trace>
-  <inkml:trace contextRef="#ctx0" brushRef="#br0" timeOffset="219521">7792 4001 0,'21'-21'16,"-21"42"15,0 0-31,0 0 16,21 22-16,-21-22 0,0 21 15,0 1-15,0 20 16,0-21-16,21-21 0,-21 22 16,0-22-16</inkml:trace>
-  <inkml:trace contextRef="#ctx0" brushRef="#br0" timeOffset="219817">7833 4320 0,'-21'-22'0,"21"1"16,0-21-1,0 21-15,0-1 16,21 22-16,0 0 16,0-21-16,0 21 15,0 0-15,1-21 16,-1 21-16,0-21 15,0 0-15,0 0 16,-21 0-16,22-1 0,-22-20 16,0 21-16,0 0 0,0-1 15,0 44 1,0-1-16,0 0 16,0 21-16,0 1 15,0 20-15,0-21 0,0 22 16,21-22-16,-21 1 0,0-22 15</inkml:trace>
-  <inkml:trace contextRef="#ctx0" brushRef="#br0" timeOffset="220138">8172 4043 0,'22'-21'0,"-22"0"16,0 0-16,21 21 15,-21 21 1,0 21-16,21 22 16,-21-22-1,0 1-15,0-1 0,0 0 16,0 0-16,0-20 16,21-1-16,-21 0 0,0 0 15,0-42 1,21 0-1,-21 0-15,22-22 0,-22 22 16,21-21-16,-21 0 16,21-1-16,-21 1 0,21 21 15,-21-1-15,0 1 0,0 0 16</inkml:trace>
-  <inkml:trace contextRef="#ctx0" brushRef="#br0" timeOffset="221207">8321 4086 0,'-21'-22'16,"42"22"15,0 0-15,-21 22-16,21-1 15,-21 0-15,21 0 16,0 22-16,-21-22 15,21 21-15,1 0 0,-22 1 16,0-22-16</inkml:trace>
-  <inkml:trace contextRef="#ctx0" brushRef="#br0" timeOffset="221381">8363 4467 0,'-21'-21'0,"0"21"15,0-22 1,21 1-16,21 0 16,0 21-1,0-21-15,0 0 0,0 21 16,22-22-16</inkml:trace>
-  <inkml:trace contextRef="#ctx0" brushRef="#br0" timeOffset="221580">8554 4065 0,'-22'0'0,"22"-22"15,-21 22-15,0 0 16,21 22 0,21 20-1,-21-21-15,0 0 0,21 21 0,-21-20 16,0 20-16,0 0 15,22-20-15,-22-1 0,0 0 16</inkml:trace>
-  <inkml:trace contextRef="#ctx0" brushRef="#br0" timeOffset="221904">8596 4128 0,'0'-21'16,"0"0"-16,0-1 0,0 1 15,0 42 1,0 1 0,0-1-16,0 0 15,0 0-15,21 22 16,0-22-16,-21 0 0,21 0 16,1 0-16,-1-21 0,-21 21 15,21-21-15,0 0 16,0-21-16,-21 0 15,0 0-15,0 0 16,0-22-16,0 1 0,0 21 16,0-22-16,0 1 0,0 21 15,-21 0-15,21 0 16,-21 42 0,21 0-16,0 0 15</inkml:trace>
-  <inkml:trace contextRef="#ctx0" brushRef="#br0" timeOffset="222302">8956 4022 0,'-22'0'15,"22"-21"-15,-21 0 0,21 0 16,-21 42-1,21 0 1,0 0-16,0 0 0,0 0 16,0 22-16,0-1 15,0-21-15,0 22 0,0-22 16,0 0-16,0 0 0,21-21 31,-21-21-31,0 0 16,0 0-16,0-22 15,0 22-15,21-42 0,-21 20 16,0 1-16,0 0 16,22-1-16,-22 1 0,0 21 15,21 0-15,0 42 16,0 0-16,0 21 16,1 1-16,-1 20 0,0 1 15,0-1-15,0-20 16,-21 20-16</inkml:trace>
-  <inkml:trace contextRef="#ctx0" brushRef="#br0" timeOffset="222437">8935 4297 0,'-22'-42'0,"22"0"16,0-1-16,0 1 0,0 21 15,22-21-15,20 42 0,0-22 16,0 22-16,-20 0 15</inkml:trace>
-  <inkml:trace contextRef="#ctx0" brushRef="#br0" timeOffset="223320">9908 4274 0,'-21'-21'0,"21"0"16,-21-21-16,21 20 0,0-20 16,0-22-16,21 22 15,0 0-15,0 0 0,1-1 16,-1 22-16,0 0 0,0 0 16,0 21-16,0 21 15,0 0-15,1 21 0,-22 1 16,0-1-16,0 0 15,-22 1-15,1-22 0,-21 21 16,21-21-16,-21 1 0,-1-1 16,1-21-16,21 0 15,-1 0-15,1 0 0,0-21 16,0-1-16,21 1 16,0-21-16,0-1 0,21 22 15,0-21-15,0 0 0,1-1 16,20 22-16,0 0 15,1 21-15,-1 21 0,-21 0 16,0 22-16,0 20 16,-21 1-16,0 20 0,-21 1 15,0-22-15,-21 22 0,0 0 16,-1-22-16,-63 22 16,64-43-1,0-20-15,-1-1 0,1-21 16,21-21-16,0-1 15,21-20-15,21 0 0,0-1 16,0 1-16,22 0 16,20 21-16,-21-1 0,1 1 15,20 21-15,-20 0 16,-1 21-16,-21 1 0,21 20 16,-21 0-16,1-21 0,-1 22 15,-21-1-15,0-21 16,21 0-16,-21 1 15,21-22-15</inkml:trace>
-  <inkml:trace contextRef="#ctx0" brushRef="#br0" timeOffset="223656">10437 4340 0,'43'-64'15,"-43"43"-15,-21 42 31,-1 0-31,22 1 16,-21 20-16,0-21 16,21 21-16,0-21 15,21 1-15,0 20 0,1-42 16,-1 21-16,0 0 0,0-21 16,0 0-16,21-21 15,-20 0-15,-1 0 16,0 0-16,-21-1 0,0-20 0,0 0 15,-21 0-15,0 20 16,-1 1-16,1 0 0,0 0 16,0 21-16,0 0 15,0 21-15,0 0 0,21 0 16,0 1 0,0-1-16,0 0 0,21-21 15</inkml:trace>
-  <inkml:trace contextRef="#ctx0" brushRef="#br0" timeOffset="223853">10818 4107 0,'0'-43'0,"0"22"0,0-21 16,0 21-16,0-21 16,0 20-16,22 22 15,-22 22-15,21 20 16,-21-21-16,21 42 0,-21-20 15,21 20-15,-21-20 0,21-1 16,-21 0-16,0 1 16,0-1-16,0-21 0</inkml:trace>
-  <inkml:trace contextRef="#ctx0" brushRef="#br0" timeOffset="224118">11136 4022 0,'21'-42'0,"-21"21"0,0-1 16,0 1-16,0 0 16,-21 21-16,0 0 15,21 21-15,-22 22 16,1-22-16,21 0 16,0 21-16,21 1 0,-21-1 15,43-21-15,-22 21 16,21 1-16,-20-22 0,20 21 15,0-20-15,-21-1 0,0 21 16,1-21-16,-44 0 16,22 0-16,-42-21 15,21 0-15</inkml:trace>
-  <inkml:trace contextRef="#ctx0" brushRef="#br0" timeOffset="224258">11157 4001 0,'21'-63'0,"22"-22"15,-22 42-15,21-20 16,0 21-16,1-1 0,-1 22 16,0 21-16,22 0 15,-22 0-15,0 0 0,-20 21 16,-1 22-16</inkml:trace>
-  <inkml:trace contextRef="#ctx0" brushRef="#br0" timeOffset="224934">7474 4890 0,'0'-21'0,"0"0"0,0 0 15,0-1-15,21 22 32,-21 22-32,21 20 0,-21-21 15,21 42-15,1-20 16,-22 42-16,21-22 0,0 22 16,-21-1-16,21-20 15,-21 20-15,0-20 0,21 0 16,-21-22-16,0 0 0</inkml:trace>
-  <inkml:trace contextRef="#ctx0" brushRef="#br0" timeOffset="225604">7834 5758 0,'0'-21'16,"-21"21"0,0 0-16,-1 0 15,-20 0-15,0 0 0,-1 0 16,-20 21-16,-22 0 16,-21 0-16,1 0 0,-23 0 15,2 22-15,-2-1 0,-20 1 16,21-1-16,-21 0 15,42 22-15,1-22 0,-1 22 16,21-22-16,22 21 16,-1-20-16,43 20 0,0-20 15,21-1-15,0 0 0,63 0 16,1 1-16,63-22 16,21 0-16,42-21 0,43 0 15,21-21-15,21-21 16,43 20-16,-1-20 0,1-21 15,-22 20-15,-42-20 0,0-1 16,-42-20-16,-43 20 16,-42 1-16,-42-1 0,-43 22 15,-21-22-15,-42 1 16,-21 20-16,-43 1 0,-21 0 16,-21 0-16,-21-1 0,-21 22 15,0 0-15,-1 0 16,-20-1-16,20 22 0,22 0 15,21 0-15,0 22 0,21-22 16,43 21-16,-1 0 16,1 0-16,20 0 0</inkml:trace>
-  <inkml:trace contextRef="#ctx0" brushRef="#br0" timeOffset="226043">7008 6075 0,'0'-21'0,"0"0"15,0 42 32,0 64-31,0-43-16,0 0 16,-21 1-16,21-1 0,0 1 15,0-1-15,0-21 16</inkml:trace>
-  <inkml:trace contextRef="#ctx0" brushRef="#br0" timeOffset="226361">6945 6245 0,'0'-21'0,"0"-1"16,0 1-16,21 21 15,0 0-15,0-21 16,22 21-16,-1 0 0,22-21 15,-22 21-15,21-21 16,-20 21-16,-1-22 0,0 22 16,-20-21-16,-1 21 0,0-21 15,-21 0-15,-21 0 16,0 0 0,-1 0-16,1 21 0,0 0 31,21 21-31,0 0 0,0 21 15,0-21-15,-21 22 16,21-1-16,0 0 0,0 1 16,0-1-16,0-21 0,0 21 15</inkml:trace>
-  <inkml:trace contextRef="#ctx0" brushRef="#br0" timeOffset="226727">7516 6052 0,'0'-42'16,"0"21"-16,21 21 16,-21 21-1,0 0-15,0 0 16,0 22-16,0-1 0,0-21 16,0 21-16,0 1 15,0-22-15,-21 0 0,21 0 16,0 0-16,-21-21 15,21-21 1,21 0-16,-21 0 0,21-22 16,-21 1-16,22 0 15,-1 0-15,0-1 0,0-20 16,0 20-16,1 22 0,-1 0 16,0 0-16,0 21 15,-21 21-15,21 0 0,0 21 16,-21 1-16,21-1 15,-21 1-15,22 20 0,-22-21 16,0 1-16,0-1 0,0 0 16,0-20-16</inkml:trace>
-  <inkml:trace contextRef="#ctx0" brushRef="#br0" timeOffset="226871">7601 6245 0,'0'-21'0,"0"-22"0,0 22 16,0 0-16,0 0 15,21-1-15,22 22 16,-22-21-16,21 21 16,-21 0-16,21 0 0,1 0 15,-1 0-15,1-21 0</inkml:trace>
-  <inkml:trace contextRef="#ctx0" brushRef="#br0" timeOffset="227332">8067 5948 0,'0'-21'0,"-22"0"15,22 0-15,-21 21 16,21-21-16,-21 21 16,21 21-1,0 0-15,0 21 16,0 1-16,0-1 0,0 0 16,0 1-16,0-1 0,0 0 15,0 1-15,0-22 16,0 21-16,0-63 15,0 0 1,0 0-16,21 0 0,-21-22 16,0 1-16,21-1 0,-21 1 15,0 0-15,0 21 16,22-22-16,-22 22 0,21 21 16,0 21-1,-21 1-15,0-1 16,21 0-16,-21 0 0,21 21 15,-21-21-15,22 1 16,-1-22-16,0 21 0,0-21 16,0-21-1,0 21-15,0-22 0,-21 1 16,22 0-16,-22-21 0,0-22 16,-22 43-1,22-21-15,-21 21 0,21-1 16,0 1-16,-21 21 15,21 21 1</inkml:trace>
-  <inkml:trace contextRef="#ctx0" brushRef="#br0" timeOffset="227705">8426 5843 0,'22'-22'16,"-1"22"15,-21 22-31,0 20 16,21 21-1,-21-42-15,0 22 0,0-1 16,0 1-16,0-22 16,0 21-16,0-21 15,0-42 1,0 0-16,0 0 15,0-22-15,0 1 0,0 0 16,21-22-16,-21 22 16,21-22-16,1 22 0,-1 0 15,-21-1-15,21 22 16,0 21-16,0 0 0,0 21 16,-21 0-16,21 22 0,1-1 15,-22 22-15,21-22 16,-21 0-16,21 22 0,-21-22 15,0 1-15,0-22 16,0 0-16</inkml:trace>
-  <inkml:trace contextRef="#ctx0" brushRef="#br0" timeOffset="227831">8554 6118 0,'-22'-43'0,"22"22"16,0-21-16,0 21 15,0-22-15,22 22 0,-1 0 16,21 0-16,0 0 0,1-1 15,-1 22-15,0 0 16,-20 0-16</inkml:trace>
-  <inkml:trace contextRef="#ctx0" brushRef="#br0" timeOffset="233845">2267 8086 0,'-21'-21'0,"21"0"0,-21 0 16,21 0-16,0-1 15,-21 1-15,21 0 0,0 42 31,0 0-15,21 22-16,-21-1 0,0 0 16,0 1-16,21-22 0,-21 21 15,0 1-15,21-22 16,0 0-16,0-21 0,0 0 16,22-21-16,20-22 15,1 1-15,-1 0 0,22-22 16,0-20-16,-1 20 0,1-21 15,0 22-15,-1-1 16,-20 22-16,-1 0 0,-20 20 16</inkml:trace>
-  <inkml:trace contextRef="#ctx0" brushRef="#br0" timeOffset="234444">5886 7197 0,'0'-21'0,"22"21"15,-22-21-15,21 0 16,0 21 0,-21 21-1,0 0 1,0 0-16,0 21 15,0-20-15,0 20 0,0-21 16,0 0-16,0 0 16,0 1-16,21-1 0,0-21 15,22-21 1,-1-1-16,21 1 0,22-21 16,0-22-16,21 22 15,21-21-15,-22-1 0,23 1 16,-23-1-16,-20 22 0,-21-1 15,-22 43-15</inkml:trace>
-  <inkml:trace contextRef="#ctx0" brushRef="#br0" timeOffset="241962">2775 8150 0,'0'-21'16,"0"-1"-16,-21 1 15,21 0 1,-21 21-16,21-21 15,0 42 64,0 0-64,0 22-15,0-1 16,0 21-16,0 1 0,0-1 15,0 22-15,0 21 16,0-21-16,21-1 0,-21 22 16,21-21-16,-21-1 0,21-20 15,-21-1-15,21 22 16,-21-43-16,21 1 0,-21-1 16,22 0-16,-22-20 15,0-1-15,21 0 0,-21 0 16,0-42 15,-21 0-31</inkml:trace>
-  <inkml:trace contextRef="#ctx0" brushRef="#br0" timeOffset="242208">2563 9314 0,'-21'0'16,"0"0"-1,42 0 17,0 0-32,-21 21 15,43 0 1,-22-21-16,0 21 0,21 0 15,-21-21-15,1 0 0,-22 22 16,21-22-16</inkml:trace>
-  <inkml:trace contextRef="#ctx0" brushRef="#br0" timeOffset="242479">3114 9208 0,'21'0'0,"-21"-21"16,0 42 15,0 0-15,-21-21 0,0 21-16,-1 0 15,1-21-15,0 22 16,-21-1-16,20 0 0,1 0 15,0-21-15,21 21 0,-21 1 16,0-22-16,21 21 16,0 0-16</inkml:trace>
-  <inkml:trace contextRef="#ctx0" brushRef="#br0" timeOffset="245111">2161 10499 0,'0'-42'16,"0"21"-16,0-1 15,0 1-15,21 0 16,1 21-16,-22-21 16,21 21-16,0 0 15,-21 21-15,21-21 0,-21 21 16,0 0-16,0 1 15,-21-1-15,0-21 16,-22 21-16,1-21 0,0 21 16,-1-21-16,1 0 0,-21 0 15,20-21-15,22 21 16,-21-21-16,20 0 0,22-1 16,0-20-16,0 21 15,22-21-15,-1-1 0,0 22 16,21-21-16,1 21 0,20-1 15,-21 22-15,22 22 16,-22 20-16,22 0 0,-22 22 16,-21-1-16,0 22 15,-21 21-15,0-22 0,-21 22 16,0 0-16,-21 0 16,0-21-16,-22-1 0,0-20 15,1-1-15,0-41 0,20 20 16,-20-42-16,20 0 15,1-21-15,-21-85 16,63 42-16,0 1 0,0-1 16,21-20-16,21 20 15,-21 22-15,21 0 0,22 20 16,-22 22-16,22 22 16,-1-1-16,-20 21 0,20 0 15,-20 22-15,-1-22 16,0 1-16,-21-1 0,22 0 15,-22 0-15,0-20 0,-21 20 16,21-42-16,-21 21 16,21-42-1</inkml:trace>
-  <inkml:trace contextRef="#ctx0" brushRef="#br0" timeOffset="245470">2754 10605 0,'0'-21'0,"0"0"0,0 0 16,-21 21-1,-1 21 1,22 0-16,-21 0 16,21 21-16,0 1 0,0-1 15,-21 0-15,21 1 16,0 20-16,21-21 0,-21 1 15,21-22-15,1 21 16,-1-20-16,21-22 0,-21 0 16,1 0-16,20-22 0,-21 1 15,21-21-15,-21 21 16,1-43-16,-22 22 0,0 0 16,0-22-16,-22 22 15,1-1-15,0 1 0,-21 21 16,0 0-16,20 21 0,-20 0 15,21 0-15,0 0 16,-1 21-16,1-21 0,0 0 16</inkml:trace>
-  <inkml:trace contextRef="#ctx0" brushRef="#br0" timeOffset="246062">3579 10266 0,'21'-21'15,"-21"0"-15,0 0 16,22 21-16,-22 21 31,-22 0-31,1 0 16,0 0-16,0 22 15,-21-22-15,-1 0 0,1-21 16,0 21-16,-1-21 16,22 0-16,-21 0 15,0 0-15,20-21 0,1 0 0,21 0 16,0-22-16,0 22 16,21 0-16,1-21 0,-1 21 15,21-22-15,0 43 16,1-21-16,-1 21 0,0 21 15,22 1-15,-22 20 16,0 21-16,1-20 0,-22 41 16,0-20-16,0-1 0,-21 22 15,0-21-15,-21-1 16,-42 43-16,41-64 16,-20 1-16,0-22 0,0-21 15,-1 0-15,1 0 16,-1-21-16,22-22 0,0 22 15,0-21-15,21-1 0,0 1 16,21 0-16,0 21 16,22-1-16,20 22 15,1 0-15,-22 22 16,0-1-16,1 0 0,-1 21 16,0-21-16,1 22 0,-22-22 15,0 0-15,21 21 16,-21-20-16,1-1 15</inkml:trace>
-  <inkml:trace contextRef="#ctx0" brushRef="#br0" timeOffset="246553">4320 10139 0,'21'-42'0,"-21"0"0,0-1 15,0 1-15,0 21 16,-21 0-16,0-1 0,0 1 16,-22 21-16,1 0 15,-21 21-15,20 1 16,22-1-16,-21 0 0,21 21 16,-1 1-16,1-1 15,21 21-15,0-20 0,0-1 16,0 22-16,21-43 15,1 21-15,20-21 0,-21 0 16,22 1-16,-1-22 0,0 0 16,-21 0-16,22-22 15,-1 1-15,-21 0 0,0 0 16,1-21-16,-22-1 0,0 1 16,0 0-16,0-1 15,0 1-15,-22 0 0,22 21 16,0-1-16,0 44 15,0-1 1,22 21-16,-22 21 0,21 1 16,-21 21-16,21-22 15,0 22-15,-21-22 0,21 1 16,0 20-16,-21-20 16,21-22-16,-21 22 0,22 20 15,-22-62 1,0-1-16</inkml:trace>
-  <inkml:trace contextRef="#ctx0" brushRef="#br0" timeOffset="247472">4870 9208 0,'-21'-21'15,"-21"0"-15,21 21 0,-43-22 16,22 22-16,-43 0 16,1 0-16,-1 22 15,-42-22-15,-21 21 0,-21 0 16,-22 0-16,-21 0 0,-21 22 15,1-1-15,-44 0 0,1 1 16,0 20-16,0-20 16,0 20-16,-233 64 15,275-63-15,21-1 16,1 0-16,41-20 0,43 20 16,0-41-16,43 20 15,41-21-15,22 0 0,21 0 16,21-21-16,22 0 0,20 0 15,1 0-15,20 0 16,1 0-16,-21 0 0,-1 0 16,0 0-16,-20 21 15,-1-21-15,-21 22 0,1-22 16,-1 21-16,-21 0 16,0 21-16,21-20 0,-21 20 15,0 21-15,0-20 0,21 41 16,-21 1-16,21 0 15,0 21-15,0 20 0,22 2 16,-22-2-16,21-20 0,1 21 16,-1 0-16,-21-42 15,21 21-15,-20-21 0,-1-1 16,0-20-16,0 20 16,0-20-16,-21-1 0,0 1 15,22-1-15,-22-20 0,0-1 16,0 0-16,0-21 15,0 1-15,21-22 0,0 0 16,0 0-16,21-22 0,1 1 16,41 0-16,1 0 15,42-21-15,21 21 0,22-22 16,20 1-16,22-1 16,20 1-16,44 0 0,-1 0 15,21-1-15,1 1 0,-1 21 16,21-22-16,-42 1 15,1 21-15,-22 0 0,-22-22 16,-41 22-16,-22 21 16,-21-21-16,-42 0 0,-21 21 15,-43-21-15,1 21 0,-1 0 16,-42-22-16,0 1 31,-21 0-15,0 21-16,-1 0 0,1-21 15,0 21-15,-21 0 0,21-21 16,0 0-16,-1 0 16,-20-1-16</inkml:trace>
-  <inkml:trace contextRef="#ctx0" brushRef="#br0" timeOffset="247874">5146 9314 0,'-43'-85'0,"22"22"16,0-1-16,0 43 0,0-21 16,21 63-1,0 0-15,0 43 0,21-1 16,0 22-16,0 21 0,0 20 15,1-20-15,20 42 16,-21-20-16,21-2 0,-21 2 16,22-2-16,-1 2 0,-21-2 15,22-20-15,-22 0 16,21 21-16,-21-21 16,0-21-16,22 21 0,-22-22 15,0 1-15,-21 0 0,21-22 16,1-21-16,-22 1 15,21 20-15,-21-42 16,0 1-16,0-1 16</inkml:trace>
-  <inkml:trace contextRef="#ctx0" brushRef="#br0" timeOffset="248816">5566 9571 0,'0'21'15,"0"0"17,21-21-17,0-21 1,1 21-16,-1-21 16,21-22-16,0 22 15,1-21-15,20-21 0,-20 20 16,20-20-16,-21-1 0,22-20 15,-22 20-15,1-21 16,-1-20-16,-21-1 0,-21 0 16,0 0-16,0-21 15,-21-21-15,0 21 0,-22 0 16,1-21-16,0 21 0,-1 0 16,1 0-16,-85-85 15,63 106-15,-20 0 16,-1 0-16,22 1 15,-22 20-15,0-21 0,1 22 16,20 20-16,1-21 0,-1 22 16,22-1-16,-1 1 15,22 20-15,0-20 0,21 21 16,0 21-16,21-22 16,0 1-16,22 21 0,-22-22 15,21 22-15,1-21 0,-1 21 16,0 0-16,1-1 15,-1-20-15,0 21 0,1 0 16,20-1-16,-21 1 0,1-21 16,-1 21-16,-21 21 15,1-21-15,-1 0 0,0 21 16,0 0-16,-21 21 31,-21-21-15,0 21-16</inkml:trace>
-  <inkml:trace contextRef="#ctx0" brushRef="#br0" timeOffset="249080">5400 5483 0,'-21'21'0,"-1"-21"15,44 0 1,-1 0 0,0 0-16,21 0 15,-21 0-15,22 0 16,-1 0-16,0 0 0,1 0 16,-22 21-16,21-21 15,-21 21-15,0 0 0,-21 22 16,0-1-16,0 0 0,0 1 15,0 41-15,-42-20 16,21 20-16</inkml:trace>
-  <inkml:trace contextRef="#ctx0" brushRef="#br0" timeOffset="251923">1061 3810 0,'-22'-63'0,"1"21"0,-21 21 16,21-22-16,-22 22 0,1 0 15,21 0 1,21 42-16,0 21 16,21 1-1,21-1-15,1 42 0,-1 1 16,22 42-16,20-21 0,1 42 15,42 0-15,0 22 16,21 20-16,0-20 0,21 20 16,1 0-16,-1 1 0,-21 0 15,-21-22-15,0 0 16,0-21-16,-21 22 0,-21-22 16,-22-21-16,22 0 15,-22 0-15,-20-21 0,20-1 16,-20-20-16,-1-21 15,-21-22-15,21 0 0,-20 1 16,-1-22-16,0-21 31,0 0-15,0-21 0,-21-1-1,0-20 1</inkml:trace>
-  <inkml:trace contextRef="#ctx0" brushRef="#br0" timeOffset="252535">2944 3387 0,'-21'0'15,"21"21"-15,0 0 16,-21 1-16,21-1 16,-21 0-16,0 0 0,0 22 15,21 20-15,-22 0 16,-20 22-16,21 42 0,-22 0 16,1 21-16,-21 43 0,-1-1 15,1 43-15,-22 21 16,-21-21-16,21 21 0,1 0 15,20 0-15,-20 0 0,41-42 16,-20-22-16,42-20 16,-22-1-16,22-42 0,0-21 15,21-22-15,-21-20 16,21-1-16,0-20 0,-21-1 16,21 0-16,0-20 15,0-1-15,0 0 0,0 0 16,0 0-16,0-42 62,21 0-46,-21 0 0,21 21-16,-21-21 15,21-22-15</inkml:trace>
-  <inkml:trace contextRef="#ctx0" brushRef="#br0" timeOffset="260970">2078 14734 0,'42'-22'15,"-42"1"-15,21 0 0,0 0 0,-21 0 16,21-1-16,0 22 16,1-21-16,-22 0 0,21-21 15,-21 21-15,21 0 16,-21-1-16,0 1 0,0 0 15,-21 0-15,0 0 0,-1-1 16,-20 22-16,-21 0 16,20 0-16,-41 22 0,20-1 15,-20 21-15,20-21 16,-21 22-16,22-1 0,21 0 16,20 1-16,1-1 0,42 0 15,22-20-15,-1 20 16,43-21-16,21 0 0,-1 21 15,22-20-15,0-1 0,-21 0 16,0 21-16,-21-20 16,-22-1-16,-20 21 0,-22 0 15,-42 1-15,-1-22 16,-126 64-16,64-64 16,-22 0-16,-21 0 0,21 0 15,-21-21-15,21 0 16,0-21-16,22 0 0,20-21 15,0 20-15,43-20 16,21 0-16,21-1 0,22 22 16</inkml:trace>
-  <inkml:trace contextRef="#ctx0" brushRef="#br0" timeOffset="261225">2796 14373 0,'0'-43'16,"0"22"-16,0 0 0,-21 0 16,0 21-16,0 0 15,0 21-15,-1 21 0,1-20 16,0 20-16,0 21 16,21 1-16,0-1 0,0 22 15,0-22-15,0 22 0,0 0 16,21-1-16,-21 1 15,21-21-15,-21 20 0,0-20 16,21-22-16,-21 0 0,22-20 16</inkml:trace>
-  <inkml:trace contextRef="#ctx0" brushRef="#br0" timeOffset="261713">3156 14500 0,'0'-21'16,"-21"-1"-16,21 1 16,-21 21-16,0 0 0,-1 0 15,1 21-15,21 1 16,0-1-16,-21 21 16,21 0-16,0 1 0,0-22 15,0 21-15,0 1 16,0-1-16,0 0 0,0-21 15,0 0-15,0 1 0,21-22 16,0 0-16,1 0 16,-1 0-16,21 0 0,-21-22 15,21 22-15,1-21 16,-22 0-16,21 21 0,-20-21 16,20 0-16,-21 21 0,0-21 15,0 0-15,0-1 16,-21-20-16,22 21 15,-22 0-15,21-22 0,-21 1 16,21 21-16,-21-21 16,0 20-16,0 1 0,21 0 15,-21 0-15,0 42 32,0 0-32,0 22 0,21 62 15,-21-41-15,0 21 16,0-22-16,0 0 15,0 1-15,22 0 0,-1-1 16,21-21-16,-21 1 0</inkml:trace>
-  <inkml:trace contextRef="#ctx0" brushRef="#br0" timeOffset="261958">4087 14373 0,'-21'-43'0,"0"22"16,0 0-1,0 21 1,21 21-16,0 0 16,0 22-16,0-1 0,0 21 15,0 1-15,0 0 0,0-1 16,0 0-16,0 1 15,0-22-15,21 1 0,-21-22 16,21 0-16</inkml:trace>
-  <inkml:trace contextRef="#ctx0" brushRef="#br0" timeOffset="262278">4108 14669 0,'0'-42'0,"0"20"0,0 1 16,0 0-1,42 0 1,-21 21-16,0-21 16,21 0-16,22 0 0,-22 21 15,1-22-15,-1 1 0,0 0 16,1 0-16,-22 0 16,0-1-16,-21 1 0,0 0 15,-21-21-15,0 21 16,-1 0-16,1-1 0,0 1 15,21 0-15,-21 21 0,21 21 16,0 22 0,0-1-16,21 21 0,-21 1 15,21-1-15,-21 1 16,21-1-16,1 1 0,-22-22 16,42 43-1</inkml:trace>
-  <inkml:trace contextRef="#ctx0" brushRef="#br0" timeOffset="262643">4765 14203 0,'0'-21'16,"0"0"-16,0 42 16,0 0-16,0 1 0,0 20 15,0 0-15,-22 0 16,22 22-16,0 0 15,-21-22-15,21 0 0,0 22 16,0-43-16,0 21 0,0-21 16,21-21-1,-21-21-15,22-64 16,-1 43-16,-21-42 16,0 20-16,0-21 15,0 1-15,21-1 0,-21 0 16,21 22-16,0 21 0,1 20 15,-1 22-15,0 0 16,21 43-16,-21 20 0,22 1 16,-22-1-16,0 1 15,0 20-15,0-20 0,1-22 16,-1 22-16,0-22 0,-21-21 16</inkml:trace>
-  <inkml:trace contextRef="#ctx0" brushRef="#br0" timeOffset="262793">4913 14479 0,'-64'-43'16,"43"22"-1,21 0 1,21 21-16,0-21 16,22 21-16,-1-22 0,22 1 15,-1 0-15,1-21 16</inkml:trace>
-  <inkml:trace contextRef="#ctx0" brushRef="#br0" timeOffset="263321">5590 13992 0,'-21'-22'15,"0"1"-15,-21 0 0,20 0 16,1 21-16,0-21 16,21 42-1,0 21-15,21 1 0,0-1 16,1 22-16,-1-1 15,0 0-15,0 22 16,21 42-16,-42-63 16,21-1-16,-21-20 0,0-22 15,-21 0-15,0-21 16,21-21-16,-21-22 16,0 1-16,21-22 0,-21 1 15,21-22-15,0 1 16,0-1-16,0 0 0,0 22 15,21-1-15,-21 22 16,21 21-16,0 21 0,0 0 16,-21 21-16,21 21 0,1-21 15,-1 22-15,21 20 16,-21-20-16,1-1 0,20 0 16,-21 22-16,21-22 0,1 1 15,-22-1-15,21-21 16,1 0-16,-22 0 15,0 0-15,0-21 0,0 0 16,0-21-16,-21 0 0,0-21 16,0 0-16,0-22 15,0 0-15,-42-168 16,21 168 0,21 1-16,-21-1 0,21 43 15,0 0-15,0 42 31,0 21-31,21-20 0</inkml:trace>
-  <inkml:trace contextRef="#ctx0" brushRef="#br0" timeOffset="263723">6394 13738 0,'0'-21'0,"-21"-1"15,0 1-15,21 0 0,0 42 16,0 0 0,0 22-16,0 20 15,21 1-15,-21-1 0,21 22 16,-21-22-16,22 22 16,-22-21-16,0-1 0,21-21 15,-21 1-15,0-22 16,0 0-16,0-42 15,0 0-15,0-22 0,0 1 16,0-43-16,0 1 16,0-1-16,0-21 0,0 21 15,0-20-15,21 41 0,-21 1 16,21 20-16,0 22 16,1 21-16,-1 42 0,21 1 15,0 20-15,-21 1 16,22 20-16,20 1 0,-20 0 15,-22-1-15,21 1 16,0-21-16,-20-1 0,-22-21 16,0-20-16</inkml:trace>
-  <inkml:trace contextRef="#ctx0" brushRef="#br0" timeOffset="263874">6416 14098 0,'-43'-43'15,"65"43"1,20 0-16,-21-21 16,42 21-16,1-21 0,0 21 15,20-21-15,22-1 16</inkml:trace>
-  <inkml:trace contextRef="#ctx0" brushRef="#br0" timeOffset="264023">7368 13907 0,'0'-21'16,"0"0"-1,21 0-15,0-1 0,1 1 16,20 0-16,0 0 0,-21 0 16,22 21-16</inkml:trace>
-  <inkml:trace contextRef="#ctx0" brushRef="#br0" timeOffset="264275">8321 13378 0,'-21'-21'0,"21"0"0,-22 21 16,1 0-16,0 0 15,21 21-15,0 0 0,0 42 16,21-20-16,0 41 16,22 107-16,-1-106 15,0 20-15,1 1 0,-22-21 16,21-1-16,1 1 16,-22-42-16,0-1 0</inkml:trace>
-  <inkml:trace contextRef="#ctx0" brushRef="#br0" timeOffset="264551">8405 13547 0,'-63'-127'15,"-22"0"-15,0-21 0,1 21 16,20-21-16,-20 21 16,-1-148-1,64 169-15,21 0 0,21 21 16,42 22-16,22 21 0,42-1 15,0 22-15,21 21 0,1 21 16,20 22-16,-21 20 16,0 22-16,-42 21 0,-43 20 15,1 2-15,-64-2 16,-21 2-16,-43-2 0,1 2 16,-43-44-16,0 1 0,0 0 15,-21-43-15,43 0 16,-1-21-16</inkml:trace>
-  <inkml:trace contextRef="#ctx0" brushRef="#br0" timeOffset="265631">9169 13547 0,'-21'-21'0,"0"21"0,-21-21 16,42 0-16,-22 0 0,22-1 16,0 1-16,22 0 0,-1 21 15,21 0-15,-21 0 16,22 0-16,20 21 0,-21 0 16,1 22-16,-1-1 15,1 0-15,-22-21 0,0 22 16,-21-1-16,0-21 15,0 22-15,-21-22 0,0-21 16,-1 0-16,1-21 16,0 0-16,0-22 15,21 1-15,-21 21 0,21-43 16,42-20 0,-21 41-16,0 1 15,22 21-15,-22-1 0,21 1 0,0 21 16,1 0-16,-1 0 15,-21 0-15,22 21 0,-22-21 16,0 22-16,0-22 0,-21 21 16,-21-21 15,0 0-15,0 21-1,0 21 1,21 1-16,0-22 0,0 21 15,21 22 1,0-43-16,21 21 0,0-42 16,1 21-16,-1-21 0,1-21 15,-1 21-15,-21-21 0,21-21 16,-42 20-16,0-20 16,0 21-16,-21-21 0,-21 21 15,0-22-15,20 22 16,-20-21-16,0 20 0,20 22 15,1-21-15,0 21 0,42 0 32,0 0-32,22 0 0,-1-21 15,22 21-15,-1 0 16,22-21-16,0 21 0,-1 0 16,-20-21-16,-1 21 0,-20 0 15,-1-21-15,-21 21 16,-42 0-1,0 0-15,0 0 0,-1 0 16,-20 0-16,21 21 16,-22 0-16,22-21 0,0 42 15,0-21-15,21 1 16,-21-1-16,21 21 0,21-21 16,0 22-16,-21-22 0,42 0 15,-20-21-15,20 21 16,0-21-16,22-21 15,-22 0-15,0 0 16,-20-22-16,-1 1 0,0-22 16,-21 22-16,0-21 15,-21-22-15,0 0 0,-22 1 16,22-1-16,-21 21 0,21 1 16,-22 0-16,43 41 15,-21 22-15,21 22 0,0-1 16,0 42-16,21 1 15,1 20-15,20 1 0,0 21 16,43 63 0,-64-84-16,21-22 0,1 1 15,-1-1-15,-21-42 0,21 22 16,-20-43-16</inkml:trace>
-  <inkml:trace contextRef="#ctx0" brushRef="#br0" timeOffset="265961">10966 13314 0,'0'-21'0,"-21"-21"0,21 21 16,-21-1 0,21 44-1,0-1 1,0 0-16,0 21 16,21-20-16,-21-1 15,21 0-15,1 0 0,-1 0 16,0 0-16,21 0 15,-20-21-15,-1 0 0,21 0 16,-21 0-16,0-21 0,0 0 16,1-21-16,-22 21 15,0 0-15,0-22 0,0 22 16,-22-21-16,22 20 16,-21 22-16,0 0 15,0 0-15,21 22 16,0-1-16,0 0 0,0 0 15,0 22-15,21-22 0,21 0 16,-20 0-16</inkml:trace>
-  <inkml:trace contextRef="#ctx0" brushRef="#br0" timeOffset="266369">11792 13293 0,'0'-21'0,"0"0"16,0 0-16,0 0 15,-21-1-15,0 1 16,-1 0-16,1 0 16,0 21-16,-21 0 0,21 0 15,0 21-15,-1 0 16,1 22-16,0-22 0,0 21 16,21 0-16,0 1 0,0-1 15,21-21-15,0 22 16,22-22-16,-1-21 0,21 21 15,1-21-15,21-21 16,-22 21-16,85-64 16,-63 22-16,-43-1 0,0 1 15,1 0-15,-43-22 16,0 1-16,-21 20 0,-1-20 16,-20 21-16,21-22 15,-21 43-15,21 0 0,-1 0 16,22 42-1,0 0-15,22 0 0,-1 22 16,0-1-16,0 21 0,0-20 16,21 20-16,-20 1 15,-1-22-15,0 0 0</inkml:trace>
-  <inkml:trace contextRef="#ctx0" brushRef="#br0" timeOffset="266503">12256 13293 0,'0'-42'15,"-21"-1"-15,21 1 0,0 0 16,21 0-16,0 20 0,21-20 16,0 21-16,1 21 15,20 0-15,-20 0 0,-1 21 16</inkml:trace>
-  <inkml:trace contextRef="#ctx0" brushRef="#br0" timeOffset="267323">10184 14478 0,'22'-21'0,"-1"21"16,-21-21-16,21 0 16,0 0-16,-21 0 15,21 0-15,0-22 0,-21 1 16,0-1-16,0 1 0,0 0 16,-42 21-16,0-22 15,-22 22-15,-21 21 0,1 21 16,-1 1-16,-21 41 15,22-21-15,-1 43 0,21-21 16,43 20-16,0-20 0,42 20 16,85 64-1,0-105-15,0 20 0,0 1 16,21-22-16,-21 22 0,-1-22 16,-20 0-16,-21 22 15,-43-22-15,-21 0 0,-21 1 16,-22-22-16,-42 21 15,1-42-15,-22 0 0,0 0 16,22 0-16,-1-21 0,0-21 16,22-1-16,20 1 15,22 0-15,21 0 0,0-1 16,0 1-16,21 21 16,22-1-16,-22 1 0,0 21 15,0 21-15,-21 1 16,21-1-16,-21 21 0,0 1 15,0-1-15,0 0 0</inkml:trace>
-  <inkml:trace contextRef="#ctx0" brushRef="#br0" timeOffset="267696">10501 15029 0,'42'-21'0,"-21"-22"16,0 1-16,1 21 0,-22 0 15,0-22-15,0 22 0,0 0 16,0 42 15,0 0-31,0 22 16,0-22-16,0 21 0,21 1 16,-21-22-16,21 21 15,21-21-15,1 0 0,-1 0 16,0-21-16,1 0 0,-1-21 15,0 0-15,1 0 16,-1 0-16,-21 0 0,-21 0 16,0-22-16,-21 22 0,-21 0 15,-1 0-15,1-22 16,-22 43-16,22-21 0,0 0 16,0 21-16,20 0 0,1 0 15,21 21 1,21-21-16,1 0 15</inkml:trace>
-  <inkml:trace contextRef="#ctx0" brushRef="#br0" timeOffset="267905">11157 14480 0,'0'-22'0,"0"-20"15,0 21-15,-21 0 0,21-1 16,0 1-16,0 42 15,21 1 1,-21 20-16,21 0 0,0 22 16,1-1-16,-22 1 15,21-1-15,0 1 0,0-22 16,0 0-16,-21 1 0,21-22 16,0 0-16,1-21 15</inkml:trace>
-  <inkml:trace contextRef="#ctx0" brushRef="#br0" timeOffset="268212">11496 14732 0,'0'-42'16,"0"21"-16,0 0 0,0 0 16,0 42 15,21 21-15,21 0-1,-21 1-15,0-22 0,22 0 16,-1 22-16,-21-43 15,22 21-15,-1-21 0,0 0 16,-21-21-16,22-1 16,-22 1-16,-21-21 0,0-1 15,0 1-15,-21 0 0,0-22 16,-1 43-16,1-21 16,0 21-16,0-1 0,0 22 15,0 0-15,21 22 16,0-1-16,0 0 15,21 0-15,0 0 0,0 1 16,21-22-16</inkml:trace>
-  <inkml:trace contextRef="#ctx0" brushRef="#br0" timeOffset="268663">12194 14457 0,'0'-21'16,"0"-21"-16,0 0 0,-21-1 15,21 22-15,-21-21 16,21 20-16,-21 1 0,21 0 15,0 42-15,0 0 16,21 22-16,0-1 16,0 1-16,22 20 0,-22 0 15,0 1-15,0-22 16,0 22-16,0-22 0,0-21 16,-21 0-16,-21-42 31,0 21-31,0-42 0,-21 21 15,21 0-15,-1 0 16,1-1-16,0 1 0,0 21 16,21-21-1,21 21-15,0 0 16,22 0-16,-1-21 0,0 21 16,0-21-16,22-1 15,-22 1-15,1 0 0,-1 21 16,-21-21-16,0 0 0,-21 0 31,0 42-15,0 0-1,0 0-15,21 0 16,1 0-16,-22 1 0,21 20 16,0-21-16,0 0 15,0 1-15</inkml:trace>
-  <inkml:trace contextRef="#ctx0" brushRef="#br0" timeOffset="268819">12787 14288 0,'-106'-106'32,"85"64"-32,0 21 0,21 42 31,0 0-16,21 21-15</inkml:trace>
-  <inkml:trace contextRef="#ctx0" brushRef="#br0" timeOffset="269493">13062 14330 0,'0'-21'0,"0"0"16,-21 21-1,0-21-15,-1 42 16,22 0 0,-21 21-16,21-20 0,0 20 15,21 0-15,-21-20 16,22 20-16,20-21 0,-21 0 16,22-21-16,-1 0 0,0 0 15,22 0-15,-22 0 16,0-21-16,-20 0 0,-1-21 15,0 20-15,-21-20 16,-21 0-16,-22-1 0,1 1 16,0 0-16,-22-1 0,1 1 15,20 21-15,1 0 16,21 21-16,0 0 0,-1 21 16,22 0-16,0 21 0,0 1 15,22-1-15,-1 0 16,21-21-16,-21 22 0,22-22 15,-1-21-15,0 0 16,-21 0-16,22 0 0,-1-21 16,-21 0-16,1-1 0,-1 1 15,0-21-15,0 21 16,-21 0-16,0 0 0,21-1 16,-21 1-16,21 21 15,0 21-15,1 22 16,-1-22-16,0 0 0,21 21 15,1-21-15,-1 1 16,-21-1-16,21 0 0,-20-21 16,20 0-16,-21 0 15,0-21-15,1 0 0,-22-1 16,21 1-16,-21 0 0,21-21 16,0 21-16,0 0 15,0 21-15,0-22 0,1 22 16,20 22-16,-21-1 15,22 0-15,-1 0 0,-21 21 16,21-21-16,-21 1 0,1-1 16,-1 0-16,0 0 15</inkml:trace>
-  <inkml:trace contextRef="#ctx0" brushRef="#br0" timeOffset="269939">11115 15283 0,'-170'84'16,"43"-41"-16,43 20 0,-1-42 15,43 1-15,42-1 16,42-21-16,21 0 15,1 0-15,21-21 0,20 21 16,23-22-16,62-20 16,0 0-16,64-1 0,22 1 15,62-21-15,22-1 0,21 1 16,21-1-16,1 22 16,-23-1-16,-41 1 0,-21 21 15,-64 0-15,-64 0 16,-42 21-16,-42-21 0,-42 21 15,-43-22-15,0 22 16,-21-21-16,-21 21 16,21-21-16,-21 21 15,-1 0 48,-20 0-63,0 0 0,-1 0 15</inkml:trace>
-  <inkml:trace contextRef="#ctx0" brushRef="#br0" timeOffset="270142">16089 14436 0,'0'21'0,"21"0"0,21-21 16,-21 0-16,1-21 15,20 21-15,-21 0 0,0-21 16</inkml:trace>
+  <inkml:trace contextRef="#ctx0" brushRef="#br0" timeOffset="-213573.73">3664 5440 0,'0'-21'0,"0"42"94,21-21-79,-21 22 1,0-1-1,21 0 17,-21-42-1,0 0-31,0-1 16,22 1-16,-22 0 15,21-21-15,0 20 0,0-41 16,0 21-16,0-1 15,0-20-15,1 20 0,-1 1 16,0 0-16,0 21 0,0-22 16,1 43-16,-22-21 15,21 21-15,0 0 16,-21 21-16,21-21 16,0 22-16,0-1 15,0 0-15,1-21 31,-1 0 1,0 0-32,0 0 15,0 21-15,22-21 0,-1 21 16,-21-21-16,21 21 16,1-21-16,-1 21 0,1 1 15,-22-22-15,21 0 16,-21 21-16,21-21 0,-20 0 15,-1 0-15,0-21 16,-21-1 15,0 1-31,0 0 16,0 0 0,0 0-16,0 0 0,0 0 15,0-1-15,0 1 16,0 0-16,0 0 0,21 0 15,-21-1 1,21 22 31,-21 22-47,22-1 31,-22 0-15,21-21-1,-21 21-15,21 0 16,0 1 0,0-1-16,0-21 15,-21 21 1,21-21 0,1 0-16,-1 0 31,0 0-16,0 0-15,0 21 16,1-21-16,-1 0 16,21 0-16,-21 0 15,0 0-15,0 0 16,1 0-16,-1 21 16,0-21-1,0 0 1,0 0-16,1 21 15,-1-21 1,0 0 0,-42 0 46,21-21-62</inkml:trace>
+  <inkml:trace contextRef="#ctx0" brushRef="#br0" timeOffset="-212979.73">5061 4721 0,'-21'0'16,"0"0"-16,0 0 15,21 21 17,21-21-1,-21 21-15,21-21-16,0 21 0,0-21 15,0 21-15,0 1 16,22-1-16,-1 0 0,1 0 15,-22 0-15,21 0 16,0 0-16,-21 1 0,1-1 16,-1 0-16,0 0 0,0 0 15,-21 1 1,21-22-16,-21 21 0,22-21 16,-22 21-16,-22 0 62,1-21-62,0 21 16,0 0-16,0 0 0,-1 1 15,-20-1-15,21 0 16,0 0-16,-21 0 0,20 1 16,1-1-16,0 0 15,21 0-15,-21 0 0,21 0 16,-21 0-16,21 1 0,0-1 15,-22-21 1,22-21 47</inkml:trace>
+  <inkml:trace contextRef="#ctx0" brushRef="#br0" timeOffset="-211272.73">6035 3959 0,'0'21'78,"0"0"-62,0 21-16,0 1 0,-21 20 16,21 1-16,0 20 15,0 1-15,0-22 0,0 22 16,21 0-16,-21-22 16,21 1-16,-21-1 0,0-20 15,21-1-15,-21-21 0,0 0 16,0 0-16,0 1 15,21-22 48,0-22-47,0 22-16,1 0 0,20 0 15,22-21-15,20 21 0,43-21 16,21 0-16,1 21 15,41-21-15,22 0 0,-1 0 16,1-1-16,0 1 16,-43 0-16,0 0 0,-20 0 15,-23-1-15,-20 1 0,-21 0 16,-22 21-16,-20-21 16,-1 21-16,-21-21 0,-21 0 15,0 0 16,-21 21-31,21-22 16,-21 22-16,21-21 16,0 0-1,0 0-15,0 0 16,0-1-16,0-20 16,0 0-16,0-22 0,0 1 15,0-1-15,0 1 16,0-22-16,21 0 0,-21 22 15,0 0-15,0-1 16,0 22-16,0-22 0,0 43 16,-21-21-16,21 21 0,-21-1 15,0 22-15,-1-21 16,22 0-16,-21 21 0,-21 0 16,21-21-16,-21 21 0,-22 0 15,0 0-15,-20 0 16,-22 21-16,-21-21 0,-21 0 15,0 21-15,-22-21 0,-20 21 16,21-21-16,-22 22 16,22-22-16,-1 0 0,43 21 15,0-21-15,0 0 16,43 21-16,20-21 0,1 21 16,20-21-16,1 21 15,21 0-15,0 0 0,21 1 16,0-1-16,0 0 0,0 21 15,0-20-15,0-1 16,0 0-16,0 0 0,0 0 16,0 0-16</inkml:trace>
+  <inkml:trace contextRef="#ctx0" brushRef="#br0" timeOffset="-210807.73">6691 4149 0,'21'0'0,"0"-21"16,0 21-1,-21-21-15,22 0 16,-22-1-16,-22 22 16,1 0-1,0 0-15,-85 22 16,64-1 0,21 0-16,-22 0 0,22 22 15,0-22-15,0 0 0,21 0 16,21 21-16,0-21 15,22 1-15,-1-1 0,0 21 16,22-42-16,-1 21 16,-20 1-16,-1-1 0,-21-21 15,0 0-15,-21 21 0,-21 0 16,-21-21 0,-22 21-16,22-21 0,-22 0 15,22 0-15,0 0 0,-1 0 16,22 0-16,0 0 15</inkml:trace>
+  <inkml:trace contextRef="#ctx0" brushRef="#br0" timeOffset="-210576.73">7136 3959 0,'0'-21'16,"-21"42"15,0 21-31,21-21 16,-21 21-16,21 1 0,-21 20 15,21-20-15,-22 20 16,22-21-16,0 22 0,0-22 16,0 1-16,0-1 15,0-21-15,22 0 0</inkml:trace>
+  <inkml:trace contextRef="#ctx0" brushRef="#br0" timeOffset="-210198.73">7262 4128 0,'22'-21'16,"-22"42"15,0 0-16,0 0-15,0 0 16,0 22-16,0-22 0,0 0 16,21 0-16,-21 1 15,21-22-15,-21 21 0,21-21 16,0 0-16,0 0 16,0 0-16,1-21 15,-22-1-15,21 1 0,0 0 16,0 0-16,-21-22 15,0 22-15,21-21 0,-21 21 16,0 0-16,0 42 31,0 0-31,0 0 0,0 21 16,0 1-16,0 20 16,21 22-1,-21-43-15,22 1 0,-22-22 16,21 0-16</inkml:trace>
+  <inkml:trace contextRef="#ctx0" brushRef="#br0" timeOffset="-209975.73">7792 4001 0,'21'-21'16,"-21"42"15,0 0-31,0 0 16,21 22-16,-21-22 0,0 21 15,0 1-15,0 20 16,0-21-16,21-21 0,-21 22 16,0-22-16</inkml:trace>
+  <inkml:trace contextRef="#ctx0" brushRef="#br0" timeOffset="-209679.73">7833 4320 0,'-21'-22'0,"21"1"16,0-21-1,0 21-15,0-1 16,21 22-16,0 0 16,0-21-16,0 21 15,0 0-15,1-21 16,-1 21-16,0-21 15,0 0-15,0 0 16,-21 0-16,22-1 0,-22-20 16,0 21-16,0 0 0,0-1 15,0 44 1,0-1-16,0 0 16,0 21-16,0 1 15,0 20-15,0-21 0,0 22 16,21-22-16,-21 1 0,0-22 15</inkml:trace>
+  <inkml:trace contextRef="#ctx0" brushRef="#br0" timeOffset="-209358.73">8172 4043 0,'22'-21'0,"-22"0"16,0 0-16,21 21 15,-21 21 1,0 21-16,21 22 16,-21-22-1,0 1-15,0-1 0,0 0 16,0 0-16,0-20 16,21-1-16,-21 0 0,0 0 15,0-42 1,21 0-1,-21 0-15,22-22 0,-22 22 16,21-21-16,-21 0 16,21-1-16,-21 1 0,21 21 15,-21-1-15,0 1 0,0 0 16</inkml:trace>
+  <inkml:trace contextRef="#ctx0" brushRef="#br0" timeOffset="-208289.73">8321 4086 0,'-21'-22'16,"42"22"15,0 0-15,-21 22-16,21-1 15,-21 0-15,21 0 16,0 22-16,-21-22 15,21 21-15,1 0 0,-22 1 16,0-22-16</inkml:trace>
+  <inkml:trace contextRef="#ctx0" brushRef="#br0" timeOffset="-208115.73">8363 4467 0,'-21'-21'0,"0"21"15,0-22 1,21 1-16,21 0 16,0 21-1,0-21-15,0 0 0,0 21 16,22-22-16</inkml:trace>
+  <inkml:trace contextRef="#ctx0" brushRef="#br0" timeOffset="-207916.73">8554 4065 0,'-22'0'0,"22"-22"15,-21 22-15,0 0 16,21 22 0,21 20-1,-21-21-15,0 0 0,21 21 0,-21-20 16,0 20-16,0 0 15,22-20-15,-22-1 0,0 0 16</inkml:trace>
+  <inkml:trace contextRef="#ctx0" brushRef="#br0" timeOffset="-207592.73">8596 4128 0,'0'-21'16,"0"0"-16,0-1 0,0 1 15,0 42 1,0 1 0,0-1-16,0 0 15,0 0-15,21 22 16,0-22-16,-21 0 0,21 0 16,1 0-16,-1-21 0,-21 21 15,21-21-15,0 0 16,0-21-16,-21 0 15,0 0-15,0 0 16,0-22-16,0 1 0,0 21 16,0-22-16,0 1 0,0 21 15,-21 0-15,21 0 16,-21 42 0,21 0-16,0 0 15</inkml:trace>
+  <inkml:trace contextRef="#ctx0" brushRef="#br0" timeOffset="-207194.73">8956 4022 0,'-22'0'15,"22"-21"-15,-21 0 0,21 0 16,-21 42-1,21 0 1,0 0-16,0 0 0,0 0 16,0 22-16,0-1 15,0-21-15,0 22 0,0-22 16,0 0-16,0 0 0,21-21 31,-21-21-31,0 0 16,0 0-16,0-22 15,0 22-15,21-42 0,-21 20 16,0 1-16,0 0 16,22-1-16,-22 1 0,0 21 15,21 0-15,0 42 16,0 0-16,0 21 16,1 1-16,-1 20 0,0 1 15,0-1-15,0-20 16,-21 20-16</inkml:trace>
+  <inkml:trace contextRef="#ctx0" brushRef="#br0" timeOffset="-207059.73">8935 4297 0,'-22'-42'0,"22"0"16,0-1-16,0 1 0,0 21 15,22-21-15,20 42 0,0-22 16,0 22-16,-20 0 15</inkml:trace>
+  <inkml:trace contextRef="#ctx0" brushRef="#br0" timeOffset="-206176.73">9908 4274 0,'-21'-21'0,"21"0"16,-21-21-16,21 20 0,0-20 16,0-22-16,21 22 15,0 0-15,0 0 0,1-1 16,-1 22-16,0 0 0,0 0 16,0 21-16,0 21 15,0 0-15,1 21 0,-22 1 16,0-1-16,0 0 15,-22 1-15,1-22 0,-21 21 16,21-21-16,-21 1 0,-1-1 16,1-21-16,21 0 15,-1 0-15,1 0 0,0-21 16,0-1-16,21 1 16,0-21-16,0-1 0,21 22 15,0-21-15,0 0 0,1-1 16,20 22-16,0 0 15,1 21-15,-1 21 0,-21 0 16,0 22-16,0 20 16,-21 1-16,0 20 0,-21 1 15,0-22-15,-21 22 0,0 0 16,-1-22-16,-63 22 16,64-43-1,0-20-15,-1-1 0,1-21 16,21-21-16,0-1 15,21-20-15,21 0 0,0-1 16,0 1-16,22 0 16,20 21-16,-21-1 0,1 1 15,20 21-15,-20 0 16,-1 21-16,-21 1 0,21 20 16,-21 0-16,1-21 0,-1 22 15,-21-1-15,0-21 16,21 0-16,-21 1 15,21-22-15</inkml:trace>
+  <inkml:trace contextRef="#ctx0" brushRef="#br0" timeOffset="-205840.73">10437 4340 0,'43'-64'15,"-43"43"-15,-21 42 31,-1 0-31,22 1 16,-21 20-16,0-21 16,21 21-16,0-21 15,21 1-15,0 20 0,1-42 16,-1 21-16,0 0 0,0-21 16,0 0-16,21-21 15,-20 0-15,-1 0 16,0 0-16,-21-1 0,0-20 0,0 0 15,-21 0-15,0 20 16,-1 1-16,1 0 0,0 0 16,0 21-16,0 0 15,0 21-15,0 0 0,21 0 16,0 1 0,0-1-16,0 0 0,21-21 15</inkml:trace>
+  <inkml:trace contextRef="#ctx0" brushRef="#br0" timeOffset="-205643.73">10818 4107 0,'0'-43'0,"0"22"0,0-21 16,0 21-16,0-21 16,0 20-16,22 22 15,-22 22-15,21 20 16,-21-21-16,21 42 0,-21-20 15,21 20-15,-21-20 0,21-1 16,-21 0-16,0 1 16,0-1-16,0-21 0</inkml:trace>
+  <inkml:trace contextRef="#ctx0" brushRef="#br0" timeOffset="-205378.73">11136 4022 0,'21'-42'0,"-21"21"0,0-1 16,0 1-16,0 0 16,-21 21-16,0 0 15,21 21-15,-22 22 16,1-22-16,21 0 16,0 21-16,21 1 0,-21-1 15,43-21-15,-22 21 16,21 1-16,-20-22 0,20 21 15,0-20-15,-21-1 0,0 21 16,1-21-16,-44 0 16,22 0-16,-42-21 15,21 0-15</inkml:trace>
+  <inkml:trace contextRef="#ctx0" brushRef="#br0" timeOffset="-205238.73">11157 4001 0,'21'-63'0,"22"-22"15,-22 42-15,21-20 16,0 21-16,1-1 0,-1 22 16,0 21-16,22 0 15,-22 0-15,0 0 0,-20 21 16,-1 22-16</inkml:trace>
+  <inkml:trace contextRef="#ctx0" brushRef="#br0" timeOffset="-204562.73">7474 4890 0,'0'-21'0,"0"0"0,0 0 15,0-1-15,21 22 32,-21 22-32,21 20 0,-21-21 15,21 42-15,1-20 16,-22 42-16,21-22 0,0 22 16,-21-1-16,21-20 15,-21 20-15,0-20 0,21 0 16,-21-22-16,0 0 0</inkml:trace>
+  <inkml:trace contextRef="#ctx0" brushRef="#br0" timeOffset="-203892.73">7834 5758 0,'0'-21'16,"-21"21"0,0 0-16,-1 0 15,-20 0-15,0 0 0,-1 0 16,-20 21-16,-22 0 16,-21 0-16,1 0 0,-23 0 15,2 22-15,-2-1 0,-20 1 16,21-1-16,-21 0 15,42 22-15,1-22 0,-1 22 16,21-22-16,22 21 16,-1-20-16,43 20 0,0-20 15,21-1-15,0 0 0,63 0 16,1 1-16,63-22 16,21 0-16,42-21 0,43 0 15,21-21-15,21-21 16,43 20-16,-1-20 0,1-21 15,-22 20-15,-42-20 0,0-1 16,-42-20-16,-43 20 16,-42 1-16,-42-1 0,-43 22 15,-21-22-15,-42 1 16,-21 20-16,-43 1 0,-21 0 16,-21 0-16,-21-1 0,-21 22 15,0 0-15,-1 0 16,-20-1-16,20 22 0,22 0 15,21 0-15,0 22 0,21-22 16,43 21-16,-1 0 16,1 0-16,20 0 0</inkml:trace>
+  <inkml:trace contextRef="#ctx0" brushRef="#br0" timeOffset="-203453.73">7008 6075 0,'0'-21'0,"0"0"15,0 42 32,0 64-31,0-43-16,0 0 16,-21 1-16,21-1 0,0 1 15,0-1-15,0-21 16</inkml:trace>
+  <inkml:trace contextRef="#ctx0" brushRef="#br0" timeOffset="-203135.73">6945 6245 0,'0'-21'0,"0"-1"16,0 1-16,21 21 15,0 0-15,0-21 16,22 21-16,-1 0 0,22-21 15,-22 21-15,21-21 16,-20 21-16,-1-22 0,0 22 16,-20-21-16,-1 21 0,0-21 15,-21 0-15,-21 0 16,0 0 0,-1 0-16,1 21 0,0 0 31,21 21-31,0 0 0,0 21 15,0-21-15,-21 22 16,21-1-16,0 0 0,0 1 16,0-1-16,0-21 0,0 21 15</inkml:trace>
+  <inkml:trace contextRef="#ctx0" brushRef="#br0" timeOffset="-202769.73">7516 6052 0,'0'-42'16,"0"21"-16,21 21 16,-21 21-1,0 0-15,0 0 16,0 22-16,0-1 0,0-21 16,0 21-16,0 1 15,0-22-15,-21 0 0,21 0 16,0 0-16,-21-21 15,21-21 1,21 0-16,-21 0 0,21-22 16,-21 1-16,22 0 15,-1 0-15,0-1 0,0-20 16,0 20-16,1 22 0,-1 0 16,0 0-16,0 21 15,-21 21-15,21 0 0,0 21 16,-21 1-16,21-1 15,-21 1-15,22 20 0,-22-21 16,0 1-16,0-1 0,0 0 16,0-20-16</inkml:trace>
+  <inkml:trace contextRef="#ctx0" brushRef="#br0" timeOffset="-202625.73">7601 6245 0,'0'-21'0,"0"-22"0,0 22 16,0 0-16,0 0 15,21-1-15,22 22 16,-22-21-16,21 21 16,-21 0-16,21 0 0,1 0 15,-1 0-15,1-21 0</inkml:trace>
+  <inkml:trace contextRef="#ctx0" brushRef="#br0" timeOffset="-202164.73">8067 5948 0,'0'-21'0,"-22"0"15,22 0-15,-21 21 16,21-21-16,-21 21 16,21 21-1,0 0-15,0 21 16,0 1-16,0-1 0,0 0 16,0 1-16,0-1 0,0 0 15,0 1-15,0-22 16,0 21-16,0-63 15,0 0 1,0 0-16,21 0 0,-21-22 16,0 1-16,21-1 0,-21 1 15,0 0-15,0 21 16,22-22-16,-22 22 0,21 21 16,0 21-1,-21 1-15,0-1 16,21 0-16,-21 0 0,21 21 15,-21-21-15,22 1 16,-1-22-16,0 21 0,0-21 16,0-21-1,0 21-15,0-22 0,-21 1 16,22 0-16,-22-21 0,0-22 16,-22 43-1,22-21-15,-21 21 0,21-1 16,0 1-16,-21 21 15,21 21 1</inkml:trace>
+  <inkml:trace contextRef="#ctx0" brushRef="#br0" timeOffset="-201791.73">8426 5843 0,'22'-22'16,"-1"22"15,-21 22-31,0 20 16,21 21-1,-21-42-15,0 22 0,0-1 16,0 1-16,0-22 16,0 21-16,0-21 15,0-42 1,0 0-16,0 0 15,0-22-15,0 1 0,0 0 16,21-22-16,-21 22 16,21-22-16,1 22 0,-1 0 15,-21-1-15,21 22 16,0 21-16,0 0 0,0 21 16,-21 0-16,21 22 0,1-1 15,-22 22-15,21-22 16,-21 0-16,21 22 0,-21-22 15,0 1-15,0-22 16,0 0-16</inkml:trace>
+  <inkml:trace contextRef="#ctx0" brushRef="#br0" timeOffset="-201665.73">8554 6118 0,'-22'-43'0,"22"22"16,0-21-16,0 21 15,0-22-15,22 22 0,-1 0 16,21 0-16,0 0 0,1-1 15,-1 22-15,0 0 16,-20 0-16</inkml:trace>
+  <inkml:trace contextRef="#ctx0" brushRef="#br0" timeOffset="-195651.73">2267 8086 0,'-21'-21'0,"21"0"0,-21 0 16,21 0-16,0-1 15,-21 1-15,21 0 0,0 42 31,0 0-15,21 22-16,-21-1 0,0 0 16,0 1-16,21-22 0,-21 21 15,0 1-15,21-22 16,0 0-16,0-21 0,0 0 16,22-21-16,20-22 15,1 1-15,-1 0 0,22-22 16,0-20-16,-1 20 0,1-21 15,0 22-15,-1-1 16,-20 22-16,-1 0 0,-20 20 16</inkml:trace>
+  <inkml:trace contextRef="#ctx0" brushRef="#br0" timeOffset="-195052.73">5886 7197 0,'0'-21'0,"22"21"15,-22-21-15,21 0 16,0 21 0,-21 21-1,0 0 1,0 0-16,0 21 15,0-20-15,0 20 0,0-21 16,0 0-16,0 0 16,0 1-16,21-1 0,0-21 15,22-21 1,-1-1-16,21 1 0,22-21 16,0-22-16,21 22 15,21-21-15,-22-1 0,23 1 16,-23-1-16,-20 22 0,-21-1 15,-22 43-15</inkml:trace>
+  <inkml:trace contextRef="#ctx0" brushRef="#br0" timeOffset="-187534.73">2775 8150 0,'0'-21'16,"0"-1"-16,-21 1 15,21 0 1,-21 21-16,21-21 15,0 42 64,0 0-64,0 22-15,0-1 16,0 21-16,0 1 0,0-1 15,0 22-15,0 21 16,0-21-16,21-1 0,-21 22 16,21-21-16,-21-1 0,21-20 15,-21-1-15,21 22 16,-21-43-16,21 1 0,-21-1 16,22 0-16,-22-20 15,0-1-15,21 0 0,-21 0 16,0-42 15,-21 0-31</inkml:trace>
+  <inkml:trace contextRef="#ctx0" brushRef="#br0" timeOffset="-187288.73">2563 9314 0,'-21'0'16,"0"0"-1,42 0 17,0 0-32,-21 21 15,43 0 1,-22-21-16,0 21 0,21 0 15,-21-21-15,1 0 0,-22 22 16,21-22-16</inkml:trace>
+  <inkml:trace contextRef="#ctx0" brushRef="#br0" timeOffset="-187017.73">3114 9208 0,'21'0'0,"-21"-21"16,0 42 15,0 0-15,-21-21 0,0 21-16,-1 0 15,1-21-15,0 22 16,-21-1-16,20 0 0,1 0 15,0-21-15,21 21 0,-21 1 16,0-22-16,21 21 16,0 0-16</inkml:trace>
+  <inkml:trace contextRef="#ctx0" brushRef="#br0" timeOffset="-184385.73">2161 10499 0,'0'-42'16,"0"21"-16,0-1 15,0 1-15,21 0 16,1 21-16,-22-21 16,21 21-16,0 0 15,-21 21-15,21-21 0,-21 21 16,0 0-16,0 1 15,-21-1-15,0-21 16,-22 21-16,1-21 0,0 21 16,-1-21-16,1 0 0,-21 0 15,20-21-15,22 21 16,-21-21-16,20 0 0,22-1 16,0-20-16,0 21 15,22-21-15,-1-1 0,0 22 16,21-21-16,1 21 0,20-1 15,-21 22-15,22 22 16,-22 20-16,22 0 0,-22 22 16,-21-1-16,0 22 15,-21 21-15,0-22 0,-21 22 16,0 0-16,-21 0 16,0-21-16,-22-1 0,0-20 15,1-1-15,0-41 0,20 20 16,-20-42-16,20 0 15,1-21-15,-21-85 16,63 42-16,0 1 0,0-1 16,21-20-16,21 20 15,-21 22-15,21 0 0,22 20 16,-22 22-16,22 22 16,-1-1-16,-20 21 0,20 0 15,-20 22-15,-1-22 16,0 1-16,-21-1 0,22 0 15,-22 0-15,0-20 0,-21 20 16,21-42-16,-21 21 16,21-42-1</inkml:trace>
+  <inkml:trace contextRef="#ctx0" brushRef="#br0" timeOffset="-184026.73">2754 10605 0,'0'-21'0,"0"0"0,0 0 16,-21 21-1,-1 21 1,22 0-16,-21 0 16,21 21-16,0 1 0,0-1 15,-21 0-15,21 1 16,0 20-16,21-21 0,-21 1 15,21-22-15,1 21 16,-1-20-16,21-22 0,-21 0 16,1 0-16,20-22 0,-21 1 15,21-21-15,-21 21 16,1-43-16,-22 22 0,0 0 16,0-22-16,-22 22 15,1-1-15,0 1 0,-21 21 16,0 0-16,20 21 0,-20 0 15,21 0-15,0 0 16,-1 21-16,1-21 0,0 0 16</inkml:trace>
+  <inkml:trace contextRef="#ctx0" brushRef="#br0" timeOffset="-183434.73">3579 10266 0,'21'-21'15,"-21"0"-15,0 0 16,22 21-16,-22 21 31,-22 0-31,1 0 16,0 0-16,0 22 15,-21-22-15,-1 0 0,1-21 16,0 21-16,-1-21 16,22 0-16,-21 0 15,0 0-15,20-21 0,1 0 0,21 0 16,0-22-16,0 22 16,21 0-16,1-21 0,-1 21 15,21-22-15,0 43 16,1-21-16,-1 21 0,0 21 15,22 1-15,-22 20 16,0 21-16,1-20 0,-22 41 16,0-20-16,0-1 0,-21 22 15,0-21-15,-21-1 16,-42 43-16,41-64 16,-20 1-16,0-22 0,0-21 15,-1 0-15,1 0 16,-1-21-16,22-22 0,0 22 15,0-21-15,21-1 0,0 1 16,21 0-16,0 21 16,22-1-16,20 22 15,1 0-15,-22 22 16,0-1-16,1 0 0,-1 21 16,0-21-16,1 22 0,-22-22 15,0 0-15,21 21 16,-21-20-16,1-1 15</inkml:trace>
+  <inkml:trace contextRef="#ctx0" brushRef="#br0" timeOffset="-182943.73">4320 10139 0,'21'-42'0,"-21"0"0,0-1 15,0 1-15,0 21 16,-21 0-16,0-1 0,0 1 16,-22 21-16,1 0 15,-21 21-15,20 1 16,22-1-16,-21 0 0,21 21 16,-1 1-16,1-1 15,21 21-15,0-20 0,0-1 16,0 22-16,21-43 15,1 21-15,20-21 0,-21 0 16,22 1-16,-1-22 0,0 0 16,-21 0-16,22-22 15,-1 1-15,-21 0 0,0 0 16,1-21-16,-22-1 0,0 1 16,0 0-16,0-1 15,0 1-15,-22 0 0,22 21 16,0-1-16,0 44 15,0-1 1,22 21-16,-22 21 0,21 1 16,-21 21-16,21-22 15,0 22-15,-21-22 0,21 1 16,0 20-16,-21-20 16,21-22-16,-21 22 0,22 20 15,-22-62 1,0-1-16</inkml:trace>
+  <inkml:trace contextRef="#ctx0" brushRef="#br0" timeOffset="-182024.73">4870 9208 0,'-21'-21'15,"-21"0"-15,21 21 0,-43-22 16,22 22-16,-43 0 16,1 0-16,-1 22 15,-42-22-15,-21 21 0,-21 0 16,-22 0-16,-21 0 0,-21 22 15,1-1-15,-44 0 0,1 1 16,0 20-16,0-20 16,0 20-16,-233 64 15,275-63-15,21-1 16,1 0-16,41-20 0,43 20 16,0-41-16,43 20 15,41-21-15,22 0 0,21 0 16,21-21-16,22 0 0,20 0 15,1 0-15,20 0 16,1 0-16,-21 0 0,-1 0 16,0 0-16,-20 21 15,-1-21-15,-21 22 0,1-22 16,-1 21-16,-21 0 16,0 21-16,21-20 0,-21 20 15,0 21-15,0-20 0,21 41 16,-21 1-16,21 0 15,0 21-15,0 20 0,22 2 16,-22-2-16,21-20 0,1 21 16,-1 0-16,-21-42 15,21 21-15,-20-21 0,-1-1 16,0-20-16,0 20 16,0-20-16,-21-1 0,0 1 15,22-1-15,-22-20 0,0-1 16,0 0-16,0-21 15,0 1-15,21-22 0,0 0 16,0 0-16,21-22 0,1 1 16,41 0-16,1 0 15,42-21-15,21 21 0,22-22 16,20 1-16,22-1 16,20 1-16,44 0 0,-1 0 15,21-1-15,1 1 0,-1 21 16,21-22-16,-42 1 15,1 21-15,-22 0 0,-22-22 16,-41 22-16,-22 21 16,-21-21-16,-42 0 0,-21 21 15,-43-21-15,1 21 0,-1 0 16,-42-22-16,0 1 31,-21 0-15,0 21-16,-1 0 0,1-21 15,0 21-15,-21 0 0,21-21 16,0 0-16,-1 0 16,-20-1-16</inkml:trace>
+  <inkml:trace contextRef="#ctx0" brushRef="#br0" timeOffset="-181622.73">5146 9314 0,'-43'-85'0,"22"22"16,0-1-16,0 43 0,0-21 16,21 63-1,0 0-15,0 43 0,21-1 16,0 22-16,0 21 0,0 20 15,1-20-15,20 42 16,-21-20-16,21-2 0,-21 2 16,22-2-16,-1 2 0,-21-2 15,22-20-15,-22 0 16,21 21-16,-21-21 16,0-21-16,22 21 0,-22-22 15,0 1-15,-21 0 0,21-22 16,1-21-16,-22 1 15,21 20-15,-21-42 16,0 1-16,0-1 16</inkml:trace>
+  <inkml:trace contextRef="#ctx0" brushRef="#br0" timeOffset="-180680.73">5566 9571 0,'0'21'15,"0"0"17,21-21-17,0-21 1,1 21-16,-1-21 16,21-22-16,0 22 15,1-21-15,20-21 0,-20 20 16,20-20-16,-21-1 0,22-20 15,-22 20-15,1-21 16,-1-20-16,-21-1 0,-21 0 16,0 0-16,0-21 15,-21-21-15,0 21 0,-22 0 16,1-21-16,0 21 0,-1 0 16,1 0-16,-85-85 15,63 106-15,-20 0 16,-1 0-16,22 1 15,-22 20-15,0-21 0,1 22 16,20 20-16,1-21 0,-1 22 16,22-1-16,-1 1 15,22 20-15,0-20 0,21 21 16,0 21-16,21-22 16,0 1-16,22 21 0,-22-22 15,21 22-15,1-21 0,-1 21 16,0 0-16,1-1 15,-1-20-15,0 21 0,1 0 16,20-1-16,-21 1 0,1-21 16,-1 21-16,-21 21 15,1-21-15,-1 0 0,0 21 16,0 0-16,-21 21 31,-21-21-15,0 21-16</inkml:trace>
+  <inkml:trace contextRef="#ctx0" brushRef="#br0" timeOffset="-180416.73">5400 5483 0,'-21'21'0,"-1"-21"15,44 0 1,-1 0 0,0 0-16,21 0 15,-21 0-15,22 0 16,-1 0-16,0 0 0,1 0 16,-22 21-16,21-21 15,-21 21-15,0 0 0,-21 22 16,0-1-16,0 0 0,0 1 15,0 41-15,-42-20 16,21 20-16</inkml:trace>
+  <inkml:trace contextRef="#ctx0" brushRef="#br0" timeOffset="-177573.73">1061 3810 0,'-22'-63'0,"1"21"0,-21 21 16,21-22-16,-22 22 0,1 0 15,21 0 1,21 42-16,0 21 16,21 1-1,21-1-15,1 42 0,-1 1 16,22 42-16,20-21 0,1 42 15,42 0-15,0 22 16,21 20-16,0-20 0,21 20 16,1 0-16,-1 1 0,-21 0 15,-21-22-15,0 0 16,0-21-16,-21 22 0,-21-22 16,-22-21-16,22 0 15,-22 0-15,-20-21 0,20-1 16,-20-20-16,-1-21 15,-21-22-15,21 0 0,-20 1 16,-1-22-16,0-21 31,0 0-15,0-21 0,-21-1-1,0-20 1</inkml:trace>
+  <inkml:trace contextRef="#ctx0" brushRef="#br0" timeOffset="-176961.73">2944 3387 0,'-21'0'15,"21"21"-15,0 0 16,-21 1-16,21-1 16,-21 0-16,0 0 0,0 22 15,21 20-15,-22 0 16,-20 22-16,21 42 0,-22 0 16,1 21-16,-21 43 0,-1-1 15,1 43-15,-22 21 16,-21-21-16,21 21 0,1 0 15,20 0-15,-20 0 0,41-42 16,-20-22-16,42-20 16,-22-1-16,22-42 0,0-21 15,21-22-15,-21-20 16,21-1-16,0-20 0,-21-1 16,21 0-16,0-20 15,0-1-15,0 0 0,0 0 16,0 0-16,0-42 62,21 0-46,-21 0 0,21 21-16,-21-21 15,21-22-15</inkml:trace>
+  <inkml:trace contextRef="#ctx0" brushRef="#br0" timeOffset="-168526.73">2078 14734 0,'42'-22'15,"-42"1"-15,21 0 0,0 0 0,-21 0 16,21-1-16,0 22 16,1-21-16,-22 0 0,21-21 15,-21 21-15,21 0 16,-21-1-16,0 1 0,0 0 15,-21 0-15,0 0 0,-1-1 16,-20 22-16,-21 0 16,20 0-16,-41 22 0,20-1 15,-20 21-15,20-21 16,-21 22-16,22-1 0,21 0 16,20 1-16,1-1 0,42 0 15,22-20-15,-1 20 16,43-21-16,21 0 0,-1 21 15,22-20-15,0-1 0,-21 0 16,0 21-16,-21-20 16,-22-1-16,-20 21 0,-22 0 15,-42 1-15,-1-22 16,-126 64-16,64-64 16,-22 0-16,-21 0 0,21 0 15,-21-21-15,21 0 16,0-21-16,22 0 0,20-21 15,0 20-15,43-20 16,21 0-16,21-1 0,22 22 16</inkml:trace>
+  <inkml:trace contextRef="#ctx0" brushRef="#br0" timeOffset="-168271.73">2796 14373 0,'0'-43'16,"0"22"-16,0 0 0,-21 0 16,0 21-16,0 0 15,0 21-15,-1 21 0,1-20 16,0 20-16,0 21 16,21 1-16,0-1 0,0 22 15,0-22-15,0 22 0,0 0 16,21-1-16,-21 1 15,21-21-15,-21 20 0,0-20 16,21-22-16,-21 0 0,22-20 16</inkml:trace>
+  <inkml:trace contextRef="#ctx0" brushRef="#br0" timeOffset="-167783.73">3156 14500 0,'0'-21'16,"-21"-1"-16,21 1 16,-21 21-16,0 0 0,-1 0 15,1 21-15,21 1 16,0-1-16,-21 21 16,21 0-16,0 1 0,0-22 15,0 21-15,0 1 16,0-1-16,0 0 0,0-21 15,0 0-15,0 1 0,21-22 16,0 0-16,1 0 16,-1 0-16,21 0 0,-21-22 15,21 22-15,1-21 16,-22 0-16,21 21 0,-20-21 16,20 0-16,-21 21 0,0-21 15,0 0-15,0-1 16,-21-20-16,22 21 15,-22 0-15,21-22 0,-21 1 16,21 21-16,-21-21 16,0 20-16,0 1 0,21 0 15,-21 0-15,0 42 32,0 0-32,0 22 0,21 62 15,-21-41-15,0 21 16,0-22-16,0 0 15,0 1-15,22 0 0,-1-1 16,21-21-16,-21 1 0</inkml:trace>
+  <inkml:trace contextRef="#ctx0" brushRef="#br0" timeOffset="-167538.73">4087 14373 0,'-21'-43'0,"0"22"16,0 0-1,0 21 1,21 21-16,0 0 16,0 22-16,0-1 0,0 21 15,0 1-15,0 0 0,0-1 16,0 0-16,0 1 15,0-22-15,21 1 0,-21-22 16,21 0-16</inkml:trace>
+  <inkml:trace contextRef="#ctx0" brushRef="#br0" timeOffset="-167218.73">4108 14669 0,'0'-42'0,"0"20"0,0 1 16,0 0-1,42 0 1,-21 21-16,0-21 16,21 0-16,22 0 0,-22 21 15,1-22-15,-1 1 0,0 0 16,1 0-16,-22 0 16,0-1-16,-21 1 0,0 0 15,-21-21-15,0 21 16,-1 0-16,1-1 0,0 1 15,21 0-15,-21 21 0,21 21 16,0 22 0,0-1-16,21 21 0,-21 1 15,21-1-15,-21 1 16,21-1-16,1 1 0,-22-22 16,42 43-1</inkml:trace>
+  <inkml:trace contextRef="#ctx0" brushRef="#br0" timeOffset="-166853.73">4765 14203 0,'0'-21'16,"0"0"-16,0 42 16,0 0-16,0 1 0,0 20 15,0 0-15,-22 0 16,22 22-16,0 0 15,-21-22-15,21 0 0,0 22 16,0-43-16,0 21 0,0-21 16,21-21-1,-21-21-15,22-64 16,-1 43-16,-21-42 16,0 20-16,0-21 15,0 1-15,21-1 0,-21 0 16,21 22-16,0 21 0,1 20 15,-1 22-15,0 0 16,21 43-16,-21 20 0,22 1 16,-22-1-16,0 1 15,0 20-15,0-20 0,1-22 16,-1 22-16,0-22 0,-21-21 16</inkml:trace>
+  <inkml:trace contextRef="#ctx0" brushRef="#br0" timeOffset="-166703.73">4913 14479 0,'-64'-43'16,"43"22"-1,21 0 1,21 21-16,0-21 16,22 21-16,-1-22 0,22 1 15,-1 0-15,1-21 16</inkml:trace>
+  <inkml:trace contextRef="#ctx0" brushRef="#br0" timeOffset="-166175.73">5590 13992 0,'-21'-22'15,"0"1"-15,-21 0 0,20 0 16,1 21-16,0-21 16,21 42-1,0 21-15,21 1 0,0-1 16,1 22-16,-1-1 15,0 0-15,0 22 16,21 42-16,-42-63 16,21-1-16,-21-20 0,0-22 15,-21 0-15,0-21 16,21-21-16,-21-22 16,0 1-16,21-22 0,-21 1 15,21-22-15,0 1 16,0-1-16,0 0 0,0 22 15,21-1-15,-21 22 16,21 21-16,0 21 0,0 0 16,-21 21-16,21 21 0,1-21 15,-1 22-15,21 20 16,-21-20-16,1-1 0,20 0 16,-21 22-16,21-22 0,1 1 15,-22-1-15,21-21 16,1 0-16,-22 0 15,0 0-15,0-21 0,0 0 16,0-21-16,-21 0 0,0-21 16,0 0-16,0-22 15,0 0-15,-42-168 16,21 168 0,21 1-16,-21-1 0,21 43 15,0 0-15,0 42 31,0 21-31,21-20 0</inkml:trace>
+  <inkml:trace contextRef="#ctx0" brushRef="#br0" timeOffset="-165773.73">6394 13738 0,'0'-21'0,"-21"-1"15,0 1-15,21 0 0,0 42 16,0 0 0,0 22-16,0 20 15,21 1-15,-21-1 0,21 22 16,-21-22-16,22 22 16,-22-21-16,0-1 0,21-21 15,-21 1-15,0-22 16,0 0-16,0-42 15,0 0-15,0-22 0,0 1 16,0-43-16,0 1 16,0-1-16,0-21 0,0 21 15,0-20-15,21 41 0,-21 1 16,21 20-16,0 22 16,1 21-16,-1 42 0,21 1 15,0 20-15,-21 1 16,22 20-16,20 1 0,-20 0 15,-22-1-15,21 1 16,0-21-16,-20-1 0,-22-21 16,0-20-16</inkml:trace>
+  <inkml:trace contextRef="#ctx0" brushRef="#br0" timeOffset="-165622.73">6416 14098 0,'-43'-43'15,"65"43"1,20 0-16,-21-21 16,42 21-16,1-21 0,0 21 15,20-21-15,22-1 16</inkml:trace>
+  <inkml:trace contextRef="#ctx0" brushRef="#br0" timeOffset="-165473.73">7368 13907 0,'0'-21'16,"0"0"-1,21 0-15,0-1 0,1 1 16,20 0-16,0 0 0,-21 0 16,22 21-16</inkml:trace>
+  <inkml:trace contextRef="#ctx0" brushRef="#br0" timeOffset="-165221.73">8321 13378 0,'-21'-21'0,"21"0"0,-22 21 16,1 0-16,0 0 15,21 21-15,0 0 0,0 42 16,21-20-16,0 41 16,22 107-16,-1-106 15,0 20-15,1 1 0,-22-21 16,21-1-16,1 1 16,-22-42-16,0-1 0</inkml:trace>
+  <inkml:trace contextRef="#ctx0" brushRef="#br0" timeOffset="-164945.73">8405 13547 0,'-63'-127'15,"-22"0"-15,0-21 0,1 21 16,20-21-16,-20 21 16,-1-148-1,64 169-15,21 0 0,21 21 16,42 22-16,22 21 0,42-1 15,0 22-15,21 21 0,1 21 16,20 22-16,-21 20 16,0 22-16,-42 21 0,-43 20 15,1 2-15,-64-2 16,-21 2-16,-43-2 0,1 2 16,-43-44-16,0 1 0,0 0 15,-21-43-15,43 0 16,-1-21-16</inkml:trace>
+  <inkml:trace contextRef="#ctx0" brushRef="#br0" timeOffset="-163865.73">9169 13547 0,'-21'-21'0,"0"21"0,-21-21 16,42 0-16,-22 0 0,22-1 16,0 1-16,22 0 0,-1 21 15,21 0-15,-21 0 16,22 0-16,20 21 0,-21 0 16,1 22-16,-1-1 15,1 0-15,-22-21 0,0 22 16,-21-1-16,0-21 15,0 22-15,-21-22 0,0-21 16,-1 0-16,1-21 16,0 0-16,0-22 15,21 1-15,-21 21 0,21-43 16,42-20 0,-21 41-16,0 1 15,22 21-15,-22-1 0,21 1 0,0 21 16,1 0-16,-1 0 15,-21 0-15,22 21 0,-22-21 16,0 22-16,0-22 0,-21 21 16,-21-21 15,0 0-15,0 21-1,0 21 1,21 1-16,0-22 0,0 21 15,21 22 1,0-43-16,21 21 0,0-42 16,1 21-16,-1-21 0,1-21 15,-1 21-15,-21-21 0,21-21 16,-42 20-16,0-20 16,0 21-16,-21-21 0,-21 21 15,0-22-15,20 22 16,-20-21-16,0 20 0,20 22 15,1-21-15,0 21 0,42 0 32,0 0-32,22 0 0,-1-21 15,22 21-15,-1 0 16,22-21-16,0 21 0,-1 0 16,-20-21-16,-1 21 0,-20 0 15,-1-21-15,-21 21 16,-42 0-1,0 0-15,0 0 0,-1 0 16,-20 0-16,21 21 16,-22 0-16,22-21 0,0 42 15,0-21-15,21 1 16,-21-1-16,21 21 0,21-21 16,0 22-16,-21-22 0,42 0 15,-20-21-15,20 21 16,0-21-16,22-21 15,-22 0-15,0 0 16,-20-22-16,-1 1 0,0-22 16,-21 22-16,0-21 15,-21-22-15,0 0 0,-22 1 16,22-1-16,-21 21 0,21 1 16,-22 0-16,43 41 15,-21 22-15,21 22 0,0-1 16,0 42-16,21 1 15,1 20-15,20 1 0,0 21 16,43 63 0,-64-84-16,21-22 0,1 1 15,-1-1-15,-21-42 0,21 22 16,-20-43-16</inkml:trace>
+  <inkml:trace contextRef="#ctx0" brushRef="#br0" timeOffset="-163535.73">10966 13314 0,'0'-21'0,"-21"-21"0,21 21 16,-21-1 0,21 44-1,0-1 1,0 0-16,0 21 16,21-20-16,-21-1 15,21 0-15,1 0 0,-1 0 16,0 0-16,21 0 15,-20-21-15,-1 0 0,21 0 16,-21 0-16,0-21 0,0 0 16,1-21-16,-22 21 15,0 0-15,0-22 0,0 22 16,-22-21-16,22 20 16,-21 22-16,0 0 15,0 0-15,21 22 16,0-1-16,0 0 0,0 0 15,0 22-15,21-22 0,21 0 16,-20 0-16</inkml:trace>
+  <inkml:trace contextRef="#ctx0" brushRef="#br0" timeOffset="-163127.73">11792 13293 0,'0'-21'0,"0"0"16,0 0-16,0 0 15,-21-1-15,0 1 16,-1 0-16,1 0 16,0 21-16,-21 0 0,21 0 15,0 21-15,-1 0 16,1 22-16,0-22 0,0 21 16,21 0-16,0 1 0,0-1 15,21-21-15,0 22 16,22-22-16,-1-21 0,21 21 15,1-21-15,21-21 16,-22 21-16,85-64 16,-63 22-16,-43-1 0,0 1 15,1 0-15,-43-22 16,0 1-16,-21 20 0,-1-20 16,-20 21-16,21-22 15,-21 43-15,21 0 0,-1 0 16,22 42-1,0 0-15,22 0 0,-1 22 16,0-1-16,0 21 0,0-20 16,21 20-16,-20 1 15,-1-22-15,0 0 0</inkml:trace>
+  <inkml:trace contextRef="#ctx0" brushRef="#br0" timeOffset="-162993.73">12256 13293 0,'0'-42'15,"-21"-1"-15,21 1 0,0 0 16,21 0-16,0 20 0,21-20 16,0 21-16,1 21 15,20 0-15,-20 0 0,-1 21 16</inkml:trace>
+  <inkml:trace contextRef="#ctx0" brushRef="#br0" timeOffset="-162173.73">10184 14478 0,'22'-21'0,"-1"21"16,-21-21-16,21 0 16,0 0-16,-21 0 15,21 0-15,0-22 0,-21 1 16,0-1-16,0 1 0,0 0 16,-42 21-16,0-22 15,-22 22-15,-21 21 0,1 21 16,-1 1-16,-21 41 15,22-21-15,-1 43 0,21-21 16,43 20-16,0-20 0,42 20 16,85 64-1,0-105-15,0 20 0,0 1 16,21-22-16,-21 22 0,-1-22 16,-20 0-16,-21 22 15,-43-22-15,-21 0 0,-21 1 16,-22-22-16,-42 21 15,1-42-15,-22 0 0,0 0 16,22 0-16,-1-21 0,0-21 16,22-1-16,20 1 15,22 0-15,21 0 0,0-1 16,0 1-16,21 21 16,22-1-16,-22 1 0,0 21 15,0 21-15,-21 1 16,21-1-16,-21 21 0,0 1 15,0-1-15,0 0 0</inkml:trace>
+  <inkml:trace contextRef="#ctx0" brushRef="#br0" timeOffset="-161800.73">10501 15029 0,'42'-21'0,"-21"-22"16,0 1-16,1 21 0,-22 0 15,0-22-15,0 22 0,0 0 16,0 42 15,0 0-31,0 22 16,0-22-16,0 21 0,21 1 16,-21-22-16,21 21 15,21-21-15,1 0 0,-1 0 16,0-21-16,1 0 0,-1-21 15,0 0-15,1 0 16,-1 0-16,-21 0 0,-21 0 16,0-22-16,-21 22 0,-21 0 15,-1 0-15,1-22 16,-22 43-16,22-21 0,0 0 16,0 21-16,20 0 0,1 0 15,21 21 1,21-21-16,1 0 15</inkml:trace>
+  <inkml:trace contextRef="#ctx0" brushRef="#br0" timeOffset="-161591.73">11157 14480 0,'0'-22'0,"0"-20"15,0 21-15,-21 0 0,21-1 16,0 1-16,0 42 15,21 1 1,-21 20-16,21 0 0,0 22 16,1-1-16,-22 1 15,21-1-15,0 1 0,0-22 16,0 0-16,-21 1 0,21-22 16,0 0-16,1-21 15</inkml:trace>
+  <inkml:trace contextRef="#ctx0" brushRef="#br0" timeOffset="-161284.73">11496 14732 0,'0'-42'16,"0"21"-16,0 0 0,0 0 16,0 42 15,21 21-15,21 0-1,-21 1-15,0-22 0,22 0 16,-1 22-16,-21-43 15,22 21-15,-1-21 0,0 0 16,-21-21-16,22-1 16,-22 1-16,-21-21 0,0-1 15,0 1-15,-21 0 0,0-22 16,-1 43-16,1-21 16,0 21-16,0-1 0,0 22 15,0 0-15,21 22 16,0-1-16,0 0 15,21 0-15,0 0 0,0 1 16,21-22-16</inkml:trace>
+  <inkml:trace contextRef="#ctx0" brushRef="#br0" timeOffset="-160833.73">12194 14457 0,'0'-21'16,"0"-21"-16,0 0 0,-21-1 15,21 22-15,-21-21 16,21 20-16,-21 1 0,21 0 15,0 42-15,0 0 16,21 22-16,0-1 16,0 1-16,22 20 0,-22 0 15,0 1-15,0-22 16,0 22-16,0-22 0,0-21 16,-21 0-16,-21-42 31,0 21-31,0-42 0,-21 21 15,21 0-15,-1 0 16,1-1-16,0 1 0,0 21 16,21-21-1,21 21-15,0 0 16,22 0-16,-1-21 0,0 21 16,0-21-16,22-1 15,-22 1-15,1 0 0,-1 21 16,-21-21-16,0 0 0,-21 0 31,0 42-15,0 0-1,0 0-15,21 0 16,1 0-16,-22 1 0,21 20 16,0-21-16,0 0 15,0 1-15</inkml:trace>
+  <inkml:trace contextRef="#ctx0" brushRef="#br0" timeOffset="-160677.73">12787 14288 0,'-106'-106'32,"85"64"-32,0 21 0,21 42 31,0 0-16,21 21-15</inkml:trace>
+  <inkml:trace contextRef="#ctx0" brushRef="#br0" timeOffset="-160003.73">13062 14330 0,'0'-21'0,"0"0"16,-21 21-1,0-21-15,-1 42 16,22 0 0,-21 21-16,21-20 0,0 20 15,21 0-15,-21-20 16,22 20-16,20-21 0,-21 0 16,22-21-16,-1 0 0,0 0 15,22 0-15,-22 0 16,0-21-16,-20 0 0,-1-21 15,0 20-15,-21-20 16,-21 0-16,-22-1 0,1 1 16,0 0-16,-22-1 0,1 1 15,20 21-15,1 0 16,21 21-16,0 0 0,-1 21 16,22 0-16,0 21 0,0 1 15,22-1-15,-1 0 16,21-21-16,-21 22 0,22-22 15,-1-21-15,0 0 16,-21 0-16,22 0 0,-1-21 16,-21 0-16,1-1 0,-1 1 15,0-21-15,0 21 16,-21 0-16,0 0 0,21-1 16,-21 1-16,21 21 15,0 21-15,1 22 16,-1-22-16,0 0 0,21 21 15,1-21-15,-1 1 16,-21-1-16,21 0 0,-20-21 16,20 0-16,-21 0 15,0-21-15,1 0 0,-22-1 16,21 1-16,-21 0 0,21-21 16,0 21-16,0 0 15,0 21-15,0-22 0,1 22 16,20 22-16,-21-1 15,22 0-15,-1 0 0,-21 21 16,21-21-16,-21 1 0,1-1 16,-1 0-16,0 0 15</inkml:trace>
+  <inkml:trace contextRef="#ctx0" brushRef="#br0" timeOffset="-159557.73">11115 15283 0,'-170'84'16,"43"-41"-16,43 20 0,-1-42 15,43 1-15,42-1 16,42-21-16,21 0 15,1 0-15,21-21 0,20 21 16,23-22-16,62-20 16,0 0-16,64-1 0,22 1 15,62-21-15,22-1 0,21 1 16,21-1-16,1 22 16,-23-1-16,-41 1 0,-21 21 15,-64 0-15,-64 0 16,-42 21-16,-42-21 0,-42 21 15,-43-22-15,0 22 16,-21-21-16,-21 21 16,21-21-16,-21 21 15,-1 0 48,-20 0-63,0 0 0,-1 0 15</inkml:trace>
+  <inkml:trace contextRef="#ctx0" brushRef="#br0" timeOffset="-159354.73">16089 14436 0,'0'21'0,"21"0"0,21-21 16,-21 0-16,1-21 15,20 21-15,-21 0 0,0-21 16</inkml:trace>
 </inkml:ink>
 </file>
 
@@ -2583,6 +2686,34 @@
 </inkml:ink>
 </file>
 
+<file path=ppt/ink/ink69.xml><?xml version="1.0" encoding="utf-8"?>
+<inkml:ink xmlns:inkml="http://www.w3.org/2003/InkML">
+  <inkml:definitions>
+    <inkml:context xml:id="ctx0">
+      <inkml:inkSource xml:id="inkSrc0">
+        <inkml:traceFormat>
+          <inkml:channel name="X" type="integer" max="1920" units="cm"/>
+          <inkml:channel name="Y" type="integer" max="1080" units="cm"/>
+          <inkml:channel name="T" type="integer" max="2.14748E9" units="dev"/>
+        </inkml:traceFormat>
+        <inkml:channelProperties>
+          <inkml:channelProperty channel="X" name="resolution" value="55.81395" units="1/cm"/>
+          <inkml:channelProperty channel="Y" name="resolution" value="55.6701" units="1/cm"/>
+          <inkml:channelProperty channel="T" name="resolution" value="1" units="1/dev"/>
+        </inkml:channelProperties>
+      </inkml:inkSource>
+      <inkml:timestamp xml:id="ts0" timeString="2022-02-21T14:52:55.531"/>
+    </inkml:context>
+    <inkml:brush xml:id="br0">
+      <inkml:brushProperty name="width" value="0.05" units="cm"/>
+      <inkml:brushProperty name="height" value="0.05" units="cm"/>
+      <inkml:brushProperty name="fitToCurve" value="1"/>
+    </inkml:brush>
+  </inkml:definitions>
+  <inkml:trace contextRef="#ctx0" brushRef="#br0">148 250 0,'-50'0'0,"26"0"16,-1-25-16,0 25 16,1 0-16,24 25 15,0-1 1,24 1-16,-24 24 0,25 1 16,0-26-16,-25 26 0,24-1 15,26-24-15,-26-1 16,1 1-16,24-25 0,1 0 15,-1-25-15,0 1 0,1-1 16,-1-24-16,0 24 16,-24-49-16,0 25 0,-1-1 15,1 1-15,-25 0 16,0 0-16,-25-1 0,1 1 16,-1 24-16,-24 25 15,-25 0-15,24 0 0,1 0 16,-25 0-16,25 25 15,-25 0-15,49-1 0,-24-24 16,24 25-16,25 0 0,0-1 16</inkml:trace>
+</inkml:ink>
+</file>
+
 <file path=ppt/ink/ink7.xml><?xml version="1.0" encoding="utf-8"?>
 <inkml:ink xmlns:inkml="http://www.w3.org/2003/InkML">
   <inkml:definitions>
@@ -2609,6 +2740,299 @@
   </inkml:definitions>
   <inkml:trace contextRef="#ctx0" brushRef="#br0">147 757 0,'-24'0'0,"24"-24"0,0-1 16,0 50 15,0 47-15,24-24-16,-24 1 15,24 23-15,-24 1 0,24 0 16,-24-25-16,25 0 16,-25 1-16,0-1 0,0-24 15,0 0-15,-25-48 16,25 0-1,-24-24-15,0-1 0,0-23 16,0-1-16,24 1 0,-24-25 16,-1-24-16,1 24 15,24-24-15,-24 0 0,24 24 16,24-23-16,0 47 16,49-48-16,-25 97 15,25 24-15,-25 24 0,25 24 16,-1 25-16,-23 0 15,-1-1-15,-24 25 0,-24 0 16,0-1-16,-24 1 16,-24-24-16,-1-1 0,1 1 15,0-25-15,-1-24 0,25 1 16,-24-1-16,23-24 16,50-24-1,-1 24 1,24 0-16,-24 0 15,25 24-15,23-24 0,-23 24 16,-1 24-16,25-23 16,-25 23-16,0-24 0,1 25 15,-1-25-15,1 0 16</inkml:trace>
   <inkml:trace contextRef="#ctx0" brushRef="#br0" timeOffset="357">1066 1047 0,'0'-24'0,"-24"0"16,24-1-16,24 25 47,-24 25-47,25-25 15,-1 0-15,0 0 0,0 0 16,0 0-16,0 0 0,25 0 15,-25-25-15,24 1 16,-23 0-16,-1 0 0,-24 0 16,0-1-16,0 1 15,-24 0-15,-1 0 0,1 0 16,-24 0-16,-1-1 16,1 25-16,24 0 0,-24 25 15,23-1-15,1 0 0,0 24 16,24 1-16,0-1 15,24 0-15,-24 1 0,49-1 16,-1-24-16,0 25 0,1-25 16,23 0-16,-23 0 15</inkml:trace>
+</inkml:ink>
+</file>
+
+<file path=ppt/ink/ink70.xml><?xml version="1.0" encoding="utf-8"?>
+<inkml:ink xmlns:inkml="http://www.w3.org/2003/InkML">
+  <inkml:definitions>
+    <inkml:context xml:id="ctx0">
+      <inkml:inkSource xml:id="inkSrc0">
+        <inkml:traceFormat>
+          <inkml:channel name="X" type="integer" max="1920" units="cm"/>
+          <inkml:channel name="Y" type="integer" max="1080" units="cm"/>
+          <inkml:channel name="T" type="integer" max="2.14748E9" units="dev"/>
+        </inkml:traceFormat>
+        <inkml:channelProperties>
+          <inkml:channelProperty channel="X" name="resolution" value="55.81395" units="1/cm"/>
+          <inkml:channelProperty channel="Y" name="resolution" value="55.6701" units="1/cm"/>
+          <inkml:channelProperty channel="T" name="resolution" value="1" units="1/dev"/>
+        </inkml:channelProperties>
+      </inkml:inkSource>
+      <inkml:timestamp xml:id="ts0" timeString="2022-02-21T14:52:56.088"/>
+    </inkml:context>
+    <inkml:brush xml:id="br0">
+      <inkml:brushProperty name="width" value="0.05" units="cm"/>
+      <inkml:brushProperty name="height" value="0.05" units="cm"/>
+      <inkml:brushProperty name="fitToCurve" value="1"/>
+    </inkml:brush>
+  </inkml:definitions>
+  <inkml:trace contextRef="#ctx0" brushRef="#br0">0 226 0,'24'-25'16,"1"50"0,-25-1-1,25 1-15,-1 0 0,-24-1 16,0 26-16,25-1 15,-25-25-15,0 26 0,0-1 16,0-24-16,0-1 16,0 1-16,-25 0 0,25-50 15,0 0 1,0-24 0,0 0-16,0-1 0,0 1 15,0-25-15,0 25 0,25-25 16,-25 25-16,25-1 15,-25 1-15,24 24 0,26 1 16,-26 24-16,1 0 16,0 0-16,24 24 0,-24 1 15,-1 0-15,1-1 0,-25 1 16,0 0-16,-25 24 16,25-24-16,-49-1 0,24 1 15,-24 0-15,0-1 16,-1-24-16,26 25 0,-1-25 15,0 0-15,25 25 16,25-25 0,0 24-16,-1-24 0,26 25 15,-26-1-15,26-24 16,-1 25-16,-24-25 0,-1 0 16,26 25-16,-26-25 15</inkml:trace>
+  <inkml:trace contextRef="#ctx0" brushRef="#br0" timeOffset="390">641 226 0,'0'-25'0,"0"0"0,0 1 16,0-1-1,0 50 1,0-1-1,0 26-15,0-26 16,0 26-16,0-26 0,0 26 16,0-26-16,0 1 0,0 24 15,0-24 1,25-25 0,-25-25-1,0 0-15,0 1 0,0-25 16,24-1-16,-24 1 0,0 0 15,0-25-15,25 24 16,-25 26-16,25-1 0,-1 0 16,1 25-1,0 25-15,-1 0 0,1-1 16,0 26-16,-1-1 16,1 0-16,-25-24 0,25 24 15,-1-24-15,-24 0 0,25-1 16</inkml:trace>
+  <inkml:trace contextRef="#ctx0" brushRef="#br0" timeOffset="547">616 275 0,'0'-25'16,"25"1"-1,0 24-15,24 0 16,0-25-16,1 25 0,24 0 15,0-25-15,0 25 16,-25 0-16</inkml:trace>
+</inkml:ink>
+</file>
+
+<file path=ppt/ink/ink71.xml><?xml version="1.0" encoding="utf-8"?>
+<inkml:ink xmlns:inkml="http://www.w3.org/2003/InkML">
+  <inkml:definitions>
+    <inkml:context xml:id="ctx0">
+      <inkml:inkSource xml:id="inkSrc0">
+        <inkml:traceFormat>
+          <inkml:channel name="X" type="integer" max="1920" units="cm"/>
+          <inkml:channel name="Y" type="integer" max="1080" units="cm"/>
+          <inkml:channel name="T" type="integer" max="2.14748E9" units="dev"/>
+        </inkml:traceFormat>
+        <inkml:channelProperties>
+          <inkml:channelProperty channel="X" name="resolution" value="55.81395" units="1/cm"/>
+          <inkml:channelProperty channel="Y" name="resolution" value="55.6701" units="1/cm"/>
+          <inkml:channelProperty channel="T" name="resolution" value="1" units="1/dev"/>
+        </inkml:channelProperties>
+      </inkml:inkSource>
+      <inkml:timestamp xml:id="ts0" timeString="2022-02-21T14:52:57.794"/>
+    </inkml:context>
+    <inkml:brush xml:id="br0">
+      <inkml:brushProperty name="width" value="0.05" units="cm"/>
+      <inkml:brushProperty name="height" value="0.05" units="cm"/>
+      <inkml:brushProperty name="fitToCurve" value="1"/>
+    </inkml:brush>
+  </inkml:definitions>
+  <inkml:trace contextRef="#ctx0" brushRef="#br0">0 25 0,'25'0'16</inkml:trace>
+  <inkml:trace contextRef="#ctx0" brushRef="#br0" timeOffset="1348">124 0 0,'0'25'62,"0"-1"-46,0 26 0,0-26-16,0 26 0,0-1 15,0 0-15,0 1 16,-25-1-16,25 25 0,0-25 15,0 1-15,-25-1 16,25 0-16,0-24 0</inkml:trace>
+</inkml:ink>
+</file>
+
+<file path=ppt/ink/ink72.xml><?xml version="1.0" encoding="utf-8"?>
+<inkml:ink xmlns:inkml="http://www.w3.org/2003/InkML">
+  <inkml:definitions>
+    <inkml:context xml:id="ctx0">
+      <inkml:inkSource xml:id="inkSrc0">
+        <inkml:traceFormat>
+          <inkml:channel name="X" type="integer" max="1920" units="cm"/>
+          <inkml:channel name="Y" type="integer" max="1080" units="cm"/>
+          <inkml:channel name="T" type="integer" max="2.14748E9" units="dev"/>
+        </inkml:traceFormat>
+        <inkml:channelProperties>
+          <inkml:channelProperty channel="X" name="resolution" value="55.81395" units="1/cm"/>
+          <inkml:channelProperty channel="Y" name="resolution" value="55.6701" units="1/cm"/>
+          <inkml:channelProperty channel="T" name="resolution" value="1" units="1/dev"/>
+        </inkml:channelProperties>
+      </inkml:inkSource>
+      <inkml:timestamp xml:id="ts0" timeString="2022-02-21T14:53:01.680"/>
+    </inkml:context>
+    <inkml:brush xml:id="br0">
+      <inkml:brushProperty name="width" value="0.05" units="cm"/>
+      <inkml:brushProperty name="height" value="0.05" units="cm"/>
+      <inkml:brushProperty name="fitToCurve" value="1"/>
+    </inkml:brush>
+  </inkml:definitions>
+  <inkml:trace contextRef="#ctx0" brushRef="#br0">24 0 0,'25'0'0,"-25"24"31,0 1-16,-25 0-15,25-1 16,-24 1-16,24-1 0,0 26 16,0-26-16,0 26 15,24-1-15,-24-24 16,50-1-16,-26-24 0,1 0 16,24 0-16,1-24 15,-26 24-15,26-50 16,-26 26-16,1-1 0,0-24 15,-1 24-15,-24-24 0,0 24 16,-24 1-16,-1-1 0,0 0 16,-24 25-16,0 0 15,-75 25-15,75 0 16</inkml:trace>
+</inkml:ink>
+</file>
+
+<file path=ppt/ink/ink73.xml><?xml version="1.0" encoding="utf-8"?>
+<inkml:ink xmlns:inkml="http://www.w3.org/2003/InkML">
+  <inkml:definitions>
+    <inkml:context xml:id="ctx0">
+      <inkml:inkSource xml:id="inkSrc0">
+        <inkml:traceFormat>
+          <inkml:channel name="X" type="integer" max="1920" units="cm"/>
+          <inkml:channel name="Y" type="integer" max="1080" units="cm"/>
+          <inkml:channel name="T" type="integer" max="2.14748E9" units="dev"/>
+        </inkml:traceFormat>
+        <inkml:channelProperties>
+          <inkml:channelProperty channel="X" name="resolution" value="55.81395" units="1/cm"/>
+          <inkml:channelProperty channel="Y" name="resolution" value="55.6701" units="1/cm"/>
+          <inkml:channelProperty channel="T" name="resolution" value="1" units="1/dev"/>
+        </inkml:channelProperties>
+      </inkml:inkSource>
+      <inkml:timestamp xml:id="ts0" timeString="2022-02-21T14:53:02.387"/>
+    </inkml:context>
+    <inkml:brush xml:id="br0">
+      <inkml:brushProperty name="width" value="0.05" units="cm"/>
+      <inkml:brushProperty name="height" value="0.05" units="cm"/>
+      <inkml:brushProperty name="fitToCurve" value="1"/>
+    </inkml:brush>
+  </inkml:definitions>
+  <inkml:trace contextRef="#ctx0" brushRef="#br0">172 124 0,'0'-24'16,"25"-1"-1,0 0-15,-1 25 16,-24-24-16,25 24 0,0-25 16,-1 25-16,1 0 15,0 0-15,-25 25 16,24-25-16,-24 24 0,0 1 15,-24 0-15,-1-1 16,-49 50 0,25-49-16,24-1 0,-24 26 0,-1-26 15,26 1-15,-26 0 16,26-1-16,48 1 16,1-25-1,0 0-15,24 0 0,0 0 16,25-25-16,25 25 15,-25-24-15,24 24 0,-24-25 16,25 0-16</inkml:trace>
+</inkml:ink>
+</file>
+
+<file path=ppt/ink/ink74.xml><?xml version="1.0" encoding="utf-8"?>
+<inkml:ink xmlns:inkml="http://www.w3.org/2003/InkML">
+  <inkml:definitions>
+    <inkml:context xml:id="ctx0">
+      <inkml:inkSource xml:id="inkSrc0">
+        <inkml:traceFormat>
+          <inkml:channel name="X" type="integer" max="1920" units="cm"/>
+          <inkml:channel name="Y" type="integer" max="1080" units="cm"/>
+          <inkml:channel name="T" type="integer" max="2.14748E9" units="dev"/>
+        </inkml:traceFormat>
+        <inkml:channelProperties>
+          <inkml:channelProperty channel="X" name="resolution" value="55.81395" units="1/cm"/>
+          <inkml:channelProperty channel="Y" name="resolution" value="55.6701" units="1/cm"/>
+          <inkml:channelProperty channel="T" name="resolution" value="1" units="1/dev"/>
+        </inkml:channelProperties>
+      </inkml:inkSource>
+      <inkml:timestamp xml:id="ts0" timeString="2022-02-21T14:53:00.964"/>
+    </inkml:context>
+    <inkml:brush xml:id="br0">
+      <inkml:brushProperty name="width" value="0.05" units="cm"/>
+      <inkml:brushProperty name="height" value="0.05" units="cm"/>
+      <inkml:brushProperty name="fitToCurve" value="1"/>
+    </inkml:brush>
+  </inkml:definitions>
+  <inkml:trace contextRef="#ctx0" brushRef="#br0">76 81 0,'0'-25'0,"25"25"16,-25-24-1,-25-1-15,0 25 16,1 0-1,-1 25-15,25-1 16,0 1-16,0 0 16,0 24-16,0-25 15,0 26-15,0-26 16,0 1-16,0 24 0,0-24 0,0 24 16,0-24-16,0 0 15</inkml:trace>
+  <inkml:trace contextRef="#ctx0" brushRef="#br0" timeOffset="380">347 32 0,'-25'0'31,"1"0"-31,24 24 0,-25-24 15,0 25-15,1 0 0,-1-1 16,25 1-16,0-1 16,0 1-16,0 0 0,0-1 15,25 1-15,-1-25 16,26 49-16,-26-49 16,1 0-16,0 0 0,-1 0 15,1-24 1,0-1-16,-1 0 0,-24 1 15,0-1-15,0 0 0,0 1 16,0-1-16,-24 1 16,-1-1-16,0 0 0,1 25 15,-1 0-15,0 0 16,1 0-16,-1 25 0,0 0 16,25-1-1</inkml:trace>
+</inkml:ink>
+</file>
+
+<file path=ppt/ink/ink75.xml><?xml version="1.0" encoding="utf-8"?>
+<inkml:ink xmlns:inkml="http://www.w3.org/2003/InkML">
+  <inkml:definitions>
+    <inkml:context xml:id="ctx0">
+      <inkml:inkSource xml:id="inkSrc0">
+        <inkml:traceFormat>
+          <inkml:channel name="X" type="integer" max="1920" units="cm"/>
+          <inkml:channel name="Y" type="integer" max="1080" units="cm"/>
+          <inkml:channel name="T" type="integer" max="2.14748E9" units="dev"/>
+        </inkml:traceFormat>
+        <inkml:channelProperties>
+          <inkml:channelProperty channel="X" name="resolution" value="55.81395" units="1/cm"/>
+          <inkml:channelProperty channel="Y" name="resolution" value="55.6701" units="1/cm"/>
+          <inkml:channelProperty channel="T" name="resolution" value="1" units="1/dev"/>
+        </inkml:channelProperties>
+      </inkml:inkSource>
+      <inkml:timestamp xml:id="ts0" timeString="2022-02-21T14:53:03.509"/>
+    </inkml:context>
+    <inkml:brush xml:id="br0">
+      <inkml:brushProperty name="width" value="0.05" units="cm"/>
+      <inkml:brushProperty name="height" value="0.05" units="cm"/>
+      <inkml:brushProperty name="fitToCurve" value="1"/>
+    </inkml:brush>
+  </inkml:definitions>
+  <inkml:trace contextRef="#ctx0" brushRef="#br0">0 14 0,'25'0'16,"-25"-24"-16,0 48 15,0 1 1,0 24 0,0-24-16,24 24 15,-24 1-15,25-1 0,-25 0 16,25 1-16,-25-1 0,24-25 15,-24 1-15,0 0 0,25-25 16</inkml:trace>
+</inkml:ink>
+</file>
+
+<file path=ppt/ink/ink76.xml><?xml version="1.0" encoding="utf-8"?>
+<inkml:ink xmlns:inkml="http://www.w3.org/2003/InkML">
+  <inkml:definitions>
+    <inkml:context xml:id="ctx0">
+      <inkml:inkSource xml:id="inkSrc0">
+        <inkml:traceFormat>
+          <inkml:channel name="X" type="integer" max="1920" units="cm"/>
+          <inkml:channel name="Y" type="integer" max="1080" units="cm"/>
+          <inkml:channel name="T" type="integer" max="2.14748E9" units="dev"/>
+        </inkml:traceFormat>
+        <inkml:channelProperties>
+          <inkml:channelProperty channel="X" name="resolution" value="55.81395" units="1/cm"/>
+          <inkml:channelProperty channel="Y" name="resolution" value="55.6701" units="1/cm"/>
+          <inkml:channelProperty channel="T" name="resolution" value="1" units="1/dev"/>
+        </inkml:channelProperties>
+      </inkml:inkSource>
+      <inkml:timestamp xml:id="ts0" timeString="2022-02-21T14:53:03.791"/>
+    </inkml:context>
+    <inkml:brush xml:id="br0">
+      <inkml:brushProperty name="width" value="0.05" units="cm"/>
+      <inkml:brushProperty name="height" value="0.05" units="cm"/>
+      <inkml:brushProperty name="fitToCurve" value="1"/>
+    </inkml:brush>
+  </inkml:definitions>
+  <inkml:trace contextRef="#ctx0" brushRef="#br0">74 52 0,'0'-25'31,"-24"50"0,24 0-31,-25-1 16,25 1-16,0 0 0,0-1 16,25 75-1,-1-74-15,1-1 16,-25 1-16,25 0 0,-1-1 15,-24 1-15,0-1 16,25 1-16,-50-25 16,1-25-1</inkml:trace>
+  <inkml:trace contextRef="#ctx0" brushRef="#br0" timeOffset="414">0 126 0,'25'-25'16,"24"1"-16,-24 24 0,24 0 16,-24-25-16,24 25 15,1 0-15,-1 0 0,-24 0 16,24-25-16,0 25 16,1 0-16,-26 0 0,1 0 15,0 0-15,-1 0 16,1 0-16,0 0 0,-25 25 15,0 0-15,0-1 16,0 1 0,0 0-16,0 24 0,-25-24 15,25-1-15,0 26 16,0-26-16,0 26 0,0-26 16,25 1-16,-25-1 0,24-24 15,1 0-15,0 0 16,-1 0-16,1 0 0,24-24 15,-24-1-15,0 1 0,-1-26 16,1 26-16,-25-26 16,0 1-16,0 0 0,0-1 15,-25 26-15,1-1 0,-1 0 16,-24 1-16,-25 24 16,24 24-16,-24-24 0</inkml:trace>
+</inkml:ink>
+</file>
+
+<file path=ppt/ink/ink77.xml><?xml version="1.0" encoding="utf-8"?>
+<inkml:ink xmlns:inkml="http://www.w3.org/2003/InkML">
+  <inkml:definitions>
+    <inkml:context xml:id="ctx0">
+      <inkml:inkSource xml:id="inkSrc0">
+        <inkml:traceFormat>
+          <inkml:channel name="X" type="integer" max="1920" units="cm"/>
+          <inkml:channel name="Y" type="integer" max="1080" units="cm"/>
+          <inkml:channel name="T" type="integer" max="2.14748E9" units="dev"/>
+        </inkml:traceFormat>
+        <inkml:channelProperties>
+          <inkml:channelProperty channel="X" name="resolution" value="55.81395" units="1/cm"/>
+          <inkml:channelProperty channel="Y" name="resolution" value="55.6701" units="1/cm"/>
+          <inkml:channelProperty channel="T" name="resolution" value="1" units="1/dev"/>
+        </inkml:channelProperties>
+      </inkml:inkSource>
+      <inkml:timestamp xml:id="ts0" timeString="2022-02-21T14:53:05.097"/>
+    </inkml:context>
+    <inkml:brush xml:id="br0">
+      <inkml:brushProperty name="width" value="0.05" units="cm"/>
+      <inkml:brushProperty name="height" value="0.05" units="cm"/>
+      <inkml:brushProperty name="fitToCurve" value="1"/>
+    </inkml:brush>
+  </inkml:definitions>
+  <inkml:trace contextRef="#ctx0" brushRef="#br0">24 180 0,'0'-25'0,"-24"25"0,24-24 15,0-1-15,0 0 16,24 25-16,1-24 16,0 24-16,-1-25 15,26 25-15,-1 0 0,0-25 16,1 25-16,-1 0 0,0 0 16,-24 0-16,24 0 15,-24 25-15,-25 0 16,-25-1-16,1-24 0,-1 25 15,-24 0-15,24-1 16,0 1-16,-24-25 0,24 25 16,1-25-16,24 24 15,-25-24 1,25 25-16,25-25 0,-1 0 16,1 0-16,0 0 0,-1 25 15,26-25-15,-1 0 16,-24 24-16,24 1 0,0-25 15,-24 25-15,-1-1 0,1 1 16,-25 0-16,0-1 16,0 1-16,0 0 0,-25-1 15,1-24-15,-26 25 0,1-25 16,-25 25-16,25-25 16,-25 0-16,25-25 0,-1 25 15,-24-25-15,50 25 16</inkml:trace>
+</inkml:ink>
+</file>
+
+<file path=ppt/ink/ink78.xml><?xml version="1.0" encoding="utf-8"?>
+<inkml:ink xmlns:inkml="http://www.w3.org/2003/InkML">
+  <inkml:definitions>
+    <inkml:context xml:id="ctx0">
+      <inkml:inkSource xml:id="inkSrc0">
+        <inkml:traceFormat>
+          <inkml:channel name="X" type="integer" max="1920" units="cm"/>
+          <inkml:channel name="Y" type="integer" max="1080" units="cm"/>
+          <inkml:channel name="T" type="integer" max="2.14748E9" units="dev"/>
+        </inkml:traceFormat>
+        <inkml:channelProperties>
+          <inkml:channelProperty channel="X" name="resolution" value="55.81395" units="1/cm"/>
+          <inkml:channelProperty channel="Y" name="resolution" value="55.6701" units="1/cm"/>
+          <inkml:channelProperty channel="T" name="resolution" value="1" units="1/dev"/>
+        </inkml:channelProperties>
+      </inkml:inkSource>
+      <inkml:timestamp xml:id="ts0" timeString="2022-02-21T14:53:06.218"/>
+    </inkml:context>
+    <inkml:brush xml:id="br0">
+      <inkml:brushProperty name="width" value="0.05" units="cm"/>
+      <inkml:brushProperty name="height" value="0.05" units="cm"/>
+      <inkml:brushProperty name="fitToCurve" value="1"/>
+    </inkml:brush>
+  </inkml:definitions>
+  <inkml:trace contextRef="#ctx0" brushRef="#br0">24 222 0,'0'-25'16,"-24"0"0,24 1-16,0-1 15,0 0-15,24 25 16,1-24-16,0-1 0,-1 25 15,1 0-15,-1-25 0,1 25 16,0 0-16,-1 25 16,1 0-16,-25-1 0,25 1 15,-25 0-15,0 24 16,-25-24-16,0 24 0,1 0 16,-1-24-16,0 24 0,-24-24 15,25 0-15,-1-1 16,0-24-16,1 0 0,24-24 31,24 24-31,1-25 0,0 0 16,-1 25-16,1-24 0,24 24 15,-24 0-15,-1 0 16,1 0-16,24 0 0,-24 24 16,0-24-16,-1 25 15,1-25-15</inkml:trace>
+  <inkml:trace contextRef="#ctx0" brushRef="#br0" timeOffset="290">591 98 0,'0'-24'0,"0"-1"0,0 0 15,0 1-15,-24 24 16,-1 24-1,25 1-15,0 0 16,0-1-16,0 1 0,0 24 16,0-24-16,0 24 15,0-24-15,25 24 0,-1-24 16,1 0-16,0-1 16,-25 1-16,24-25 0,1 25 15,-50-25 1,1-25-1,-1 0-15,0 1 16</inkml:trace>
+  <inkml:trace contextRef="#ctx0" brushRef="#br0" timeOffset="698">517 123 0,'25'-25'0,"-25"1"16,25-1-16,-1 0 0,26 25 15,-26-24-15,1 24 16,0 0-16,-1 0 0,26 0 15,24 0 1,-50 0-16,26 0 0,-26 24 16,26-24-16,-26 0 0,1 0 15,0 0-15,-1 0 16,1 0-16,-50 25 31,25 0-31,-24 24 16,24-24-16,-25-1 15,25 26-15,0-26 16,0 1-16,25 24 0,-25-24 16,24 0-16,1-1 0,0 1 15,-1-25-15,1 0 16,24 0-16,-24 0 0,0-25 16,24 1-16,-24-1 0,-1 0 15,1-24-15,-25 24 16,0-24-16,0 0 0,-25 24 15,1-24-15,-1 24 16,0 0-16,-24 25 0,0 0 16,-25 0-16,24 0 0,-24 25 15</inkml:trace>
+</inkml:ink>
+</file>
+
+<file path=ppt/ink/ink79.xml><?xml version="1.0" encoding="utf-8"?>
+<inkml:ink xmlns:inkml="http://www.w3.org/2003/InkML">
+  <inkml:definitions>
+    <inkml:context xml:id="ctx0">
+      <inkml:inkSource xml:id="inkSrc0">
+        <inkml:traceFormat>
+          <inkml:channel name="X" type="integer" max="1920" units="cm"/>
+          <inkml:channel name="Y" type="integer" max="1080" units="cm"/>
+          <inkml:channel name="T" type="integer" max="2.14748E9" units="dev"/>
+        </inkml:traceFormat>
+        <inkml:channelProperties>
+          <inkml:channelProperty channel="X" name="resolution" value="55.81395" units="1/cm"/>
+          <inkml:channelProperty channel="Y" name="resolution" value="55.6701" units="1/cm"/>
+          <inkml:channelProperty channel="T" name="resolution" value="1" units="1/dev"/>
+        </inkml:channelProperties>
+      </inkml:inkSource>
+      <inkml:timestamp xml:id="ts0" timeString="2022-02-21T14:53:17.927"/>
+    </inkml:context>
+    <inkml:brush xml:id="br0">
+      <inkml:brushProperty name="width" value="0.05" units="cm"/>
+      <inkml:brushProperty name="height" value="0.05" units="cm"/>
+      <inkml:brushProperty name="fitToCurve" value="1"/>
+    </inkml:brush>
+  </inkml:definitions>
+  <inkml:trace contextRef="#ctx0" brushRef="#br0">74 370 0,'-25'-25'0,"1"1"16,-1-1-16,50 25 31,-1 25-31,-24 24 15,25 0-15,0 1 16,-1 24-16,1-25 0,0 25 16,-1 0-16,1-25 15,-25 1-15,0-1 0,0-24 16</inkml:trace>
+  <inkml:trace contextRef="#ctx0" brushRef="#br0" timeOffset="314">148 765 0,'0'-25'0,"0"0"16,0-24-16,0 24 0,25 1 16,-1-1-16,1 25 15,-1 0-15,1 0 16,0-25-16,-1 25 0,1 0 16,0 0-16,24 0 15,-24 0-15,-1-24 0,1 24 16,-25-25-16,25 0 0,-25 1 15,24-1 1,-24 0-16,0 1 16,0-1-16,0 50 31,0-1-31,0 1 16,0 49-16,0-25 0,0 25 15,25 0-15,-25 0 0,25 0 16,-1 0-16,-24-24 15</inkml:trace>
+  <inkml:trace contextRef="#ctx0" brushRef="#br0" timeOffset="691">838 518 0,'0'-74'15,"0"25"-15,0 24 16,0 0-16,0 50 15,0 0-15,0 24 16,0 0-16,0 1 16,25-1-16,-25 0 0,0 1 15,0-1-15,0 0 0,0-24 16,0 0-16,0-1 16,-25-24-1,25-24-15,0-1 16,0-24-16,-24-1 0,24 1 0,0 0 15,24-25-15,-24 24 16,25-24-16,0 25 0,-1 0 16,1 24-16,0 0 0,24 25 15,-24 0-15,-1 25 16,1 0-16,-25 24 0,25 0 16,-1 25-16,-24 0 15,25-24-15,-25 24 0,0 0 16,0-25-16,0 0 0,0-24 15</inkml:trace>
+  <inkml:trace contextRef="#ctx0" brushRef="#br0" timeOffset="820">937 765 0,'0'-25'0,"-25"-24"0,25 24 16,0 0-16,0 1 15,25-1-15,0 25 0,-1-25 16,1 1-16,0 24 0,24-25 15,0 25-15</inkml:trace>
+  <inkml:trace contextRef="#ctx0" brushRef="#br0" timeOffset="1320">1406 395 0,'0'-25'15,"0"0"-15,-25 1 0,25-1 16,-25 0-16,25 1 15,0 48 1,0 1-16,0 24 16,25 1-16,-25-1 15,25 0-15,-25 25 0,0-24 16,0 24-16,0-25 0,0-24 16,0-1-16,0 1 15,0-50 1,0 1-1,0-26-15,0 1 0,24 0 16,-24-1-16,0-24 16,25 25-16,-1 24 0,-24-24 15,25 24-15,0 1 0,-1 24 16,1 24 0,0 1-16,-25 0 0,24 24 15,1 0-15,0 1 0,-1-26 16,1 26-16,0-1 15,-25-24-15,24-1 0,1-24 16,0 0-16,-1 0 16,-24-24-16,0-26 15,25 26-15,-25-26 0,0-24 16,0 25-16,0 0 16,0-1-16,0 26 0,0-26 15,0 26-15,0 48 16,0 1-1</inkml:trace>
+  <inkml:trace contextRef="#ctx0" brushRef="#br0" timeOffset="1694">2121 296 0,'0'-25'0,"0"1"0,24 24 16,-24-25-16,0 50 31,0-1-31,0 1 0,0 0 16,25 24-16,-25 0 0,0 1 15,25-1-15,-25 0 16,0 1-16,0-26 0,0 26 16,24-50-1,-24-50 1,0 26-16,0-26 15,0 1-15,25-25 0,-25 25 16,25-25-16,-25 0 0,24 0 16,-24 0-16,25 24 15,24 1-15,-24 49 16,0 0-16,-25 25 0,24 24 16,1 0-16,0 1 15,-25 24-15,24-25 0,-24 25 16,0-25-16,0 1 15,0-1-15</inkml:trace>
+  <inkml:trace contextRef="#ctx0" brushRef="#br0" timeOffset="1825">2170 395 0,'-25'-50'16,"25"26"-16,25-26 0,24 26 15,1 24-15,24-25 0,24 0 16,26 25-16,-26-24 15,25 24-15,1 0 0</inkml:trace>
 </inkml:ink>
 </file>
 
@@ -2642,6 +3066,289 @@
 </inkml:ink>
 </file>
 
+<file path=ppt/ink/ink80.xml><?xml version="1.0" encoding="utf-8"?>
+<inkml:ink xmlns:inkml="http://www.w3.org/2003/InkML">
+  <inkml:definitions>
+    <inkml:context xml:id="ctx0">
+      <inkml:inkSource xml:id="inkSrc0">
+        <inkml:traceFormat>
+          <inkml:channel name="X" type="integer" max="1920" units="cm"/>
+          <inkml:channel name="Y" type="integer" max="1080" units="cm"/>
+          <inkml:channel name="T" type="integer" max="2.14748E9" units="dev"/>
+        </inkml:traceFormat>
+        <inkml:channelProperties>
+          <inkml:channelProperty channel="X" name="resolution" value="55.81395" units="1/cm"/>
+          <inkml:channelProperty channel="Y" name="resolution" value="55.6701" units="1/cm"/>
+          <inkml:channelProperty channel="T" name="resolution" value="1" units="1/dev"/>
+        </inkml:channelProperties>
+      </inkml:inkSource>
+      <inkml:timestamp xml:id="ts0" timeString="2022-02-21T14:53:16.974"/>
+    </inkml:context>
+    <inkml:brush xml:id="br0">
+      <inkml:brushProperty name="width" value="0.05" units="cm"/>
+      <inkml:brushProperty name="height" value="0.05" units="cm"/>
+      <inkml:brushProperty name="fitToCurve" value="1"/>
+    </inkml:brush>
+  </inkml:definitions>
+  <inkml:trace contextRef="#ctx0" brushRef="#br0">74 321 0,'0'-25'0,"0"1"16,0-1-16,-25 0 0,1 25 15,-1-24-15,25 48 32,25 1-32,-25 24 15,24-24-15,1 24 16,0 1-16,-1-1 0,1 0 15,24 1-15,-24-1 0,24 0 16,-24-24-16,0 0 16,24-1-16,-25 1 0,1-25 15,24 0-15,-24-25 16,24 1-16,1-1 0,-1-24 16,0-1-16,1 1 0,-1-25 15,0 25-15,25-25 16,-24 0-16,-1 0 0,0 24 15,1 1-15,-1 24 16,-24 25-16,24 0 0,0 0 16,-24 25-16,24 24 0,25 1 15,-24-1-15,-1 0 16,25 1-16,0-1 0,0-24 16,0 24-16,-25-24 15,25-1-15,-25 1 0,25-25 16,-24 0-16,24 0 0,-25 0 15,0 0-15,25-25 16,-24 25-16,24-24 0,-25-26 16,25 26-16,-25-1 15,25-24-15,-24 24 0,-1-24 16,25 24-16,-25 0 0,25 1 16,-25 24-16,1 0 15,-1 24-15,0 26 0,1-26 16,-1 26-16,0 24 15,50 24-15,-50-48 16,1-26-16,-1 1 0,0 24 16,1-49-16,-1 25 15,0-25-15,1 0 0,24-25 16,0 1-16,0-1 16,-1-24-16,1 24 0,0-24 15,0 24-15,0-24 0,-24 24 16,24 0-16,-25 1 15,-24-1-15,24 25 0,-24 0 16,24 0-16,-24 25 16,-1-1-16,26 1 0,-1 0 15,-24-1-15,24 1 0,25 24 16,-25-24-16,1 0 16,24-1-16,-25 1 0,0-25 15,25 0-15,0 0 16,0 0-16,0 0 0,25 0 15,-25 0-15,24-25 0,-24 25 16,0 0-16,0 0 16,-24 0-16,-1 0 0,-24 25 15,-1-25-15,1 0 16,-25-25 0,-25 25-16,1-24 15,-1-1-15,0 0 16</inkml:trace>
+  <inkml:trace contextRef="#ctx0" brushRef="#br0" timeOffset="313">5869 25 0,'-25'-25'16,"1"25"-16,-26 0 0,26 0 0,-1 0 15,-24 0-15,24 0 16,25 25-16,-25-25 0,25 25 15,25-25 1,0 24-16,49-24 0,-25 25 16,50 24-16,-25-24 0,49 24 15,-49-24-15,25 24 16,-25 25-16,-25-24 0,0-1 16,-24 25-16,-25-25 15,-25 1-15,1 24 0,-26-25 16,1 0-16,-25 1 0,-25-1 15,25 0-15,0-24 16,0 24-16,0-24 0,0 24 16,25-24-16,0-25 15</inkml:trace>
+</inkml:ink>
+</file>
+
+<file path=ppt/ink/ink81.xml><?xml version="1.0" encoding="utf-8"?>
+<inkml:ink xmlns:inkml="http://www.w3.org/2003/InkML">
+  <inkml:definitions>
+    <inkml:context xml:id="ctx0">
+      <inkml:inkSource xml:id="inkSrc0">
+        <inkml:traceFormat>
+          <inkml:channel name="X" type="integer" max="1920" units="cm"/>
+          <inkml:channel name="Y" type="integer" max="1080" units="cm"/>
+          <inkml:channel name="T" type="integer" max="2.14748E9" units="dev"/>
+        </inkml:traceFormat>
+        <inkml:channelProperties>
+          <inkml:channelProperty channel="X" name="resolution" value="55.81395" units="1/cm"/>
+          <inkml:channelProperty channel="Y" name="resolution" value="55.6701" units="1/cm"/>
+          <inkml:channelProperty channel="T" name="resolution" value="1" units="1/dev"/>
+        </inkml:channelProperties>
+      </inkml:inkSource>
+      <inkml:timestamp xml:id="ts0" timeString="2022-02-21T14:53:32.056"/>
+    </inkml:context>
+    <inkml:brush xml:id="br0">
+      <inkml:brushProperty name="width" value="0.05" units="cm"/>
+      <inkml:brushProperty name="height" value="0.05" units="cm"/>
+      <inkml:brushProperty name="fitToCurve" value="1"/>
+    </inkml:brush>
+  </inkml:definitions>
+  <inkml:trace contextRef="#ctx0" brushRef="#br0">0 0 0,'25'0'0,"0"0"32,-1 0-17,1 0 17,-25 25-32,0 0 15,0-1 1,0 1-16,0 24 0,0-24 15,0 24-15,0-24 0,25 24 16,-25-24-16,0 24 16,0-24-16,24 0 0,-24-1 15,0 1-15,25-25 16,-25 25-16</inkml:trace>
+</inkml:ink>
+</file>
+
+<file path=ppt/ink/ink82.xml><?xml version="1.0" encoding="utf-8"?>
+<inkml:ink xmlns:inkml="http://www.w3.org/2003/InkML">
+  <inkml:definitions>
+    <inkml:context xml:id="ctx0">
+      <inkml:inkSource xml:id="inkSrc0">
+        <inkml:traceFormat>
+          <inkml:channel name="X" type="integer" max="1920" units="cm"/>
+          <inkml:channel name="Y" type="integer" max="1080" units="cm"/>
+          <inkml:channel name="T" type="integer" max="2.14748E9" units="dev"/>
+        </inkml:traceFormat>
+        <inkml:channelProperties>
+          <inkml:channelProperty channel="X" name="resolution" value="55.81395" units="1/cm"/>
+          <inkml:channelProperty channel="Y" name="resolution" value="55.6701" units="1/cm"/>
+          <inkml:channelProperty channel="T" name="resolution" value="1" units="1/dev"/>
+        </inkml:channelProperties>
+      </inkml:inkSource>
+      <inkml:timestamp xml:id="ts0" timeString="2022-02-21T14:53:33.753"/>
+    </inkml:context>
+    <inkml:brush xml:id="br0">
+      <inkml:brushProperty name="width" value="0.05" units="cm"/>
+      <inkml:brushProperty name="height" value="0.05" units="cm"/>
+      <inkml:brushProperty name="fitToCurve" value="1"/>
+    </inkml:brush>
+  </inkml:definitions>
+  <inkml:trace contextRef="#ctx0" brushRef="#br0">0 25 0,'0'-25'15,"25"25"1,-25 25 15,0-1-15,24 1-16,-24 0 0,25-1 16,-25 26-16,0-26 15,25 26-15,-25-26 0,0 26 16,0-26-16,0 1 15,24 0-15,-24-1 0</inkml:trace>
+</inkml:ink>
+</file>
+
+<file path=ppt/ink/ink83.xml><?xml version="1.0" encoding="utf-8"?>
+<inkml:ink xmlns:inkml="http://www.w3.org/2003/InkML">
+  <inkml:definitions>
+    <inkml:context xml:id="ctx0">
+      <inkml:inkSource xml:id="inkSrc0">
+        <inkml:traceFormat>
+          <inkml:channel name="X" type="integer" max="1920" units="cm"/>
+          <inkml:channel name="Y" type="integer" max="1080" units="cm"/>
+          <inkml:channel name="T" type="integer" max="2.14748E9" units="dev"/>
+        </inkml:traceFormat>
+        <inkml:channelProperties>
+          <inkml:channelProperty channel="X" name="resolution" value="55.81395" units="1/cm"/>
+          <inkml:channelProperty channel="Y" name="resolution" value="55.6701" units="1/cm"/>
+          <inkml:channelProperty channel="T" name="resolution" value="1" units="1/dev"/>
+        </inkml:channelProperties>
+      </inkml:inkSource>
+      <inkml:timestamp xml:id="ts0" timeString="2022-02-21T14:53:34.174"/>
+    </inkml:context>
+    <inkml:brush xml:id="br0">
+      <inkml:brushProperty name="width" value="0.05" units="cm"/>
+      <inkml:brushProperty name="height" value="0.05" units="cm"/>
+      <inkml:brushProperty name="fitToCurve" value="1"/>
+    </inkml:brush>
+  </inkml:definitions>
+  <inkml:trace contextRef="#ctx0" brushRef="#br0">103 0 0,'0'25'16,"-24"-25"-16,-1 25 15,25-1-15,-25 1 0,25 0 16,-24-1-16,24 1 16,0 24-16,0-24 0,0 24 15,0-24-15,0 0 16,24-1-16,1 1 0,-25 0 15,25-25-15,-1 24 0,1-24 16,0 0-16,-1 0 0,26-24 16,-26 24-16,1-25 15,0 0-15,-25 1 0,24-26 16,-24 26-16,0-26 16,0 26-16,0-1 0,-24 0 15,-1 1-15,0-1 0,1 25 16,-1 0-16,0 0 15,1 0-15,-1 25 16,25-1 0,0 1-16,0 0 15</inkml:trace>
+</inkml:ink>
+</file>
+
+<file path=ppt/ink/ink84.xml><?xml version="1.0" encoding="utf-8"?>
+<inkml:ink xmlns:inkml="http://www.w3.org/2003/InkML">
+  <inkml:definitions>
+    <inkml:context xml:id="ctx0">
+      <inkml:inkSource xml:id="inkSrc0">
+        <inkml:traceFormat>
+          <inkml:channel name="X" type="integer" max="1920" units="cm"/>
+          <inkml:channel name="Y" type="integer" max="1080" units="cm"/>
+          <inkml:channel name="T" type="integer" max="2.14748E9" units="dev"/>
+        </inkml:traceFormat>
+        <inkml:channelProperties>
+          <inkml:channelProperty channel="X" name="resolution" value="55.81395" units="1/cm"/>
+          <inkml:channelProperty channel="Y" name="resolution" value="55.6701" units="1/cm"/>
+          <inkml:channelProperty channel="T" name="resolution" value="1" units="1/dev"/>
+        </inkml:channelProperties>
+      </inkml:inkSource>
+      <inkml:timestamp xml:id="ts0" timeString="2022-02-21T14:53:34.537"/>
+    </inkml:context>
+    <inkml:brush xml:id="br0">
+      <inkml:brushProperty name="width" value="0.05" units="cm"/>
+      <inkml:brushProperty name="height" value="0.05" units="cm"/>
+      <inkml:brushProperty name="fitToCurve" value="1"/>
+    </inkml:brush>
+  </inkml:definitions>
+  <inkml:trace contextRef="#ctx0" brushRef="#br0">74 49 0,'0'-24'16,"-24"24"0,24 24-1,-25-24-15,25 25 16,-25 0-16,25-1 0,0 1 15,0 0-15,0 24 0,0-24 16,0-1-16,25 26 16,-25-26-16,25-24 15,-1 25-15,1 0 0,0-25 16,-1 0-16,1 0 0,0 0 16,-1-25-16,1 0 15,0 1-15,-1-1 0,1-24 16,-25-1-16,0 26 0,0-26 15,-25 1-15,1 24 16,-1 1-16,0-1 0,-24 25 16,24 0-16,-24 0 15</inkml:trace>
+</inkml:ink>
+</file>
+
+<file path=ppt/ink/ink85.xml><?xml version="1.0" encoding="utf-8"?>
+<inkml:ink xmlns:inkml="http://www.w3.org/2003/InkML">
+  <inkml:definitions>
+    <inkml:context xml:id="ctx0">
+      <inkml:inkSource xml:id="inkSrc0">
+        <inkml:traceFormat>
+          <inkml:channel name="X" type="integer" max="1920" units="cm"/>
+          <inkml:channel name="Y" type="integer" max="1080" units="cm"/>
+          <inkml:channel name="T" type="integer" max="2.14748E9" units="dev"/>
+        </inkml:traceFormat>
+        <inkml:channelProperties>
+          <inkml:channelProperty channel="X" name="resolution" value="55.81395" units="1/cm"/>
+          <inkml:channelProperty channel="Y" name="resolution" value="55.6701" units="1/cm"/>
+          <inkml:channelProperty channel="T" name="resolution" value="1" units="1/dev"/>
+        </inkml:channelProperties>
+      </inkml:inkSource>
+      <inkml:timestamp xml:id="ts0" timeString="2022-02-21T14:53:36.220"/>
+    </inkml:context>
+    <inkml:brush xml:id="br0">
+      <inkml:brushProperty name="width" value="0.05" units="cm"/>
+      <inkml:brushProperty name="height" value="0.05" units="cm"/>
+      <inkml:brushProperty name="fitToCurve" value="1"/>
+    </inkml:brush>
+  </inkml:definitions>
+  <inkml:trace contextRef="#ctx0" brushRef="#br0">17 123 0,'-24'0'0,"48"0"63,-24-24-63,25 24 15,-1 0-15,1 0 0,24-25 16,1 25-16,24-25 0,-25 25 16,25-24-16,-25 24 15,1-25-15,-1 25 0,-24 0 16,-1 0-16,1 0 0,-25 25 15,0-1-15,-25 1 16,25 0-16,-24 24 16,-1 25-16,25-25 0,-25 25 15,25-24-15,0 24 0,-24-25 16,24 0-16,0 1 16,0-26-16,24 25 0,-24-24 15</inkml:trace>
+  <inkml:trace contextRef="#ctx0" brushRef="#br0" timeOffset="151">313 444 0,'-25'-25'0,"25"1"0,0-1 16,0 0 0,25 25-16,24 0 15,-24-24-15,49 24 0,-25 0 16,25 0-16,0-25 15,0 25-15</inkml:trace>
+</inkml:ink>
+</file>
+
+<file path=ppt/ink/ink86.xml><?xml version="1.0" encoding="utf-8"?>
+<inkml:ink xmlns:inkml="http://www.w3.org/2003/InkML">
+  <inkml:definitions>
+    <inkml:context xml:id="ctx0">
+      <inkml:inkSource xml:id="inkSrc0">
+        <inkml:traceFormat>
+          <inkml:channel name="X" type="integer" max="1920" units="cm"/>
+          <inkml:channel name="Y" type="integer" max="1080" units="cm"/>
+          <inkml:channel name="T" type="integer" max="2.14748E9" units="dev"/>
+        </inkml:traceFormat>
+        <inkml:channelProperties>
+          <inkml:channelProperty channel="X" name="resolution" value="55.81395" units="1/cm"/>
+          <inkml:channelProperty channel="Y" name="resolution" value="55.6701" units="1/cm"/>
+          <inkml:channelProperty channel="T" name="resolution" value="1" units="1/dev"/>
+        </inkml:channelProperties>
+      </inkml:inkSource>
+      <inkml:timestamp xml:id="ts0" timeString="2022-02-21T14:53:39.464"/>
+    </inkml:context>
+    <inkml:brush xml:id="br0">
+      <inkml:brushProperty name="width" value="0.05" units="cm"/>
+      <inkml:brushProperty name="height" value="0.05" units="cm"/>
+      <inkml:brushProperty name="fitToCurve" value="1"/>
+    </inkml:brush>
+  </inkml:definitions>
+  <inkml:trace contextRef="#ctx0" brushRef="#br0">0 14 0,'0'-24'31,"0"48"32,0 26-48,25-26-15,-25 1 0,25 0 16,-25-1-16,24 1 16,1 0-16,0-1 0,-1 1 15,1-25-15,0 25 0,-1-25 16,1 0-16,0 0 16,-1-25-16,1 25 0,0-25 15,-1 1-15,-24-1 0,25-24 16,0 24-16,-1 0 15,1 1-15,-25-1 0,25 25 16,-25 25 0,0 24-16,0-24 15,0 49-15,0-25 0,0 25 16,0-25-16,0 25 16,0 0-16,24-24 0,1-1 15</inkml:trace>
+</inkml:ink>
+</file>
+
+<file path=ppt/ink/ink87.xml><?xml version="1.0" encoding="utf-8"?>
+<inkml:ink xmlns:inkml="http://www.w3.org/2003/InkML">
+  <inkml:definitions>
+    <inkml:context xml:id="ctx0">
+      <inkml:inkSource xml:id="inkSrc0">
+        <inkml:traceFormat>
+          <inkml:channel name="X" type="integer" max="1920" units="cm"/>
+          <inkml:channel name="Y" type="integer" max="1080" units="cm"/>
+          <inkml:channel name="T" type="integer" max="2.14748E9" units="dev"/>
+        </inkml:traceFormat>
+        <inkml:channelProperties>
+          <inkml:channelProperty channel="X" name="resolution" value="55.81395" units="1/cm"/>
+          <inkml:channelProperty channel="Y" name="resolution" value="55.6701" units="1/cm"/>
+          <inkml:channelProperty channel="T" name="resolution" value="1" units="1/dev"/>
+        </inkml:channelProperties>
+      </inkml:inkSource>
+      <inkml:timestamp xml:id="ts0" timeString="2022-02-21T14:53:40.092"/>
+    </inkml:context>
+    <inkml:brush xml:id="br0">
+      <inkml:brushProperty name="width" value="0.05" units="cm"/>
+      <inkml:brushProperty name="height" value="0.05" units="cm"/>
+      <inkml:brushProperty name="fitToCurve" value="1"/>
+    </inkml:brush>
+  </inkml:definitions>
+  <inkml:trace contextRef="#ctx0" brushRef="#br0">0 86 0,'0'-24'16,"0"-1"-1,25 25 1,0-25-16,-1 25 0,1 0 16,0 0-16,-1 0 15,26 0-15,-26 0 0,26 0 16,-26 0-16,26 0 0,-26 25 16,1-25-16,0 25 15,-1-1-15,-24 1 16,0 0-16,-24-1 15,-1 1-15,-24 0 16,24-1-16,0-24 0,1 25 16,-1-25-16,0 0 15,25 25-15,-24-25 0,48 0 32,1 24-32,0-24 15,-1 0-15,1 0 0,0 25 16,-1 0-16,1-25 15,24 49 1,-24-24-16,-25-1 0,0 1 0,-25 0 16,1-1-1,-26-24-15,26 25 0,-26-25 16,-48 0 0,73-25-16,0 25 0,1-24 15,24-1-15</inkml:trace>
+  <inkml:trace contextRef="#ctx0" brushRef="#br0" timeOffset="622">839 111 0,'25'0'0,"-1"0"0,-48 0 16,-1 0-1,25 25-15,-25-25 16,1 0-16,-1 24 15,0 1-15,25 0 16,-24-1-16,24 1 0,0 0 16,0-1-16,24 1 0,1 0 15,0-1-15,-1 1 16,1 0-16,24-1 0,-24-24 16,0 0-16,24 0 0,-25 0 15,1 0-15,-25-24 16,25-1-16,-25 0 0,0 1 15,0-1-15,0 0 16,0 1-16,0-1 0,-25 0 16,25 1-16,0-1 0,0 0 15,25 25 1,-25-24 0,24 24-16,1 0 15,0 0-15,-1 0 0,1 0 16,24 0-16,-24 24 15,0-24-15,-1 25 0,1 0 16,-25-1-16,0 1 16,0 0-1,0 24-15,0-24 0,0-1 16,0 1-16,25 24 0,-25-24 16,24 0-16,1-25 15,0 24-15,-1-24 0,1 0 16,0 0-16,-1 0 15,26-24-15,-1-1 0,-24 0 16,-1 1-16,26-1 0,-26-24 16,-24 24-16,0-24 15,0 24-15,-24-24 16,-1 24-16,-24 0 0,-25 25 16,0-24-16,0 24 0,0 24 15,-25 1-15</inkml:trace>
+</inkml:ink>
+</file>
+
+<file path=ppt/ink/ink88.xml><?xml version="1.0" encoding="utf-8"?>
+<inkml:ink xmlns:inkml="http://www.w3.org/2003/InkML">
+  <inkml:definitions>
+    <inkml:context xml:id="ctx0">
+      <inkml:inkSource xml:id="inkSrc0">
+        <inkml:traceFormat>
+          <inkml:channel name="X" type="integer" max="1920" units="cm"/>
+          <inkml:channel name="Y" type="integer" max="1080" units="cm"/>
+          <inkml:channel name="T" type="integer" max="2.14748E9" units="dev"/>
+        </inkml:traceFormat>
+        <inkml:channelProperties>
+          <inkml:channelProperty channel="X" name="resolution" value="55.81395" units="1/cm"/>
+          <inkml:channelProperty channel="Y" name="resolution" value="55.6701" units="1/cm"/>
+          <inkml:channelProperty channel="T" name="resolution" value="1" units="1/dev"/>
+        </inkml:channelProperties>
+      </inkml:inkSource>
+      <inkml:timestamp xml:id="ts0" timeString="2022-02-21T14:53:41.444"/>
+    </inkml:context>
+    <inkml:brush xml:id="br0">
+      <inkml:brushProperty name="width" value="0.05" units="cm"/>
+      <inkml:brushProperty name="height" value="0.05" units="cm"/>
+      <inkml:brushProperty name="fitToCurve" value="1"/>
+    </inkml:brush>
+  </inkml:definitions>
+  <inkml:trace contextRef="#ctx0" brushRef="#br0">293 50 0,'0'-25'0,"25"25"0,-25-25 15,-25 25 1,1 25 0,-1 0-1,-24-1-15,24 1 0,0 0 16,-24 24-16,24-24 0,1 24 15,-1 0-15,0-24 16,25 74-16,25-75 16,0 26-16,-1-26 15,1 1-15,24-25 0,1 25 16,-1-25-16,0 0 0,1-25 16,-26 25-16,1-25 15,0 1-15,-1-1 16,-24 0-16,-24-24 15,-1 49-15,0 0 0,1 0 16,-26 0-16,26 0 0,-26 25 16,26-1-16,-1 1 15,0 0-15,1-1 0,24 1 16,0 0-16,0-1 16</inkml:trace>
+</inkml:ink>
+</file>
+
+<file path=ppt/ink/ink89.xml><?xml version="1.0" encoding="utf-8"?>
+<inkml:ink xmlns:inkml="http://www.w3.org/2003/InkML">
+  <inkml:definitions>
+    <inkml:context xml:id="ctx0">
+      <inkml:inkSource xml:id="inkSrc0">
+        <inkml:traceFormat>
+          <inkml:channel name="X" type="integer" max="1920" units="cm"/>
+          <inkml:channel name="Y" type="integer" max="1080" units="cm"/>
+          <inkml:channel name="T" type="integer" max="2.14748E9" units="dev"/>
+        </inkml:traceFormat>
+        <inkml:channelProperties>
+          <inkml:channelProperty channel="X" name="resolution" value="55.81395" units="1/cm"/>
+          <inkml:channelProperty channel="Y" name="resolution" value="55.6701" units="1/cm"/>
+          <inkml:channelProperty channel="T" name="resolution" value="1" units="1/dev"/>
+        </inkml:channelProperties>
+      </inkml:inkSource>
+      <inkml:timestamp xml:id="ts0" timeString="2022-02-21T14:53:44.022"/>
+    </inkml:context>
+    <inkml:brush xml:id="br0">
+      <inkml:brushProperty name="width" value="0.05" units="cm"/>
+      <inkml:brushProperty name="height" value="0.05" units="cm"/>
+      <inkml:brushProperty name="fitToCurve" value="1"/>
+    </inkml:brush>
+  </inkml:definitions>
+  <inkml:trace contextRef="#ctx0" brushRef="#br0">74 226 0,'0'-25'0,"-25"25"0,25-25 16,0 1-1,0-1-15,25 25 16,49-74 0,-49 74-16,-1-25 15,26 1-15,-26 24 0,26 0 16,-26 0-16,26 0 16,-26 0-16,1 24 0,-25 1 15,0 0-15,0 24 16,-25-24-16,1 24 0,-26 0 15,26 1-15,-26-1 0,1 0 16,0 1-16,-1-26 16,1 1-16,24 0 0,-24-1 15,49 1 1,49-25 0,1-25-16,-1 25 0,25-24 15,25 24-15,-1-25 16,-24 25-16,25-25 0,-25 25 15,0 0-15,0-24 0,-25 24 16,-24 0-16,-1-25 16</inkml:trace>
+</inkml:ink>
+</file>
+
 <file path=ppt/ink/ink9.xml><?xml version="1.0" encoding="utf-8"?>
 <inkml:ink xmlns:inkml="http://www.w3.org/2003/InkML">
   <inkml:definitions>
@@ -2671,6 +3378,370 @@
   <inkml:trace contextRef="#ctx0" brushRef="#br0" timeOffset="1269">1138 556 0,'-24'0'16,"24"-24"-16,0 0 0,0-1 15,0 1 1,0 0-16,24 24 15,-24-24-15,25 24 0,-1 0 16,0 24 0,0 0-16,0 0 0,1 1 0,-1 23 15,0-24-15,-24 25 16,24-1-16,-24-24 0,0 0 16,0 1-16,0-1 0,0 0 15,-24-24 1,24-24-16,0 0 15,0-1-15,-24 1 16,24 0-16,0-24 0,0 23 16,24-23-16,-24 0 0,24-1 15,0 1-15,1 24 16,-1 0-16,0 24 0,0 0 16,0 0-16,0 24 15,1 0-15,-25 0 0,24 0 16,0 25-16,-24-25 0,0 0 15,24 0-15,-24 0 16,0-48 15,0 0-31,24 0 16,1 0-16,-25-1 16,24 1-16,0 0 0,0 0 15,0 24-15,1-24 0,-1 24 16,0 24-16,0 0 15,0 0-15,-24 0 16,25 1-16,-1-1 0,-24 0 16,24 0-16,0 0 15,0-24-15,0 25 0,1-25 16,-1 0-16,0-25 16,0 25-16,25-24 0,-25 0 15,0 0-15,-24 0 0,24-25 16,-24 25-16,0-24 15,-24-1-15,24 25 0,-24-24 16,0 24-16,-25 24 16,25-25-16,0 25 0,0 25 15,-1-1-15,25 0 0,0 24 16,0 1-16,0-25 16,25 24-16,-25 1 0,48-25 15,-24 24-15,25-24 0,-1-24 16,0 25-16</inkml:trace>
   <inkml:trace contextRef="#ctx0" brushRef="#br0" timeOffset="1798">2469 387 0,'-24'-24'0,"24"-1"16,-24 1-16,24 0 15,0 0-15,24 48 16,-24 0-1,24-24-15,0 24 0,0 1 16,-24 23-16,24-24 16,1 0-16,-25 25 0,24-25 15,-24 0-15,0 0 16,0 0-16,-24-24 16,24-24-1,-25 0-15,25 0 16,25-97-1,-1 97-15,-24-25 16,24 1-16,0 24 0,0 0 16,25 24-16,-25 0 0,0 24 15,0-24-15,1 24 16,-25 24-16,24-23 0,0-1 16,-24 0-16,0 0 15,0 0-15,24 0 0,-24 1 16,24-25-1,-24-25 1,0 1-16,25 24 16,-25-24-16,0 0 15,24 24-15,-24-24 0,24 24 16,0 24-16,0 0 16,-24 0-1,24 0-15,1 1 0,-25-1 16,24 0-16,0 0 15,-24 0-15,24-24 0,0 0 16,1 0-16</inkml:trace>
   <inkml:trace contextRef="#ctx0" brushRef="#br0" timeOffset="2722">3412 411 0,'25'-24'0,"-1"-25"16,-24 25-16,0 0 0,0 0 15,0 0-15,-24 24 0,-1 0 16,1 0-1,0 24-15,0-24 0,0 24 16,24 0-16,0 0 16,0 1-16,0 23 0,0-24 15,24 0-15,0 0 0,-24 1 16,24-25-16,0 24 16,25-24-16,-25 0 0,0 0 15,0-24 1,0-1-16,-24 1 15,0 0-15,-24 0 0,24 0 16,-24 0-16,24-1 16,0 1-16,0 0 15,0 0-15,24 24 16,0 0-16,25 0 0,-25 0 16,24 0-16,1 24 0,-25 0 15,24-24-15,-23 24 16,-1 1-16,-24-1 0,0 0 15,0 0-15,0 0 16,-24-24-16,-1 24 0,1-24 16,0 0-16,0 0 0,0 0 15,24-24 1,0 0-16,0 0 0,0 0 16,24 0-16,24-1 0,-24 1 15,25 0-15,-1 24 16,1-24-16,-25 24 0,24 0 15,0 0-15,-23 0 16,-1 0-16,-24 24 0,24-24 16,-24 24 46,0 0-46,0 1-1,24-25-15,-24 24 0,24-24 16,1 24-16,-1-24 0,0 24 16,0-24-16,0 0 15,25-24-15,-25 24 0,0-24 16,0 24-16,1-24 0,-1-1 16,0 1-1,-24 0-15,-24 24 16,0 24-1,24 25-15,-25-1 0,25 0 16,0 25-16,0 120 16,25-120-16,-25 24 15,24-1-15,-24-23 0,0-25 16,0 1-16,-24-1 16,-1-24-16,-23-24 0,0 0 15,-1-24-15,1 0 16,-1-24-16,25-25 0,0 25 15,0-25-15,24 1 0,24-1 16,24 0-16,1 25 0,-1 0 16,25-1-16,-25 25 15,25 24-15,-1-24 0,-23 24 16,-1 0-16</inkml:trace>
+</inkml:ink>
+</file>
+
+<file path=ppt/ink/ink90.xml><?xml version="1.0" encoding="utf-8"?>
+<inkml:ink xmlns:inkml="http://www.w3.org/2003/InkML">
+  <inkml:definitions>
+    <inkml:context xml:id="ctx0">
+      <inkml:inkSource xml:id="inkSrc0">
+        <inkml:traceFormat>
+          <inkml:channel name="X" type="integer" max="1920" units="cm"/>
+          <inkml:channel name="Y" type="integer" max="1080" units="cm"/>
+          <inkml:channel name="T" type="integer" max="2.14748E9" units="dev"/>
+        </inkml:traceFormat>
+        <inkml:channelProperties>
+          <inkml:channelProperty channel="X" name="resolution" value="55.81395" units="1/cm"/>
+          <inkml:channelProperty channel="Y" name="resolution" value="55.6701" units="1/cm"/>
+          <inkml:channelProperty channel="T" name="resolution" value="1" units="1/dev"/>
+        </inkml:channelProperties>
+      </inkml:inkSource>
+      <inkml:timestamp xml:id="ts0" timeString="2022-02-21T14:53:44.566"/>
+    </inkml:context>
+    <inkml:brush xml:id="br0">
+      <inkml:brushProperty name="width" value="0.05" units="cm"/>
+      <inkml:brushProperty name="height" value="0.05" units="cm"/>
+      <inkml:brushProperty name="fitToCurve" value="1"/>
+    </inkml:brush>
+  </inkml:definitions>
+  <inkml:trace contextRef="#ctx0" brushRef="#br0">0 74 0,'0'-25'16,"0"1"0,0-1-16,24 25 15,-24 25-15,25-1 16,-25 1-16,25 24 15,-25 1-15,24-1 0,1 0 16,-25 1-16,25 24 0,-1-25 16,-24-24-16,25 24 15,-25 0-15,0-24 0,0 0 16,25-1-16</inkml:trace>
+</inkml:ink>
+</file>
+
+<file path=ppt/ink/ink91.xml><?xml version="1.0" encoding="utf-8"?>
+<inkml:ink xmlns:inkml="http://www.w3.org/2003/InkML">
+  <inkml:definitions>
+    <inkml:context xml:id="ctx0">
+      <inkml:inkSource xml:id="inkSrc0">
+        <inkml:traceFormat>
+          <inkml:channel name="X" type="integer" max="1920" units="cm"/>
+          <inkml:channel name="Y" type="integer" max="1080" units="cm"/>
+          <inkml:channel name="T" type="integer" max="2.14748E9" units="dev"/>
+        </inkml:traceFormat>
+        <inkml:channelProperties>
+          <inkml:channelProperty channel="X" name="resolution" value="55.81395" units="1/cm"/>
+          <inkml:channelProperty channel="Y" name="resolution" value="55.6701" units="1/cm"/>
+          <inkml:channelProperty channel="T" name="resolution" value="1" units="1/dev"/>
+        </inkml:channelProperties>
+      </inkml:inkSource>
+      <inkml:timestamp xml:id="ts0" timeString="2022-02-21T14:53:44.902"/>
+    </inkml:context>
+    <inkml:brush xml:id="br0">
+      <inkml:brushProperty name="width" value="0.05" units="cm"/>
+      <inkml:brushProperty name="height" value="0.05" units="cm"/>
+      <inkml:brushProperty name="fitToCurve" value="1"/>
+    </inkml:brush>
+  </inkml:definitions>
+  <inkml:trace contextRef="#ctx0" brushRef="#br0">166 79 0,'0'-24'0,"0"-1"16,-24 25 0,-1 0-16,25-25 0,-25 25 15,1 0-15,-1 0 16,0 25-16,25 0 15,-24 24 1,24-24-16,0 24 0,24-24 16,-24 24-16,25 0 0,0-24 15,-1 24-15,1-24 16,0 0-16,24 24 0,-24-24 16,-1-1-16,-24 1 15,-24-25 16,-1-25-31,0 25 16,1-24-16,-1-26 0,0 1 16,1 0-16</inkml:trace>
+  <inkml:trace contextRef="#ctx0" brushRef="#br0" timeOffset="379">216 55 0,'24'-25'0,"25"25"15,1-25-15,-1 25 0,-24 0 16,24 0-16,0 0 0,1 0 15,-26 0 1,26 0-16,-1 0 0,-24 0 0,-1 0 16,26 0-1,-26 0-15,-24 25 32,0 0-17,0-1-15,0 26 0,0-26 16,0 26-16,0-1 0,0-24 15,0 24-15,0 0 16,25-24-16,0 0 16,-1-1-16,1 1 0,24 0 15,-24-25-15,24 0 0,1 0 16,-1-25-16,0 0 16,25-24-16,-49 0 15,0 24-15,-1-24 0,-24-1 16,-24 1-16,24 0 15,-50 24-15,1 0 0,0 1 16,-1-1-16,-24 25 16,0 0-16,0 0 0</inkml:trace>
+</inkml:ink>
+</file>
+
+<file path=ppt/ink/ink92.xml><?xml version="1.0" encoding="utf-8"?>
+<inkml:ink xmlns:inkml="http://www.w3.org/2003/InkML">
+  <inkml:definitions>
+    <inkml:context xml:id="ctx0">
+      <inkml:inkSource xml:id="inkSrc0">
+        <inkml:traceFormat>
+          <inkml:channel name="X" type="integer" max="1920" units="cm"/>
+          <inkml:channel name="Y" type="integer" max="1080" units="cm"/>
+          <inkml:channel name="T" type="integer" max="2.14748E9" units="dev"/>
+        </inkml:traceFormat>
+        <inkml:channelProperties>
+          <inkml:channelProperty channel="X" name="resolution" value="55.81395" units="1/cm"/>
+          <inkml:channelProperty channel="Y" name="resolution" value="55.6701" units="1/cm"/>
+          <inkml:channelProperty channel="T" name="resolution" value="1" units="1/dev"/>
+        </inkml:channelProperties>
+      </inkml:inkSource>
+      <inkml:timestamp xml:id="ts0" timeString="2022-02-21T14:54:00.307"/>
+    </inkml:context>
+    <inkml:brush xml:id="br0">
+      <inkml:brushProperty name="width" value="0.05" units="cm"/>
+      <inkml:brushProperty name="height" value="0.05" units="cm"/>
+      <inkml:brushProperty name="fitToCurve" value="1"/>
+    </inkml:brush>
+  </inkml:definitions>
+  <inkml:trace contextRef="#ctx0" brushRef="#br0">25 80 0,'0'-25'15,"-25"25"-15,25-25 78,25 25-78,-1 0 16,1 0 0,24 0-16,-24-24 15,24 24-15,1 0 0,-26 0 16,26 0-16,-26 0 0,1 0 15,0 24-15,-1-24 0,-24 25 32,0 0-32,-24-25 15,24 24-15,-25 1 16,0-25-16,1 25 0,-1-25 16,25 24-16,-25-24 0,1 25 15,-1-25-15,25 25 16,25-1 15,-1-24-31,26 0 0,-1 25 16,0-25-16,1 25 0,-1-25 15,0 24-15,1 1 16,-1 0-16,-25-25 0,1 24 16,0 26-16,-1-50 15,-24 49-15,0-24 16,-24-25-16,24 24 0,-50 1 0,26-1 15,-25-24-15,-1 25 16,1-25-16,0 0 0,-1 0 16,1 0-16,0-25 0,24 25 15,0-24-15,-24-1 16</inkml:trace>
+</inkml:ink>
+</file>
+
+<file path=ppt/ink/ink93.xml><?xml version="1.0" encoding="utf-8"?>
+<inkml:ink xmlns:inkml="http://www.w3.org/2003/InkML">
+  <inkml:definitions>
+    <inkml:context xml:id="ctx0">
+      <inkml:inkSource xml:id="inkSrc0">
+        <inkml:traceFormat>
+          <inkml:channel name="X" type="integer" max="1920" units="cm"/>
+          <inkml:channel name="Y" type="integer" max="1080" units="cm"/>
+          <inkml:channel name="T" type="integer" max="2.14748E9" units="dev"/>
+        </inkml:traceFormat>
+        <inkml:channelProperties>
+          <inkml:channelProperty channel="X" name="resolution" value="55.81395" units="1/cm"/>
+          <inkml:channelProperty channel="Y" name="resolution" value="55.6701" units="1/cm"/>
+          <inkml:channelProperty channel="T" name="resolution" value="1" units="1/dev"/>
+        </inkml:channelProperties>
+      </inkml:inkSource>
+      <inkml:timestamp xml:id="ts0" timeString="2022-02-21T14:54:02.164"/>
+    </inkml:context>
+    <inkml:brush xml:id="br0">
+      <inkml:brushProperty name="width" value="0.05" units="cm"/>
+      <inkml:brushProperty name="height" value="0.05" units="cm"/>
+      <inkml:brushProperty name="fitToCurve" value="1"/>
+    </inkml:brush>
+  </inkml:definitions>
+  <inkml:trace contextRef="#ctx0" brushRef="#br0">0 28 0,'24'0'0,"1"-24"15,0 24-15,-1 0 16,1 0-16,0 0 0,24 0 16,0 0-16,1 0 15,-26 0-15,26 0 0,-1 24 16,0 1-16,-24-25 15,0 25-15,-1-1 0,-24 1 16,0 24-16,-24-24 0,-1 0 16,0-1-16,1 26 15,-26-26-15,26 1 0,-26-25 16,26 25-16,-1-1 16,0-24-16,1 25 0,48 0 15,1-25 1,0 0-16,24 24 15,0-24-15,1 0 0,-1 0 16,25 0-16,0 0 16,49 0-16,-74-24 15</inkml:trace>
+</inkml:ink>
+</file>
+
+<file path=ppt/ink/ink94.xml><?xml version="1.0" encoding="utf-8"?>
+<inkml:ink xmlns:inkml="http://www.w3.org/2003/InkML">
+  <inkml:definitions>
+    <inkml:context xml:id="ctx0">
+      <inkml:inkSource xml:id="inkSrc0">
+        <inkml:traceFormat>
+          <inkml:channel name="X" type="integer" max="1920" units="cm"/>
+          <inkml:channel name="Y" type="integer" max="1080" units="cm"/>
+          <inkml:channel name="T" type="integer" max="2.14748E9" units="dev"/>
+        </inkml:traceFormat>
+        <inkml:channelProperties>
+          <inkml:channelProperty channel="X" name="resolution" value="55.81395" units="1/cm"/>
+          <inkml:channelProperty channel="Y" name="resolution" value="55.6701" units="1/cm"/>
+          <inkml:channelProperty channel="T" name="resolution" value="1" units="1/dev"/>
+        </inkml:channelProperties>
+      </inkml:inkSource>
+      <inkml:timestamp xml:id="ts0" timeString="2022-02-21T14:54:02.511"/>
+    </inkml:context>
+    <inkml:brush xml:id="br0">
+      <inkml:brushProperty name="width" value="0.05" units="cm"/>
+      <inkml:brushProperty name="height" value="0.05" units="cm"/>
+      <inkml:brushProperty name="fitToCurve" value="1"/>
+    </inkml:brush>
+  </inkml:definitions>
+  <inkml:trace contextRef="#ctx0" brushRef="#br0">99 25 0,'-25'-25'16,"1"25"0,-1 0-16,0 0 31,25 25-31,0 0 0,0-1 15,0 1-15,0 0 16,0-1-16,0 26 0,0-26 16,25 26-16,-25-26 0,25 26 15,-25-26-15,24 1 16,1 0-16,-25 24 0,25-49 16,-25 25-16,24-1 15,-24 1-15,0 0 16,-24-25-16,-1 24 15,0-24-15,1 0 16,-1 0-16</inkml:trace>
+  <inkml:trace contextRef="#ctx0" brushRef="#br0" timeOffset="493">198 124 0,'24'0'0,"1"-25"15,0 25-15,-1 0 16,1-25-16,0 25 16,-1 0-16,1 0 15,24 0-15,25 25 16,-24-25-16,-1 0 16,0 0-16,0 0 0,1 0 15,-26 25-15,1-25 0,0 0 16,-1 0-16,-48 0 31,-1 0-15,0 24-16,1-24 0,-1 0 15,0 25-15,1 0 0,-1 24 16,1-24-16,24 24 16,-25-24-16,0 24 0,25 0 15,0-24-15,0 24 0,25-24 16,-25 0-16,25-1 15,-1 1-15,25-25 0,1 0 16,-1 0-16,0 0 16,25-25-16,-24 1 0,-1-1 15,0-24-15,1 24 0,-26-24 16,1-1-16,0 1 16,-25 0-16,0-1 0,-25 26 15,-24-26-15,-1 50 16,1-24-16,0 24 0,-25 0 15,0 0-15,0 0 0</inkml:trace>
+</inkml:ink>
+</file>
+
+<file path=ppt/ink/ink95.xml><?xml version="1.0" encoding="utf-8"?>
+<inkml:ink xmlns:inkml="http://www.w3.org/2003/InkML">
+  <inkml:definitions>
+    <inkml:context xml:id="ctx0">
+      <inkml:inkSource xml:id="inkSrc0">
+        <inkml:traceFormat>
+          <inkml:channel name="X" type="integer" max="1920" units="cm"/>
+          <inkml:channel name="Y" type="integer" max="1080" units="cm"/>
+          <inkml:channel name="T" type="integer" max="2.14748E9" units="dev"/>
+        </inkml:traceFormat>
+        <inkml:channelProperties>
+          <inkml:channelProperty channel="X" name="resolution" value="55.81395" units="1/cm"/>
+          <inkml:channelProperty channel="Y" name="resolution" value="55.6701" units="1/cm"/>
+          <inkml:channelProperty channel="T" name="resolution" value="1" units="1/dev"/>
+        </inkml:channelProperties>
+      </inkml:inkSource>
+      <inkml:timestamp xml:id="ts0" timeString="2022-02-21T14:54:05.090"/>
+    </inkml:context>
+    <inkml:brush xml:id="br0">
+      <inkml:brushProperty name="width" value="0.05" units="cm"/>
+      <inkml:brushProperty name="height" value="0.05" units="cm"/>
+      <inkml:brushProperty name="fitToCurve" value="1"/>
+    </inkml:brush>
+  </inkml:definitions>
+  <inkml:trace contextRef="#ctx0" brushRef="#br0">97 74 0,'0'-25'0,"25"25"15,-25-24-15,-25 24 31,0 0-15,1 0 0,-1 0-1,25 24-15,-25 1 16,25 0-16,0-1 0,25 1 16,-25 0-16,25-1 15,24 1-15,-24 0 0,24-1 16,0 26-16,1-26 15,-1 1-15,0 0 0,-24-1 16,24 1-16,-24 0 0,-25-1 16,0 1-16,0 0 15,-25-1-15,-24-24 16,0 0-16,-1 0 16,1 0-16,0 0 0,-25-24 15,49-1-15</inkml:trace>
+  <inkml:trace contextRef="#ctx0" brushRef="#br0" timeOffset="168">23 271 0,'25'-49'16,"24"0"-16,-24 24 16,24-24-16,-24 24 0,24 0 15,-24 1-15,24 24 0,-24 0 16,-1-25-16,1 25 16,0 0-16,-1 0 0,1 0 15,-1 0-15,26 0 16,-26 0-16,26 0 0,-1 0 15,0 0-15,25 0 0,-24 0 16</inkml:trace>
+</inkml:ink>
+</file>
+
+<file path=ppt/ink/ink96.xml><?xml version="1.0" encoding="utf-8"?>
+<inkml:ink xmlns:inkml="http://www.w3.org/2003/InkML">
+  <inkml:definitions>
+    <inkml:context xml:id="ctx0">
+      <inkml:inkSource xml:id="inkSrc0">
+        <inkml:traceFormat>
+          <inkml:channel name="X" type="integer" max="1920" units="cm"/>
+          <inkml:channel name="Y" type="integer" max="1080" units="cm"/>
+          <inkml:channel name="T" type="integer" max="2.14748E9" units="dev"/>
+        </inkml:traceFormat>
+        <inkml:channelProperties>
+          <inkml:channelProperty channel="X" name="resolution" value="55.81395" units="1/cm"/>
+          <inkml:channelProperty channel="Y" name="resolution" value="55.6701" units="1/cm"/>
+          <inkml:channelProperty channel="T" name="resolution" value="1" units="1/dev"/>
+        </inkml:channelProperties>
+      </inkml:inkSource>
+      <inkml:timestamp xml:id="ts0" timeString="2022-02-21T14:53:07.690"/>
+    </inkml:context>
+    <inkml:brush xml:id="br0">
+      <inkml:brushProperty name="width" value="0.05" units="cm"/>
+      <inkml:brushProperty name="height" value="0.05" units="cm"/>
+      <inkml:brushProperty name="fitToCurve" value="1"/>
+    </inkml:brush>
+  </inkml:definitions>
+  <inkml:trace contextRef="#ctx0" brushRef="#br0">617 398 0,'0'-25'15,"-25"0"-15,25 1 16,0-1 0,0 50-1,25-1 1,-1 50-1,-24-49-15,25 0 16,-25-1-16,25 1 0,-1 0 16,1-1-1,0-24-15,-1 0 0,1 0 16,-1 0-16,1-24 0,-25-1 16,25 0-16,-1 1 0,1-1 15,-25 0-15,25 1 16,-25-26-16,24 50 0,-24-24 15,25 48 1,-25 1-16,0 0 16,0 24-16,0 0 15,0 1-15,0 24 0,0-25 16,0 0-16,0 1 0</inkml:trace>
+  <inkml:trace contextRef="#ctx0" brushRef="#br0" timeOffset="1252">3181 200 0,'0'-24'15,"-24"24"-15,24-25 0,0 0 16,0 1-16,24-1 16,-24 0-16,25 25 15,0-24-15,-1 24 0,1-25 16,24 25-16,-24 0 0,-1 0 15,1 0-15,0 0 16,-1 0-16,1 25 0,0-1 16,-25 1-1,0 0-15,-25-25 16,25 24-16,-25 1 0,25 0 16,-24-25-16,-1 24 15,0 1-15,1-25 16,24 25-16,-25-25 15,50 0 1,-1 0 0,1 0-1,0 0 1,-1 0-16,1 0 16,0 0-1,-1 0 1,1 0-1,0 0 1,-1 24-16,1 1 16,-25 0-1,0-1 1,-25 1-16,25 0 16,-24-25-16,-1 24 0,0 1 15,1-25-15,-1 0 16,0 0-16,1 25 15,-1-25-15,0 0 0,1 0 16,-1 0-16,1-25 16,-1 25-16,0 0 15,1-25-15,24 1 16</inkml:trace>
+  <inkml:trace contextRef="#ctx0" brushRef="#br0" timeOffset="1920">4044 151 0,'25'-25'0,"0"25"16,-50-24-1,0 24 1,1 0-16,-1 24 0,0-24 0,1 25 15,-1 0-15,0-25 16,1 24-16,24 1 0,0 0 16,0-1-16,0 26 0,24-26 15,1 1-15,0-25 16,-1 25-16,1-1 0,0-24 16,24 0-16,-24 0 15,-1 0-15,1 0 0,0 0 16,-1-24-16,1-1 0,-25 0 15,0 1 1,-25-1-16,25 0 0,-24 1 16,-1-1-16,0 0 15,1 25-15,-1-24 16,50 24 15,-1 0-31,1 0 0,0-25 16,24 25-16,0 0 15,25 0-15,-49 0 16,24 0-16,-24 0 0,0 0 16,-1 0-16,-24 25 15,25-1-15,-25 1 16,0 24-16,0-24 16,0 24-16,0-24 15,0 0-15,25-1 0,-1 1 16,1-25-1,0 0-15,-1 0 0,1 0 16,-1 0-16,1-25 16,24 25-16,-24-24 0,0-1 15,-1-24-15,1 24 16,0 0-16,-25-24 0,0 24 16,-25 1-16,-24-1 0,-1 0 15,1 25-15,-25 0 16,-98 0-16</inkml:trace>
+  <inkml:trace contextRef="#ctx0" brushRef="#br0" timeOffset="66197">986 6365 0,'0'-24'0,"0"-1"15,25 0 1,-25 50 0,0 0-16,0-1 15,25 1-15,-25 24 0,24 1 16,-24 24-16,25-25 0,-25 0 15,25 25-15,-25-24 16,0-1-16</inkml:trace>
+  <inkml:trace contextRef="#ctx0" brushRef="#br0" timeOffset="66467">789 6612 0,'-24'-74'15,"-1"25"-15,0-1 0,1 1 16,24 0-16,24 24 16,1 0-16,24 1 0,0 24 15,25 24-15,0 1 0,0 0 16,0 24-16,0 0 16,-24 1-16,-1-1 0,-24 0 15,-1 25-15,-24-24 0,-49-1 16,24 0-1,-49 1-15,0-26 0,0 1 0,-24 0 16,24-1-16,-25-24 16,25 0-16,25-24 0</inkml:trace>
+  <inkml:trace contextRef="#ctx0" brushRef="#br0" timeOffset="66838">1850 6415 0,'0'-25'0,"0"0"15,24 1-15,-24-1 16,-24 25 0,-26 0-1,26 25-15,-26-1 0,26 26 16,-26-26-16,26 26 0,-1-1 16,0 25-16,1-25 15,24 1-15,0-1 0,24 0 16,1 1-16,0-26 0,24 1 15,0 0-15,1-25 16,-1 0-16,0 0 0,-24-25 16,0 25-16</inkml:trace>
+  <inkml:trace contextRef="#ctx0" brushRef="#br0" timeOffset="66977">1874 6711 0,'-49'-25'0,"24"0"15,1 1-15,-1 24 0,0-25 16,1 25-16,-1 0 0,50 0 31,-1-25-31,1 25 0,24 0 16,1 0-16,-1-24 15,0 24-15</inkml:trace>
+  <inkml:trace contextRef="#ctx0" brushRef="#br0" timeOffset="67285">2269 6365 0,'-25'0'0,"0"-24"0,1 24 16,-1-25-1,25 50 1,0-1-16,-25 1 16,25 0-16,0-1 0,0 26 15,0-1-15,0 0 0,0 1 16,0-26-16,0 26 15,0-1-15,0-24 0,0-1 16,0 1-16,0 0 16,25-1-16,0-24 15,-1 0-15,1 0 0,0 0 16,-1 0-16,26 0 16,-26 0-16,26-24 15,-1 24-15,0-25 0,1 25 16</inkml:trace>
+  <inkml:trace contextRef="#ctx0" brushRef="#br0" timeOffset="67702">2589 6365 0,'-24'-24'16,"-1"24"-16,0-25 15,50 25 1,0 0-16,-1 0 0,50 0 16,0 0-1,-24 0-15,-1 0 0,0 0 16,1 0-16,-26 0 0,1 0 16,-50 0-1,1 0 1,-1 0-16,0 0 0,1 0 15,-1 0-15,0 0 16,1 0-16</inkml:trace>
+  <inkml:trace contextRef="#ctx0" brushRef="#br0" timeOffset="67865">2737 6291 0,'-24'0'16,"24"25"15,24-25-31</inkml:trace>
+  <inkml:trace contextRef="#ctx0" brushRef="#br0" timeOffset="69513">2565 6316 0,'0'25'125,"0"-1"-125,0 26 16,0-26 0,0 26-16,24-1 0,-24 0 15,0 1-15,0-1 0,0 0 16,25 1-16,-25-1 15,25-24-15,-25-1 0,24 26 16,1-50-16,0 24 16,24 1-16,-24-25 0,-1 0 15,26 0-15,-26 0 0,26 0 16,-26 0-16,1-25 16,0 25-16</inkml:trace>
+  <inkml:trace contextRef="#ctx0" brushRef="#br0" timeOffset="69709">2639 6686 0,'-25'-25'16,"0"1"-16,50-1 31,0 25-31,-1 0 15,26 0-15,-1 0 16,0 0-16,1 0 0,-1 0 16</inkml:trace>
+  <inkml:trace contextRef="#ctx0" brushRef="#br0" timeOffset="70088">3255 6390 0,'-24'0'0,"-1"-25"0,25 1 16,25-1 0,-1 25-16,26 0 15,-26 0-15,50 0 0,-25-25 16,1 25-16,24 0 0,-25 0 15,-24 0-15,24 0 16,-98 0 15,24 0-31,0 0 0,-24 0 16,24 0-16,1 0 0,-1 25 16,0-25-16,1 25 15,24-1-15,0 26 0,0-1 16,0 0-16,0 1 15,0 24-15,0-25 0,0 25 16,0-25-16,24 1 16,-24-26-16</inkml:trace>
+  <inkml:trace contextRef="#ctx0" brushRef="#br0" timeOffset="70341">3995 6390 0,'0'-25'16,"-49"1"-16,24 24 15,0 0-15,1 24 0,-1 1 16,0 0-16,1-1 16,-1 26-16,25-1 0,-25 0 15,25 1-15,0-1 16,25 0-16,-25 1 0,25-1 15,-1-24-15,50 24 16,-24-24-16,-26-25 16,26 0-16,-26-25 0</inkml:trace>
+  <inkml:trace contextRef="#ctx0" brushRef="#br0" timeOffset="70476">3896 6612 0,'-24'0'0,"-26"-25"16,26 25-16,48 0 31,26 0-31,-26 0 16,26 0-16,73 0 15</inkml:trace>
+  <inkml:trace contextRef="#ctx0" brushRef="#br0" timeOffset="2695">814 1409 0,'-25'0'16,"1"0"-16,-1 0 0,0 0 16,1 24-16,-1 1 15,0 0-15,25-1 16,-24 1-16,24 0 15,0-1-15,24 1 0,-24 0 16,25-25-16,0 24 16,-1 1-16,1 0 0,0-1 15,24 1-15,-25 0 16,1-1-16,0-24 0,-1 25 16,1 0-16,-25-1 0,0 1 15,-25-25 1,1 25-16,-1-25 0,0 0 15,-24 0-15,25 0 0,-26-25 16</inkml:trace>
+  <inkml:trace contextRef="#ctx0" brushRef="#br0" timeOffset="2855">691 1359 0,'24'-24'15,"26"-1"-15,-26 0 16,1 25-16,24-24 0,-24 24 15,24-25-15,0 25 0,1 0 16,-1-25-16,0 25 16,1 0-16,-1 0 0,-24 0 15,-1 0-15</inkml:trace>
+  <inkml:trace contextRef="#ctx0" brushRef="#br0" timeOffset="4050">3354 1211 0,'-25'0'16,"25"-24"-16,0-1 15,0 0 1,25 25-16,-1-24 0,1 24 16,0-25-16,-1 0 0,1 25 15,24-24-15,-24 24 16,0 0-16,24 0 0,-24 24 16,-1-24-16,1 25 15,0 0-15,-25-1 0,0 26 16,0-26-16,-25 1 0,25 24 15,-25-24-15,1 0 16,-1-1-16,0 1 0,1-25 16,24 25-16,-25-25 0,25 24 15,-25-24-15,50 0 16,0-24 0,24 24-16,-24 0 15,-1-25-15,26 25 0,-26 0 16,1 0-16,24 25 15,-49-1-15,25-24 0,0 50 16,-25-26-16,0 1 16,-25 0-16,0-1 0,1 26 15,-1-26-15,0 1 0,-24-25 16,0 25-16,24-25 16,-24 0-16,-1 0 0,1 0 15,24 0-15,1-25 0,-1 0 16,25 1-16,0-1 15</inkml:trace>
+  <inkml:trace contextRef="#ctx0" brushRef="#br0" timeOffset="4481">4316 1088 0,'24'-25'0,"1"25"15,-25-24-15,0-1 0,-25 25 16,1 0 0,-1 0-16,0 25 15,1-1-15,-1 1 0,25 0 16,-25 24-16,25-24 16,-24 24-16,24 0 15,0 1-15,0-1 0,24 0 16,-24 1-16,25-26 0,0 1 15,-1 0-15,26-1 0,-26-24 16,1 0-16,0 0 16,-1 0-16,1 0 15,0-24-15,-1-1 0,-24 0 16,0 1-16,0-1 0,0 0 16,-24 25-16,-1-24 15,0 24-15,1 0 0,-1 24 16,0-24-16,1 25 0,-1 0 15,0-1-15,25 1 16,0 0-16,0-1 0,0 1 16,25-25-16,0 0 15,-1 0-15</inkml:trace>
+  <inkml:trace contextRef="#ctx0" brushRef="#br0" timeOffset="4793">4809 1236 0,'24'-25'16,"1"25"-16,-25-24 0,-25 24 16,1 0-1,24 24-15,-25-24 16,0 25-16,1 0 0,-1-1 16,25 26-16,-25-26 15,25 1-15,0 24 0,25-24 16,-25 0-16,25-1 15,-1-24-15,26 25 0,-26-25 16,1 0-16,24-25 0,-24 25 16,0-24-16,-1-1 15,-24 0-15,0 1 0,0-26 16,0 26-16,-24-1 16,-1 25-16,0-25 0,1 25 15,-26 0-15,26 0 0,-1 0 16,-24 25-16</inkml:trace>
+  <inkml:trace contextRef="#ctx0" brushRef="#br0" timeOffset="13539">1110 2469 0,'0'-25'15,"0"1"1,-25 24-1,-24 0-15,24 0 16,0 24-16,1 1 16,-26 0-16,26-1 0,-1 26 15,0-1-15,1 0 0,24 1 16,0-1-16,0 0 16,24 1-16,26-26 0,-26 26 15,50-26-15,-24-24 16,-1 0-16,25 0 0,-25 0 15,1-24-15,-1-1 0,-24 0 16,-1 1-16,-24-1 16,-24-74-1,-26 75-15,26 24 0,-26 0 16,1 0-16,24 0 16,-24 24-16,24 1 0,1 24 15,-1-24-15,0 24 16,25-24-16</inkml:trace>
+  <inkml:trace contextRef="#ctx0" brushRef="#br0" timeOffset="14704">3477 2395 0,'0'-25'0,"0"1"16,0-1-16,0 1 16,0-1-16,25 25 15,-25-25-15,24 1 0,1 24 16,0-25-16,-1 25 0,26 0 15,-1-25-15,0 25 16,-24 0-16,24 0 0,-24 25 16,0-25-16,-1 25 0,1-25 15,-25 24-15,0 1 16,-25-25-16,1 25 0,-26-1 16,26 1-16,-1-25 15,-24 24-15,24-24 0,0 25 16,25 0-1,25-25 1,24 0-16,-24 0 0,74 24 31,-50-24-31,-24 25 0,24-25 0,-24 25 16,-1-1-16,-24 1 16,-24 0-16,-26-1 15,1-24-15,0 25 0,-25-25 16,0 25-16,0-25 15,24 0-15,1 0 0,24 0 16,1 0-16</inkml:trace>
+  <inkml:trace contextRef="#ctx0" brushRef="#br0" timeOffset="15092">4414 2223 0,'50'-25'0,"-26"0"16,-24 1 0,-24 24-16,-1 0 0,0 0 15,1 0-15,-26 24 0,26 1 16,-1 0-16,25-1 16,-25 26-16,25-26 0,0 25 15,0 1-15,0-1 0,25 0 16,0-24-16,24 49 15,0-74 1,-24 25-16,0-25 0,24 0 16,-24 0-16,-1 0 0,1-25 15,0 25-15,-25-25 0,0 1 16,0-1-16,0 0 16,-25 1-16,0-1 15,1 25-15,-1-25 0,0 25 16,1 0-16,-1 25 15,25 0-15,0-1 16,25-24 0</inkml:trace>
+  <inkml:trace contextRef="#ctx0" brushRef="#br0" timeOffset="15394">4981 2297 0,'0'-25'16,"25"0"-16,-25 1 0,-25 24 31,1 24-31,-1 1 16,25 0-16,-25-1 0,25 1 16,0-1-16,25 26 15,0-50-15,-1 24 0,26 1 16,-1-25-16,0 0 15,1 0-15,-1-25 0,-24 1 16,24-1-16,-24 0 0,-25 1 16,0-1-16,0 1 15,-25-1-15,-24 0 0,-1 1 16,1 24-16,-25 0 0,0 0 16,-25 0-16,25 24 15</inkml:trace>
+  <inkml:trace contextRef="#ctx0" brushRef="#br0" timeOffset="17756">5129 3456 0,'-24'-25'16,"-1"25"-16,0 0 0,1 25 16,-26-25-16,26 24 15,-1 1-15,0 0 0,25-1 16,0 25-16,0-24 0,0 0 16,25-1-16,0 1 15,-1 0-15,75-1 16,-74-24-16,24 0 15,0-24-15,-24 24 0,0-25 16,-1 0-16,-24 1 0,0-26 16,-24 26-16,-1-1 15,-24 1-15,24-1 0,-24 0 16,-50 1 0,50 24-16</inkml:trace>
+  <inkml:trace contextRef="#ctx0" brushRef="#br0" timeOffset="17105">3206 3431 0,'-25'0'0,"1"0"16,24-25-16,0 1 15,24-1-15,1 25 16,0-25-16,-1 25 0,26-24 15,-1 24-15,0-25 16,-24 25-16,24 0 0,0 0 16,-24 0-16,24 0 15,1 49-15,-50-24 16,0 0-16,0-1 16,-25 1-16,0 24 15,1-24-15,-1 0 0,0-25 16,1 24-16,-1 1 0,0-25 15,25 24 1,25-24 0,0 0-16,-1 0 15,1 0-15,24 0 0,1 0 16,-1 0-16,0 25 0,1-25 16,-1 25-16,-24-1 15,-1 1-15,-24 0 0,0-1 16,-24 26-16,24-26 15,-50 1-15,1-25 0,0 25 16,-1-1-16,1-24 16,0 0-16,24 0 0,0 0 15,1-24-15</inkml:trace>
+  <inkml:trace contextRef="#ctx0" brushRef="#br0" timeOffset="17459">4242 3357 0,'49'0'0,"-24"-25"16,-50 50 15,0-25-31,1 25 0,-26-1 16,26 1-16,-1 0 0,0 24 15,25-24-15,0 24 16,0-25-16,0 26 0,25-26 15,0 26-15,-1-26 16,26 1-16,-1-25 0,0 25 16,-24-25-16,24 0 0,1 0 15,-26-25-15,1 25 16,-25-25-16,0 1 0,0-1 16,0 0-16,-25 25 15,1 0-15,-1 0 16,0 0-1,1 0-15,-1 25 0,25 0 16,0-1 0</inkml:trace>
+  <inkml:trace contextRef="#ctx0" brushRef="#br0" timeOffset="16395">715 3677 0,'-24'-24'16,"-1"24"-1,0-25-15,1 25 16,24-25 0,24 25-16,26-24 15,-26 24-15,26-25 16,23 1-16,-23 24 0,24-25 16,-25 0-16,25 1 15,-25 24-15,-24 0 16,24 0-16,-24 0 0,-25 24 15,0 1-15,0 0 0,0 24 16,0 0-16,0 25 16,-25-25-16,25 25 0,0-24 15,0-1-15,0 0 0,0 1 16,0-26-16,0 26 16,0-26-16</inkml:trace>
+  <inkml:trace contextRef="#ctx0" brushRef="#br0" timeOffset="16535">962 3924 0,'-25'-25'0,"0"1"0,25-1 15,0 0-15,0 1 16,25 24-16,24 0 16,1 0-16,-1-25 15,25 25-15,0 0 0,25 0 16</inkml:trace>
+  <inkml:trace contextRef="#ctx0" brushRef="#br0" timeOffset="64775">25 4072 0,'-25'0'0,"50"0"16,-1-25 0,1 25-16,0 25 15,-25 0-15,0 24 16,0-24-16,0-1 16,0 26-16,0-1 0,0 25 15,0-25 1,0 1-16,0-26 0,24 26 15,-24-26-15,25 26 16,0-1-16,-1-24 16,1 24-16,24-49 0,1 25 15,-1-1-15,50 1 16,-25-25-16,49 25 0,0-25 16,25 0-16,25 0 0,24 0 15,50 0-15,-25 0 16,49 0-16,0 0 0,25 0 15,0 24-15,0-24 16,0 25-16,0-1 0,0 1 16,-25 0-16,-24-1 0,-1 1 15,-24 0-15,0 24 16,-49-24-16,-1-1 0,-24-24 16,-25 25-16,1 0 15,-26-25-15,1 0 0,-25 24 16,0-24-16,-25 0 0,1 0 15,-26 0-15,1-24 16,0 24-16,-25-25 16,0 0 15,0 1-15,0-1-16,0 0 15,0-24-15,0 24 16,0-24-16,0 0 0,-25-25 15,0 0-15,25 25 16,-24-25-16,-1 0 0,0 0 16,1 0-16,-1 24 15,0 1-15,25 24 0,-24 1 16,-1 24-16,0 24 16,25 1-1,-24 24-15</inkml:trace>
+  <inkml:trace contextRef="#ctx0" brushRef="#br0" timeOffset="65484">2145 4935 0,'25'0'0,"-25"-25"15,0 50 17,0 0-32,0-1 15,-25 26-15,25-1 0,0 25 16,-24-25-16,24 25 15,-25 0-15,25 0 0,-24 0 16,24 0-16,-25-24 0,25 24 16,0-50-16,-25 26 15,25-26-15,0 1 0</inkml:trace>
+  <inkml:trace contextRef="#ctx0" brushRef="#br0" timeOffset="65680">1751 5700 0,'-25'0'0,"1"0"15,48 0 17,1 24-17,0-24-15,-1 25 0,1-25 16,0 25-16,-1-25 15,1 0-15</inkml:trace>
+  <inkml:trace contextRef="#ctx0" brushRef="#br0" timeOffset="65820">2096 5774 0,'49'-25'16,"-49"0"-16,25 1 0,-25-1 16,25 25-16,-50 0 31,25 25-16,-25-1-15,1 26 0,-1-26 16</inkml:trace>
+  <inkml:trace contextRef="#ctx0" brushRef="#br0" timeOffset="88503">5129 1039 0,'0'-25'15,"25"1"1,0 24 0,-25-25-16,24 25 15,1 0 1,0-25-16,-1 25 0,26 0 15,-26 0-15,26 0 0,24 0 16,-25 25-16,25-25 16,0 0-16,-25 25 0,25-25 15,25 49 1,-50-49-16,-24 24 0,-1 26 16,1-26-16,-25 1 0,0 24 15,0 1-15,0-26 16,-25 26-16,25-1 0,-24-24 15,-1 24-15,0 0 0,1 1 16,-25 24 0,24-50-16,0 26 0,1-26 15,-1 26-15,0-26 16,-24 1-16,24 0 0,1 24 16,-1-24-16,25-1 0,-25 1 15,25 0-15,-24-1 16,24 1-16,0 0 0,0 24 15,24-24-15,1-1 16,0 1-16,-1-25 0,1 25 16,24-1-16,1 1 0,-1-25 15,0 0-15,0 25 16,75-25-16,-75 0 16,-24 0-16,24 0 15,0 0-15,-24 0 0,0 0 16,-1 0-16,-24 24 15,-24-24 1,-1 25-16,0-25 16,-24 24-16,24-24 15,1 25-15,-26 0 0,26-1 16,-26 1-16,26 0 16,-1-1-16,0 1 0,1 0 15,24-1-15,-25 1 0,25 0 16,0-1-16,0 1 0,0 0 15,0 24-15,0-24 16,25-1-16,-25 26 0,24-26 16,1 26-16,24-1 15,-24-24-15,49 73 16,-49-48-16,24-1 0,-24 0 16,-1 1-16,1-1 15,0 0-15,-25 1 0,0-1 16,24 0-16,-24-24 15,0 24-15,-24 0 0,24-24 16,-50 49 0,26-49-16,-1-1 0,-24 1 15,24 0-15,-24-1 0,-1 1 16,1-25-16,0 25 16,0-1-16,24-24 0,-24 0 15,24 25-15,-24-25 0,24 0 16,0 0-16,1 0 15,-1 0-15,0 0 0,25-25 16,25 1 15,0-1-15,24 25 0</inkml:trace>
+  <inkml:trace contextRef="#ctx0" brushRef="#br0" timeOffset="93022">8902 3751 0,'0'-24'0,"25"24"31,-25-25-31,25 0 16,-25 1 0,24 24-16,-24-25 15,25 25-15,-25 25 16,0-1-1,0 1-15,25 24 0,-25 1 16,24-1-16,-24 0 16,25 75-16,0-75 15,-25 0-15,24-24 0,1 24 16,0-49-16,-1 25 16,1-25-16,0-25 0,24 1 15,0-1-15,1-24 0,24-25 16,0 0-16,0 0 15,0 0-15,-1-25 16,100-73-16,-99 98 16,0 24-16,-25 1 0,1 0 15,-1 49-15,-24 0 0,-1 0 16,-24 24 0,0 1-16,-24 0 0,-1-1 15</inkml:trace>
+  <inkml:trace contextRef="#ctx0" brushRef="#br0" timeOffset="89799">7398 1310 0,'-25'25'15,"1"-25"-15,24 24 16,-25-24 15,25 25-31,25-25 16,-1 0-16,1 0 0,49 0 15,-25 0-15,50 0 16,0 0-16,-1 0 0,1 0 16,24 0-16,-24-25 15,-25 25-15,0 0 0,0 0 16,-49 0-16,24 0 0,-49-24 16,-25-1-1,1 25 1,-1-25-16,0 25 15</inkml:trace>
+  <inkml:trace contextRef="#ctx0" brushRef="#br0" timeOffset="90024">8286 1211 0,'0'-24'0,"0"-1"47,25 50-16,-1-25-31,1 24 15,0-24-15,24 25 0,0 0 16,-24-1-16,24 1 16,-24 24-16,-1-24 0,-24 0 15,0-1-15,0 1 0,0 0 16,-24-1-16,-1 1 16,0 0-16,1-25 0,-1 0 15</inkml:trace>
+  <inkml:trace contextRef="#ctx0" brushRef="#br0" timeOffset="90368">9322 1088 0,'24'-25'16,"1"1"-16,-25-1 15,0 1-15,-25-1 16,1 25 0,-1 0-16,0 0 0,1 0 15,-1 25 1,0-1-16,1 1 16,24-1-16,0 26 0,0-26 15,24 26-15,1-1 0,0-24 16,-1 24-16,26 0 0,-26-24 15,1 24-15,24-24 16,-49 0-16,25-1 0,-25 1 16,0 0-16,-25-25 15,1 0 1,-26 0-16</inkml:trace>
+  <inkml:trace contextRef="#ctx0" brushRef="#br0" timeOffset="90554">9297 1088 0,'25'-49'0,"-1"24"16,1 1-1,0 24-15,-1-25 0,1 25 16,0 0-16,-1 0 16,26 0-16,-26-25 0,26 25 15,-1 0-15,0 0 0,-24 0 16,24 25-16,-24-25 15,-1 0-15</inkml:trace>
+  <inkml:trace contextRef="#ctx0" brushRef="#br0" timeOffset="91174">9913 1039 0,'-24'-25'16,"-1"1"-16,50-1 15,-1 0 1,1 25 0,0-24-16,-1 24 0,26 0 15,-26 0-15,26 0 16,-26 0-16,1 0 0,0 24 16,-1-24-16,1 25 0,-25 0 15,25-1-15,-25 1 16,-25-1-16,25 1 15,-25 0-15,1-1 16,-1 26-16,0-26 16,25 1-1,0 0 1,25-25 0,0 0-16,-1 24 15,1-24-15,49 25 16,-25 0-16,-24-1 0,0-24 15,-1 25-15,1 0 16,0-1-16,-25 1 0,0 0 16,-25-1-1,0 1-15,1-25 0,-26 0 16,26 25-16,-26-25 16,1 0-16,-25-25 15,25 25-15,24-25 0,0 1 16,25-1-16,0 0 15</inkml:trace>
+  <inkml:trace contextRef="#ctx0" brushRef="#br0" timeOffset="91552">10752 990 0,'25'0'15,"-25"-25"-15,-25 25 16,0 0-1,1 25 1,24-1-16,0 1 0,0-1 16,0 26-16,0-26 15,0 26-15,0-1 0,24 0 16,1 1-16,0-1 16,-1-24-16,26-1 0,-26 1 15,26-25-15,-1 0 0,-25 0 16,26 0-16,-26-25 15,1 25-15,-25-24 0,25-26 16,-25 26-16,0-1 16,-25 0-16,25 1 0,-25-1 15,-73 0 1,73 25-16,1 25 16,-1 0-16,0-25 0,25 24 15,0 1-15,-24 0 16,24-1-16,0 1 0,24-25 15</inkml:trace>
+  <inkml:trace contextRef="#ctx0" brushRef="#br0" timeOffset="91905">11615 1063 0,'-25'-24'16,"1"-1"-16,-1 25 0,0 0 15,1 0-15,-1 0 16,0 0-16,1 0 0,24 49 16,-25-24-16,25 0 15,0 24-15,0 0 0,0 1 16,25-1-16,-1 0 0,1-24 16,24 24-16,1-24 0,-1 0 15,0-25-15,1 0 16,24 0-16,-25 0 0,-24-25 15,-1 0-15,1 1 16,0-1-16,-25-24 0,-25-1 16,0 1-16,1 0 0,-26-1 15,1 1-15,0 24 16,-1-24-16,1 25 0,0 24 16,-1 0-16,26 0 15,-26 0-15</inkml:trace>
+  <inkml:trace contextRef="#ctx0" brushRef="#br0" timeOffset="92384">12034 718 0,'-49'-24'0,"0"-26"0,-25 26 15,0-1-15,-25-24 0,0 24 16,-49 0-16,0 25 15,-24 0-15,-25 0 0,-1 25 16,-24 0-16,0 24 0,0 0 16,25 1-16,-25 24 15,50 24-15,-1 1 16,25 24-16,49 0 0,1 25 16,24-24-16,49 24 0,25-25 15,0 0-15,49-24 0,25 0 16,25-1-16,24-48 15,25 24-15,25-25 0,24-25 16,25 1-16,0-25 16,25 0-16,24 0 0,0-25 15,0-24-15,-24 25 0,0-26 16,-25-24-16,-25 25 16,0-25-16,-49-25 0,-25 1 15,-24-1-15,-25 0 16,-25 1-16,-49-1 0,-24 25 15,-26-25-15,-24 1 0,-24 24 16,-26 0-16,1 25 16,-25-25-16,0 49 0,25-24 15,0 24-15,-1 25 16,26 0-16,24 0 0,0 25 16,0-1-16</inkml:trace>
+  <inkml:trace contextRef="#ctx0" brushRef="#br0" timeOffset="72616">7768 6341 0,'0'-25'16,"-25"25"0,1-25-16,24 1 31,0 48 31,24 26-62,-24-26 0,0 26 16,0-1-16,50 148 16,-50-123-1,24-24-15,-24-1 16,25 0-16</inkml:trace>
+  <inkml:trace contextRef="#ctx0" brushRef="#br0" timeOffset="72899">7497 6513 0,'-25'-49'0,"0"0"0,1 24 15,24-24-15,0 24 16,24-24-16,1 24 0,24 25 16,1-25-16,24 25 15,98 25-15,-73 0 16,0-1-16,-25 26 0,0-1 15,0 0-15,-25 1 16,-49-1-16,0 25 0,0-25 16,-49 1-16,-1-26 15,1 26-15,-25-26 0,0 1 16,0 0-16,0-25 16,25 0-16,-1 0 0,1-25 15,24 25-15</inkml:trace>
+  <inkml:trace contextRef="#ctx0" brushRef="#br0" timeOffset="73276">8508 6390 0,'0'-25'15,"0"1"-15,0 48 31,0 1-15,0 0-16,0 24 16,24 0-16,-24 1 0,25 24 15,24-25-15,-24 0 0,24 1 16,-24-1-16,24-24 16,1-1-16,-1-24 0,0 0 15,-24 0-15,24 0 0,-24-24 16,-25-26-16,25 1 15,-25 0-15,0-1 16,-25-24-16,25 25 0,-25 0 16,25-1-16,-24 1 0,24 24 15,-25 1-15,25 48 32,25-24-17,-1 25-15</inkml:trace>
+  <inkml:trace contextRef="#ctx0" brushRef="#br0" timeOffset="73703">9297 6390 0,'-49'-74'16,"24"74"-1,25-25-15,0 50 16,0 0-1,25-1-15,-25 26 16,24 24-16,1-25 0,-25 25 16,25 0-16,-1-25 0,-24 1 15,25-1-15,-25 0 16,25-24-16,-25 0 0,0-50 31,0 0-31,0 1 0,-25-1 16,25-24-16,-25-25 0,1 24 15,24-24-15,-25 0 16,25 0-16,0 0 0,0 0 16,25 25-16,-1 0 15,1 24-15,0 25 0,24 0 16,-24 0-16,24 25 0,0-1 16,1 26-16,-26-1 15,1 0-15,0-24 0,-25 24 16,-25-24-16,0 0 15,-24-1-15,-25 1 0,-25 0 16,1-25-16,-26 0 0</inkml:trace>
+  <inkml:trace contextRef="#ctx0" brushRef="#br0" timeOffset="70924">4932 6390 0,'-25'0'0,"25"-25"16,0 50 15,0 0-31,0-1 0,0 26 16,0-1-16,0 0 0,0 1 15,0 24-15,0-25 16,-24 0-16,24-24 0,0 24 16,-25-24-16,25 0 15,0-50 1,0 0 0,0 1-16,25-26 0,-25 1 15,24 0-15,-24-25 0,25 0 16,0 0-16,-1 0 15,-24 0-15,25 0 0,0 24 16,-1 26-16,1-1 16,0 25-16,-1 25 0,-24-1 15,25 26-15,0-1 0,-1 25 16,-24 0-16,25-25 16,0 25-16,-1 0 0,-24-24 15,25-1-15,-25-24 16,0 24-16,0-24 0</inkml:trace>
+  <inkml:trace contextRef="#ctx0" brushRef="#br0" timeOffset="71074">5006 6612 0,'-25'-25'0,"1"1"16,-1 24-16,0 0 0,25-25 15,25 25 1,0 0-16,24 0 15,-24 0-15,49 0 0,-25 0 16,25 0-16</inkml:trace>
+  <inkml:trace contextRef="#ctx0" brushRef="#br0" timeOffset="71290">5647 6316 0,'-24'0'15,"-1"-25"-15,25 1 0,-25 24 0,25-25 16,0 50 0,0-1-16,25 26 15,0-1-15,-1 0 16,-24 1-16,25-1 0,-25 0 16,25 25-16,-25-24 15,0-1-15,0-24 0,0-1 16,0 1-16</inkml:trace>
+  <inkml:trace contextRef="#ctx0" brushRef="#br0" timeOffset="71561">5524 6464 0,'0'-25'16,"0"1"-16,0-26 15,0 26-15,0-1 0,0 0 16,25 25-16,-1-24 0,1 24 15,0-25-15,24 25 16,0 0-16,1 0 16,-1 25-16,25-25 0,-25 49 15,0-24-15,1 24 0,-26 0 16,1 1-16,-25 24 0,0-25 16,-25-24-16,1 24 15,-1 0-15,-49-24 0,25 0 16,-25-25-16,0 24 15,25-24-15,-1 0 0</inkml:trace>
+  <inkml:trace contextRef="#ctx0" brushRef="#br0" timeOffset="72057">6362 6267 0,'-49'0'0,"24"-25"0,1 25 16,-1-25-16,0 25 15,25-24-15,0-1 16,25 25-16,24 0 0,-24 0 16,24 0-16,1 0 0,24 0 15,-25 0-15,25 0 16,-25 25-16,1-25 0,48 24 31,-98 1-31,0 0 0,0-1 16,0 1-16,-24 0 0,-1 24 15,0-24-15,25 24 16,-24 0-16,-1 1 0,25-1 16,0 0-16,0 1 0,0-1 15,0-24-15,0 24 16,25-49-16,-25 25 0,24-1 15,-24-48 17,0-1-32,-24 25 0,-26-25 15,26 1-15,-26-1 16,1 0-16,0 25 0,-1-24 16,1 24-16,-25 0 15,25 24-15,-25 1 16,49 0-16,25-1 15</inkml:trace>
+  <inkml:trace contextRef="#ctx0" brushRef="#br0" timeOffset="74946">5425 7401 0,'0'-24'31,"-24"24"-31,-1-25 0,0 0 15,1 25-15,-1 0 0,0 0 16,-24 25-16,0 0 16,-1-1-16,26 25 0,-26 1 15,26-1-15,-1 25 16,0-25-16,25 25 0,0 0 16,25-24-16,24-1 0,1 0 15,-1-24-15,25 0 16,0-1-16,25-24 0,-25-24 15,0-1-15,0 0 16,0-24-16</inkml:trace>
+  <inkml:trace contextRef="#ctx0" brushRef="#br0" timeOffset="75271">5894 7574 0,'0'-25'0,"0"0"0,0 1 16,0-1-16,-25 25 15,1 0 1,24 25-16,-25-1 15,25 1-15,0 0 16,-25 73 0,50-24-16,0-24 15,-1-1-15,1-24 0,-1-1 16,26 1-16,48-25 16,-48 0-16,-26-25 15,26 1-15,-26-1 0,1-24 16,-25 24-16,0-24 0,0-1 15,-25 1-15,1 24 16,-1-24-16,0 24 0,-24 1 16,24 24-16,1 0 15,-1 0-15,0 0 0,1 0 16,24 24-16,0 1 16,24-25-1</inkml:trace>
+  <inkml:trace contextRef="#ctx0" brushRef="#br0" timeOffset="75822">6486 7500 0,'0'-25'0,"0"0"16,-25 1 0,0 24 15,25 24-31,0 26 15,0-26-15,25 26 0,-25-1 16,25-24-16,-25 24 16,24 50-16,1-75 15,-25 1-15,0 0 0,0-50 32,0 0-32,-25 1 15,25-26-15,-24 1 16,24 0-16,0-1 0,0 1 15,0 0-15,24-1 0,-24 1 16,25 25-16,0-1 16,-1 0-16,1 25 0,0 25 15,-1 0-15,1-1 16,-25 25-16,25-24 0,-25 24 16,24 1-16,-24-26 0,25 1 15,-25 0-15,0-1 16,25-24-16,-25-24 31,24 24-31,-24-25 0,0-24 16,25 24-16,-25 0 0,25 1 15,-25-1-15,24 0 16,-24 1-16,25 24 0,0 24 16,-1 1-1,-24 0-15,0 24 0,25-24 16,-25 24-16,25-24 0,-25-1 15,24 1-15,1 0 16,-25-1-16</inkml:trace>
+  <inkml:trace contextRef="#ctx0" brushRef="#br0" timeOffset="76243">7275 7524 0,'24'-49'0,"-24"24"16,25 1-16,-25-1 15,0 50 1,0-1 0,0 1-16,0 24 15,0-24-15,0 24 0,0 1 16,0-1-16,25 0 0,-25-24 16,0 24-16,24-24 15,-24 0-15,-24-50 31,24 0-31,0-24 16,-25 0-16,25-1 0,0-24 16,0 25-16,25-25 15,-25 25-15,24 0 0,1-1 16,0 26-16,-1-1 16,1 25-16,0 0 0,-1 0 15,1 25-15,0-1 0,-1 26 16,-24-26-16,0 25 15,-24-24-15,24 24 0,-50-24 16,26 0-16,-26-1 16,1 1-16,0-25 0,24 0 15,-24 0-15,24-25 0,25 1 16</inkml:trace>
+  <inkml:trace contextRef="#ctx0" brushRef="#br0" timeOffset="76666">7842 7401 0,'-25'0'16,"25"25"15,25-25-31,-25 24 16,0 26-16,25-26 0,-25 1 15,24 24-15,-24 1 16,0-26-16,25 26 0,-25-26 16,0 26-16,0-26 15,0 1-15,-25-50 16,25 1 0,0-1-16,-24-24 15,24-1-15,0 1 0,0 0 16,24-1-16,1-24 0,-25 25 15,25 0-15,-1 0 16,1 24-16,0 0 0,24 25 16,-24 0-16,-1 25 15,1 24-15,0-24 0,-1 24 16,1 25-16,-25-25 0,25 1 16,-25 24-16,0-25 15,0-24-15,0 24 0,-25-24 16,25-1-16</inkml:trace>
+  <inkml:trace contextRef="#ctx0" brushRef="#br0" timeOffset="76835">7891 7524 0,'-24'0'16,"48"0"15,26 0-16,-26 0-15,26 0 16,24 0-16,-25 0 0,0 0 16</inkml:trace>
+  <inkml:trace contextRef="#ctx0" brushRef="#br0" timeOffset="77345">8532 7426 0,'0'-25'15,"-24"25"-15,24-24 0,-25-1 16,0 25-1,25-25-15,0 50 16,25-25 0,-25 25-16,25-1 0,-25 25 15,24 1-15,-24-1 0,25 0 16,-25 1-16,0-1 16,0 0-16,0 1 0,0-26 15,0 1-15,0 0 16,0-1-16,-25-24 0,1 0 15,24-24-15,-25-1 0,0-24 16,25 24-16,-24-24 16,24-75-1,24 75-15,1-25 0,0 25 16,-1 0-16,26-1 0,-1 26 16,-24-1-16,24 0 0,0 25 15,-24 25-15,0-25 16,-1 25-16,1 24 0,-25-24 15,0 24-15,-25-25 16,25 1-16,-49 0 0,24-1 16,-24 1-16,0 0 0,24-25 15,-24 0-15,24 0 16,0 0-16,1 0 0,48 0 16,1 0-1,24 0-15,-24 24 16,24 1-16,1-25 0,-1 25 15,-24 24-15,24-24 16,0-1-16,-24 1 0,0 0 16,-1-1-16</inkml:trace>
+  <inkml:trace contextRef="#ctx0" brushRef="#br0" timeOffset="77554">9026 7475 0,'24'-49'16,"-24"24"-16,0 1 0,25-1 16,-25 0-16,25 25 15,-25 25-15,0 24 16,24-24-16,-24 24 0,0 0 16,0 1-16,0-1 15,0 0-15,-24 1 0,24-1 16,0-24-16,0-1 15,0 1-15</inkml:trace>
+  <inkml:trace contextRef="#ctx0" brushRef="#br0" timeOffset="77757">9420 7426 0,'0'-25'0,"0"1"0,0 48 47,0 1-47,0-1 16,0 26-16,0-26 0,0 26 15,0-1-15,0 0 16,-24 50-16,24-74 16,0-1-16</inkml:trace>
+  <inkml:trace contextRef="#ctx0" brushRef="#br0" timeOffset="78107">9396 7426 0,'0'-49'0,"0"24"15,24 0-15,1 25 16,-25 25 0,25 0-16,-25-1 0,24 1 15,1 24-15,0 0 16,-25 1-16,24-26 0,1 26 15,0-1-15,24-24 16,-24-1-16,-1 1 0,1 0 16,24-25-16,-24 0 0,-1-25 15,1 25-15,0-49 16,-1 24-16,-24-24 0,25-1 16,-25 1-16,0 0 15,0-1-15,0 1 0,-25 0 16,25 24-16,-24 1 0,-1 24 15,0 0 1,1 24 0,24 1-16,0 0 15,0-1-15</inkml:trace>
+  <inkml:trace contextRef="#ctx0" brushRef="#br0" timeOffset="78485">10209 7352 0,'0'-25'0,"25"1"16,-25-1-16,0 0 0,0 1 15,0-1-15,-25 25 0,1 0 16,-1 25 0,0-1-16,1 26 0,-1-1 15,0 0-15,25 25 0,-24 0 16,24-25-16,0 25 15,24-24-15,1-1 0,0 0 16,24-24 0,25 0-16,-49-25 0,24 0 15,-24-25-15,24 0 0,-24-24 16,-1 24-16,1-24 16,-25 0-16,0-1 0,0 1 15,0 24-15,0 1 0,0-1 16,0 50-1,0-1-15,0 26 16,0-1-16,0 0 16,25 25-16,-25-24 0,24-1 15,1 0-15,0 1 0</inkml:trace>
+  <inkml:trace contextRef="#ctx0" brushRef="#br0" timeOffset="79460">11319 7377 0,'0'-25'16,"-25"25"0,25-25-1,0 50 1,0 24-1,0-24-15,25 24 0,-25-24 16,0 24-16,0 0 16,25-24-16,-25 49 15,0-49-15,0-1 0,-25-24 32,25-24-17,0-1-15,-25 0 16,25-49-1,0 50-15,0-26 0,25 1 0,-25-25 16,25 25-16,-25 0 16,24-1-16,1 1 0,0 24 15,-1 1-15,1 24 16,0 0-16,-1 24 0,1 1 16,0 24-16,-1 1 0,1 24 15,0-25-15,-25 25 16,24 0-16,-24-25 0,25 25 15,-25-25-15,0 1 16,25-1-16,-25-24 16,0-1-16</inkml:trace>
+  <inkml:trace contextRef="#ctx0" brushRef="#br0" timeOffset="80142">11319 7524 0,'0'-24'15,"0"-1"1,25 0-16,24 25 16,-24 0-1,24 0-15,0-24 0,1 24 0,-1 0 16,0 0-16,1-25 0,-1 25 16,0 0-16,-24-24 15,0 24-15,-1-25 16,-24 0-1,0 1-15,0-1 16,25 50 15,-25-1-15,0 1-16,25 24 0,-25 0 16,0-24-16,0 24 15,0 1-15,0-1 0,0 0 16,0 1-16,0-26 15,0 1-15,-25 0 0,25-50 47,0 0-47,0-24 0,0 0 16,25-1-16,-25 1 16,24 0-16,-24-1 0,25-23 15,0 23-15,-1 26 0,-24-26 16,25 26-16,0 24 15,-1 0-15,1 0 16,-25 24-16,0 1 16,25 24-16,-25-24 0,0 0 15,0-1-15,0 25 16,0 1-16,0-26 16,0 1-16,24-25 31,1 0-16,0 0 1,-1 0 0,1 25-16,-25-1 15,24 1-15,-24 0 16,0-1-16,25-24 0,-25 25 16</inkml:trace>
+  <inkml:trace contextRef="#ctx0" brushRef="#br0" timeOffset="80531">12577 7278 0,'0'-25'0,"-25"1"15,0-1-15,50 25 31,0 0-31,24 0 16,0 0-16,1 0 0,-1 0 16,25 0-16,-25 0 0,1 0 15,-1 0-15,0 0 16,-24 0-16,0 0 0,-50 0 16,0 0-1,1 0-15,-1-25 0,-24 25 16,24 0-16,-24 0 15,24 0-15,0 0 0,1 0 16,24 25-16,-25 0 0,25-1 16,-25 26-16,25-26 15,0 26-15,0 23 0,-24-23 16,24-1-16,0 0 16,0 1-16,0-1 0,0 0 15,0-24-15,0 0 0</inkml:trace>
+  <inkml:trace contextRef="#ctx0" brushRef="#br0" timeOffset="81300">13317 6834 0,'-50'-25'0,"-24"-24"15,0 24-15,-24-24 0,-1 24 16,-24 1-16,-25-26 16,24 26-16,-24 24 0,25-25 15,-25 25-15,50 0 16,-26 25-16,50-1 0,0 1 15,0 0-15,0 24 0,0 0 16,25-24-16,-25 24 16,0 25-16,25-24 0,-25-1 15,24 0-15,-24 25 16,25-24-16,0 24 0,24-25 16,-24 25-16,49-25 0,-25 0 15,25 25-15,25-24 16,0 24-16,-1-25 0,1 25 15,24-25-15,0 25 16,1-24-16,24-1 16,49 50-16,-24-75 0,-25 1 15,24 0-15,1-1 16,24-24-16,-24 25 0,24-25 16,1 0-16,-1 25 15,0-25-15,0 0 0,1 0 16,-26-25-16,1 25 0,-25-25 15,25 25-15,-25-24 16,-25-1-16,74-49 16,-73 25-16,-1-1 15,0 1-15,-24-25 0,24 25 16,-24-1-16,-1-24 0,1 25 16,-25-25-16,25 25 15,-25-1-15,0-23 0,-25 23 16,0-24-16,1 0 15,-1 25-15,1-25 0,-1 25 16,-24-1-16,24 1 16,0 0-16,-24 24 0,24 0 15,-24 1-15,24-1 0,-24 25 16,24-25-16,-24 25 0,24-24 16,1 24-16,-1 0 15,-24 0-15,24 0 0,0 0 16,1 0-16,-26 0 15</inkml:trace>
+  <inkml:trace contextRef="#ctx0" brushRef="#br0" timeOffset="94768">8138 9300 0,'25'25'78,"-25"-1"-63,0 1 1,0 0-16,24-1 16,-24 1-16,0 0 15,0-1 1,0-48 31,25 24-47,-25-25 15,0 50 48,-25-25-47,25 24-16,0 1 0,-24 0 15,24 24-15,-25 0 0,0 25 16,1-24-16,-1 24 15,25 0-15,-25 24 0,25-24 16,25 0-16,0 0 16,24 0-16,0-25 0,25 25 15,25-24-15,-1-26 0,1 26 16,148 24 0,-124-50-16,-24 1 0,-1-25 15,1 25-15,0-25 16,-25 0-16,0 0 0,0 0 15,0-25-15,-25 0 0,0-24 16,0 24-16,-24-24 16,0 0-16,-1-1 15,-24 1-15,25 0 0,-25-1 16,0 1-16,0-25 0,0 25 16,0-1-16,0 1 0,0 0 15,0 24-15,0-24 16,0 24-16,0 1 15,-25 48 17,25 1-17,-24-25 17,-1 0-17</inkml:trace>
+  <inkml:trace contextRef="#ctx0" brushRef="#br0" timeOffset="95252">9050 8757 0,'-49'-24'0,"0"24"15,-1 0-15,1 0 0,0 0 16,24 24-16,0-24 0,1 25 16,-1 0-16,0-1 15,1 1-15,-1 0 16,0 24-16,25-24 0,-24 24 15,24 0-15,0-24 0,24 24 16,1-24-16,0 24 0,-1-24 16,26 0-16,-1-1 15,0 1-15,1 0 0,-1-25 16,0 0-16,1 0 0,-1 0 16,0 0-16,-24-25 15,0 0-15,-1 1 0,1-26 16,-25 26-16,0-26 15,0 26-15,-25-26 0,1 26 16,-1-26-16,0 26 16,1-1-16,-1 25 0,0 0 15,1 0-15,-1 0 0,0 0 16,25 25-16</inkml:trace>
+  <inkml:trace contextRef="#ctx0" brushRef="#br0" timeOffset="95663">9716 8955 0,'25'0'0,"24"0"0,-24-25 16,-1 25-1,-24-25 1,-24 25-16,-1 0 0,25 25 15,-25-25-15,1 25 16,-25 24-16,24 0 16,0-24-16,25 24 0,-24-24 15,24 24-15,0-24 16,24 24-16,1-24 0,0 0 16,-1-1-16,1-24 15,24 0-15,0 0 0,25 0 16,-24 0-16,-1 0 0,0-24 15,1-1-15,-1 0 16,-24 1-16,-25-26 0,24 1 16,-24 24-16,0-24 15,-24 0-15,-1-1 0,0 1 16,-24 0-16,0 24 0,-1 0 16,-24 1-16,25 24 15,0-25-15,-1 25 0,1 0 16</inkml:trace>
+  <inkml:trace contextRef="#ctx0" brushRef="#br0" timeOffset="96474">10037 8486 0,'-74'-74'16,"49"50"-16,-24-1 0,-25 0 16,24 1-16,-23 24 0,-1-25 15,-25 25-15,25 0 0,-25 25 16,-24-1-16,0 1 16,-1 0-16,1-1 0,0 26 15,-1-1-15,-24 0 0,25 1 16,0-1-16,0 25 15,-198 123 1,222-123-16,25-25 16,25 25-16,0 25 0,-1-25 15,26 74 1,24-49-16,0-1 0,0-24 16,24 25-16,1-25 0,24 24 15,1-24-15,-1 0 16,25 0-16,-25 0 0,25-24 15,0-1-15,0 0 0,0 1 16,25-1-16,-25-24 16,25-1-16,-1 26 0,25-50 15,-24 24-15,0 1 16,24 0-16,-24-25 0,24 24 16,-24-24-16,24 25 0,-24-25 15,24 25-15,-24-25 16,-1 0-16,1 0 0,-1 0 15,-24 0-15,25-25 16,-25 25-16,25-25 0,-25-24 16,0 24-16,0-24 0,0 0 15,-25-25-15,25 0 16,0 0-16,-25 0 0,1 0 16,-1-25-16,-24 25 15,-1-24-15,1 24 0,-1-25 16,-24 0-16,0 25 15,25 0-15,-25-24 0,0 24 16,-25-25-16,1 25 0,-1 0 16,1 0-16,-1 0 0,0 0 15,-24 25-15,24-1 16,-24 1-16,0 0 0,-1 24 16,1-24-16,-25 24 15,0-24-15,0 24 0,0 1 16,-25-1-16,25-24 0,0 24 15,-24 25-15,24-25 16,0 1-16,0 24 0,25 0 16,-1 0-16,1 0 15</inkml:trace>
+  <inkml:trace contextRef="#ctx0" brushRef="#br0" timeOffset="107189">10604 6316 0,'0'-25'63,"25"25"-63,24-24 0,0-26 16,25 26-16,25-26 15,49 1-15,24-25 0,50 0 16,25-24-16,49-1 0,24 0 15,26 1-15,24-26 16,0 1-16,-1 0 0,-23-1 16,-50 1-16,0 0 15,-75 0-15,1 24 0,-74-24 16,-24 49-16,-26-25 0,-24 25 16,-24 25-16,-26-25 15,1 24-15,0 1 0,-25 0 16,0 24-16,0-24 0,0 24 15,-25-24-15,25 24 16,-25 0-16,25 1 16,-24-1-16,24 0 15,0 1 1,-25 24-16,25-25 16,-25 25-16,1-25 15,-1 25-15,25-24 16,-49 24-16,24-25 15,0 25-15,-24-24 0,0-1 16,-1 25-16,1-25 16,0 1-16,-1-1 0,1 0 15,0 1-15,-1-1 0,1 0 16,0 1-16,-1-26 16,1-24-16,0 25 15,24 0-15,1-1 0,24 1 16,-25-25-16,25 25 15,0-1-15,25-24 0,-1 25 16,26-25-16,-1 25 16,25-1-16,0-24 0,0 25 15,24 0-15,-24 0 0,25-1 16,-25 26-16,0-26 16,0 26-16,-25-26 0,1 26 15,24-1-15,-50 0 16,26 25-16,-26-24 15,1 24-15,0-25 0,-1 25 0,-24-25 16,25 25-16,0 0 16,-25-24-16,24 24 0,1 0 15,-25-25-15,25 25 16,-1 0-16,-24-25 16,-24 50 15,-1-25-16,0 0-15,1 0 16</inkml:trace>
+  <inkml:trace contextRef="#ctx0" brushRef="#br0" timeOffset="107557">15437 1655 0,'-24'-24'16,"-26"-1"-16,26 25 15,-1-25-15,25 1 16,25 24-16,-1 0 16,26 0-16,24 0 15,0 0-15,24 0 0,100 0 16,-100 0-1,1 24-15,-25-24 0,0 0 16,0 25-16,-50 0 0,1-1 16,-25 26-16,0-1 15,-25 0-15,-24 1 0,0 24 16,-1 0-16,1 0 0,0 0 16,24 0-16,-24 0 15,24-1-15,25 1 0,0-24 16,0-1-16,25 0 15,0 1-15</inkml:trace>
+</inkml:ink>
+</file>
+
+<file path=ppt/ink/ink97.xml><?xml version="1.0" encoding="utf-8"?>
+<inkml:ink xmlns:inkml="http://www.w3.org/2003/InkML">
+  <inkml:definitions>
+    <inkml:context xml:id="ctx0">
+      <inkml:inkSource xml:id="inkSrc0">
+        <inkml:traceFormat>
+          <inkml:channel name="X" type="integer" max="1920" units="cm"/>
+          <inkml:channel name="Y" type="integer" max="1080" units="cm"/>
+          <inkml:channel name="T" type="integer" max="2.14748E9" units="dev"/>
+        </inkml:traceFormat>
+        <inkml:channelProperties>
+          <inkml:channelProperty channel="X" name="resolution" value="55.81395" units="1/cm"/>
+          <inkml:channelProperty channel="Y" name="resolution" value="55.6701" units="1/cm"/>
+          <inkml:channelProperty channel="T" name="resolution" value="1" units="1/dev"/>
+        </inkml:channelProperties>
+      </inkml:inkSource>
+      <inkml:timestamp xml:id="ts0" timeString="2022-02-21T14:54:06.932"/>
+    </inkml:context>
+    <inkml:brush xml:id="br0">
+      <inkml:brushProperty name="width" value="0.05" units="cm"/>
+      <inkml:brushProperty name="height" value="0.05" units="cm"/>
+      <inkml:brushProperty name="fitToCurve" value="1"/>
+    </inkml:brush>
+  </inkml:definitions>
+  <inkml:trace contextRef="#ctx0" brushRef="#br0">1849 81 0,'25'-24'16,"-25"-1"-16,0 0 0,-25 25 31,1 25-15,-1 0-16,0 24 0,25-24 15,-24-1-15,24 26 16,0-26-16,0 26 0,24-26 16,1 1-16,-25 0 0,49-25 15,-24 24-15,0-24 16,-1 0-16,26 0 0,-26-24 15,1-1-15,0 0 16,-25 1-16,0-26 0,0 26 16,0-26-16,-25 26 0,-24-26 15,-1 26-15,-24 24 16,0-25-16</inkml:trace>
+  <inkml:trace contextRef="#ctx0" brushRef="#br0" timeOffset="-695">0 155 0,'0'-24'0,"25"-1"15,-1 0-15,26 1 16,-26-1-16,1 25 16,0-25-16,24 25 0,-24 0 15,-1 0-15,25 0 0,-24 0 16,0 0-16,-1 25 16,1 0-16,-25-1 15,0 1-15,0 0 16,0-1-16,-25 1 15,25 0-15,-24-25 0,24 24 16,-25-24-16,25 25 16,-25-25-16,25 25 0,25-25 31,0 0-31,-1 0 16,1 0-16,24 0 0,-24 0 15,24 24-15,-24-24 16,24 0-16,-24 25 0,24-25 15,-24 25-15,-25-1 16,0 1-16,0 0 16,-25-1-16,1 1 0,-1 0 15,-123-1 1,99-24-16,-1 0 16,1 0-16,0 0 0,24 0 15,1-24-15,24-1 16,0 0-16,0 1 0</inkml:trace>
+  <inkml:trace contextRef="#ctx0" brushRef="#br0" timeOffset="-310">1036 32 0,'24'0'0,"-24"-25"15,25 25-15,-50 0 16,1 25-1,-1-25-15,25 25 0,-49-1 16,24 1-16,25 0 16,-25-1-16,1 1 0,24 24 15,0-24-15,24 24 0,1-24 16,0 24-16,-1-24 0,26 0 16,-26-1-16,26 1 15,-1-25-15,-24 25 0,24-25 16,-24 0-16,24 0 15,-24-25-15,-1 0 16,-24 1-16,-24-1 16,-1 0-1,-24 25-15,24 0 0,0 0 16,-49 25 0,50 0-16,-1-25 0,0 24 15,1 1-15,24 0 16,0-1-1,24-24-15</inkml:trace>
+  <inkml:trace contextRef="#ctx0" brushRef="#br0" timeOffset="52846">641 870 0,'-25'0'16,"-24"-24"-1,24 24-15,1-25 0,-1 0 16,25 1 0,25-1-16,-1 25 15,26 0-15,-1-24 16,25 24-16,0-25 0,25 25 15,24-25-15,0 25 0,1-24 16,24 24-16,-25 0 16,-25-25-16,1 25 0,-25 0 15,0 0-15,-49 0 16,-50 0-16,-24 25 16,-25-1-16,-25 1 0,-24 0 15,-25-1-15,0 1 16,0-1-16,0 1 0,25-25 15,-1 25-15,26-1 0,24-24 16,24 0-16,26 0 16,48 0-16,26-24 15,-1 24-15,50-25 16,-1 0-16,26 1 0,-1-1 16,0 1-16,1 24 15,-1-25-15,0 0 0,0 25 16,-24 0-16,-25-24 0,0 24 15,-25 0-15,-24 0 16,-50 24-16,1-24 16,-1 0-16</inkml:trace>
+</inkml:ink>
+</file>
+
+<file path=ppt/ink/ink98.xml><?xml version="1.0" encoding="utf-8"?>
+<inkml:ink xmlns:inkml="http://www.w3.org/2003/InkML">
+  <inkml:definitions>
+    <inkml:context xml:id="ctx0">
+      <inkml:inkSource xml:id="inkSrc0">
+        <inkml:traceFormat>
+          <inkml:channel name="X" type="integer" max="1920" units="cm"/>
+          <inkml:channel name="Y" type="integer" max="1080" units="cm"/>
+          <inkml:channel name="T" type="integer" max="2.14748E9" units="dev"/>
+        </inkml:traceFormat>
+        <inkml:channelProperties>
+          <inkml:channelProperty channel="X" name="resolution" value="55.81395" units="1/cm"/>
+          <inkml:channelProperty channel="Y" name="resolution" value="55.6701" units="1/cm"/>
+          <inkml:channelProperty channel="T" name="resolution" value="1" units="1/dev"/>
+        </inkml:channelProperties>
+      </inkml:inkSource>
+      <inkml:timestamp xml:id="ts0" timeString="2022-02-21T14:53:36.995"/>
+    </inkml:context>
+    <inkml:brush xml:id="br0">
+      <inkml:brushProperty name="width" value="0.05" units="cm"/>
+      <inkml:brushProperty name="height" value="0.05" units="cm"/>
+      <inkml:brushProperty name="fitToCurve" value="1"/>
+    </inkml:brush>
+  </inkml:definitions>
+  <inkml:trace contextRef="#ctx0" brushRef="#br0">74 148 0,'-25'-25'16,"1"0"0,-1 25-16,25-24 15,0-1 1,25 25-16,-1-25 16,1 25-16,0 0 0,24-24 15,-25 24-15,26 0 16,-26 0-16,26 24 0,-26-24 15,1 0-15,0 25 16,-25 0-16,0-1 16,0 26-1,-50-1 1,26-24-16,-1-1 16,25 1-1,25 0 1,24-25-1,-24 24-15,24 1 16,-24-25-16,24 25 16,-24-1-16,24 1 0,-24 0 15,-1-1-15,-24 1 0,-24 0 16,-1-1 0,0 1-16,-24-25 0,-25 25 15,25-25-15,-1 0 16,1 0-16,0 0 0,24 0 15,0-25-15</inkml:trace>
+  <inkml:trace contextRef="#ctx0" brushRef="#br0" timeOffset="377">888 49 0,'24'0'0,"-24"-25"16,-24 25-1,-1 0-15,0 0 16,25 25 0,-24 0-16,24-1 15,0 26-15,-25-26 16,25 26-16,0-1 0,0 0 16,0 1-16,0-1 0,25 0 15,-25-24-15,24 24 16,1-24-16,0 0 0,24-25 15,-24 0-15,-1 0 0,1 0 16,0 0 0,-1-25-16,-24 0 0,25 1 0,-25-1 15,0 0 1,-25 25-16,1-24 0,-1 24 16,0 0-1,1 24-15,24 1 16</inkml:trace>
+  <inkml:trace contextRef="#ctx0" brushRef="#br0" timeOffset="689">1455 246 0,'24'-74'16,"-24"50"-16,-24 24 15,-1 0 1,25 24-16,-25 1 0,25 0 16,-24 24-16,24-24 15,0 24-15,0 0 0,24-24 16,1 49 0,0-49-16,24-1 0,-24 1 15,-1-25-15,26 0 0,-26 0 16,1 0-16,0-25 0,-1 1 15,-24-26-15,-24-24 16,-1 25 0,0 24-16,-24-24 0,24 24 15,-24 1-15,0-1 0,-25 25 16,0 25-16</inkml:trace>
+  <inkml:trace contextRef="#ctx0" brushRef="#br0" timeOffset="84992">345 887 0,'-25'0'0,"25"-24"16,-24 24 0,24-25-16,0 0 15,24 1-15,26 24 16,-1-25 0,0 25-16,25-24 0,0 24 15,25 0-15,-25-25 16,25 25-16,-1 0 0,-24 0 15,0 0-15,-24-25 0,-1 25 16,-24 0-16,-50 0 16,0 0-16,-49 25 15,25-25-15,-50 0 16,25 25-16,-24-25 0,-1 24 16,0-24-16,25 0 0,0 0 15,25 25-15,0-25 16,24 0-16,0 0 0,50 24 15,0-24 1,24 0-16,25 0 0,0 0 16,25 0-16,-25 0 15,24 0-15,-24 0 0,0 0 16,-24-24-16,-1 24 0,-24 0 16,-75 0-1,1 0-15,0 0 16,-25 24-16,0 1 0</inkml:trace>
+</inkml:ink>
+</file>
+
+<file path=ppt/ink/ink99.xml><?xml version="1.0" encoding="utf-8"?>
+<inkml:ink xmlns:inkml="http://www.w3.org/2003/InkML">
+  <inkml:definitions>
+    <inkml:context xml:id="ctx0">
+      <inkml:inkSource xml:id="inkSrc0">
+        <inkml:traceFormat>
+          <inkml:channel name="X" type="integer" max="1920" units="cm"/>
+          <inkml:channel name="Y" type="integer" max="1080" units="cm"/>
+          <inkml:channel name="T" type="integer" max="2.14748E9" units="dev"/>
+        </inkml:traceFormat>
+        <inkml:channelProperties>
+          <inkml:channelProperty channel="X" name="resolution" value="55.81395" units="1/cm"/>
+          <inkml:channelProperty channel="Y" name="resolution" value="55.6701" units="1/cm"/>
+          <inkml:channelProperty channel="T" name="resolution" value="1" units="1/dev"/>
+        </inkml:channelProperties>
+      </inkml:inkSource>
+      <inkml:timestamp xml:id="ts0" timeString="2022-02-21T14:53:42.078"/>
+    </inkml:context>
+    <inkml:brush xml:id="br0">
+      <inkml:brushProperty name="width" value="0.05" units="cm"/>
+      <inkml:brushProperty name="height" value="0.05" units="cm"/>
+      <inkml:brushProperty name="fitToCurve" value="1"/>
+    </inkml:brush>
+  </inkml:definitions>
+  <inkml:trace contextRef="#ctx0" brushRef="#br0">30 249 0,'0'-25'16,"-25"1"-16,25-1 15,0 0 1,25 1-16,-1-1 16,1 25-16,0 0 15,24 0-15,0 0 16,1 0-16,-1 0 0,-24 0 16,24 25-16,0-25 0,-24 24 15,0 1-15,-25 0 16,0-1-16,-25 1 15,0 0-15,1-25 16,-1 24-16,0-24 0,1 25 16,-1-25-16,0 0 0,25 25 15,25-25 1,0 24 0,-1-24-16,26 25 15,-26-25-15,26 25 0,-26-1 16,26-24-16,-26 25 15,1 0-15,-25-1 0,0 1 16,0 0-16,-25-1 0,1-24 16,-1 25-16,-24 0 15,-1-25-15,1 0 0,0 0 16,-1 0-16,26 0 0,-1-25 16,25 0-16</inkml:trace>
+  <inkml:trace contextRef="#ctx0" brushRef="#br0" timeOffset="377">1016 27 0,'25'-25'0,"0"25"0,-50 25 32,0-25-17,1 25-15,-1-1 0,0 1 16,1 24-16,-1-24 15,25 24-15,0 1 0,0-1 16,0-24-16,25 24 16,-1-24-16,26 24 15,-26-24-15,1-1 0,24-24 0,-24 25 16,24-25-16,-24 0 16,-1 0-16,1-25 0,-25 1 15,0-1-15,0 0 16,0 1-1,-25 24-15,25-25 0,-24 25 16,-1 0-16,0 25 16,1-25-16,-1 24 0,1-24 15,-1 25-15,25 0 16,0-1-16,0 1 16,25-25-16,-1 0 0</inkml:trace>
+  <inkml:trace contextRef="#ctx0" brushRef="#br0" timeOffset="726">1929 101 0,'0'-25'0,"-25"25"16,0 0-1,1 25-15,-1-25 16,-24 25-16,24 24 0,0-24 15,25 24-15,-24-24 16,24 24-16,0-24 0,0 24 16,24-24-16,1-1 15,0 1-15,-1 0 0,1-1 16,24-24-16,-24 0 0,24 0 16,-24 0-16,24-24 15,-24-1-15,0 0 0,-1 1 16,1-1-16,-25-24 0,0 24 15,-25-24-15,1 24 16,-1-24-16,-24 49 0,24-25 16,-24 0-1,-1 25-15,1 0 0,0 25 0,-1-25 16</inkml:trace>
+  <inkml:trace contextRef="#ctx0" brushRef="#br0" timeOffset="79070">622 866 0,'-25'0'0,"0"0"16,1 0-16,48 0 31,1 0-16,24-25-15,1 25 0,24 0 16,24-25-16,-24 25 0,25 0 16,-1-24-16,1 24 15,0 0-15,-25-25 0,0 25 16,-25 0-16,-24 0 16,-1 0-16,-24 25 0,-24-25 15,-1 24-15,-49-24 0,25 25 16,-50-25-16,25 25 15,0-25-15,-24 0 0,24 0 16,0 0-16,0 0 0,24 0 16,1 0-16,24 0 15,1 0-15,48 0 32,1 0-32,24 0 15,1 0-15,-1 0 0,0 0 16,25 0-16,-24 0 15,23 0-15,1 0 0,-24 0 16,-1-25-16,-24 25 16,-1 0-16,1 0 0,-50 0 15,1 0 1,-26 0-16,26 0 0,-26 0 16,-24 0-16,50 0 0,-25 0 15,-1 0 1,26 0-16,48 0 15,26 0-15,-1 0 16,25-25-16,24 1 0,1 24 16</inkml:trace>
 </inkml:ink>
 </file>
 
@@ -2821,7 +3892,7 @@
           <a:p>
             <a:fld id="{08B69917-2836-44AD-9473-705724BCA047}" type="datetimeFigureOut">
               <a:rPr lang="en-US" smtClean="0"/>
-              <a:t>2/16/2022</a:t>
+              <a:t>2/21/2022</a:t>
             </a:fld>
             <a:endParaRPr lang="en-US"/>
           </a:p>
@@ -3019,7 +4090,7 @@
           <a:p>
             <a:fld id="{08B69917-2836-44AD-9473-705724BCA047}" type="datetimeFigureOut">
               <a:rPr lang="en-US" smtClean="0"/>
-              <a:t>2/16/2022</a:t>
+              <a:t>2/21/2022</a:t>
             </a:fld>
             <a:endParaRPr lang="en-US"/>
           </a:p>
@@ -3227,7 +4298,7 @@
           <a:p>
             <a:fld id="{08B69917-2836-44AD-9473-705724BCA047}" type="datetimeFigureOut">
               <a:rPr lang="en-US" smtClean="0"/>
-              <a:t>2/16/2022</a:t>
+              <a:t>2/21/2022</a:t>
             </a:fld>
             <a:endParaRPr lang="en-US"/>
           </a:p>
@@ -3425,7 +4496,7 @@
           <a:p>
             <a:fld id="{08B69917-2836-44AD-9473-705724BCA047}" type="datetimeFigureOut">
               <a:rPr lang="en-US" smtClean="0"/>
-              <a:t>2/16/2022</a:t>
+              <a:t>2/21/2022</a:t>
             </a:fld>
             <a:endParaRPr lang="en-US"/>
           </a:p>
@@ -3700,7 +4771,7 @@
           <a:p>
             <a:fld id="{08B69917-2836-44AD-9473-705724BCA047}" type="datetimeFigureOut">
               <a:rPr lang="en-US" smtClean="0"/>
-              <a:t>2/16/2022</a:t>
+              <a:t>2/21/2022</a:t>
             </a:fld>
             <a:endParaRPr lang="en-US"/>
           </a:p>
@@ -3965,7 +5036,7 @@
           <a:p>
             <a:fld id="{08B69917-2836-44AD-9473-705724BCA047}" type="datetimeFigureOut">
               <a:rPr lang="en-US" smtClean="0"/>
-              <a:t>2/16/2022</a:t>
+              <a:t>2/21/2022</a:t>
             </a:fld>
             <a:endParaRPr lang="en-US"/>
           </a:p>
@@ -4377,7 +5448,7 @@
           <a:p>
             <a:fld id="{08B69917-2836-44AD-9473-705724BCA047}" type="datetimeFigureOut">
               <a:rPr lang="en-US" smtClean="0"/>
-              <a:t>2/16/2022</a:t>
+              <a:t>2/21/2022</a:t>
             </a:fld>
             <a:endParaRPr lang="en-US"/>
           </a:p>
@@ -4518,7 +5589,7 @@
           <a:p>
             <a:fld id="{08B69917-2836-44AD-9473-705724BCA047}" type="datetimeFigureOut">
               <a:rPr lang="en-US" smtClean="0"/>
-              <a:t>2/16/2022</a:t>
+              <a:t>2/21/2022</a:t>
             </a:fld>
             <a:endParaRPr lang="en-US"/>
           </a:p>
@@ -4631,7 +5702,7 @@
           <a:p>
             <a:fld id="{08B69917-2836-44AD-9473-705724BCA047}" type="datetimeFigureOut">
               <a:rPr lang="en-US" smtClean="0"/>
-              <a:t>2/16/2022</a:t>
+              <a:t>2/21/2022</a:t>
             </a:fld>
             <a:endParaRPr lang="en-US"/>
           </a:p>
@@ -4942,7 +6013,7 @@
           <a:p>
             <a:fld id="{08B69917-2836-44AD-9473-705724BCA047}" type="datetimeFigureOut">
               <a:rPr lang="en-US" smtClean="0"/>
-              <a:t>2/16/2022</a:t>
+              <a:t>2/21/2022</a:t>
             </a:fld>
             <a:endParaRPr lang="en-US"/>
           </a:p>
@@ -5230,7 +6301,7 @@
           <a:p>
             <a:fld id="{08B69917-2836-44AD-9473-705724BCA047}" type="datetimeFigureOut">
               <a:rPr lang="en-US" smtClean="0"/>
-              <a:t>2/16/2022</a:t>
+              <a:t>2/21/2022</a:t>
             </a:fld>
             <a:endParaRPr lang="en-US"/>
           </a:p>
@@ -5471,7 +6542,7 @@
           <a:p>
             <a:fld id="{08B69917-2836-44AD-9473-705724BCA047}" type="datetimeFigureOut">
               <a:rPr lang="en-US" smtClean="0"/>
-              <a:t>2/16/2022</a:t>
+              <a:t>2/21/2022</a:t>
             </a:fld>
             <a:endParaRPr lang="en-US"/>
           </a:p>
@@ -5888,8 +6959,8 @@
           <a:chExt cx="0" cy="0"/>
         </a:xfrm>
       </p:grpSpPr>
-      <mc:AlternateContent xmlns:mc="http://schemas.openxmlformats.org/markup-compatibility/2006">
-        <mc:Choice xmlns:p14="http://schemas.microsoft.com/office/powerpoint/2010/main" Requires="p14">
+      <mc:AlternateContent xmlns:mc="http://schemas.openxmlformats.org/markup-compatibility/2006" xmlns:p14="http://schemas.microsoft.com/office/powerpoint/2010/main">
+        <mc:Choice Requires="p14">
           <p:contentPart p14:bwMode="auto" r:id="rId2">
             <p14:nvContentPartPr>
               <p14:cNvPr id="189" name="Ink 188">
@@ -5908,7 +6979,7 @@
             </p14:xfrm>
           </p:contentPart>
         </mc:Choice>
-        <mc:Fallback>
+        <mc:Fallback xmlns="">
           <p:pic>
             <p:nvPicPr>
               <p:cNvPr id="189" name="Ink 188">
@@ -6029,8 +7100,8 @@
           <a:chExt cx="0" cy="0"/>
         </a:xfrm>
       </p:grpSpPr>
-      <mc:AlternateContent xmlns:mc="http://schemas.openxmlformats.org/markup-compatibility/2006">
-        <mc:Choice xmlns:p14="http://schemas.microsoft.com/office/powerpoint/2010/main" Requires="p14">
+      <mc:AlternateContent xmlns:mc="http://schemas.openxmlformats.org/markup-compatibility/2006" xmlns:p14="http://schemas.microsoft.com/office/powerpoint/2010/main">
+        <mc:Choice Requires="p14">
           <p:contentPart p14:bwMode="auto" r:id="rId2">
             <p14:nvContentPartPr>
               <p14:cNvPr id="5" name="Ink 4">
@@ -6049,7 +7120,7 @@
             </p14:xfrm>
           </p:contentPart>
         </mc:Choice>
-        <mc:Fallback>
+        <mc:Fallback xmlns="">
           <p:pic>
             <p:nvPicPr>
               <p:cNvPr id="5" name="Ink 4">
@@ -6080,8 +7151,8 @@
           </p:pic>
         </mc:Fallback>
       </mc:AlternateContent>
-      <mc:AlternateContent xmlns:mc="http://schemas.openxmlformats.org/markup-compatibility/2006">
-        <mc:Choice xmlns:p14="http://schemas.microsoft.com/office/powerpoint/2010/main" Requires="p14">
+      <mc:AlternateContent xmlns:mc="http://schemas.openxmlformats.org/markup-compatibility/2006" xmlns:p14="http://schemas.microsoft.com/office/powerpoint/2010/main">
+        <mc:Choice Requires="p14">
           <p:contentPart p14:bwMode="auto" r:id="rId4">
             <p14:nvContentPartPr>
               <p14:cNvPr id="15" name="Ink 14">
@@ -6100,7 +7171,7 @@
             </p14:xfrm>
           </p:contentPart>
         </mc:Choice>
-        <mc:Fallback>
+        <mc:Fallback xmlns="">
           <p:pic>
             <p:nvPicPr>
               <p:cNvPr id="15" name="Ink 14">
@@ -6131,8 +7202,8 @@
           </p:pic>
         </mc:Fallback>
       </mc:AlternateContent>
-      <mc:AlternateContent xmlns:mc="http://schemas.openxmlformats.org/markup-compatibility/2006">
-        <mc:Choice xmlns:p14="http://schemas.microsoft.com/office/powerpoint/2010/main" Requires="p14">
+      <mc:AlternateContent xmlns:mc="http://schemas.openxmlformats.org/markup-compatibility/2006" xmlns:p14="http://schemas.microsoft.com/office/powerpoint/2010/main">
+        <mc:Choice Requires="p14">
           <p:contentPart p14:bwMode="auto" r:id="rId6">
             <p14:nvContentPartPr>
               <p14:cNvPr id="16" name="Ink 15">
@@ -6151,7 +7222,7 @@
             </p14:xfrm>
           </p:contentPart>
         </mc:Choice>
-        <mc:Fallback>
+        <mc:Fallback xmlns="">
           <p:pic>
             <p:nvPicPr>
               <p:cNvPr id="16" name="Ink 15">
@@ -6182,8 +7253,8 @@
           </p:pic>
         </mc:Fallback>
       </mc:AlternateContent>
-      <mc:AlternateContent xmlns:mc="http://schemas.openxmlformats.org/markup-compatibility/2006">
-        <mc:Choice xmlns:p14="http://schemas.microsoft.com/office/powerpoint/2010/main" Requires="p14">
+      <mc:AlternateContent xmlns:mc="http://schemas.openxmlformats.org/markup-compatibility/2006" xmlns:p14="http://schemas.microsoft.com/office/powerpoint/2010/main">
+        <mc:Choice Requires="p14">
           <p:contentPart p14:bwMode="auto" r:id="rId8">
             <p14:nvContentPartPr>
               <p14:cNvPr id="17" name="Ink 16">
@@ -6202,7 +7273,7 @@
             </p14:xfrm>
           </p:contentPart>
         </mc:Choice>
-        <mc:Fallback>
+        <mc:Fallback xmlns="">
           <p:pic>
             <p:nvPicPr>
               <p:cNvPr id="17" name="Ink 16">
@@ -6233,8 +7304,8 @@
           </p:pic>
         </mc:Fallback>
       </mc:AlternateContent>
-      <mc:AlternateContent xmlns:mc="http://schemas.openxmlformats.org/markup-compatibility/2006">
-        <mc:Choice xmlns:p14="http://schemas.microsoft.com/office/powerpoint/2010/main" Requires="p14">
+      <mc:AlternateContent xmlns:mc="http://schemas.openxmlformats.org/markup-compatibility/2006" xmlns:p14="http://schemas.microsoft.com/office/powerpoint/2010/main">
+        <mc:Choice Requires="p14">
           <p:contentPart p14:bwMode="auto" r:id="rId10">
             <p14:nvContentPartPr>
               <p14:cNvPr id="18" name="Ink 17">
@@ -6253,7 +7324,7 @@
             </p14:xfrm>
           </p:contentPart>
         </mc:Choice>
-        <mc:Fallback>
+        <mc:Fallback xmlns="">
           <p:pic>
             <p:nvPicPr>
               <p:cNvPr id="18" name="Ink 17">
@@ -6284,8 +7355,8 @@
           </p:pic>
         </mc:Fallback>
       </mc:AlternateContent>
-      <mc:AlternateContent xmlns:mc="http://schemas.openxmlformats.org/markup-compatibility/2006">
-        <mc:Choice xmlns:p14="http://schemas.microsoft.com/office/powerpoint/2010/main" Requires="p14">
+      <mc:AlternateContent xmlns:mc="http://schemas.openxmlformats.org/markup-compatibility/2006" xmlns:p14="http://schemas.microsoft.com/office/powerpoint/2010/main">
+        <mc:Choice Requires="p14">
           <p:contentPart p14:bwMode="auto" r:id="rId12">
             <p14:nvContentPartPr>
               <p14:cNvPr id="23" name="Ink 22">
@@ -6304,7 +7375,7 @@
             </p14:xfrm>
           </p:contentPart>
         </mc:Choice>
-        <mc:Fallback>
+        <mc:Fallback xmlns="">
           <p:pic>
             <p:nvPicPr>
               <p:cNvPr id="23" name="Ink 22">
@@ -6335,8 +7406,8 @@
           </p:pic>
         </mc:Fallback>
       </mc:AlternateContent>
-      <mc:AlternateContent xmlns:mc="http://schemas.openxmlformats.org/markup-compatibility/2006">
-        <mc:Choice xmlns:p14="http://schemas.microsoft.com/office/powerpoint/2010/main" Requires="p14">
+      <mc:AlternateContent xmlns:mc="http://schemas.openxmlformats.org/markup-compatibility/2006" xmlns:p14="http://schemas.microsoft.com/office/powerpoint/2010/main">
+        <mc:Choice Requires="p14">
           <p:contentPart p14:bwMode="auto" r:id="rId14">
             <p14:nvContentPartPr>
               <p14:cNvPr id="30" name="Ink 29">
@@ -6355,7 +7426,7 @@
             </p14:xfrm>
           </p:contentPart>
         </mc:Choice>
-        <mc:Fallback>
+        <mc:Fallback xmlns="">
           <p:pic>
             <p:nvPicPr>
               <p:cNvPr id="30" name="Ink 29">
@@ -6386,8 +7457,8 @@
           </p:pic>
         </mc:Fallback>
       </mc:AlternateContent>
-      <mc:AlternateContent xmlns:mc="http://schemas.openxmlformats.org/markup-compatibility/2006">
-        <mc:Choice xmlns:p14="http://schemas.microsoft.com/office/powerpoint/2010/main" Requires="p14">
+      <mc:AlternateContent xmlns:mc="http://schemas.openxmlformats.org/markup-compatibility/2006" xmlns:p14="http://schemas.microsoft.com/office/powerpoint/2010/main">
+        <mc:Choice Requires="p14">
           <p:contentPart p14:bwMode="auto" r:id="rId16">
             <p14:nvContentPartPr>
               <p14:cNvPr id="31" name="Ink 30">
@@ -6406,7 +7477,7 @@
             </p14:xfrm>
           </p:contentPart>
         </mc:Choice>
-        <mc:Fallback>
+        <mc:Fallback xmlns="">
           <p:pic>
             <p:nvPicPr>
               <p:cNvPr id="31" name="Ink 30">
@@ -6437,8 +7508,8 @@
           </p:pic>
         </mc:Fallback>
       </mc:AlternateContent>
-      <mc:AlternateContent xmlns:mc="http://schemas.openxmlformats.org/markup-compatibility/2006">
-        <mc:Choice xmlns:p14="http://schemas.microsoft.com/office/powerpoint/2010/main" Requires="p14">
+      <mc:AlternateContent xmlns:mc="http://schemas.openxmlformats.org/markup-compatibility/2006" xmlns:p14="http://schemas.microsoft.com/office/powerpoint/2010/main">
+        <mc:Choice Requires="p14">
           <p:contentPart p14:bwMode="auto" r:id="rId18">
             <p14:nvContentPartPr>
               <p14:cNvPr id="34" name="Ink 33">
@@ -6457,7 +7528,7 @@
             </p14:xfrm>
           </p:contentPart>
         </mc:Choice>
-        <mc:Fallback>
+        <mc:Fallback xmlns="">
           <p:pic>
             <p:nvPicPr>
               <p:cNvPr id="34" name="Ink 33">
@@ -6488,8 +7559,8 @@
           </p:pic>
         </mc:Fallback>
       </mc:AlternateContent>
-      <mc:AlternateContent xmlns:mc="http://schemas.openxmlformats.org/markup-compatibility/2006">
-        <mc:Choice xmlns:p14="http://schemas.microsoft.com/office/powerpoint/2010/main" Requires="p14">
+      <mc:AlternateContent xmlns:mc="http://schemas.openxmlformats.org/markup-compatibility/2006" xmlns:p14="http://schemas.microsoft.com/office/powerpoint/2010/main">
+        <mc:Choice Requires="p14">
           <p:contentPart p14:bwMode="auto" r:id="rId20">
             <p14:nvContentPartPr>
               <p14:cNvPr id="35" name="Ink 34">
@@ -6508,7 +7579,7 @@
             </p14:xfrm>
           </p:contentPart>
         </mc:Choice>
-        <mc:Fallback>
+        <mc:Fallback xmlns="">
           <p:pic>
             <p:nvPicPr>
               <p:cNvPr id="35" name="Ink 34">
@@ -6539,8 +7610,8 @@
           </p:pic>
         </mc:Fallback>
       </mc:AlternateContent>
-      <mc:AlternateContent xmlns:mc="http://schemas.openxmlformats.org/markup-compatibility/2006">
-        <mc:Choice xmlns:p14="http://schemas.microsoft.com/office/powerpoint/2010/main" Requires="p14">
+      <mc:AlternateContent xmlns:mc="http://schemas.openxmlformats.org/markup-compatibility/2006" xmlns:p14="http://schemas.microsoft.com/office/powerpoint/2010/main">
+        <mc:Choice Requires="p14">
           <p:contentPart p14:bwMode="auto" r:id="rId22">
             <p14:nvContentPartPr>
               <p14:cNvPr id="36" name="Ink 35">
@@ -6559,7 +7630,7 @@
             </p14:xfrm>
           </p:contentPart>
         </mc:Choice>
-        <mc:Fallback>
+        <mc:Fallback xmlns="">
           <p:pic>
             <p:nvPicPr>
               <p:cNvPr id="36" name="Ink 35">
@@ -6590,8 +7661,8 @@
           </p:pic>
         </mc:Fallback>
       </mc:AlternateContent>
-      <mc:AlternateContent xmlns:mc="http://schemas.openxmlformats.org/markup-compatibility/2006">
-        <mc:Choice xmlns:p14="http://schemas.microsoft.com/office/powerpoint/2010/main" Requires="p14">
+      <mc:AlternateContent xmlns:mc="http://schemas.openxmlformats.org/markup-compatibility/2006" xmlns:p14="http://schemas.microsoft.com/office/powerpoint/2010/main">
+        <mc:Choice Requires="p14">
           <p:contentPart p14:bwMode="auto" r:id="rId24">
             <p14:nvContentPartPr>
               <p14:cNvPr id="42" name="Ink 41">
@@ -6610,7 +7681,7 @@
             </p14:xfrm>
           </p:contentPart>
         </mc:Choice>
-        <mc:Fallback>
+        <mc:Fallback xmlns="">
           <p:pic>
             <p:nvPicPr>
               <p:cNvPr id="42" name="Ink 41">
@@ -6641,8 +7712,8 @@
           </p:pic>
         </mc:Fallback>
       </mc:AlternateContent>
-      <mc:AlternateContent xmlns:mc="http://schemas.openxmlformats.org/markup-compatibility/2006">
-        <mc:Choice xmlns:p14="http://schemas.microsoft.com/office/powerpoint/2010/main" Requires="p14">
+      <mc:AlternateContent xmlns:mc="http://schemas.openxmlformats.org/markup-compatibility/2006" xmlns:p14="http://schemas.microsoft.com/office/powerpoint/2010/main">
+        <mc:Choice Requires="p14">
           <p:contentPart p14:bwMode="auto" r:id="rId26">
             <p14:nvContentPartPr>
               <p14:cNvPr id="43" name="Ink 42">
@@ -6661,7 +7732,7 @@
             </p14:xfrm>
           </p:contentPart>
         </mc:Choice>
-        <mc:Fallback>
+        <mc:Fallback xmlns="">
           <p:pic>
             <p:nvPicPr>
               <p:cNvPr id="43" name="Ink 42">
@@ -6692,8 +7763,8 @@
           </p:pic>
         </mc:Fallback>
       </mc:AlternateContent>
-      <mc:AlternateContent xmlns:mc="http://schemas.openxmlformats.org/markup-compatibility/2006">
-        <mc:Choice xmlns:p14="http://schemas.microsoft.com/office/powerpoint/2010/main" Requires="p14">
+      <mc:AlternateContent xmlns:mc="http://schemas.openxmlformats.org/markup-compatibility/2006" xmlns:p14="http://schemas.microsoft.com/office/powerpoint/2010/main">
+        <mc:Choice Requires="p14">
           <p:contentPart p14:bwMode="auto" r:id="rId28">
             <p14:nvContentPartPr>
               <p14:cNvPr id="47" name="Ink 46">
@@ -6712,7 +7783,7 @@
             </p14:xfrm>
           </p:contentPart>
         </mc:Choice>
-        <mc:Fallback>
+        <mc:Fallback xmlns="">
           <p:pic>
             <p:nvPicPr>
               <p:cNvPr id="47" name="Ink 46">
@@ -6743,8 +7814,8 @@
           </p:pic>
         </mc:Fallback>
       </mc:AlternateContent>
-      <mc:AlternateContent xmlns:mc="http://schemas.openxmlformats.org/markup-compatibility/2006">
-        <mc:Choice xmlns:p14="http://schemas.microsoft.com/office/powerpoint/2010/main" Requires="p14">
+      <mc:AlternateContent xmlns:mc="http://schemas.openxmlformats.org/markup-compatibility/2006" xmlns:p14="http://schemas.microsoft.com/office/powerpoint/2010/main">
+        <mc:Choice Requires="p14">
           <p:contentPart p14:bwMode="auto" r:id="rId30">
             <p14:nvContentPartPr>
               <p14:cNvPr id="50" name="Ink 49">
@@ -6763,7 +7834,7 @@
             </p14:xfrm>
           </p:contentPart>
         </mc:Choice>
-        <mc:Fallback>
+        <mc:Fallback xmlns="">
           <p:pic>
             <p:nvPicPr>
               <p:cNvPr id="50" name="Ink 49">
@@ -6794,8 +7865,8 @@
           </p:pic>
         </mc:Fallback>
       </mc:AlternateContent>
-      <mc:AlternateContent xmlns:mc="http://schemas.openxmlformats.org/markup-compatibility/2006">
-        <mc:Choice xmlns:p14="http://schemas.microsoft.com/office/powerpoint/2010/main" Requires="p14">
+      <mc:AlternateContent xmlns:mc="http://schemas.openxmlformats.org/markup-compatibility/2006" xmlns:p14="http://schemas.microsoft.com/office/powerpoint/2010/main">
+        <mc:Choice Requires="p14">
           <p:contentPart p14:bwMode="auto" r:id="rId32">
             <p14:nvContentPartPr>
               <p14:cNvPr id="51" name="Ink 50">
@@ -6814,7 +7885,7 @@
             </p14:xfrm>
           </p:contentPart>
         </mc:Choice>
-        <mc:Fallback>
+        <mc:Fallback xmlns="">
           <p:pic>
             <p:nvPicPr>
               <p:cNvPr id="51" name="Ink 50">
@@ -6845,8 +7916,8 @@
           </p:pic>
         </mc:Fallback>
       </mc:AlternateContent>
-      <mc:AlternateContent xmlns:mc="http://schemas.openxmlformats.org/markup-compatibility/2006">
-        <mc:Choice xmlns:p14="http://schemas.microsoft.com/office/powerpoint/2010/main" Requires="p14">
+      <mc:AlternateContent xmlns:mc="http://schemas.openxmlformats.org/markup-compatibility/2006" xmlns:p14="http://schemas.microsoft.com/office/powerpoint/2010/main">
+        <mc:Choice Requires="p14">
           <p:contentPart p14:bwMode="auto" r:id="rId34">
             <p14:nvContentPartPr>
               <p14:cNvPr id="52" name="Ink 51">
@@ -6865,7 +7936,7 @@
             </p14:xfrm>
           </p:contentPart>
         </mc:Choice>
-        <mc:Fallback>
+        <mc:Fallback xmlns="">
           <p:pic>
             <p:nvPicPr>
               <p:cNvPr id="52" name="Ink 51">
@@ -6896,8 +7967,8 @@
           </p:pic>
         </mc:Fallback>
       </mc:AlternateContent>
-      <mc:AlternateContent xmlns:mc="http://schemas.openxmlformats.org/markup-compatibility/2006">
-        <mc:Choice xmlns:p14="http://schemas.microsoft.com/office/powerpoint/2010/main" Requires="p14">
+      <mc:AlternateContent xmlns:mc="http://schemas.openxmlformats.org/markup-compatibility/2006" xmlns:p14="http://schemas.microsoft.com/office/powerpoint/2010/main">
+        <mc:Choice Requires="p14">
           <p:contentPart p14:bwMode="auto" r:id="rId36">
             <p14:nvContentPartPr>
               <p14:cNvPr id="61" name="Ink 60">
@@ -6916,7 +7987,7 @@
             </p14:xfrm>
           </p:contentPart>
         </mc:Choice>
-        <mc:Fallback>
+        <mc:Fallback xmlns="">
           <p:pic>
             <p:nvPicPr>
               <p:cNvPr id="61" name="Ink 60">
@@ -6947,8 +8018,8 @@
           </p:pic>
         </mc:Fallback>
       </mc:AlternateContent>
-      <mc:AlternateContent xmlns:mc="http://schemas.openxmlformats.org/markup-compatibility/2006">
-        <mc:Choice xmlns:p14="http://schemas.microsoft.com/office/powerpoint/2010/main" Requires="p14">
+      <mc:AlternateContent xmlns:mc="http://schemas.openxmlformats.org/markup-compatibility/2006" xmlns:p14="http://schemas.microsoft.com/office/powerpoint/2010/main">
+        <mc:Choice Requires="p14">
           <p:contentPart p14:bwMode="auto" r:id="rId38">
             <p14:nvContentPartPr>
               <p14:cNvPr id="62" name="Ink 61">
@@ -6967,7 +8038,7 @@
             </p14:xfrm>
           </p:contentPart>
         </mc:Choice>
-        <mc:Fallback>
+        <mc:Fallback xmlns="">
           <p:pic>
             <p:nvPicPr>
               <p:cNvPr id="62" name="Ink 61">
@@ -6998,8 +8069,8 @@
           </p:pic>
         </mc:Fallback>
       </mc:AlternateContent>
-      <mc:AlternateContent xmlns:mc="http://schemas.openxmlformats.org/markup-compatibility/2006">
-        <mc:Choice xmlns:p14="http://schemas.microsoft.com/office/powerpoint/2010/main" Requires="p14">
+      <mc:AlternateContent xmlns:mc="http://schemas.openxmlformats.org/markup-compatibility/2006" xmlns:p14="http://schemas.microsoft.com/office/powerpoint/2010/main">
+        <mc:Choice Requires="p14">
           <p:contentPart p14:bwMode="auto" r:id="rId40">
             <p14:nvContentPartPr>
               <p14:cNvPr id="87" name="Ink 86">
@@ -7018,7 +8089,7 @@
             </p14:xfrm>
           </p:contentPart>
         </mc:Choice>
-        <mc:Fallback>
+        <mc:Fallback xmlns="">
           <p:pic>
             <p:nvPicPr>
               <p:cNvPr id="87" name="Ink 86">
@@ -7049,8 +8120,8 @@
           </p:pic>
         </mc:Fallback>
       </mc:AlternateContent>
-      <mc:AlternateContent xmlns:mc="http://schemas.openxmlformats.org/markup-compatibility/2006">
-        <mc:Choice xmlns:p14="http://schemas.microsoft.com/office/powerpoint/2010/main" Requires="p14">
+      <mc:AlternateContent xmlns:mc="http://schemas.openxmlformats.org/markup-compatibility/2006" xmlns:p14="http://schemas.microsoft.com/office/powerpoint/2010/main">
+        <mc:Choice Requires="p14">
           <p:contentPart p14:bwMode="auto" r:id="rId42">
             <p14:nvContentPartPr>
               <p14:cNvPr id="96" name="Ink 95">
@@ -7069,7 +8140,7 @@
             </p14:xfrm>
           </p:contentPart>
         </mc:Choice>
-        <mc:Fallback>
+        <mc:Fallback xmlns="">
           <p:pic>
             <p:nvPicPr>
               <p:cNvPr id="96" name="Ink 95">
@@ -7100,8 +8171,8 @@
           </p:pic>
         </mc:Fallback>
       </mc:AlternateContent>
-      <mc:AlternateContent xmlns:mc="http://schemas.openxmlformats.org/markup-compatibility/2006">
-        <mc:Choice xmlns:p14="http://schemas.microsoft.com/office/powerpoint/2010/main" Requires="p14">
+      <mc:AlternateContent xmlns:mc="http://schemas.openxmlformats.org/markup-compatibility/2006" xmlns:p14="http://schemas.microsoft.com/office/powerpoint/2010/main">
+        <mc:Choice Requires="p14">
           <p:contentPart p14:bwMode="auto" r:id="rId44">
             <p14:nvContentPartPr>
               <p14:cNvPr id="99" name="Ink 98">
@@ -7120,7 +8191,7 @@
             </p14:xfrm>
           </p:contentPart>
         </mc:Choice>
-        <mc:Fallback>
+        <mc:Fallback xmlns="">
           <p:pic>
             <p:nvPicPr>
               <p:cNvPr id="99" name="Ink 98">
@@ -7151,8 +8222,8 @@
           </p:pic>
         </mc:Fallback>
       </mc:AlternateContent>
-      <mc:AlternateContent xmlns:mc="http://schemas.openxmlformats.org/markup-compatibility/2006">
-        <mc:Choice xmlns:p14="http://schemas.microsoft.com/office/powerpoint/2010/main" Requires="p14">
+      <mc:AlternateContent xmlns:mc="http://schemas.openxmlformats.org/markup-compatibility/2006" xmlns:p14="http://schemas.microsoft.com/office/powerpoint/2010/main">
+        <mc:Choice Requires="p14">
           <p:contentPart p14:bwMode="auto" r:id="rId46">
             <p14:nvContentPartPr>
               <p14:cNvPr id="102" name="Ink 101">
@@ -7171,7 +8242,7 @@
             </p14:xfrm>
           </p:contentPart>
         </mc:Choice>
-        <mc:Fallback>
+        <mc:Fallback xmlns="">
           <p:pic>
             <p:nvPicPr>
               <p:cNvPr id="102" name="Ink 101">
@@ -7202,8 +8273,8 @@
           </p:pic>
         </mc:Fallback>
       </mc:AlternateContent>
-      <mc:AlternateContent xmlns:mc="http://schemas.openxmlformats.org/markup-compatibility/2006">
-        <mc:Choice xmlns:p14="http://schemas.microsoft.com/office/powerpoint/2010/main" Requires="p14">
+      <mc:AlternateContent xmlns:mc="http://schemas.openxmlformats.org/markup-compatibility/2006" xmlns:p14="http://schemas.microsoft.com/office/powerpoint/2010/main">
+        <mc:Choice Requires="p14">
           <p:contentPart p14:bwMode="auto" r:id="rId48">
             <p14:nvContentPartPr>
               <p14:cNvPr id="112" name="Ink 111">
@@ -7222,7 +8293,7 @@
             </p14:xfrm>
           </p:contentPart>
         </mc:Choice>
-        <mc:Fallback>
+        <mc:Fallback xmlns="">
           <p:pic>
             <p:nvPicPr>
               <p:cNvPr id="112" name="Ink 111">
@@ -7253,8 +8324,8 @@
           </p:pic>
         </mc:Fallback>
       </mc:AlternateContent>
-      <mc:AlternateContent xmlns:mc="http://schemas.openxmlformats.org/markup-compatibility/2006">
-        <mc:Choice xmlns:p14="http://schemas.microsoft.com/office/powerpoint/2010/main" Requires="p14">
+      <mc:AlternateContent xmlns:mc="http://schemas.openxmlformats.org/markup-compatibility/2006" xmlns:p14="http://schemas.microsoft.com/office/powerpoint/2010/main">
+        <mc:Choice Requires="p14">
           <p:contentPart p14:bwMode="auto" r:id="rId50">
             <p14:nvContentPartPr>
               <p14:cNvPr id="113" name="Ink 112">
@@ -7273,7 +8344,7 @@
             </p14:xfrm>
           </p:contentPart>
         </mc:Choice>
-        <mc:Fallback>
+        <mc:Fallback xmlns="">
           <p:pic>
             <p:nvPicPr>
               <p:cNvPr id="113" name="Ink 112">
@@ -7304,8 +8375,8 @@
           </p:pic>
         </mc:Fallback>
       </mc:AlternateContent>
-      <mc:AlternateContent xmlns:mc="http://schemas.openxmlformats.org/markup-compatibility/2006">
-        <mc:Choice xmlns:p14="http://schemas.microsoft.com/office/powerpoint/2010/main" Requires="p14">
+      <mc:AlternateContent xmlns:mc="http://schemas.openxmlformats.org/markup-compatibility/2006" xmlns:p14="http://schemas.microsoft.com/office/powerpoint/2010/main">
+        <mc:Choice Requires="p14">
           <p:contentPart p14:bwMode="auto" r:id="rId52">
             <p14:nvContentPartPr>
               <p14:cNvPr id="117" name="Ink 116">
@@ -7324,7 +8395,7 @@
             </p14:xfrm>
           </p:contentPart>
         </mc:Choice>
-        <mc:Fallback>
+        <mc:Fallback xmlns="">
           <p:pic>
             <p:nvPicPr>
               <p:cNvPr id="117" name="Ink 116">
@@ -7355,8 +8426,8 @@
           </p:pic>
         </mc:Fallback>
       </mc:AlternateContent>
-      <mc:AlternateContent xmlns:mc="http://schemas.openxmlformats.org/markup-compatibility/2006">
-        <mc:Choice xmlns:p14="http://schemas.microsoft.com/office/powerpoint/2010/main" Requires="p14">
+      <mc:AlternateContent xmlns:mc="http://schemas.openxmlformats.org/markup-compatibility/2006" xmlns:p14="http://schemas.microsoft.com/office/powerpoint/2010/main">
+        <mc:Choice Requires="p14">
           <p:contentPart p14:bwMode="auto" r:id="rId54">
             <p14:nvContentPartPr>
               <p14:cNvPr id="123" name="Ink 122">
@@ -7375,7 +8446,7 @@
             </p14:xfrm>
           </p:contentPart>
         </mc:Choice>
-        <mc:Fallback>
+        <mc:Fallback xmlns="">
           <p:pic>
             <p:nvPicPr>
               <p:cNvPr id="123" name="Ink 122">
@@ -7406,8 +8477,8 @@
           </p:pic>
         </mc:Fallback>
       </mc:AlternateContent>
-      <mc:AlternateContent xmlns:mc="http://schemas.openxmlformats.org/markup-compatibility/2006">
-        <mc:Choice xmlns:p14="http://schemas.microsoft.com/office/powerpoint/2010/main" Requires="p14">
+      <mc:AlternateContent xmlns:mc="http://schemas.openxmlformats.org/markup-compatibility/2006" xmlns:p14="http://schemas.microsoft.com/office/powerpoint/2010/main">
+        <mc:Choice Requires="p14">
           <p:contentPart p14:bwMode="auto" r:id="rId56">
             <p14:nvContentPartPr>
               <p14:cNvPr id="127" name="Ink 126">
@@ -7426,7 +8497,7 @@
             </p14:xfrm>
           </p:contentPart>
         </mc:Choice>
-        <mc:Fallback>
+        <mc:Fallback xmlns="">
           <p:pic>
             <p:nvPicPr>
               <p:cNvPr id="127" name="Ink 126">
@@ -7457,8 +8528,8 @@
           </p:pic>
         </mc:Fallback>
       </mc:AlternateContent>
-      <mc:AlternateContent xmlns:mc="http://schemas.openxmlformats.org/markup-compatibility/2006">
-        <mc:Choice xmlns:p14="http://schemas.microsoft.com/office/powerpoint/2010/main" Requires="p14">
+      <mc:AlternateContent xmlns:mc="http://schemas.openxmlformats.org/markup-compatibility/2006" xmlns:p14="http://schemas.microsoft.com/office/powerpoint/2010/main">
+        <mc:Choice Requires="p14">
           <p:contentPart p14:bwMode="auto" r:id="rId58">
             <p14:nvContentPartPr>
               <p14:cNvPr id="139" name="Ink 138">
@@ -7477,7 +8548,7 @@
             </p14:xfrm>
           </p:contentPart>
         </mc:Choice>
-        <mc:Fallback>
+        <mc:Fallback xmlns="">
           <p:pic>
             <p:nvPicPr>
               <p:cNvPr id="139" name="Ink 138">
@@ -7508,8 +8579,8 @@
           </p:pic>
         </mc:Fallback>
       </mc:AlternateContent>
-      <mc:AlternateContent xmlns:mc="http://schemas.openxmlformats.org/markup-compatibility/2006">
-        <mc:Choice xmlns:p14="http://schemas.microsoft.com/office/powerpoint/2010/main" Requires="p14">
+      <mc:AlternateContent xmlns:mc="http://schemas.openxmlformats.org/markup-compatibility/2006" xmlns:p14="http://schemas.microsoft.com/office/powerpoint/2010/main">
+        <mc:Choice Requires="p14">
           <p:contentPart p14:bwMode="auto" r:id="rId60">
             <p14:nvContentPartPr>
               <p14:cNvPr id="140" name="Ink 139">
@@ -7528,7 +8599,7 @@
             </p14:xfrm>
           </p:contentPart>
         </mc:Choice>
-        <mc:Fallback>
+        <mc:Fallback xmlns="">
           <p:pic>
             <p:nvPicPr>
               <p:cNvPr id="140" name="Ink 139">
@@ -7559,8 +8630,8 @@
           </p:pic>
         </mc:Fallback>
       </mc:AlternateContent>
-      <mc:AlternateContent xmlns:mc="http://schemas.openxmlformats.org/markup-compatibility/2006">
-        <mc:Choice xmlns:p14="http://schemas.microsoft.com/office/powerpoint/2010/main" Requires="p14">
+      <mc:AlternateContent xmlns:mc="http://schemas.openxmlformats.org/markup-compatibility/2006" xmlns:p14="http://schemas.microsoft.com/office/powerpoint/2010/main">
+        <mc:Choice Requires="p14">
           <p:contentPart p14:bwMode="auto" r:id="rId62">
             <p14:nvContentPartPr>
               <p14:cNvPr id="141" name="Ink 140">
@@ -7579,7 +8650,7 @@
             </p14:xfrm>
           </p:contentPart>
         </mc:Choice>
-        <mc:Fallback>
+        <mc:Fallback xmlns="">
           <p:pic>
             <p:nvPicPr>
               <p:cNvPr id="141" name="Ink 140">
@@ -7610,8 +8681,8 @@
           </p:pic>
         </mc:Fallback>
       </mc:AlternateContent>
-      <mc:AlternateContent xmlns:mc="http://schemas.openxmlformats.org/markup-compatibility/2006">
-        <mc:Choice xmlns:p14="http://schemas.microsoft.com/office/powerpoint/2010/main" Requires="p14">
+      <mc:AlternateContent xmlns:mc="http://schemas.openxmlformats.org/markup-compatibility/2006" xmlns:p14="http://schemas.microsoft.com/office/powerpoint/2010/main">
+        <mc:Choice Requires="p14">
           <p:contentPart p14:bwMode="auto" r:id="rId64">
             <p14:nvContentPartPr>
               <p14:cNvPr id="152" name="Ink 151">
@@ -7630,7 +8701,7 @@
             </p14:xfrm>
           </p:contentPart>
         </mc:Choice>
-        <mc:Fallback>
+        <mc:Fallback xmlns="">
           <p:pic>
             <p:nvPicPr>
               <p:cNvPr id="152" name="Ink 151">
@@ -7661,8 +8732,8 @@
           </p:pic>
         </mc:Fallback>
       </mc:AlternateContent>
-      <mc:AlternateContent xmlns:mc="http://schemas.openxmlformats.org/markup-compatibility/2006">
-        <mc:Choice xmlns:p14="http://schemas.microsoft.com/office/powerpoint/2010/main" Requires="p14">
+      <mc:AlternateContent xmlns:mc="http://schemas.openxmlformats.org/markup-compatibility/2006" xmlns:p14="http://schemas.microsoft.com/office/powerpoint/2010/main">
+        <mc:Choice Requires="p14">
           <p:contentPart p14:bwMode="auto" r:id="rId66">
             <p14:nvContentPartPr>
               <p14:cNvPr id="153" name="Ink 152">
@@ -7681,7 +8752,7 @@
             </p14:xfrm>
           </p:contentPart>
         </mc:Choice>
-        <mc:Fallback>
+        <mc:Fallback xmlns="">
           <p:pic>
             <p:nvPicPr>
               <p:cNvPr id="153" name="Ink 152">
@@ -7712,8 +8783,8 @@
           </p:pic>
         </mc:Fallback>
       </mc:AlternateContent>
-      <mc:AlternateContent xmlns:mc="http://schemas.openxmlformats.org/markup-compatibility/2006">
-        <mc:Choice xmlns:p14="http://schemas.microsoft.com/office/powerpoint/2010/main" Requires="p14">
+      <mc:AlternateContent xmlns:mc="http://schemas.openxmlformats.org/markup-compatibility/2006" xmlns:p14="http://schemas.microsoft.com/office/powerpoint/2010/main">
+        <mc:Choice Requires="p14">
           <p:contentPart p14:bwMode="auto" r:id="rId68">
             <p14:nvContentPartPr>
               <p14:cNvPr id="154" name="Ink 153">
@@ -7732,7 +8803,7 @@
             </p14:xfrm>
           </p:contentPart>
         </mc:Choice>
-        <mc:Fallback>
+        <mc:Fallback xmlns="">
           <p:pic>
             <p:nvPicPr>
               <p:cNvPr id="154" name="Ink 153">
@@ -7763,8 +8834,8 @@
           </p:pic>
         </mc:Fallback>
       </mc:AlternateContent>
-      <mc:AlternateContent xmlns:mc="http://schemas.openxmlformats.org/markup-compatibility/2006">
-        <mc:Choice xmlns:p14="http://schemas.microsoft.com/office/powerpoint/2010/main" Requires="p14">
+      <mc:AlternateContent xmlns:mc="http://schemas.openxmlformats.org/markup-compatibility/2006" xmlns:p14="http://schemas.microsoft.com/office/powerpoint/2010/main">
+        <mc:Choice Requires="p14">
           <p:contentPart p14:bwMode="auto" r:id="rId70">
             <p14:nvContentPartPr>
               <p14:cNvPr id="155" name="Ink 154">
@@ -7783,7 +8854,7 @@
             </p14:xfrm>
           </p:contentPart>
         </mc:Choice>
-        <mc:Fallback>
+        <mc:Fallback xmlns="">
           <p:pic>
             <p:nvPicPr>
               <p:cNvPr id="155" name="Ink 154">
@@ -7814,8 +8885,8 @@
           </p:pic>
         </mc:Fallback>
       </mc:AlternateContent>
-      <mc:AlternateContent xmlns:mc="http://schemas.openxmlformats.org/markup-compatibility/2006">
-        <mc:Choice xmlns:p14="http://schemas.microsoft.com/office/powerpoint/2010/main" Requires="p14">
+      <mc:AlternateContent xmlns:mc="http://schemas.openxmlformats.org/markup-compatibility/2006" xmlns:p14="http://schemas.microsoft.com/office/powerpoint/2010/main">
+        <mc:Choice Requires="p14">
           <p:contentPart p14:bwMode="auto" r:id="rId72">
             <p14:nvContentPartPr>
               <p14:cNvPr id="158" name="Ink 157">
@@ -7834,7 +8905,7 @@
             </p14:xfrm>
           </p:contentPart>
         </mc:Choice>
-        <mc:Fallback>
+        <mc:Fallback xmlns="">
           <p:pic>
             <p:nvPicPr>
               <p:cNvPr id="158" name="Ink 157">
@@ -7865,8 +8936,8 @@
           </p:pic>
         </mc:Fallback>
       </mc:AlternateContent>
-      <mc:AlternateContent xmlns:mc="http://schemas.openxmlformats.org/markup-compatibility/2006">
-        <mc:Choice xmlns:p14="http://schemas.microsoft.com/office/powerpoint/2010/main" Requires="p14">
+      <mc:AlternateContent xmlns:mc="http://schemas.openxmlformats.org/markup-compatibility/2006" xmlns:p14="http://schemas.microsoft.com/office/powerpoint/2010/main">
+        <mc:Choice Requires="p14">
           <p:contentPart p14:bwMode="auto" r:id="rId74">
             <p14:nvContentPartPr>
               <p14:cNvPr id="176" name="Ink 175">
@@ -7885,7 +8956,7 @@
             </p14:xfrm>
           </p:contentPart>
         </mc:Choice>
-        <mc:Fallback>
+        <mc:Fallback xmlns="">
           <p:pic>
             <p:nvPicPr>
               <p:cNvPr id="176" name="Ink 175">
@@ -7916,8 +8987,8 @@
           </p:pic>
         </mc:Fallback>
       </mc:AlternateContent>
-      <mc:AlternateContent xmlns:mc="http://schemas.openxmlformats.org/markup-compatibility/2006">
-        <mc:Choice xmlns:p14="http://schemas.microsoft.com/office/powerpoint/2010/main" Requires="p14">
+      <mc:AlternateContent xmlns:mc="http://schemas.openxmlformats.org/markup-compatibility/2006" xmlns:p14="http://schemas.microsoft.com/office/powerpoint/2010/main">
+        <mc:Choice Requires="p14">
           <p:contentPart p14:bwMode="auto" r:id="rId76">
             <p14:nvContentPartPr>
               <p14:cNvPr id="177" name="Ink 176">
@@ -7936,7 +9007,7 @@
             </p14:xfrm>
           </p:contentPart>
         </mc:Choice>
-        <mc:Fallback>
+        <mc:Fallback xmlns="">
           <p:pic>
             <p:nvPicPr>
               <p:cNvPr id="177" name="Ink 176">
@@ -7967,8 +9038,8 @@
           </p:pic>
         </mc:Fallback>
       </mc:AlternateContent>
-      <mc:AlternateContent xmlns:mc="http://schemas.openxmlformats.org/markup-compatibility/2006">
-        <mc:Choice xmlns:p14="http://schemas.microsoft.com/office/powerpoint/2010/main" Requires="p14">
+      <mc:AlternateContent xmlns:mc="http://schemas.openxmlformats.org/markup-compatibility/2006" xmlns:p14="http://schemas.microsoft.com/office/powerpoint/2010/main">
+        <mc:Choice Requires="p14">
           <p:contentPart p14:bwMode="auto" r:id="rId78">
             <p14:nvContentPartPr>
               <p14:cNvPr id="178" name="Ink 177">
@@ -7987,7 +9058,7 @@
             </p14:xfrm>
           </p:contentPart>
         </mc:Choice>
-        <mc:Fallback>
+        <mc:Fallback xmlns="">
           <p:pic>
             <p:nvPicPr>
               <p:cNvPr id="178" name="Ink 177">
@@ -8018,8 +9089,8 @@
           </p:pic>
         </mc:Fallback>
       </mc:AlternateContent>
-      <mc:AlternateContent xmlns:mc="http://schemas.openxmlformats.org/markup-compatibility/2006">
-        <mc:Choice xmlns:p14="http://schemas.microsoft.com/office/powerpoint/2010/main" Requires="p14">
+      <mc:AlternateContent xmlns:mc="http://schemas.openxmlformats.org/markup-compatibility/2006" xmlns:p14="http://schemas.microsoft.com/office/powerpoint/2010/main">
+        <mc:Choice Requires="p14">
           <p:contentPart p14:bwMode="auto" r:id="rId80">
             <p14:nvContentPartPr>
               <p14:cNvPr id="181" name="Ink 180">
@@ -8038,7 +9109,7 @@
             </p14:xfrm>
           </p:contentPart>
         </mc:Choice>
-        <mc:Fallback>
+        <mc:Fallback xmlns="">
           <p:pic>
             <p:nvPicPr>
               <p:cNvPr id="181" name="Ink 180">
@@ -8069,8 +9140,8 @@
           </p:pic>
         </mc:Fallback>
       </mc:AlternateContent>
-      <mc:AlternateContent xmlns:mc="http://schemas.openxmlformats.org/markup-compatibility/2006">
-        <mc:Choice xmlns:p14="http://schemas.microsoft.com/office/powerpoint/2010/main" Requires="p14">
+      <mc:AlternateContent xmlns:mc="http://schemas.openxmlformats.org/markup-compatibility/2006" xmlns:p14="http://schemas.microsoft.com/office/powerpoint/2010/main">
+        <mc:Choice Requires="p14">
           <p:contentPart p14:bwMode="auto" r:id="rId82">
             <p14:nvContentPartPr>
               <p14:cNvPr id="186" name="Ink 185">
@@ -8089,7 +9160,7 @@
             </p14:xfrm>
           </p:contentPart>
         </mc:Choice>
-        <mc:Fallback>
+        <mc:Fallback xmlns="">
           <p:pic>
             <p:nvPicPr>
               <p:cNvPr id="186" name="Ink 185">
@@ -8120,8 +9191,8 @@
           </p:pic>
         </mc:Fallback>
       </mc:AlternateContent>
-      <mc:AlternateContent xmlns:mc="http://schemas.openxmlformats.org/markup-compatibility/2006">
-        <mc:Choice xmlns:p14="http://schemas.microsoft.com/office/powerpoint/2010/main" Requires="p14">
+      <mc:AlternateContent xmlns:mc="http://schemas.openxmlformats.org/markup-compatibility/2006" xmlns:p14="http://schemas.microsoft.com/office/powerpoint/2010/main">
+        <mc:Choice Requires="p14">
           <p:contentPart p14:bwMode="auto" r:id="rId84">
             <p14:nvContentPartPr>
               <p14:cNvPr id="187" name="Ink 186">
@@ -8140,7 +9211,7 @@
             </p14:xfrm>
           </p:contentPart>
         </mc:Choice>
-        <mc:Fallback>
+        <mc:Fallback xmlns="">
           <p:pic>
             <p:nvPicPr>
               <p:cNvPr id="187" name="Ink 186">
@@ -8171,8 +9242,8 @@
           </p:pic>
         </mc:Fallback>
       </mc:AlternateContent>
-      <mc:AlternateContent xmlns:mc="http://schemas.openxmlformats.org/markup-compatibility/2006">
-        <mc:Choice xmlns:p14="http://schemas.microsoft.com/office/powerpoint/2010/main" Requires="p14">
+      <mc:AlternateContent xmlns:mc="http://schemas.openxmlformats.org/markup-compatibility/2006" xmlns:p14="http://schemas.microsoft.com/office/powerpoint/2010/main">
+        <mc:Choice Requires="p14">
           <p:contentPart p14:bwMode="auto" r:id="rId86">
             <p14:nvContentPartPr>
               <p14:cNvPr id="188" name="Ink 187">
@@ -8191,7 +9262,7 @@
             </p14:xfrm>
           </p:contentPart>
         </mc:Choice>
-        <mc:Fallback>
+        <mc:Fallback xmlns="">
           <p:pic>
             <p:nvPicPr>
               <p:cNvPr id="188" name="Ink 187">
@@ -8222,8 +9293,8 @@
           </p:pic>
         </mc:Fallback>
       </mc:AlternateContent>
-      <mc:AlternateContent xmlns:mc="http://schemas.openxmlformats.org/markup-compatibility/2006">
-        <mc:Choice xmlns:p14="http://schemas.microsoft.com/office/powerpoint/2010/main" Requires="p14">
+      <mc:AlternateContent xmlns:mc="http://schemas.openxmlformats.org/markup-compatibility/2006" xmlns:p14="http://schemas.microsoft.com/office/powerpoint/2010/main">
+        <mc:Choice Requires="p14">
           <p:contentPart p14:bwMode="auto" r:id="rId88">
             <p14:nvContentPartPr>
               <p14:cNvPr id="191" name="Ink 190">
@@ -8242,7 +9313,7 @@
             </p14:xfrm>
           </p:contentPart>
         </mc:Choice>
-        <mc:Fallback>
+        <mc:Fallback xmlns="">
           <p:pic>
             <p:nvPicPr>
               <p:cNvPr id="191" name="Ink 190">
@@ -8273,8 +9344,8 @@
           </p:pic>
         </mc:Fallback>
       </mc:AlternateContent>
-      <mc:AlternateContent xmlns:mc="http://schemas.openxmlformats.org/markup-compatibility/2006">
-        <mc:Choice xmlns:p14="http://schemas.microsoft.com/office/powerpoint/2010/main" Requires="p14">
+      <mc:AlternateContent xmlns:mc="http://schemas.openxmlformats.org/markup-compatibility/2006" xmlns:p14="http://schemas.microsoft.com/office/powerpoint/2010/main">
+        <mc:Choice Requires="p14">
           <p:contentPart p14:bwMode="auto" r:id="rId90">
             <p14:nvContentPartPr>
               <p14:cNvPr id="192" name="Ink 191">
@@ -8293,7 +9364,7 @@
             </p14:xfrm>
           </p:contentPart>
         </mc:Choice>
-        <mc:Fallback>
+        <mc:Fallback xmlns="">
           <p:pic>
             <p:nvPicPr>
               <p:cNvPr id="192" name="Ink 191">
@@ -8324,8 +9395,8 @@
           </p:pic>
         </mc:Fallback>
       </mc:AlternateContent>
-      <mc:AlternateContent xmlns:mc="http://schemas.openxmlformats.org/markup-compatibility/2006">
-        <mc:Choice xmlns:p14="http://schemas.microsoft.com/office/powerpoint/2010/main" Requires="p14">
+      <mc:AlternateContent xmlns:mc="http://schemas.openxmlformats.org/markup-compatibility/2006" xmlns:p14="http://schemas.microsoft.com/office/powerpoint/2010/main">
+        <mc:Choice Requires="p14">
           <p:contentPart p14:bwMode="auto" r:id="rId92">
             <p14:nvContentPartPr>
               <p14:cNvPr id="202" name="Ink 201">
@@ -8344,7 +9415,7 @@
             </p14:xfrm>
           </p:contentPart>
         </mc:Choice>
-        <mc:Fallback>
+        <mc:Fallback xmlns="">
           <p:pic>
             <p:nvPicPr>
               <p:cNvPr id="202" name="Ink 201">
@@ -8375,8 +9446,8 @@
           </p:pic>
         </mc:Fallback>
       </mc:AlternateContent>
-      <mc:AlternateContent xmlns:mc="http://schemas.openxmlformats.org/markup-compatibility/2006">
-        <mc:Choice xmlns:p14="http://schemas.microsoft.com/office/powerpoint/2010/main" Requires="p14">
+      <mc:AlternateContent xmlns:mc="http://schemas.openxmlformats.org/markup-compatibility/2006" xmlns:p14="http://schemas.microsoft.com/office/powerpoint/2010/main">
+        <mc:Choice Requires="p14">
           <p:contentPart p14:bwMode="auto" r:id="rId93">
             <p14:nvContentPartPr>
               <p14:cNvPr id="203" name="Ink 202">
@@ -8395,7 +9466,7 @@
             </p14:xfrm>
           </p:contentPart>
         </mc:Choice>
-        <mc:Fallback>
+        <mc:Fallback xmlns="">
           <p:pic>
             <p:nvPicPr>
               <p:cNvPr id="203" name="Ink 202">
@@ -8426,8 +9497,8 @@
           </p:pic>
         </mc:Fallback>
       </mc:AlternateContent>
-      <mc:AlternateContent xmlns:mc="http://schemas.openxmlformats.org/markup-compatibility/2006">
-        <mc:Choice xmlns:p14="http://schemas.microsoft.com/office/powerpoint/2010/main" Requires="p14">
+      <mc:AlternateContent xmlns:mc="http://schemas.openxmlformats.org/markup-compatibility/2006" xmlns:p14="http://schemas.microsoft.com/office/powerpoint/2010/main">
+        <mc:Choice Requires="p14">
           <p:contentPart p14:bwMode="auto" r:id="rId95">
             <p14:nvContentPartPr>
               <p14:cNvPr id="204" name="Ink 203">
@@ -8446,7 +9517,7 @@
             </p14:xfrm>
           </p:contentPart>
         </mc:Choice>
-        <mc:Fallback>
+        <mc:Fallback xmlns="">
           <p:pic>
             <p:nvPicPr>
               <p:cNvPr id="204" name="Ink 203">
@@ -8477,8 +9548,8 @@
           </p:pic>
         </mc:Fallback>
       </mc:AlternateContent>
-      <mc:AlternateContent xmlns:mc="http://schemas.openxmlformats.org/markup-compatibility/2006">
-        <mc:Choice xmlns:p14="http://schemas.microsoft.com/office/powerpoint/2010/main" Requires="p14">
+      <mc:AlternateContent xmlns:mc="http://schemas.openxmlformats.org/markup-compatibility/2006" xmlns:p14="http://schemas.microsoft.com/office/powerpoint/2010/main">
+        <mc:Choice Requires="p14">
           <p:contentPart p14:bwMode="auto" r:id="rId97">
             <p14:nvContentPartPr>
               <p14:cNvPr id="205" name="Ink 204">
@@ -8497,7 +9568,7 @@
             </p14:xfrm>
           </p:contentPart>
         </mc:Choice>
-        <mc:Fallback>
+        <mc:Fallback xmlns="">
           <p:pic>
             <p:nvPicPr>
               <p:cNvPr id="205" name="Ink 204">
@@ -8528,8 +9599,8 @@
           </p:pic>
         </mc:Fallback>
       </mc:AlternateContent>
-      <mc:AlternateContent xmlns:mc="http://schemas.openxmlformats.org/markup-compatibility/2006">
-        <mc:Choice xmlns:p14="http://schemas.microsoft.com/office/powerpoint/2010/main" Requires="p14">
+      <mc:AlternateContent xmlns:mc="http://schemas.openxmlformats.org/markup-compatibility/2006" xmlns:p14="http://schemas.microsoft.com/office/powerpoint/2010/main">
+        <mc:Choice Requires="p14">
           <p:contentPart p14:bwMode="auto" r:id="rId99">
             <p14:nvContentPartPr>
               <p14:cNvPr id="208" name="Ink 207">
@@ -8548,7 +9619,7 @@
             </p14:xfrm>
           </p:contentPart>
         </mc:Choice>
-        <mc:Fallback>
+        <mc:Fallback xmlns="">
           <p:pic>
             <p:nvPicPr>
               <p:cNvPr id="208" name="Ink 207">
@@ -8579,8 +9650,8 @@
           </p:pic>
         </mc:Fallback>
       </mc:AlternateContent>
-      <mc:AlternateContent xmlns:mc="http://schemas.openxmlformats.org/markup-compatibility/2006">
-        <mc:Choice xmlns:p14="http://schemas.microsoft.com/office/powerpoint/2010/main" Requires="p14">
+      <mc:AlternateContent xmlns:mc="http://schemas.openxmlformats.org/markup-compatibility/2006" xmlns:p14="http://schemas.microsoft.com/office/powerpoint/2010/main">
+        <mc:Choice Requires="p14">
           <p:contentPart p14:bwMode="auto" r:id="rId101">
             <p14:nvContentPartPr>
               <p14:cNvPr id="214" name="Ink 213">
@@ -8599,7 +9670,7 @@
             </p14:xfrm>
           </p:contentPart>
         </mc:Choice>
-        <mc:Fallback>
+        <mc:Fallback xmlns="">
           <p:pic>
             <p:nvPicPr>
               <p:cNvPr id="214" name="Ink 213">
@@ -8630,8 +9701,8 @@
           </p:pic>
         </mc:Fallback>
       </mc:AlternateContent>
-      <mc:AlternateContent xmlns:mc="http://schemas.openxmlformats.org/markup-compatibility/2006">
-        <mc:Choice xmlns:p14="http://schemas.microsoft.com/office/powerpoint/2010/main" Requires="p14">
+      <mc:AlternateContent xmlns:mc="http://schemas.openxmlformats.org/markup-compatibility/2006" xmlns:p14="http://schemas.microsoft.com/office/powerpoint/2010/main">
+        <mc:Choice Requires="p14">
           <p:contentPart p14:bwMode="auto" r:id="rId103">
             <p14:nvContentPartPr>
               <p14:cNvPr id="218" name="Ink 217">
@@ -8650,7 +9721,7 @@
             </p14:xfrm>
           </p:contentPart>
         </mc:Choice>
-        <mc:Fallback>
+        <mc:Fallback xmlns="">
           <p:pic>
             <p:nvPicPr>
               <p:cNvPr id="218" name="Ink 217">
@@ -8681,8 +9752,8 @@
           </p:pic>
         </mc:Fallback>
       </mc:AlternateContent>
-      <mc:AlternateContent xmlns:mc="http://schemas.openxmlformats.org/markup-compatibility/2006">
-        <mc:Choice xmlns:p14="http://schemas.microsoft.com/office/powerpoint/2010/main" Requires="p14">
+      <mc:AlternateContent xmlns:mc="http://schemas.openxmlformats.org/markup-compatibility/2006" xmlns:p14="http://schemas.microsoft.com/office/powerpoint/2010/main">
+        <mc:Choice Requires="p14">
           <p:contentPart p14:bwMode="auto" r:id="rId105">
             <p14:nvContentPartPr>
               <p14:cNvPr id="220" name="Ink 219">
@@ -8701,7 +9772,7 @@
             </p14:xfrm>
           </p:contentPart>
         </mc:Choice>
-        <mc:Fallback>
+        <mc:Fallback xmlns="">
           <p:pic>
             <p:nvPicPr>
               <p:cNvPr id="220" name="Ink 219">
@@ -9705,8 +10776,8 @@
           </a:p>
         </p:txBody>
       </p:sp>
-      <mc:AlternateContent xmlns:mc="http://schemas.openxmlformats.org/markup-compatibility/2006">
-        <mc:Choice xmlns:p14="http://schemas.microsoft.com/office/powerpoint/2010/main" Requires="p14">
+      <mc:AlternateContent xmlns:mc="http://schemas.openxmlformats.org/markup-compatibility/2006" xmlns:p14="http://schemas.microsoft.com/office/powerpoint/2010/main">
+        <mc:Choice Requires="p14">
           <p:contentPart p14:bwMode="auto" r:id="rId2">
             <p14:nvContentPartPr>
               <p14:cNvPr id="28" name="Ink 27">
@@ -9725,7 +10796,7 @@
             </p14:xfrm>
           </p:contentPart>
         </mc:Choice>
-        <mc:Fallback>
+        <mc:Fallback xmlns="">
           <p:pic>
             <p:nvPicPr>
               <p:cNvPr id="28" name="Ink 27">
@@ -9756,8 +10827,8 @@
           </p:pic>
         </mc:Fallback>
       </mc:AlternateContent>
-      <mc:AlternateContent xmlns:mc="http://schemas.openxmlformats.org/markup-compatibility/2006">
-        <mc:Choice xmlns:p14="http://schemas.microsoft.com/office/powerpoint/2010/main" Requires="p14">
+      <mc:AlternateContent xmlns:mc="http://schemas.openxmlformats.org/markup-compatibility/2006" xmlns:p14="http://schemas.microsoft.com/office/powerpoint/2010/main">
+        <mc:Choice Requires="p14">
           <p:contentPart p14:bwMode="auto" r:id="rId4">
             <p14:nvContentPartPr>
               <p14:cNvPr id="29" name="Ink 28">
@@ -9776,7 +10847,7 @@
             </p14:xfrm>
           </p:contentPart>
         </mc:Choice>
-        <mc:Fallback>
+        <mc:Fallback xmlns="">
           <p:pic>
             <p:nvPicPr>
               <p:cNvPr id="29" name="Ink 28">
@@ -9807,8 +10878,8 @@
           </p:pic>
         </mc:Fallback>
       </mc:AlternateContent>
-      <mc:AlternateContent xmlns:mc="http://schemas.openxmlformats.org/markup-compatibility/2006">
-        <mc:Choice xmlns:p14="http://schemas.microsoft.com/office/powerpoint/2010/main" Requires="p14">
+      <mc:AlternateContent xmlns:mc="http://schemas.openxmlformats.org/markup-compatibility/2006" xmlns:p14="http://schemas.microsoft.com/office/powerpoint/2010/main">
+        <mc:Choice Requires="p14">
           <p:contentPart p14:bwMode="auto" r:id="rId6">
             <p14:nvContentPartPr>
               <p14:cNvPr id="30" name="Ink 29">
@@ -9827,7 +10898,7 @@
             </p14:xfrm>
           </p:contentPart>
         </mc:Choice>
-        <mc:Fallback>
+        <mc:Fallback xmlns="">
           <p:pic>
             <p:nvPicPr>
               <p:cNvPr id="30" name="Ink 29">
@@ -9858,8 +10929,8 @@
           </p:pic>
         </mc:Fallback>
       </mc:AlternateContent>
-      <mc:AlternateContent xmlns:mc="http://schemas.openxmlformats.org/markup-compatibility/2006">
-        <mc:Choice xmlns:p14="http://schemas.microsoft.com/office/powerpoint/2010/main" Requires="p14">
+      <mc:AlternateContent xmlns:mc="http://schemas.openxmlformats.org/markup-compatibility/2006" xmlns:p14="http://schemas.microsoft.com/office/powerpoint/2010/main">
+        <mc:Choice Requires="p14">
           <p:contentPart p14:bwMode="auto" r:id="rId8">
             <p14:nvContentPartPr>
               <p14:cNvPr id="31" name="Ink 30">
@@ -9878,7 +10949,7 @@
             </p14:xfrm>
           </p:contentPart>
         </mc:Choice>
-        <mc:Fallback>
+        <mc:Fallback xmlns="">
           <p:pic>
             <p:nvPicPr>
               <p:cNvPr id="31" name="Ink 30">
@@ -9909,8 +10980,8 @@
           </p:pic>
         </mc:Fallback>
       </mc:AlternateContent>
-      <mc:AlternateContent xmlns:mc="http://schemas.openxmlformats.org/markup-compatibility/2006">
-        <mc:Choice xmlns:p14="http://schemas.microsoft.com/office/powerpoint/2010/main" Requires="p14">
+      <mc:AlternateContent xmlns:mc="http://schemas.openxmlformats.org/markup-compatibility/2006" xmlns:p14="http://schemas.microsoft.com/office/powerpoint/2010/main">
+        <mc:Choice Requires="p14">
           <p:contentPart p14:bwMode="auto" r:id="rId10">
             <p14:nvContentPartPr>
               <p14:cNvPr id="38" name="Ink 37">
@@ -9929,7 +11000,7 @@
             </p14:xfrm>
           </p:contentPart>
         </mc:Choice>
-        <mc:Fallback>
+        <mc:Fallback xmlns="">
           <p:pic>
             <p:nvPicPr>
               <p:cNvPr id="38" name="Ink 37">
@@ -9960,8 +11031,8 @@
           </p:pic>
         </mc:Fallback>
       </mc:AlternateContent>
-      <mc:AlternateContent xmlns:mc="http://schemas.openxmlformats.org/markup-compatibility/2006">
-        <mc:Choice xmlns:p14="http://schemas.microsoft.com/office/powerpoint/2010/main" Requires="p14">
+      <mc:AlternateContent xmlns:mc="http://schemas.openxmlformats.org/markup-compatibility/2006" xmlns:p14="http://schemas.microsoft.com/office/powerpoint/2010/main">
+        <mc:Choice Requires="p14">
           <p:contentPart p14:bwMode="auto" r:id="rId12">
             <p14:nvContentPartPr>
               <p14:cNvPr id="41" name="Ink 40">
@@ -9980,7 +11051,7 @@
             </p14:xfrm>
           </p:contentPart>
         </mc:Choice>
-        <mc:Fallback>
+        <mc:Fallback xmlns="">
           <p:pic>
             <p:nvPicPr>
               <p:cNvPr id="41" name="Ink 40">
@@ -10011,8 +11082,8 @@
           </p:pic>
         </mc:Fallback>
       </mc:AlternateContent>
-      <mc:AlternateContent xmlns:mc="http://schemas.openxmlformats.org/markup-compatibility/2006">
-        <mc:Choice xmlns:p14="http://schemas.microsoft.com/office/powerpoint/2010/main" Requires="p14">
+      <mc:AlternateContent xmlns:mc="http://schemas.openxmlformats.org/markup-compatibility/2006" xmlns:p14="http://schemas.microsoft.com/office/powerpoint/2010/main">
+        <mc:Choice Requires="p14">
           <p:contentPart p14:bwMode="auto" r:id="rId14">
             <p14:nvContentPartPr>
               <p14:cNvPr id="43" name="Ink 42">
@@ -10031,7 +11102,7 @@
             </p14:xfrm>
           </p:contentPart>
         </mc:Choice>
-        <mc:Fallback>
+        <mc:Fallback xmlns="">
           <p:pic>
             <p:nvPicPr>
               <p:cNvPr id="43" name="Ink 42">
@@ -10200,8 +11271,8 @@
           </a:p>
         </p:txBody>
       </p:sp>
-      <mc:AlternateContent xmlns:mc="http://schemas.openxmlformats.org/markup-compatibility/2006">
-        <mc:Choice xmlns:p14="http://schemas.microsoft.com/office/powerpoint/2010/main" Requires="p14">
+      <mc:AlternateContent xmlns:mc="http://schemas.openxmlformats.org/markup-compatibility/2006" xmlns:p14="http://schemas.microsoft.com/office/powerpoint/2010/main">
+        <mc:Choice Requires="p14">
           <p:contentPart p14:bwMode="auto" r:id="rId16">
             <p14:nvContentPartPr>
               <p14:cNvPr id="73" name="Ink 72">
@@ -10220,7 +11291,7 @@
             </p14:xfrm>
           </p:contentPart>
         </mc:Choice>
-        <mc:Fallback>
+        <mc:Fallback xmlns="">
           <p:pic>
             <p:nvPicPr>
               <p:cNvPr id="73" name="Ink 72">
@@ -10281,8 +11352,8 @@
           <a:chExt cx="0" cy="0"/>
         </a:xfrm>
       </p:grpSpPr>
-      <mc:AlternateContent xmlns:mc="http://schemas.openxmlformats.org/markup-compatibility/2006">
-        <mc:Choice xmlns:p14="http://schemas.microsoft.com/office/powerpoint/2010/main" Requires="p14">
+      <mc:AlternateContent xmlns:mc="http://schemas.openxmlformats.org/markup-compatibility/2006" xmlns:p14="http://schemas.microsoft.com/office/powerpoint/2010/main">
+        <mc:Choice Requires="p14">
           <p:contentPart p14:bwMode="auto" r:id="rId2">
             <p14:nvContentPartPr>
               <p14:cNvPr id="324" name="Ink 323">
@@ -10301,7 +11372,7 @@
             </p14:xfrm>
           </p:contentPart>
         </mc:Choice>
-        <mc:Fallback>
+        <mc:Fallback xmlns="">
           <p:pic>
             <p:nvPicPr>
               <p:cNvPr id="324" name="Ink 323">
@@ -10362,8 +11433,8 @@
           <a:chExt cx="0" cy="0"/>
         </a:xfrm>
       </p:grpSpPr>
-      <mc:AlternateContent xmlns:mc="http://schemas.openxmlformats.org/markup-compatibility/2006">
-        <mc:Choice xmlns:p14="http://schemas.microsoft.com/office/powerpoint/2010/main" Requires="p14">
+      <mc:AlternateContent xmlns:mc="http://schemas.openxmlformats.org/markup-compatibility/2006" xmlns:p14="http://schemas.microsoft.com/office/powerpoint/2010/main">
+        <mc:Choice Requires="p14">
           <p:contentPart p14:bwMode="auto" r:id="rId2">
             <p14:nvContentPartPr>
               <p14:cNvPr id="9" name="Ink 8">
@@ -10382,7 +11453,7 @@
             </p14:xfrm>
           </p:contentPart>
         </mc:Choice>
-        <mc:Fallback>
+        <mc:Fallback xmlns="">
           <p:pic>
             <p:nvPicPr>
               <p:cNvPr id="9" name="Ink 8">
@@ -10413,8 +11484,8 @@
           </p:pic>
         </mc:Fallback>
       </mc:AlternateContent>
-      <mc:AlternateContent xmlns:mc="http://schemas.openxmlformats.org/markup-compatibility/2006">
-        <mc:Choice xmlns:p14="http://schemas.microsoft.com/office/powerpoint/2010/main" Requires="p14">
+      <mc:AlternateContent xmlns:mc="http://schemas.openxmlformats.org/markup-compatibility/2006" xmlns:p14="http://schemas.microsoft.com/office/powerpoint/2010/main">
+        <mc:Choice Requires="p14">
           <p:contentPart p14:bwMode="auto" r:id="rId4">
             <p14:nvContentPartPr>
               <p14:cNvPr id="27" name="Ink 26">
@@ -10433,7 +11504,7 @@
             </p14:xfrm>
           </p:contentPart>
         </mc:Choice>
-        <mc:Fallback>
+        <mc:Fallback xmlns="">
           <p:pic>
             <p:nvPicPr>
               <p:cNvPr id="27" name="Ink 26">
@@ -10464,8 +11535,8 @@
           </p:pic>
         </mc:Fallback>
       </mc:AlternateContent>
-      <mc:AlternateContent xmlns:mc="http://schemas.openxmlformats.org/markup-compatibility/2006">
-        <mc:Choice xmlns:p14="http://schemas.microsoft.com/office/powerpoint/2010/main" Requires="p14">
+      <mc:AlternateContent xmlns:mc="http://schemas.openxmlformats.org/markup-compatibility/2006" xmlns:p14="http://schemas.microsoft.com/office/powerpoint/2010/main">
+        <mc:Choice Requires="p14">
           <p:contentPart p14:bwMode="auto" r:id="rId6">
             <p14:nvContentPartPr>
               <p14:cNvPr id="35" name="Ink 34">
@@ -10484,7 +11555,7 @@
             </p14:xfrm>
           </p:contentPart>
         </mc:Choice>
-        <mc:Fallback>
+        <mc:Fallback xmlns="">
           <p:pic>
             <p:nvPicPr>
               <p:cNvPr id="35" name="Ink 34">
@@ -10515,8 +11586,8 @@
           </p:pic>
         </mc:Fallback>
       </mc:AlternateContent>
-      <mc:AlternateContent xmlns:mc="http://schemas.openxmlformats.org/markup-compatibility/2006">
-        <mc:Choice xmlns:p14="http://schemas.microsoft.com/office/powerpoint/2010/main" Requires="p14">
+      <mc:AlternateContent xmlns:mc="http://schemas.openxmlformats.org/markup-compatibility/2006" xmlns:p14="http://schemas.microsoft.com/office/powerpoint/2010/main">
+        <mc:Choice Requires="p14">
           <p:contentPart p14:bwMode="auto" r:id="rId8">
             <p14:nvContentPartPr>
               <p14:cNvPr id="71" name="Ink 70">
@@ -10535,7 +11606,7 @@
             </p14:xfrm>
           </p:contentPart>
         </mc:Choice>
-        <mc:Fallback>
+        <mc:Fallback xmlns="">
           <p:pic>
             <p:nvPicPr>
               <p:cNvPr id="71" name="Ink 70">
@@ -10566,8 +11637,8 @@
           </p:pic>
         </mc:Fallback>
       </mc:AlternateContent>
-      <mc:AlternateContent xmlns:mc="http://schemas.openxmlformats.org/markup-compatibility/2006">
-        <mc:Choice xmlns:p14="http://schemas.microsoft.com/office/powerpoint/2010/main" Requires="p14">
+      <mc:AlternateContent xmlns:mc="http://schemas.openxmlformats.org/markup-compatibility/2006" xmlns:p14="http://schemas.microsoft.com/office/powerpoint/2010/main">
+        <mc:Choice Requires="p14">
           <p:contentPart p14:bwMode="auto" r:id="rId10">
             <p14:nvContentPartPr>
               <p14:cNvPr id="131" name="Ink 130">
@@ -10586,7 +11657,7 @@
             </p14:xfrm>
           </p:contentPart>
         </mc:Choice>
-        <mc:Fallback>
+        <mc:Fallback xmlns="">
           <p:pic>
             <p:nvPicPr>
               <p:cNvPr id="131" name="Ink 130">
@@ -10647,6 +11718,1740 @@
           <a:chExt cx="0" cy="0"/>
         </a:xfrm>
       </p:grpSpPr>
+      <mc:AlternateContent xmlns:mc="http://schemas.openxmlformats.org/markup-compatibility/2006">
+        <mc:Choice xmlns:p14="http://schemas.microsoft.com/office/powerpoint/2010/main" Requires="p14">
+          <p:contentPart p14:bwMode="auto" r:id="rId2">
+            <p14:nvContentPartPr>
+              <p14:cNvPr id="2" name="Ink 1">
+                <a:extLst>
+                  <a:ext uri="{FF2B5EF4-FFF2-40B4-BE49-F238E27FC236}">
+                    <a16:creationId xmlns:a16="http://schemas.microsoft.com/office/drawing/2014/main" id="{CEEEDDBD-0850-4913-93BF-C46D69340B81}"/>
+                  </a:ext>
+                </a:extLst>
+              </p14:cNvPr>
+              <p14:cNvContentPartPr/>
+              <p14:nvPr/>
+            </p14:nvContentPartPr>
+            <p14:xfrm>
+              <a:off x="1828912" y="495986"/>
+              <a:ext cx="233280" cy="214560"/>
+            </p14:xfrm>
+          </p:contentPart>
+        </mc:Choice>
+        <mc:Fallback>
+          <p:pic>
+            <p:nvPicPr>
+              <p:cNvPr id="2" name="Ink 1">
+                <a:extLst>
+                  <a:ext uri="{FF2B5EF4-FFF2-40B4-BE49-F238E27FC236}">
+                    <a16:creationId xmlns:a16="http://schemas.microsoft.com/office/drawing/2014/main" id="{CEEEDDBD-0850-4913-93BF-C46D69340B81}"/>
+                  </a:ext>
+                </a:extLst>
+              </p:cNvPr>
+              <p:cNvPicPr/>
+              <p:nvPr/>
+            </p:nvPicPr>
+            <p:blipFill>
+              <a:blip r:embed="rId3"/>
+              <a:stretch>
+                <a:fillRect/>
+              </a:stretch>
+            </p:blipFill>
+            <p:spPr>
+              <a:xfrm>
+                <a:off x="1819912" y="486986"/>
+                <a:ext cx="250920" cy="232200"/>
+              </a:xfrm>
+              <a:prstGeom prst="rect">
+                <a:avLst/>
+              </a:prstGeom>
+            </p:spPr>
+          </p:pic>
+        </mc:Fallback>
+      </mc:AlternateContent>
+      <mc:AlternateContent xmlns:mc="http://schemas.openxmlformats.org/markup-compatibility/2006">
+        <mc:Choice xmlns:p14="http://schemas.microsoft.com/office/powerpoint/2010/main" Requires="p14">
+          <p:contentPart p14:bwMode="auto" r:id="rId4">
+            <p14:nvContentPartPr>
+              <p14:cNvPr id="6" name="Ink 5">
+                <a:extLst>
+                  <a:ext uri="{FF2B5EF4-FFF2-40B4-BE49-F238E27FC236}">
+                    <a16:creationId xmlns:a16="http://schemas.microsoft.com/office/drawing/2014/main" id="{21CD2AF1-6159-4928-82FB-07B65AE4F68F}"/>
+                  </a:ext>
+                </a:extLst>
+              </p14:cNvPr>
+              <p14:cNvContentPartPr/>
+              <p14:nvPr/>
+            </p14:nvContentPartPr>
+            <p14:xfrm>
+              <a:off x="2166232" y="433706"/>
+              <a:ext cx="390960" cy="232560"/>
+            </p14:xfrm>
+          </p:contentPart>
+        </mc:Choice>
+        <mc:Fallback>
+          <p:pic>
+            <p:nvPicPr>
+              <p:cNvPr id="6" name="Ink 5">
+                <a:extLst>
+                  <a:ext uri="{FF2B5EF4-FFF2-40B4-BE49-F238E27FC236}">
+                    <a16:creationId xmlns:a16="http://schemas.microsoft.com/office/drawing/2014/main" id="{21CD2AF1-6159-4928-82FB-07B65AE4F68F}"/>
+                  </a:ext>
+                </a:extLst>
+              </p:cNvPr>
+              <p:cNvPicPr/>
+              <p:nvPr/>
+            </p:nvPicPr>
+            <p:blipFill>
+              <a:blip r:embed="rId5"/>
+              <a:stretch>
+                <a:fillRect/>
+              </a:stretch>
+            </p:blipFill>
+            <p:spPr>
+              <a:xfrm>
+                <a:off x="2157232" y="424706"/>
+                <a:ext cx="408600" cy="250200"/>
+              </a:xfrm>
+              <a:prstGeom prst="rect">
+                <a:avLst/>
+              </a:prstGeom>
+            </p:spPr>
+          </p:pic>
+        </mc:Fallback>
+      </mc:AlternateContent>
+      <mc:AlternateContent xmlns:mc="http://schemas.openxmlformats.org/markup-compatibility/2006">
+        <mc:Choice xmlns:p14="http://schemas.microsoft.com/office/powerpoint/2010/main" Requires="p14">
+          <p:contentPart p14:bwMode="auto" r:id="rId6">
+            <p14:nvContentPartPr>
+              <p14:cNvPr id="9" name="Ink 8">
+                <a:extLst>
+                  <a:ext uri="{FF2B5EF4-FFF2-40B4-BE49-F238E27FC236}">
+                    <a16:creationId xmlns:a16="http://schemas.microsoft.com/office/drawing/2014/main" id="{9F8E1FAD-2CAA-4546-893E-D0A9E7B8238B}"/>
+                  </a:ext>
+                </a:extLst>
+              </p14:cNvPr>
+              <p14:cNvContentPartPr/>
+              <p14:nvPr/>
+            </p14:nvContentPartPr>
+            <p14:xfrm>
+              <a:off x="1890832" y="1047506"/>
+              <a:ext cx="45000" cy="240120"/>
+            </p14:xfrm>
+          </p:contentPart>
+        </mc:Choice>
+        <mc:Fallback>
+          <p:pic>
+            <p:nvPicPr>
+              <p:cNvPr id="9" name="Ink 8">
+                <a:extLst>
+                  <a:ext uri="{FF2B5EF4-FFF2-40B4-BE49-F238E27FC236}">
+                    <a16:creationId xmlns:a16="http://schemas.microsoft.com/office/drawing/2014/main" id="{9F8E1FAD-2CAA-4546-893E-D0A9E7B8238B}"/>
+                  </a:ext>
+                </a:extLst>
+              </p:cNvPr>
+              <p:cNvPicPr/>
+              <p:nvPr/>
+            </p:nvPicPr>
+            <p:blipFill>
+              <a:blip r:embed="rId7"/>
+              <a:stretch>
+                <a:fillRect/>
+              </a:stretch>
+            </p:blipFill>
+            <p:spPr>
+              <a:xfrm>
+                <a:off x="1881832" y="1038506"/>
+                <a:ext cx="62640" cy="257760"/>
+              </a:xfrm>
+              <a:prstGeom prst="rect">
+                <a:avLst/>
+              </a:prstGeom>
+            </p:spPr>
+          </p:pic>
+        </mc:Fallback>
+      </mc:AlternateContent>
+      <mc:AlternateContent xmlns:mc="http://schemas.openxmlformats.org/markup-compatibility/2006">
+        <mc:Choice xmlns:p14="http://schemas.microsoft.com/office/powerpoint/2010/main" Requires="p14">
+          <p:contentPart p14:bwMode="auto" r:id="rId8">
+            <p14:nvContentPartPr>
+              <p14:cNvPr id="12" name="Ink 11">
+                <a:extLst>
+                  <a:ext uri="{FF2B5EF4-FFF2-40B4-BE49-F238E27FC236}">
+                    <a16:creationId xmlns:a16="http://schemas.microsoft.com/office/drawing/2014/main" id="{D250965E-AD2A-40AA-87B9-9F63F13A7F30}"/>
+                  </a:ext>
+                </a:extLst>
+              </p14:cNvPr>
+              <p14:cNvContentPartPr/>
+              <p14:nvPr/>
+            </p14:nvContentPartPr>
+            <p14:xfrm>
+              <a:off x="3187192" y="1012226"/>
+              <a:ext cx="142200" cy="134640"/>
+            </p14:xfrm>
+          </p:contentPart>
+        </mc:Choice>
+        <mc:Fallback>
+          <p:pic>
+            <p:nvPicPr>
+              <p:cNvPr id="12" name="Ink 11">
+                <a:extLst>
+                  <a:ext uri="{FF2B5EF4-FFF2-40B4-BE49-F238E27FC236}">
+                    <a16:creationId xmlns:a16="http://schemas.microsoft.com/office/drawing/2014/main" id="{D250965E-AD2A-40AA-87B9-9F63F13A7F30}"/>
+                  </a:ext>
+                </a:extLst>
+              </p:cNvPr>
+              <p:cNvPicPr/>
+              <p:nvPr/>
+            </p:nvPicPr>
+            <p:blipFill>
+              <a:blip r:embed="rId9"/>
+              <a:stretch>
+                <a:fillRect/>
+              </a:stretch>
+            </p:blipFill>
+            <p:spPr>
+              <a:xfrm>
+                <a:off x="3178192" y="1003226"/>
+                <a:ext cx="159840" cy="152280"/>
+              </a:xfrm>
+              <a:prstGeom prst="rect">
+                <a:avLst/>
+              </a:prstGeom>
+            </p:spPr>
+          </p:pic>
+        </mc:Fallback>
+      </mc:AlternateContent>
+      <mc:AlternateContent xmlns:mc="http://schemas.openxmlformats.org/markup-compatibility/2006">
+        <mc:Choice xmlns:p14="http://schemas.microsoft.com/office/powerpoint/2010/main" Requires="p14">
+          <p:contentPart p14:bwMode="auto" r:id="rId10">
+            <p14:nvContentPartPr>
+              <p14:cNvPr id="13" name="Ink 12">
+                <a:extLst>
+                  <a:ext uri="{FF2B5EF4-FFF2-40B4-BE49-F238E27FC236}">
+                    <a16:creationId xmlns:a16="http://schemas.microsoft.com/office/drawing/2014/main" id="{AE8CE40F-8311-4896-BBDC-C3F92B6E5AED}"/>
+                  </a:ext>
+                </a:extLst>
+              </p14:cNvPr>
+              <p14:cNvContentPartPr/>
+              <p14:nvPr/>
+            </p14:nvContentPartPr>
+            <p14:xfrm>
+              <a:off x="1935472" y="1420106"/>
+              <a:ext cx="248760" cy="151920"/>
+            </p14:xfrm>
+          </p:contentPart>
+        </mc:Choice>
+        <mc:Fallback>
+          <p:pic>
+            <p:nvPicPr>
+              <p:cNvPr id="13" name="Ink 12">
+                <a:extLst>
+                  <a:ext uri="{FF2B5EF4-FFF2-40B4-BE49-F238E27FC236}">
+                    <a16:creationId xmlns:a16="http://schemas.microsoft.com/office/drawing/2014/main" id="{AE8CE40F-8311-4896-BBDC-C3F92B6E5AED}"/>
+                  </a:ext>
+                </a:extLst>
+              </p:cNvPr>
+              <p:cNvPicPr/>
+              <p:nvPr/>
+            </p:nvPicPr>
+            <p:blipFill>
+              <a:blip r:embed="rId11"/>
+              <a:stretch>
+                <a:fillRect/>
+              </a:stretch>
+            </p:blipFill>
+            <p:spPr>
+              <a:xfrm>
+                <a:off x="1926472" y="1411106"/>
+                <a:ext cx="266400" cy="169560"/>
+              </a:xfrm>
+              <a:prstGeom prst="rect">
+                <a:avLst/>
+              </a:prstGeom>
+            </p:spPr>
+          </p:pic>
+        </mc:Fallback>
+      </mc:AlternateContent>
+      <mc:AlternateContent xmlns:mc="http://schemas.openxmlformats.org/markup-compatibility/2006">
+        <mc:Choice xmlns:p14="http://schemas.microsoft.com/office/powerpoint/2010/main" Requires="p14">
+          <p:contentPart p14:bwMode="auto" r:id="rId12">
+            <p14:nvContentPartPr>
+              <p14:cNvPr id="14" name="Ink 13">
+                <a:extLst>
+                  <a:ext uri="{FF2B5EF4-FFF2-40B4-BE49-F238E27FC236}">
+                    <a16:creationId xmlns:a16="http://schemas.microsoft.com/office/drawing/2014/main" id="{0C82104F-C92C-4C5F-9413-A66A8785DB96}"/>
+                  </a:ext>
+                </a:extLst>
+              </p14:cNvPr>
+              <p14:cNvContentPartPr/>
+              <p14:nvPr/>
+            </p14:nvContentPartPr>
+            <p14:xfrm>
+              <a:off x="2920072" y="1000706"/>
+              <a:ext cx="169920" cy="162720"/>
+            </p14:xfrm>
+          </p:contentPart>
+        </mc:Choice>
+        <mc:Fallback>
+          <p:pic>
+            <p:nvPicPr>
+              <p:cNvPr id="14" name="Ink 13">
+                <a:extLst>
+                  <a:ext uri="{FF2B5EF4-FFF2-40B4-BE49-F238E27FC236}">
+                    <a16:creationId xmlns:a16="http://schemas.microsoft.com/office/drawing/2014/main" id="{0C82104F-C92C-4C5F-9413-A66A8785DB96}"/>
+                  </a:ext>
+                </a:extLst>
+              </p:cNvPr>
+              <p:cNvPicPr/>
+              <p:nvPr/>
+            </p:nvPicPr>
+            <p:blipFill>
+              <a:blip r:embed="rId13"/>
+              <a:stretch>
+                <a:fillRect/>
+              </a:stretch>
+            </p:blipFill>
+            <p:spPr>
+              <a:xfrm>
+                <a:off x="2911072" y="991706"/>
+                <a:ext cx="187560" cy="180360"/>
+              </a:xfrm>
+              <a:prstGeom prst="rect">
+                <a:avLst/>
+              </a:prstGeom>
+            </p:spPr>
+          </p:pic>
+        </mc:Fallback>
+      </mc:AlternateContent>
+      <mc:AlternateContent xmlns:mc="http://schemas.openxmlformats.org/markup-compatibility/2006">
+        <mc:Choice xmlns:p14="http://schemas.microsoft.com/office/powerpoint/2010/main" Requires="p14">
+          <p:contentPart p14:bwMode="auto" r:id="rId14">
+            <p14:nvContentPartPr>
+              <p14:cNvPr id="15" name="Ink 14">
+                <a:extLst>
+                  <a:ext uri="{FF2B5EF4-FFF2-40B4-BE49-F238E27FC236}">
+                    <a16:creationId xmlns:a16="http://schemas.microsoft.com/office/drawing/2014/main" id="{05B48CC2-6C03-41A0-A532-C6501F3BF300}"/>
+                  </a:ext>
+                </a:extLst>
+              </p14:cNvPr>
+              <p14:cNvContentPartPr/>
+              <p14:nvPr/>
+            </p14:nvContentPartPr>
+            <p14:xfrm>
+              <a:off x="2920792" y="1353146"/>
+              <a:ext cx="53640" cy="174240"/>
+            </p14:xfrm>
+          </p:contentPart>
+        </mc:Choice>
+        <mc:Fallback>
+          <p:pic>
+            <p:nvPicPr>
+              <p:cNvPr id="15" name="Ink 14">
+                <a:extLst>
+                  <a:ext uri="{FF2B5EF4-FFF2-40B4-BE49-F238E27FC236}">
+                    <a16:creationId xmlns:a16="http://schemas.microsoft.com/office/drawing/2014/main" id="{05B48CC2-6C03-41A0-A532-C6501F3BF300}"/>
+                  </a:ext>
+                </a:extLst>
+              </p:cNvPr>
+              <p:cNvPicPr/>
+              <p:nvPr/>
+            </p:nvPicPr>
+            <p:blipFill>
+              <a:blip r:embed="rId15"/>
+              <a:stretch>
+                <a:fillRect/>
+              </a:stretch>
+            </p:blipFill>
+            <p:spPr>
+              <a:xfrm>
+                <a:off x="2911792" y="1344146"/>
+                <a:ext cx="71280" cy="191880"/>
+              </a:xfrm>
+              <a:prstGeom prst="rect">
+                <a:avLst/>
+              </a:prstGeom>
+            </p:spPr>
+          </p:pic>
+        </mc:Fallback>
+      </mc:AlternateContent>
+      <mc:AlternateContent xmlns:mc="http://schemas.openxmlformats.org/markup-compatibility/2006">
+        <mc:Choice xmlns:p14="http://schemas.microsoft.com/office/powerpoint/2010/main" Requires="p14">
+          <p:contentPart p14:bwMode="auto" r:id="rId16">
+            <p14:nvContentPartPr>
+              <p14:cNvPr id="18" name="Ink 17">
+                <a:extLst>
+                  <a:ext uri="{FF2B5EF4-FFF2-40B4-BE49-F238E27FC236}">
+                    <a16:creationId xmlns:a16="http://schemas.microsoft.com/office/drawing/2014/main" id="{9434A566-2CDF-4BDF-ABEB-F8783ECDE4C4}"/>
+                  </a:ext>
+                </a:extLst>
+              </p14:cNvPr>
+              <p14:cNvContentPartPr/>
+              <p14:nvPr/>
+            </p14:nvContentPartPr>
+            <p14:xfrm>
+              <a:off x="3062632" y="1348466"/>
+              <a:ext cx="330120" cy="169920"/>
+            </p14:xfrm>
+          </p:contentPart>
+        </mc:Choice>
+        <mc:Fallback>
+          <p:pic>
+            <p:nvPicPr>
+              <p:cNvPr id="18" name="Ink 17">
+                <a:extLst>
+                  <a:ext uri="{FF2B5EF4-FFF2-40B4-BE49-F238E27FC236}">
+                    <a16:creationId xmlns:a16="http://schemas.microsoft.com/office/drawing/2014/main" id="{9434A566-2CDF-4BDF-ABEB-F8783ECDE4C4}"/>
+                  </a:ext>
+                </a:extLst>
+              </p:cNvPr>
+              <p:cNvPicPr/>
+              <p:nvPr/>
+            </p:nvPicPr>
+            <p:blipFill>
+              <a:blip r:embed="rId17"/>
+              <a:stretch>
+                <a:fillRect/>
+              </a:stretch>
+            </p:blipFill>
+            <p:spPr>
+              <a:xfrm>
+                <a:off x="3053632" y="1339466"/>
+                <a:ext cx="347760" cy="187560"/>
+              </a:xfrm>
+              <a:prstGeom prst="rect">
+                <a:avLst/>
+              </a:prstGeom>
+            </p:spPr>
+          </p:pic>
+        </mc:Fallback>
+      </mc:AlternateContent>
+      <mc:AlternateContent xmlns:mc="http://schemas.openxmlformats.org/markup-compatibility/2006">
+        <mc:Choice xmlns:p14="http://schemas.microsoft.com/office/powerpoint/2010/main" Requires="p14">
+          <p:contentPart p14:bwMode="auto" r:id="rId18">
+            <p14:nvContentPartPr>
+              <p14:cNvPr id="19" name="Ink 18">
+                <a:extLst>
+                  <a:ext uri="{FF2B5EF4-FFF2-40B4-BE49-F238E27FC236}">
+                    <a16:creationId xmlns:a16="http://schemas.microsoft.com/office/drawing/2014/main" id="{FAEB8044-99FD-4409-A7FE-2D55C4ADDFDE}"/>
+                  </a:ext>
+                </a:extLst>
+              </p14:cNvPr>
+              <p14:cNvContentPartPr/>
+              <p14:nvPr/>
+            </p14:nvContentPartPr>
+            <p14:xfrm>
+              <a:off x="1908832" y="1746266"/>
+              <a:ext cx="222120" cy="207360"/>
+            </p14:xfrm>
+          </p:contentPart>
+        </mc:Choice>
+        <mc:Fallback>
+          <p:pic>
+            <p:nvPicPr>
+              <p:cNvPr id="19" name="Ink 18">
+                <a:extLst>
+                  <a:ext uri="{FF2B5EF4-FFF2-40B4-BE49-F238E27FC236}">
+                    <a16:creationId xmlns:a16="http://schemas.microsoft.com/office/drawing/2014/main" id="{FAEB8044-99FD-4409-A7FE-2D55C4ADDFDE}"/>
+                  </a:ext>
+                </a:extLst>
+              </p:cNvPr>
+              <p:cNvPicPr/>
+              <p:nvPr/>
+            </p:nvPicPr>
+            <p:blipFill>
+              <a:blip r:embed="rId19"/>
+              <a:stretch>
+                <a:fillRect/>
+              </a:stretch>
+            </p:blipFill>
+            <p:spPr>
+              <a:xfrm>
+                <a:off x="1899832" y="1737266"/>
+                <a:ext cx="239760" cy="225000"/>
+              </a:xfrm>
+              <a:prstGeom prst="rect">
+                <a:avLst/>
+              </a:prstGeom>
+            </p:spPr>
+          </p:pic>
+        </mc:Fallback>
+      </mc:AlternateContent>
+      <mc:AlternateContent xmlns:mc="http://schemas.openxmlformats.org/markup-compatibility/2006">
+        <mc:Choice xmlns:p14="http://schemas.microsoft.com/office/powerpoint/2010/main" Requires="p14">
+          <p:contentPart p14:bwMode="auto" r:id="rId20">
+            <p14:nvContentPartPr>
+              <p14:cNvPr id="23" name="Ink 22">
+                <a:extLst>
+                  <a:ext uri="{FF2B5EF4-FFF2-40B4-BE49-F238E27FC236}">
+                    <a16:creationId xmlns:a16="http://schemas.microsoft.com/office/drawing/2014/main" id="{00B765F7-7AC7-4AE2-96E7-E428FED2464E}"/>
+                  </a:ext>
+                </a:extLst>
+              </p14:cNvPr>
+              <p14:cNvContentPartPr/>
+              <p14:nvPr/>
+            </p14:nvContentPartPr>
+            <p14:xfrm>
+              <a:off x="2956432" y="1686866"/>
+              <a:ext cx="515160" cy="168840"/>
+            </p14:xfrm>
+          </p:contentPart>
+        </mc:Choice>
+        <mc:Fallback>
+          <p:pic>
+            <p:nvPicPr>
+              <p:cNvPr id="23" name="Ink 22">
+                <a:extLst>
+                  <a:ext uri="{FF2B5EF4-FFF2-40B4-BE49-F238E27FC236}">
+                    <a16:creationId xmlns:a16="http://schemas.microsoft.com/office/drawing/2014/main" id="{00B765F7-7AC7-4AE2-96E7-E428FED2464E}"/>
+                  </a:ext>
+                </a:extLst>
+              </p:cNvPr>
+              <p:cNvPicPr/>
+              <p:nvPr/>
+            </p:nvPicPr>
+            <p:blipFill>
+              <a:blip r:embed="rId21"/>
+              <a:stretch>
+                <a:fillRect/>
+              </a:stretch>
+            </p:blipFill>
+            <p:spPr>
+              <a:xfrm>
+                <a:off x="2947432" y="1677866"/>
+                <a:ext cx="532800" cy="186480"/>
+              </a:xfrm>
+              <a:prstGeom prst="rect">
+                <a:avLst/>
+              </a:prstGeom>
+            </p:spPr>
+          </p:pic>
+        </mc:Fallback>
+      </mc:AlternateContent>
+      <mc:AlternateContent xmlns:mc="http://schemas.openxmlformats.org/markup-compatibility/2006">
+        <mc:Choice xmlns:p14="http://schemas.microsoft.com/office/powerpoint/2010/main" Requires="p14">
+          <p:contentPart p14:bwMode="auto" r:id="rId22">
+            <p14:nvContentPartPr>
+              <p14:cNvPr id="44" name="Ink 43">
+                <a:extLst>
+                  <a:ext uri="{FF2B5EF4-FFF2-40B4-BE49-F238E27FC236}">
+                    <a16:creationId xmlns:a16="http://schemas.microsoft.com/office/drawing/2014/main" id="{D1A2BBC9-2D22-432D-B463-DCAC46D98FF8}"/>
+                  </a:ext>
+                </a:extLst>
+              </p14:cNvPr>
+              <p14:cNvContentPartPr/>
+              <p14:nvPr/>
+            </p14:nvContentPartPr>
+            <p14:xfrm>
+              <a:off x="5220112" y="1047506"/>
+              <a:ext cx="1047960" cy="355680"/>
+            </p14:xfrm>
+          </p:contentPart>
+        </mc:Choice>
+        <mc:Fallback>
+          <p:pic>
+            <p:nvPicPr>
+              <p:cNvPr id="44" name="Ink 43">
+                <a:extLst>
+                  <a:ext uri="{FF2B5EF4-FFF2-40B4-BE49-F238E27FC236}">
+                    <a16:creationId xmlns:a16="http://schemas.microsoft.com/office/drawing/2014/main" id="{D1A2BBC9-2D22-432D-B463-DCAC46D98FF8}"/>
+                  </a:ext>
+                </a:extLst>
+              </p:cNvPr>
+              <p:cNvPicPr/>
+              <p:nvPr/>
+            </p:nvPicPr>
+            <p:blipFill>
+              <a:blip r:embed="rId23"/>
+              <a:stretch>
+                <a:fillRect/>
+              </a:stretch>
+            </p:blipFill>
+            <p:spPr>
+              <a:xfrm>
+                <a:off x="5211112" y="1038506"/>
+                <a:ext cx="1065600" cy="373320"/>
+              </a:xfrm>
+              <a:prstGeom prst="rect">
+                <a:avLst/>
+              </a:prstGeom>
+            </p:spPr>
+          </p:pic>
+        </mc:Fallback>
+      </mc:AlternateContent>
+      <mc:AlternateContent xmlns:mc="http://schemas.openxmlformats.org/markup-compatibility/2006">
+        <mc:Choice xmlns:p14="http://schemas.microsoft.com/office/powerpoint/2010/main" Requires="p14">
+          <p:contentPart p14:bwMode="auto" r:id="rId24">
+            <p14:nvContentPartPr>
+              <p14:cNvPr id="45" name="Ink 44">
+                <a:extLst>
+                  <a:ext uri="{FF2B5EF4-FFF2-40B4-BE49-F238E27FC236}">
+                    <a16:creationId xmlns:a16="http://schemas.microsoft.com/office/drawing/2014/main" id="{053767B0-8D9D-423E-9C76-E28A02E74795}"/>
+                  </a:ext>
+                </a:extLst>
+              </p14:cNvPr>
+              <p14:cNvContentPartPr/>
+              <p14:nvPr/>
+            </p14:nvContentPartPr>
+            <p14:xfrm>
+              <a:off x="4252432" y="1509026"/>
+              <a:ext cx="2324520" cy="408960"/>
+            </p14:xfrm>
+          </p:contentPart>
+        </mc:Choice>
+        <mc:Fallback>
+          <p:pic>
+            <p:nvPicPr>
+              <p:cNvPr id="45" name="Ink 44">
+                <a:extLst>
+                  <a:ext uri="{FF2B5EF4-FFF2-40B4-BE49-F238E27FC236}">
+                    <a16:creationId xmlns:a16="http://schemas.microsoft.com/office/drawing/2014/main" id="{053767B0-8D9D-423E-9C76-E28A02E74795}"/>
+                  </a:ext>
+                </a:extLst>
+              </p:cNvPr>
+              <p:cNvPicPr/>
+              <p:nvPr/>
+            </p:nvPicPr>
+            <p:blipFill>
+              <a:blip r:embed="rId25"/>
+              <a:stretch>
+                <a:fillRect/>
+              </a:stretch>
+            </p:blipFill>
+            <p:spPr>
+              <a:xfrm>
+                <a:off x="4243432" y="1500026"/>
+                <a:ext cx="2342160" cy="426600"/>
+              </a:xfrm>
+              <a:prstGeom prst="rect">
+                <a:avLst/>
+              </a:prstGeom>
+            </p:spPr>
+          </p:pic>
+        </mc:Fallback>
+      </mc:AlternateContent>
+      <mc:AlternateContent xmlns:mc="http://schemas.openxmlformats.org/markup-compatibility/2006">
+        <mc:Choice xmlns:p14="http://schemas.microsoft.com/office/powerpoint/2010/main" Requires="p14">
+          <p:contentPart p14:bwMode="auto" r:id="rId26">
+            <p14:nvContentPartPr>
+              <p14:cNvPr id="58" name="Ink 57">
+                <a:extLst>
+                  <a:ext uri="{FF2B5EF4-FFF2-40B4-BE49-F238E27FC236}">
+                    <a16:creationId xmlns:a16="http://schemas.microsoft.com/office/drawing/2014/main" id="{1072887D-F171-4A9D-8789-953481A5E5CC}"/>
+                  </a:ext>
+                </a:extLst>
+              </p14:cNvPr>
+              <p14:cNvContentPartPr/>
+              <p14:nvPr/>
+            </p14:nvContentPartPr>
+            <p14:xfrm>
+              <a:off x="8051872" y="861026"/>
+              <a:ext cx="62640" cy="178200"/>
+            </p14:xfrm>
+          </p:contentPart>
+        </mc:Choice>
+        <mc:Fallback>
+          <p:pic>
+            <p:nvPicPr>
+              <p:cNvPr id="58" name="Ink 57">
+                <a:extLst>
+                  <a:ext uri="{FF2B5EF4-FFF2-40B4-BE49-F238E27FC236}">
+                    <a16:creationId xmlns:a16="http://schemas.microsoft.com/office/drawing/2014/main" id="{1072887D-F171-4A9D-8789-953481A5E5CC}"/>
+                  </a:ext>
+                </a:extLst>
+              </p:cNvPr>
+              <p:cNvPicPr/>
+              <p:nvPr/>
+            </p:nvPicPr>
+            <p:blipFill>
+              <a:blip r:embed="rId27"/>
+              <a:stretch>
+                <a:fillRect/>
+              </a:stretch>
+            </p:blipFill>
+            <p:spPr>
+              <a:xfrm>
+                <a:off x="8042872" y="852026"/>
+                <a:ext cx="80280" cy="195840"/>
+              </a:xfrm>
+              <a:prstGeom prst="rect">
+                <a:avLst/>
+              </a:prstGeom>
+            </p:spPr>
+          </p:pic>
+        </mc:Fallback>
+      </mc:AlternateContent>
+      <mc:AlternateContent xmlns:mc="http://schemas.openxmlformats.org/markup-compatibility/2006">
+        <mc:Choice xmlns:p14="http://schemas.microsoft.com/office/powerpoint/2010/main" Requires="p14">
+          <p:contentPart p14:bwMode="auto" r:id="rId28">
+            <p14:nvContentPartPr>
+              <p14:cNvPr id="59" name="Ink 58">
+                <a:extLst>
+                  <a:ext uri="{FF2B5EF4-FFF2-40B4-BE49-F238E27FC236}">
+                    <a16:creationId xmlns:a16="http://schemas.microsoft.com/office/drawing/2014/main" id="{68916BB1-CAC5-45DA-8630-DF9F6A69F130}"/>
+                  </a:ext>
+                </a:extLst>
+              </p14:cNvPr>
+              <p14:cNvContentPartPr/>
+              <p14:nvPr/>
+            </p14:nvContentPartPr>
+            <p14:xfrm>
+              <a:off x="8975272" y="843386"/>
+              <a:ext cx="44640" cy="151200"/>
+            </p14:xfrm>
+          </p:contentPart>
+        </mc:Choice>
+        <mc:Fallback>
+          <p:pic>
+            <p:nvPicPr>
+              <p:cNvPr id="59" name="Ink 58">
+                <a:extLst>
+                  <a:ext uri="{FF2B5EF4-FFF2-40B4-BE49-F238E27FC236}">
+                    <a16:creationId xmlns:a16="http://schemas.microsoft.com/office/drawing/2014/main" id="{68916BB1-CAC5-45DA-8630-DF9F6A69F130}"/>
+                  </a:ext>
+                </a:extLst>
+              </p:cNvPr>
+              <p:cNvPicPr/>
+              <p:nvPr/>
+            </p:nvPicPr>
+            <p:blipFill>
+              <a:blip r:embed="rId29"/>
+              <a:stretch>
+                <a:fillRect/>
+              </a:stretch>
+            </p:blipFill>
+            <p:spPr>
+              <a:xfrm>
+                <a:off x="8966272" y="834386"/>
+                <a:ext cx="62280" cy="168840"/>
+              </a:xfrm>
+              <a:prstGeom prst="rect">
+                <a:avLst/>
+              </a:prstGeom>
+            </p:spPr>
+          </p:pic>
+        </mc:Fallback>
+      </mc:AlternateContent>
+      <mc:AlternateContent xmlns:mc="http://schemas.openxmlformats.org/markup-compatibility/2006">
+        <mc:Choice xmlns:p14="http://schemas.microsoft.com/office/powerpoint/2010/main" Requires="p14">
+          <p:contentPart p14:bwMode="auto" r:id="rId30">
+            <p14:nvContentPartPr>
+              <p14:cNvPr id="60" name="Ink 59">
+                <a:extLst>
+                  <a:ext uri="{FF2B5EF4-FFF2-40B4-BE49-F238E27FC236}">
+                    <a16:creationId xmlns:a16="http://schemas.microsoft.com/office/drawing/2014/main" id="{B6CE9965-76D2-46F1-9C45-0C0DCFB0AE87}"/>
+                  </a:ext>
+                </a:extLst>
+              </p14:cNvPr>
+              <p14:cNvContentPartPr/>
+              <p14:nvPr/>
+            </p14:nvContentPartPr>
+            <p14:xfrm>
+              <a:off x="9168952" y="834386"/>
+              <a:ext cx="117360" cy="161640"/>
+            </p14:xfrm>
+          </p:contentPart>
+        </mc:Choice>
+        <mc:Fallback>
+          <p:pic>
+            <p:nvPicPr>
+              <p:cNvPr id="60" name="Ink 59">
+                <a:extLst>
+                  <a:ext uri="{FF2B5EF4-FFF2-40B4-BE49-F238E27FC236}">
+                    <a16:creationId xmlns:a16="http://schemas.microsoft.com/office/drawing/2014/main" id="{B6CE9965-76D2-46F1-9C45-0C0DCFB0AE87}"/>
+                  </a:ext>
+                </a:extLst>
+              </p:cNvPr>
+              <p:cNvPicPr/>
+              <p:nvPr/>
+            </p:nvPicPr>
+            <p:blipFill>
+              <a:blip r:embed="rId31"/>
+              <a:stretch>
+                <a:fillRect/>
+              </a:stretch>
+            </p:blipFill>
+            <p:spPr>
+              <a:xfrm>
+                <a:off x="9159952" y="825386"/>
+                <a:ext cx="135000" cy="179280"/>
+              </a:xfrm>
+              <a:prstGeom prst="rect">
+                <a:avLst/>
+              </a:prstGeom>
+            </p:spPr>
+          </p:pic>
+        </mc:Fallback>
+      </mc:AlternateContent>
+      <mc:AlternateContent xmlns:mc="http://schemas.openxmlformats.org/markup-compatibility/2006">
+        <mc:Choice xmlns:p14="http://schemas.microsoft.com/office/powerpoint/2010/main" Requires="p14">
+          <p:contentPart p14:bwMode="auto" r:id="rId32">
+            <p14:nvContentPartPr>
+              <p14:cNvPr id="61" name="Ink 60">
+                <a:extLst>
+                  <a:ext uri="{FF2B5EF4-FFF2-40B4-BE49-F238E27FC236}">
+                    <a16:creationId xmlns:a16="http://schemas.microsoft.com/office/drawing/2014/main" id="{ED05BDE6-ADC3-4117-B894-600D7898EC64}"/>
+                  </a:ext>
+                </a:extLst>
+              </p14:cNvPr>
+              <p14:cNvContentPartPr/>
+              <p14:nvPr/>
+            </p14:nvContentPartPr>
+            <p14:xfrm>
+              <a:off x="9410152" y="843386"/>
+              <a:ext cx="117720" cy="144720"/>
+            </p14:xfrm>
+          </p:contentPart>
+        </mc:Choice>
+        <mc:Fallback>
+          <p:pic>
+            <p:nvPicPr>
+              <p:cNvPr id="61" name="Ink 60">
+                <a:extLst>
+                  <a:ext uri="{FF2B5EF4-FFF2-40B4-BE49-F238E27FC236}">
+                    <a16:creationId xmlns:a16="http://schemas.microsoft.com/office/drawing/2014/main" id="{ED05BDE6-ADC3-4117-B894-600D7898EC64}"/>
+                  </a:ext>
+                </a:extLst>
+              </p:cNvPr>
+              <p:cNvPicPr/>
+              <p:nvPr/>
+            </p:nvPicPr>
+            <p:blipFill>
+              <a:blip r:embed="rId33"/>
+              <a:stretch>
+                <a:fillRect/>
+              </a:stretch>
+            </p:blipFill>
+            <p:spPr>
+              <a:xfrm>
+                <a:off x="9401152" y="834386"/>
+                <a:ext cx="135360" cy="162360"/>
+              </a:xfrm>
+              <a:prstGeom prst="rect">
+                <a:avLst/>
+              </a:prstGeom>
+            </p:spPr>
+          </p:pic>
+        </mc:Fallback>
+      </mc:AlternateContent>
+      <mc:AlternateContent xmlns:mc="http://schemas.openxmlformats.org/markup-compatibility/2006">
+        <mc:Choice xmlns:p14="http://schemas.microsoft.com/office/powerpoint/2010/main" Requires="p14">
+          <p:contentPart p14:bwMode="auto" r:id="rId34">
+            <p14:nvContentPartPr>
+              <p14:cNvPr id="68" name="Ink 67">
+                <a:extLst>
+                  <a:ext uri="{FF2B5EF4-FFF2-40B4-BE49-F238E27FC236}">
+                    <a16:creationId xmlns:a16="http://schemas.microsoft.com/office/drawing/2014/main" id="{2C264EBE-52FC-4696-90A5-3DA11AA4B017}"/>
+                  </a:ext>
+                </a:extLst>
+              </p14:cNvPr>
+              <p14:cNvContentPartPr/>
+              <p14:nvPr/>
+            </p14:nvContentPartPr>
+            <p14:xfrm>
+              <a:off x="8028112" y="1260626"/>
+              <a:ext cx="263880" cy="257760"/>
+            </p14:xfrm>
+          </p:contentPart>
+        </mc:Choice>
+        <mc:Fallback>
+          <p:pic>
+            <p:nvPicPr>
+              <p:cNvPr id="68" name="Ink 67">
+                <a:extLst>
+                  <a:ext uri="{FF2B5EF4-FFF2-40B4-BE49-F238E27FC236}">
+                    <a16:creationId xmlns:a16="http://schemas.microsoft.com/office/drawing/2014/main" id="{2C264EBE-52FC-4696-90A5-3DA11AA4B017}"/>
+                  </a:ext>
+                </a:extLst>
+              </p:cNvPr>
+              <p:cNvPicPr/>
+              <p:nvPr/>
+            </p:nvPicPr>
+            <p:blipFill>
+              <a:blip r:embed="rId35"/>
+              <a:stretch>
+                <a:fillRect/>
+              </a:stretch>
+            </p:blipFill>
+            <p:spPr>
+              <a:xfrm>
+                <a:off x="8019112" y="1251626"/>
+                <a:ext cx="281520" cy="275400"/>
+              </a:xfrm>
+              <a:prstGeom prst="rect">
+                <a:avLst/>
+              </a:prstGeom>
+            </p:spPr>
+          </p:pic>
+        </mc:Fallback>
+      </mc:AlternateContent>
+      <mc:AlternateContent xmlns:mc="http://schemas.openxmlformats.org/markup-compatibility/2006">
+        <mc:Choice xmlns:p14="http://schemas.microsoft.com/office/powerpoint/2010/main" Requires="p14">
+          <p:contentPart p14:bwMode="auto" r:id="rId36">
+            <p14:nvContentPartPr>
+              <p14:cNvPr id="69" name="Ink 68">
+                <a:extLst>
+                  <a:ext uri="{FF2B5EF4-FFF2-40B4-BE49-F238E27FC236}">
+                    <a16:creationId xmlns:a16="http://schemas.microsoft.com/office/drawing/2014/main" id="{402E3FEB-A08F-4FA4-9BA4-A7C2B3EEA131}"/>
+                  </a:ext>
+                </a:extLst>
+              </p14:cNvPr>
+              <p14:cNvContentPartPr/>
+              <p14:nvPr/>
+            </p14:nvContentPartPr>
+            <p14:xfrm>
+              <a:off x="8158432" y="1690466"/>
+              <a:ext cx="195840" cy="227520"/>
+            </p14:xfrm>
+          </p:contentPart>
+        </mc:Choice>
+        <mc:Fallback>
+          <p:pic>
+            <p:nvPicPr>
+              <p:cNvPr id="69" name="Ink 68">
+                <a:extLst>
+                  <a:ext uri="{FF2B5EF4-FFF2-40B4-BE49-F238E27FC236}">
+                    <a16:creationId xmlns:a16="http://schemas.microsoft.com/office/drawing/2014/main" id="{402E3FEB-A08F-4FA4-9BA4-A7C2B3EEA131}"/>
+                  </a:ext>
+                </a:extLst>
+              </p:cNvPr>
+              <p:cNvPicPr/>
+              <p:nvPr/>
+            </p:nvPicPr>
+            <p:blipFill>
+              <a:blip r:embed="rId37"/>
+              <a:stretch>
+                <a:fillRect/>
+              </a:stretch>
+            </p:blipFill>
+            <p:spPr>
+              <a:xfrm>
+                <a:off x="8149432" y="1681466"/>
+                <a:ext cx="213480" cy="245160"/>
+              </a:xfrm>
+              <a:prstGeom prst="rect">
+                <a:avLst/>
+              </a:prstGeom>
+            </p:spPr>
+          </p:pic>
+        </mc:Fallback>
+      </mc:AlternateContent>
+      <mc:AlternateContent xmlns:mc="http://schemas.openxmlformats.org/markup-compatibility/2006">
+        <mc:Choice xmlns:p14="http://schemas.microsoft.com/office/powerpoint/2010/main" Requires="p14">
+          <p:contentPart p14:bwMode="auto" r:id="rId38">
+            <p14:nvContentPartPr>
+              <p14:cNvPr id="72" name="Ink 71">
+                <a:extLst>
+                  <a:ext uri="{FF2B5EF4-FFF2-40B4-BE49-F238E27FC236}">
+                    <a16:creationId xmlns:a16="http://schemas.microsoft.com/office/drawing/2014/main" id="{EAFA9FE7-F4C6-4D70-8FB5-441032A58BB0}"/>
+                  </a:ext>
+                </a:extLst>
+              </p14:cNvPr>
+              <p14:cNvContentPartPr/>
+              <p14:nvPr/>
+            </p14:nvContentPartPr>
+            <p14:xfrm>
+              <a:off x="9046192" y="1691186"/>
+              <a:ext cx="632880" cy="200160"/>
+            </p14:xfrm>
+          </p:contentPart>
+        </mc:Choice>
+        <mc:Fallback>
+          <p:pic>
+            <p:nvPicPr>
+              <p:cNvPr id="72" name="Ink 71">
+                <a:extLst>
+                  <a:ext uri="{FF2B5EF4-FFF2-40B4-BE49-F238E27FC236}">
+                    <a16:creationId xmlns:a16="http://schemas.microsoft.com/office/drawing/2014/main" id="{EAFA9FE7-F4C6-4D70-8FB5-441032A58BB0}"/>
+                  </a:ext>
+                </a:extLst>
+              </p:cNvPr>
+              <p:cNvPicPr/>
+              <p:nvPr/>
+            </p:nvPicPr>
+            <p:blipFill>
+              <a:blip r:embed="rId39"/>
+              <a:stretch>
+                <a:fillRect/>
+              </a:stretch>
+            </p:blipFill>
+            <p:spPr>
+              <a:xfrm>
+                <a:off x="9037192" y="1682186"/>
+                <a:ext cx="650520" cy="217800"/>
+              </a:xfrm>
+              <a:prstGeom prst="rect">
+                <a:avLst/>
+              </a:prstGeom>
+            </p:spPr>
+          </p:pic>
+        </mc:Fallback>
+      </mc:AlternateContent>
+      <mc:AlternateContent xmlns:mc="http://schemas.openxmlformats.org/markup-compatibility/2006">
+        <mc:Choice xmlns:p14="http://schemas.microsoft.com/office/powerpoint/2010/main" Requires="p14">
+          <p:contentPart p14:bwMode="auto" r:id="rId40">
+            <p14:nvContentPartPr>
+              <p14:cNvPr id="73" name="Ink 72">
+                <a:extLst>
+                  <a:ext uri="{FF2B5EF4-FFF2-40B4-BE49-F238E27FC236}">
+                    <a16:creationId xmlns:a16="http://schemas.microsoft.com/office/drawing/2014/main" id="{82827241-0C33-4802-8EA2-C9335B9F3D8F}"/>
+                  </a:ext>
+                </a:extLst>
+              </p14:cNvPr>
+              <p14:cNvContentPartPr/>
+              <p14:nvPr/>
+            </p14:nvContentPartPr>
+            <p14:xfrm>
+              <a:off x="8186152" y="2139386"/>
+              <a:ext cx="161280" cy="213480"/>
+            </p14:xfrm>
+          </p:contentPart>
+        </mc:Choice>
+        <mc:Fallback>
+          <p:pic>
+            <p:nvPicPr>
+              <p:cNvPr id="73" name="Ink 72">
+                <a:extLst>
+                  <a:ext uri="{FF2B5EF4-FFF2-40B4-BE49-F238E27FC236}">
+                    <a16:creationId xmlns:a16="http://schemas.microsoft.com/office/drawing/2014/main" id="{82827241-0C33-4802-8EA2-C9335B9F3D8F}"/>
+                  </a:ext>
+                </a:extLst>
+              </p:cNvPr>
+              <p:cNvPicPr/>
+              <p:nvPr/>
+            </p:nvPicPr>
+            <p:blipFill>
+              <a:blip r:embed="rId41"/>
+              <a:stretch>
+                <a:fillRect/>
+              </a:stretch>
+            </p:blipFill>
+            <p:spPr>
+              <a:xfrm>
+                <a:off x="8177152" y="2130386"/>
+                <a:ext cx="178920" cy="231120"/>
+              </a:xfrm>
+              <a:prstGeom prst="rect">
+                <a:avLst/>
+              </a:prstGeom>
+            </p:spPr>
+          </p:pic>
+        </mc:Fallback>
+      </mc:AlternateContent>
+      <mc:AlternateContent xmlns:mc="http://schemas.openxmlformats.org/markup-compatibility/2006">
+        <mc:Choice xmlns:p14="http://schemas.microsoft.com/office/powerpoint/2010/main" Requires="p14">
+          <p:contentPart p14:bwMode="auto" r:id="rId42">
+            <p14:nvContentPartPr>
+              <p14:cNvPr id="77" name="Ink 76">
+                <a:extLst>
+                  <a:ext uri="{FF2B5EF4-FFF2-40B4-BE49-F238E27FC236}">
+                    <a16:creationId xmlns:a16="http://schemas.microsoft.com/office/drawing/2014/main" id="{95E2CF1D-B7BA-4298-B22C-BC0BB6CB6EA7}"/>
+                  </a:ext>
+                </a:extLst>
+              </p14:cNvPr>
+              <p14:cNvContentPartPr/>
+              <p14:nvPr/>
+            </p14:nvContentPartPr>
+            <p14:xfrm>
+              <a:off x="8167432" y="2599826"/>
+              <a:ext cx="328680" cy="205920"/>
+            </p14:xfrm>
+          </p:contentPart>
+        </mc:Choice>
+        <mc:Fallback>
+          <p:pic>
+            <p:nvPicPr>
+              <p:cNvPr id="77" name="Ink 76">
+                <a:extLst>
+                  <a:ext uri="{FF2B5EF4-FFF2-40B4-BE49-F238E27FC236}">
+                    <a16:creationId xmlns:a16="http://schemas.microsoft.com/office/drawing/2014/main" id="{95E2CF1D-B7BA-4298-B22C-BC0BB6CB6EA7}"/>
+                  </a:ext>
+                </a:extLst>
+              </p:cNvPr>
+              <p:cNvPicPr/>
+              <p:nvPr/>
+            </p:nvPicPr>
+            <p:blipFill>
+              <a:blip r:embed="rId43"/>
+              <a:stretch>
+                <a:fillRect/>
+              </a:stretch>
+            </p:blipFill>
+            <p:spPr>
+              <a:xfrm>
+                <a:off x="8158432" y="2590826"/>
+                <a:ext cx="346320" cy="223560"/>
+              </a:xfrm>
+              <a:prstGeom prst="rect">
+                <a:avLst/>
+              </a:prstGeom>
+            </p:spPr>
+          </p:pic>
+        </mc:Fallback>
+      </mc:AlternateContent>
+      <mc:AlternateContent xmlns:mc="http://schemas.openxmlformats.org/markup-compatibility/2006">
+        <mc:Choice xmlns:p14="http://schemas.microsoft.com/office/powerpoint/2010/main" Requires="p14">
+          <p:contentPart p14:bwMode="auto" r:id="rId44">
+            <p14:nvContentPartPr>
+              <p14:cNvPr id="78" name="Ink 77">
+                <a:extLst>
+                  <a:ext uri="{FF2B5EF4-FFF2-40B4-BE49-F238E27FC236}">
+                    <a16:creationId xmlns:a16="http://schemas.microsoft.com/office/drawing/2014/main" id="{96F66FAF-4BFB-47A4-A50B-66CB776128B9}"/>
+                  </a:ext>
+                </a:extLst>
+              </p14:cNvPr>
+              <p14:cNvContentPartPr/>
+              <p14:nvPr/>
+            </p14:nvContentPartPr>
+            <p14:xfrm>
+              <a:off x="9090832" y="2538986"/>
+              <a:ext cx="80280" cy="231120"/>
+            </p14:xfrm>
+          </p:contentPart>
+        </mc:Choice>
+        <mc:Fallback>
+          <p:pic>
+            <p:nvPicPr>
+              <p:cNvPr id="78" name="Ink 77">
+                <a:extLst>
+                  <a:ext uri="{FF2B5EF4-FFF2-40B4-BE49-F238E27FC236}">
+                    <a16:creationId xmlns:a16="http://schemas.microsoft.com/office/drawing/2014/main" id="{96F66FAF-4BFB-47A4-A50B-66CB776128B9}"/>
+                  </a:ext>
+                </a:extLst>
+              </p:cNvPr>
+              <p:cNvPicPr/>
+              <p:nvPr/>
+            </p:nvPicPr>
+            <p:blipFill>
+              <a:blip r:embed="rId45"/>
+              <a:stretch>
+                <a:fillRect/>
+              </a:stretch>
+            </p:blipFill>
+            <p:spPr>
+              <a:xfrm>
+                <a:off x="9081832" y="2529986"/>
+                <a:ext cx="97920" cy="248760"/>
+              </a:xfrm>
+              <a:prstGeom prst="rect">
+                <a:avLst/>
+              </a:prstGeom>
+            </p:spPr>
+          </p:pic>
+        </mc:Fallback>
+      </mc:AlternateContent>
+      <mc:AlternateContent xmlns:mc="http://schemas.openxmlformats.org/markup-compatibility/2006">
+        <mc:Choice xmlns:p14="http://schemas.microsoft.com/office/powerpoint/2010/main" Requires="p14">
+          <p:contentPart p14:bwMode="auto" r:id="rId46">
+            <p14:nvContentPartPr>
+              <p14:cNvPr id="81" name="Ink 80">
+                <a:extLst>
+                  <a:ext uri="{FF2B5EF4-FFF2-40B4-BE49-F238E27FC236}">
+                    <a16:creationId xmlns:a16="http://schemas.microsoft.com/office/drawing/2014/main" id="{43876D90-5FD7-46FB-BA2A-4364D993FDC9}"/>
+                  </a:ext>
+                </a:extLst>
+              </p14:cNvPr>
+              <p14:cNvContentPartPr/>
+              <p14:nvPr/>
+            </p14:nvContentPartPr>
+            <p14:xfrm>
+              <a:off x="9306112" y="2554826"/>
+              <a:ext cx="477000" cy="197640"/>
+            </p14:xfrm>
+          </p:contentPart>
+        </mc:Choice>
+        <mc:Fallback>
+          <p:pic>
+            <p:nvPicPr>
+              <p:cNvPr id="81" name="Ink 80">
+                <a:extLst>
+                  <a:ext uri="{FF2B5EF4-FFF2-40B4-BE49-F238E27FC236}">
+                    <a16:creationId xmlns:a16="http://schemas.microsoft.com/office/drawing/2014/main" id="{43876D90-5FD7-46FB-BA2A-4364D993FDC9}"/>
+                  </a:ext>
+                </a:extLst>
+              </p:cNvPr>
+              <p:cNvPicPr/>
+              <p:nvPr/>
+            </p:nvPicPr>
+            <p:blipFill>
+              <a:blip r:embed="rId47"/>
+              <a:stretch>
+                <a:fillRect/>
+              </a:stretch>
+            </p:blipFill>
+            <p:spPr>
+              <a:xfrm>
+                <a:off x="9297112" y="2545826"/>
+                <a:ext cx="494640" cy="215280"/>
+              </a:xfrm>
+              <a:prstGeom prst="rect">
+                <a:avLst/>
+              </a:prstGeom>
+            </p:spPr>
+          </p:pic>
+        </mc:Fallback>
+      </mc:AlternateContent>
+      <mc:AlternateContent xmlns:mc="http://schemas.openxmlformats.org/markup-compatibility/2006">
+        <mc:Choice xmlns:p14="http://schemas.microsoft.com/office/powerpoint/2010/main" Requires="p14">
+          <p:contentPart p14:bwMode="auto" r:id="rId48">
+            <p14:nvContentPartPr>
+              <p14:cNvPr id="89" name="Ink 88">
+                <a:extLst>
+                  <a:ext uri="{FF2B5EF4-FFF2-40B4-BE49-F238E27FC236}">
+                    <a16:creationId xmlns:a16="http://schemas.microsoft.com/office/drawing/2014/main" id="{CCB13266-DDA6-4512-A7F1-7AD53287474A}"/>
+                  </a:ext>
+                </a:extLst>
+              </p14:cNvPr>
+              <p14:cNvContentPartPr/>
+              <p14:nvPr/>
+            </p14:nvContentPartPr>
+            <p14:xfrm>
+              <a:off x="8247352" y="3122906"/>
+              <a:ext cx="279000" cy="224280"/>
+            </p14:xfrm>
+          </p:contentPart>
+        </mc:Choice>
+        <mc:Fallback>
+          <p:pic>
+            <p:nvPicPr>
+              <p:cNvPr id="89" name="Ink 88">
+                <a:extLst>
+                  <a:ext uri="{FF2B5EF4-FFF2-40B4-BE49-F238E27FC236}">
+                    <a16:creationId xmlns:a16="http://schemas.microsoft.com/office/drawing/2014/main" id="{CCB13266-DDA6-4512-A7F1-7AD53287474A}"/>
+                  </a:ext>
+                </a:extLst>
+              </p:cNvPr>
+              <p:cNvPicPr/>
+              <p:nvPr/>
+            </p:nvPicPr>
+            <p:blipFill>
+              <a:blip r:embed="rId49"/>
+              <a:stretch>
+                <a:fillRect/>
+              </a:stretch>
+            </p:blipFill>
+            <p:spPr>
+              <a:xfrm>
+                <a:off x="8238352" y="3113906"/>
+                <a:ext cx="296640" cy="241920"/>
+              </a:xfrm>
+              <a:prstGeom prst="rect">
+                <a:avLst/>
+              </a:prstGeom>
+            </p:spPr>
+          </p:pic>
+        </mc:Fallback>
+      </mc:AlternateContent>
+      <mc:AlternateContent xmlns:mc="http://schemas.openxmlformats.org/markup-compatibility/2006">
+        <mc:Choice xmlns:p14="http://schemas.microsoft.com/office/powerpoint/2010/main" Requires="p14">
+          <p:contentPart p14:bwMode="auto" r:id="rId50">
+            <p14:nvContentPartPr>
+              <p14:cNvPr id="90" name="Ink 89">
+                <a:extLst>
+                  <a:ext uri="{FF2B5EF4-FFF2-40B4-BE49-F238E27FC236}">
+                    <a16:creationId xmlns:a16="http://schemas.microsoft.com/office/drawing/2014/main" id="{32ED561C-8308-437D-AD95-294E817FC9D9}"/>
+                  </a:ext>
+                </a:extLst>
+              </p14:cNvPr>
+              <p14:cNvContentPartPr/>
+              <p14:nvPr/>
+            </p14:nvContentPartPr>
+            <p14:xfrm>
+              <a:off x="9197392" y="2990426"/>
+              <a:ext cx="293040" cy="174600"/>
+            </p14:xfrm>
+          </p:contentPart>
+        </mc:Choice>
+        <mc:Fallback>
+          <p:pic>
+            <p:nvPicPr>
+              <p:cNvPr id="90" name="Ink 89">
+                <a:extLst>
+                  <a:ext uri="{FF2B5EF4-FFF2-40B4-BE49-F238E27FC236}">
+                    <a16:creationId xmlns:a16="http://schemas.microsoft.com/office/drawing/2014/main" id="{32ED561C-8308-437D-AD95-294E817FC9D9}"/>
+                  </a:ext>
+                </a:extLst>
+              </p:cNvPr>
+              <p:cNvPicPr/>
+              <p:nvPr/>
+            </p:nvPicPr>
+            <p:blipFill>
+              <a:blip r:embed="rId51"/>
+              <a:stretch>
+                <a:fillRect/>
+              </a:stretch>
+            </p:blipFill>
+            <p:spPr>
+              <a:xfrm>
+                <a:off x="9188392" y="2981426"/>
+                <a:ext cx="310680" cy="192240"/>
+              </a:xfrm>
+              <a:prstGeom prst="rect">
+                <a:avLst/>
+              </a:prstGeom>
+            </p:spPr>
+          </p:pic>
+        </mc:Fallback>
+      </mc:AlternateContent>
+      <mc:AlternateContent xmlns:mc="http://schemas.openxmlformats.org/markup-compatibility/2006">
+        <mc:Choice xmlns:p14="http://schemas.microsoft.com/office/powerpoint/2010/main" Requires="p14">
+          <p:contentPart p14:bwMode="auto" r:id="rId52">
+            <p14:nvContentPartPr>
+              <p14:cNvPr id="93" name="Ink 92">
+                <a:extLst>
+                  <a:ext uri="{FF2B5EF4-FFF2-40B4-BE49-F238E27FC236}">
+                    <a16:creationId xmlns:a16="http://schemas.microsoft.com/office/drawing/2014/main" id="{87AE906A-CBCE-47CF-9E3A-64723BE7BCC0}"/>
+                  </a:ext>
+                </a:extLst>
+              </p14:cNvPr>
+              <p14:cNvContentPartPr/>
+              <p14:nvPr/>
+            </p14:nvContentPartPr>
+            <p14:xfrm>
+              <a:off x="9623272" y="2947226"/>
+              <a:ext cx="435600" cy="223200"/>
+            </p14:xfrm>
+          </p:contentPart>
+        </mc:Choice>
+        <mc:Fallback>
+          <p:pic>
+            <p:nvPicPr>
+              <p:cNvPr id="93" name="Ink 92">
+                <a:extLst>
+                  <a:ext uri="{FF2B5EF4-FFF2-40B4-BE49-F238E27FC236}">
+                    <a16:creationId xmlns:a16="http://schemas.microsoft.com/office/drawing/2014/main" id="{87AE906A-CBCE-47CF-9E3A-64723BE7BCC0}"/>
+                  </a:ext>
+                </a:extLst>
+              </p:cNvPr>
+              <p:cNvPicPr/>
+              <p:nvPr/>
+            </p:nvPicPr>
+            <p:blipFill>
+              <a:blip r:embed="rId53"/>
+              <a:stretch>
+                <a:fillRect/>
+              </a:stretch>
+            </p:blipFill>
+            <p:spPr>
+              <a:xfrm>
+                <a:off x="9614272" y="2938226"/>
+                <a:ext cx="453240" cy="240840"/>
+              </a:xfrm>
+              <a:prstGeom prst="rect">
+                <a:avLst/>
+              </a:prstGeom>
+            </p:spPr>
+          </p:pic>
+        </mc:Fallback>
+      </mc:AlternateContent>
+      <mc:AlternateContent xmlns:mc="http://schemas.openxmlformats.org/markup-compatibility/2006">
+        <mc:Choice xmlns:p14="http://schemas.microsoft.com/office/powerpoint/2010/main" Requires="p14">
+          <p:contentPart p14:bwMode="auto" r:id="rId54">
+            <p14:nvContentPartPr>
+              <p14:cNvPr id="96" name="Ink 95">
+                <a:extLst>
+                  <a:ext uri="{FF2B5EF4-FFF2-40B4-BE49-F238E27FC236}">
+                    <a16:creationId xmlns:a16="http://schemas.microsoft.com/office/drawing/2014/main" id="{A15DD211-85AC-419D-A1F6-5D4B3DB5AB7D}"/>
+                  </a:ext>
+                </a:extLst>
+              </p14:cNvPr>
+              <p14:cNvContentPartPr/>
+              <p14:nvPr/>
+            </p14:nvContentPartPr>
+            <p14:xfrm>
+              <a:off x="8318992" y="3586586"/>
+              <a:ext cx="301680" cy="208800"/>
+            </p14:xfrm>
+          </p:contentPart>
+        </mc:Choice>
+        <mc:Fallback>
+          <p:pic>
+            <p:nvPicPr>
+              <p:cNvPr id="96" name="Ink 95">
+                <a:extLst>
+                  <a:ext uri="{FF2B5EF4-FFF2-40B4-BE49-F238E27FC236}">
+                    <a16:creationId xmlns:a16="http://schemas.microsoft.com/office/drawing/2014/main" id="{A15DD211-85AC-419D-A1F6-5D4B3DB5AB7D}"/>
+                  </a:ext>
+                </a:extLst>
+              </p:cNvPr>
+              <p:cNvPicPr/>
+              <p:nvPr/>
+            </p:nvPicPr>
+            <p:blipFill>
+              <a:blip r:embed="rId55"/>
+              <a:stretch>
+                <a:fillRect/>
+              </a:stretch>
+            </p:blipFill>
+            <p:spPr>
+              <a:xfrm>
+                <a:off x="8309992" y="3577586"/>
+                <a:ext cx="319320" cy="226440"/>
+              </a:xfrm>
+              <a:prstGeom prst="rect">
+                <a:avLst/>
+              </a:prstGeom>
+            </p:spPr>
+          </p:pic>
+        </mc:Fallback>
+      </mc:AlternateContent>
+      <mc:AlternateContent xmlns:mc="http://schemas.openxmlformats.org/markup-compatibility/2006">
+        <mc:Choice xmlns:p14="http://schemas.microsoft.com/office/powerpoint/2010/main" Requires="p14">
+          <p:contentPart p14:bwMode="auto" r:id="rId56">
+            <p14:nvContentPartPr>
+              <p14:cNvPr id="168" name="Ink 167">
+                <a:extLst>
+                  <a:ext uri="{FF2B5EF4-FFF2-40B4-BE49-F238E27FC236}">
+                    <a16:creationId xmlns:a16="http://schemas.microsoft.com/office/drawing/2014/main" id="{0E62FCDC-2555-4614-925A-5CFF26276A9A}"/>
+                  </a:ext>
+                </a:extLst>
+              </p14:cNvPr>
+              <p14:cNvContentPartPr/>
+              <p14:nvPr/>
+            </p14:nvContentPartPr>
+            <p14:xfrm>
+              <a:off x="1793272" y="2040746"/>
+              <a:ext cx="5879160" cy="3881160"/>
+            </p14:xfrm>
+          </p:contentPart>
+        </mc:Choice>
+        <mc:Fallback>
+          <p:pic>
+            <p:nvPicPr>
+              <p:cNvPr id="168" name="Ink 167">
+                <a:extLst>
+                  <a:ext uri="{FF2B5EF4-FFF2-40B4-BE49-F238E27FC236}">
+                    <a16:creationId xmlns:a16="http://schemas.microsoft.com/office/drawing/2014/main" id="{0E62FCDC-2555-4614-925A-5CFF26276A9A}"/>
+                  </a:ext>
+                </a:extLst>
+              </p:cNvPr>
+              <p:cNvPicPr/>
+              <p:nvPr/>
+            </p:nvPicPr>
+            <p:blipFill>
+              <a:blip r:embed="rId57"/>
+              <a:stretch>
+                <a:fillRect/>
+              </a:stretch>
+            </p:blipFill>
+            <p:spPr>
+              <a:xfrm>
+                <a:off x="1784272" y="2031746"/>
+                <a:ext cx="5896800" cy="3898800"/>
+              </a:xfrm>
+              <a:prstGeom prst="rect">
+                <a:avLst/>
+              </a:prstGeom>
+            </p:spPr>
+          </p:pic>
+        </mc:Fallback>
+      </mc:AlternateContent>
+      <mc:AlternateContent xmlns:mc="http://schemas.openxmlformats.org/markup-compatibility/2006">
+        <mc:Choice xmlns:p14="http://schemas.microsoft.com/office/powerpoint/2010/main" Requires="p14">
+          <p:contentPart p14:bwMode="auto" r:id="rId58">
+            <p14:nvContentPartPr>
+              <p14:cNvPr id="170" name="Ink 169">
+                <a:extLst>
+                  <a:ext uri="{FF2B5EF4-FFF2-40B4-BE49-F238E27FC236}">
+                    <a16:creationId xmlns:a16="http://schemas.microsoft.com/office/drawing/2014/main" id="{07C03D12-2DE1-4A06-B00C-D642BD189A21}"/>
+                  </a:ext>
+                </a:extLst>
+              </p14:cNvPr>
+              <p14:cNvContentPartPr/>
+              <p14:nvPr/>
+            </p14:nvContentPartPr>
+            <p14:xfrm>
+              <a:off x="9294952" y="3521786"/>
+              <a:ext cx="740160" cy="314640"/>
+            </p14:xfrm>
+          </p:contentPart>
+        </mc:Choice>
+        <mc:Fallback>
+          <p:pic>
+            <p:nvPicPr>
+              <p:cNvPr id="170" name="Ink 169">
+                <a:extLst>
+                  <a:ext uri="{FF2B5EF4-FFF2-40B4-BE49-F238E27FC236}">
+                    <a16:creationId xmlns:a16="http://schemas.microsoft.com/office/drawing/2014/main" id="{07C03D12-2DE1-4A06-B00C-D642BD189A21}"/>
+                  </a:ext>
+                </a:extLst>
+              </p:cNvPr>
+              <p:cNvPicPr/>
+              <p:nvPr/>
+            </p:nvPicPr>
+            <p:blipFill>
+              <a:blip r:embed="rId59"/>
+              <a:stretch>
+                <a:fillRect/>
+              </a:stretch>
+            </p:blipFill>
+            <p:spPr>
+              <a:xfrm>
+                <a:off x="9285952" y="3512786"/>
+                <a:ext cx="757800" cy="332280"/>
+              </a:xfrm>
+              <a:prstGeom prst="rect">
+                <a:avLst/>
+              </a:prstGeom>
+            </p:spPr>
+          </p:pic>
+        </mc:Fallback>
+      </mc:AlternateContent>
+      <mc:AlternateContent xmlns:mc="http://schemas.openxmlformats.org/markup-compatibility/2006">
+        <mc:Choice xmlns:p14="http://schemas.microsoft.com/office/powerpoint/2010/main" Requires="p14">
+          <p:contentPart p14:bwMode="auto" r:id="rId60">
+            <p14:nvContentPartPr>
+              <p14:cNvPr id="173" name="Ink 172">
+                <a:extLst>
+                  <a:ext uri="{FF2B5EF4-FFF2-40B4-BE49-F238E27FC236}">
+                    <a16:creationId xmlns:a16="http://schemas.microsoft.com/office/drawing/2014/main" id="{B592ED2D-73C0-4FA0-B8F5-908E62287FA0}"/>
+                  </a:ext>
+                </a:extLst>
+              </p14:cNvPr>
+              <p14:cNvContentPartPr/>
+              <p14:nvPr/>
+            </p14:nvContentPartPr>
+            <p14:xfrm>
+              <a:off x="8904352" y="1216346"/>
+              <a:ext cx="613080" cy="319680"/>
+            </p14:xfrm>
+          </p:contentPart>
+        </mc:Choice>
+        <mc:Fallback>
+          <p:pic>
+            <p:nvPicPr>
+              <p:cNvPr id="173" name="Ink 172">
+                <a:extLst>
+                  <a:ext uri="{FF2B5EF4-FFF2-40B4-BE49-F238E27FC236}">
+                    <a16:creationId xmlns:a16="http://schemas.microsoft.com/office/drawing/2014/main" id="{B592ED2D-73C0-4FA0-B8F5-908E62287FA0}"/>
+                  </a:ext>
+                </a:extLst>
+              </p:cNvPr>
+              <p:cNvPicPr/>
+              <p:nvPr/>
+            </p:nvPicPr>
+            <p:blipFill>
+              <a:blip r:embed="rId61"/>
+              <a:stretch>
+                <a:fillRect/>
+              </a:stretch>
+            </p:blipFill>
+            <p:spPr>
+              <a:xfrm>
+                <a:off x="8895352" y="1207346"/>
+                <a:ext cx="630720" cy="337320"/>
+              </a:xfrm>
+              <a:prstGeom prst="rect">
+                <a:avLst/>
+              </a:prstGeom>
+            </p:spPr>
+          </p:pic>
+        </mc:Fallback>
+      </mc:AlternateContent>
+      <mc:AlternateContent xmlns:mc="http://schemas.openxmlformats.org/markup-compatibility/2006">
+        <mc:Choice xmlns:p14="http://schemas.microsoft.com/office/powerpoint/2010/main" Requires="p14">
+          <p:contentPart p14:bwMode="auto" r:id="rId62">
+            <p14:nvContentPartPr>
+              <p14:cNvPr id="174" name="Ink 173">
+                <a:extLst>
+                  <a:ext uri="{FF2B5EF4-FFF2-40B4-BE49-F238E27FC236}">
+                    <a16:creationId xmlns:a16="http://schemas.microsoft.com/office/drawing/2014/main" id="{C7773C29-6BF4-4045-A738-BC4EB2B153D5}"/>
+                  </a:ext>
+                </a:extLst>
+              </p14:cNvPr>
+              <p14:cNvContentPartPr/>
+              <p14:nvPr/>
+            </p14:nvContentPartPr>
+            <p14:xfrm>
+              <a:off x="9000112" y="2085386"/>
+              <a:ext cx="765720" cy="316080"/>
+            </p14:xfrm>
+          </p:contentPart>
+        </mc:Choice>
+        <mc:Fallback>
+          <p:pic>
+            <p:nvPicPr>
+              <p:cNvPr id="174" name="Ink 173">
+                <a:extLst>
+                  <a:ext uri="{FF2B5EF4-FFF2-40B4-BE49-F238E27FC236}">
+                    <a16:creationId xmlns:a16="http://schemas.microsoft.com/office/drawing/2014/main" id="{C7773C29-6BF4-4045-A738-BC4EB2B153D5}"/>
+                  </a:ext>
+                </a:extLst>
+              </p:cNvPr>
+              <p:cNvPicPr/>
+              <p:nvPr/>
+            </p:nvPicPr>
+            <p:blipFill>
+              <a:blip r:embed="rId63"/>
+              <a:stretch>
+                <a:fillRect/>
+              </a:stretch>
+            </p:blipFill>
+            <p:spPr>
+              <a:xfrm>
+                <a:off x="8991112" y="2076386"/>
+                <a:ext cx="783360" cy="333720"/>
+              </a:xfrm>
+              <a:prstGeom prst="rect">
+                <a:avLst/>
+              </a:prstGeom>
+            </p:spPr>
+          </p:pic>
+        </mc:Fallback>
+      </mc:AlternateContent>
+      <mc:AlternateContent xmlns:mc="http://schemas.openxmlformats.org/markup-compatibility/2006">
+        <mc:Choice xmlns:p14="http://schemas.microsoft.com/office/powerpoint/2010/main" Requires="p14">
+          <p:contentPart p14:bwMode="auto" r:id="rId64">
+            <p14:nvContentPartPr>
+              <p14:cNvPr id="177" name="Ink 176">
+                <a:extLst>
+                  <a:ext uri="{FF2B5EF4-FFF2-40B4-BE49-F238E27FC236}">
+                    <a16:creationId xmlns:a16="http://schemas.microsoft.com/office/drawing/2014/main" id="{E9B7669A-78D5-41B0-BAB7-7FD8FA400883}"/>
+                  </a:ext>
+                </a:extLst>
+              </p14:cNvPr>
+              <p14:cNvContentPartPr/>
+              <p14:nvPr/>
+            </p14:nvContentPartPr>
+            <p14:xfrm>
+              <a:off x="8673592" y="4163666"/>
+              <a:ext cx="328680" cy="435240"/>
+            </p14:xfrm>
+          </p:contentPart>
+        </mc:Choice>
+        <mc:Fallback>
+          <p:pic>
+            <p:nvPicPr>
+              <p:cNvPr id="177" name="Ink 176">
+                <a:extLst>
+                  <a:ext uri="{FF2B5EF4-FFF2-40B4-BE49-F238E27FC236}">
+                    <a16:creationId xmlns:a16="http://schemas.microsoft.com/office/drawing/2014/main" id="{E9B7669A-78D5-41B0-BAB7-7FD8FA400883}"/>
+                  </a:ext>
+                </a:extLst>
+              </p:cNvPr>
+              <p:cNvPicPr/>
+              <p:nvPr/>
+            </p:nvPicPr>
+            <p:blipFill>
+              <a:blip r:embed="rId65"/>
+              <a:stretch>
+                <a:fillRect/>
+              </a:stretch>
+            </p:blipFill>
+            <p:spPr>
+              <a:xfrm>
+                <a:off x="8664592" y="4154666"/>
+                <a:ext cx="346320" cy="452880"/>
+              </a:xfrm>
+              <a:prstGeom prst="rect">
+                <a:avLst/>
+              </a:prstGeom>
+            </p:spPr>
+          </p:pic>
+        </mc:Fallback>
+      </mc:AlternateContent>
+      <mc:AlternateContent xmlns:mc="http://schemas.openxmlformats.org/markup-compatibility/2006">
+        <mc:Choice xmlns:p14="http://schemas.microsoft.com/office/powerpoint/2010/main" Requires="p14">
+          <p:contentPart p14:bwMode="auto" r:id="rId66">
+            <p14:nvContentPartPr>
+              <p14:cNvPr id="183" name="Ink 182">
+                <a:extLst>
+                  <a:ext uri="{FF2B5EF4-FFF2-40B4-BE49-F238E27FC236}">
+                    <a16:creationId xmlns:a16="http://schemas.microsoft.com/office/drawing/2014/main" id="{3EF5E4AD-B144-418A-96D8-633420AA9BA9}"/>
+                  </a:ext>
+                </a:extLst>
+              </p14:cNvPr>
+              <p14:cNvContentPartPr/>
+              <p14:nvPr/>
+            </p14:nvContentPartPr>
+            <p14:xfrm>
+              <a:off x="8309632" y="4687466"/>
+              <a:ext cx="960120" cy="444240"/>
+            </p14:xfrm>
+          </p:contentPart>
+        </mc:Choice>
+        <mc:Fallback>
+          <p:pic>
+            <p:nvPicPr>
+              <p:cNvPr id="183" name="Ink 182">
+                <a:extLst>
+                  <a:ext uri="{FF2B5EF4-FFF2-40B4-BE49-F238E27FC236}">
+                    <a16:creationId xmlns:a16="http://schemas.microsoft.com/office/drawing/2014/main" id="{3EF5E4AD-B144-418A-96D8-633420AA9BA9}"/>
+                  </a:ext>
+                </a:extLst>
+              </p:cNvPr>
+              <p:cNvPicPr/>
+              <p:nvPr/>
+            </p:nvPicPr>
+            <p:blipFill>
+              <a:blip r:embed="rId67"/>
+              <a:stretch>
+                <a:fillRect/>
+              </a:stretch>
+            </p:blipFill>
+            <p:spPr>
+              <a:xfrm>
+                <a:off x="8300632" y="4678466"/>
+                <a:ext cx="977760" cy="461880"/>
+              </a:xfrm>
+              <a:prstGeom prst="rect">
+                <a:avLst/>
+              </a:prstGeom>
+            </p:spPr>
+          </p:pic>
+        </mc:Fallback>
+      </mc:AlternateContent>
+      <mc:AlternateContent xmlns:mc="http://schemas.openxmlformats.org/markup-compatibility/2006">
+        <mc:Choice xmlns:p14="http://schemas.microsoft.com/office/powerpoint/2010/main" Requires="p14">
+          <p:contentPart p14:bwMode="auto" r:id="rId68">
+            <p14:nvContentPartPr>
+              <p14:cNvPr id="194" name="Ink 193">
+                <a:extLst>
+                  <a:ext uri="{FF2B5EF4-FFF2-40B4-BE49-F238E27FC236}">
+                    <a16:creationId xmlns:a16="http://schemas.microsoft.com/office/drawing/2014/main" id="{0508DABD-90C0-4273-9F47-57D1496A5D32}"/>
+                  </a:ext>
+                </a:extLst>
+              </p14:cNvPr>
+              <p14:cNvContentPartPr/>
+              <p14:nvPr/>
+            </p14:nvContentPartPr>
+            <p14:xfrm>
+              <a:off x="9534712" y="4446986"/>
+              <a:ext cx="2050560" cy="1128600"/>
+            </p14:xfrm>
+          </p:contentPart>
+        </mc:Choice>
+        <mc:Fallback>
+          <p:pic>
+            <p:nvPicPr>
+              <p:cNvPr id="194" name="Ink 193">
+                <a:extLst>
+                  <a:ext uri="{FF2B5EF4-FFF2-40B4-BE49-F238E27FC236}">
+                    <a16:creationId xmlns:a16="http://schemas.microsoft.com/office/drawing/2014/main" id="{0508DABD-90C0-4273-9F47-57D1496A5D32}"/>
+                  </a:ext>
+                </a:extLst>
+              </p:cNvPr>
+              <p:cNvPicPr/>
+              <p:nvPr/>
+            </p:nvPicPr>
+            <p:blipFill>
+              <a:blip r:embed="rId69"/>
+              <a:stretch>
+                <a:fillRect/>
+              </a:stretch>
+            </p:blipFill>
+            <p:spPr>
+              <a:xfrm>
+                <a:off x="9525712" y="4437986"/>
+                <a:ext cx="2068200" cy="1146240"/>
+              </a:xfrm>
+              <a:prstGeom prst="rect">
+                <a:avLst/>
+              </a:prstGeom>
+            </p:spPr>
+          </p:pic>
+        </mc:Fallback>
+      </mc:AlternateContent>
     </p:spTree>
     <p:extLst>
       <p:ext uri="{BB962C8B-B14F-4D97-AF65-F5344CB8AC3E}">

</xml_diff>